<commit_message>
Added animations to initial presentation - updated log file
</commit_message>
<xml_diff>
--- a/presentations/20151113 Initial presentation/WebRTC_Initial.pptx
+++ b/presentations/20151113 Initial presentation/WebRTC_Initial.pptx
@@ -5,7 +5,7 @@
     <p:sldMasterId id="2147483648" r:id="rId1"/>
   </p:sldMasterIdLst>
   <p:notesMasterIdLst>
-    <p:notesMasterId r:id="rId9"/>
+    <p:notesMasterId r:id="rId10"/>
   </p:notesMasterIdLst>
   <p:sldIdLst>
     <p:sldId id="263" r:id="rId2"/>
@@ -14,7 +14,8 @@
     <p:sldId id="270" r:id="rId5"/>
     <p:sldId id="272" r:id="rId6"/>
     <p:sldId id="273" r:id="rId7"/>
-    <p:sldId id="269" r:id="rId8"/>
+    <p:sldId id="274" r:id="rId8"/>
+    <p:sldId id="269" r:id="rId9"/>
   </p:sldIdLst>
   <p:sldSz cx="9144000" cy="6858000" type="screen4x3"/>
   <p:notesSz cx="6858000" cy="9144000"/>
@@ -115,7 +116,7 @@
   </p:defaultTextStyle>
   <p:extLst>
     <p:ext uri="{EFAFB233-063F-42B5-8137-9DF3F51BA10A}">
-      <p15:sldGuideLst xmlns:p15="http://schemas.microsoft.com/office/powerpoint/2012/main">
+      <p15:sldGuideLst xmlns:p15="http://schemas.microsoft.com/office/powerpoint/2012/main" xmlns="">
         <p15:guide id="1" orient="horz" pos="1002">
           <p15:clr>
             <a:srgbClr val="A4A3A4"/>
@@ -2041,6 +2042,137 @@
             </a:pPr>
             <a:r>
               <a:rPr lang="de-AT" b="0" baseline="0" dirty="0" smtClean="0"/>
+              <a:t>As </a:t>
+            </a:r>
+            <a:r>
+              <a:rPr lang="de-AT" b="0" baseline="0" dirty="0" err="1" smtClean="0"/>
+              <a:t>long</a:t>
+            </a:r>
+            <a:r>
+              <a:rPr lang="de-AT" b="0" baseline="0" dirty="0" smtClean="0"/>
+              <a:t> </a:t>
+            </a:r>
+            <a:r>
+              <a:rPr lang="de-AT" b="0" baseline="0" dirty="0" err="1" smtClean="0"/>
+              <a:t>as</a:t>
+            </a:r>
+            <a:r>
+              <a:rPr lang="de-AT" b="0" baseline="0" dirty="0" smtClean="0"/>
+              <a:t> </a:t>
+            </a:r>
+            <a:r>
+              <a:rPr lang="de-AT" b="0" baseline="0" dirty="0" err="1" smtClean="0"/>
+              <a:t>it‘s</a:t>
+            </a:r>
+            <a:r>
+              <a:rPr lang="de-AT" b="0" baseline="0" dirty="0" smtClean="0"/>
+              <a:t> </a:t>
+            </a:r>
+            <a:r>
+              <a:rPr lang="de-AT" b="0" baseline="0" dirty="0" err="1" smtClean="0"/>
+              <a:t>only</a:t>
+            </a:r>
+            <a:r>
+              <a:rPr lang="de-AT" b="0" baseline="0" dirty="0" smtClean="0"/>
+              <a:t> </a:t>
+            </a:r>
+            <a:r>
+              <a:rPr lang="de-AT" b="0" baseline="0" dirty="0" err="1" smtClean="0"/>
+              <a:t>two</a:t>
+            </a:r>
+            <a:r>
+              <a:rPr lang="de-AT" b="0" baseline="0" dirty="0" smtClean="0"/>
+              <a:t> </a:t>
+            </a:r>
+            <a:r>
+              <a:rPr lang="de-AT" b="0" baseline="0" dirty="0" err="1" smtClean="0"/>
+              <a:t>parties</a:t>
+            </a:r>
+            <a:r>
+              <a:rPr lang="de-AT" b="0" baseline="0" dirty="0" smtClean="0"/>
+              <a:t>, </a:t>
+            </a:r>
+            <a:r>
+              <a:rPr lang="de-AT" b="0" baseline="0" dirty="0" err="1" smtClean="0"/>
+              <a:t>it‘s</a:t>
+            </a:r>
+            <a:r>
+              <a:rPr lang="de-AT" b="0" baseline="0" dirty="0" smtClean="0"/>
+              <a:t> </a:t>
+            </a:r>
+            <a:r>
+              <a:rPr lang="de-AT" b="0" baseline="0" dirty="0" err="1" smtClean="0"/>
+              <a:t>really</a:t>
+            </a:r>
+            <a:r>
+              <a:rPr lang="de-AT" b="0" baseline="0" dirty="0" smtClean="0"/>
+              <a:t> simple, but </a:t>
+            </a:r>
+            <a:r>
+              <a:rPr lang="de-AT" b="0" baseline="0" dirty="0" err="1" smtClean="0"/>
+              <a:t>from</a:t>
+            </a:r>
+            <a:r>
+              <a:rPr lang="de-AT" b="0" baseline="0" dirty="0" smtClean="0"/>
+              <a:t> </a:t>
+            </a:r>
+            <a:r>
+              <a:rPr lang="de-AT" b="0" baseline="0" dirty="0" err="1" smtClean="0"/>
+              <a:t>then</a:t>
+            </a:r>
+            <a:r>
+              <a:rPr lang="de-AT" b="0" baseline="0" dirty="0" smtClean="0"/>
+              <a:t> </a:t>
+            </a:r>
+            <a:r>
+              <a:rPr lang="de-AT" b="0" baseline="0" dirty="0" err="1" smtClean="0"/>
+              <a:t>it</a:t>
+            </a:r>
+            <a:r>
+              <a:rPr lang="de-AT" b="0" baseline="0" dirty="0" smtClean="0"/>
+              <a:t> </a:t>
+            </a:r>
+            <a:r>
+              <a:rPr lang="de-AT" b="0" baseline="0" dirty="0" err="1" smtClean="0"/>
+              <a:t>gets</a:t>
+            </a:r>
+            <a:r>
+              <a:rPr lang="de-AT" b="0" baseline="0" dirty="0" smtClean="0"/>
+              <a:t> </a:t>
+            </a:r>
+            <a:r>
+              <a:rPr lang="de-AT" b="0" baseline="0" dirty="0" err="1" smtClean="0"/>
+              <a:t>complicated</a:t>
+            </a:r>
+            <a:r>
+              <a:rPr lang="de-AT" b="0" baseline="0" dirty="0" smtClean="0"/>
+              <a:t>. An MCU </a:t>
+            </a:r>
+            <a:r>
+              <a:rPr lang="de-AT" b="0" baseline="0" dirty="0" err="1" smtClean="0"/>
+              <a:t>is</a:t>
+            </a:r>
+            <a:r>
+              <a:rPr lang="de-AT" b="0" baseline="0" dirty="0" smtClean="0"/>
+              <a:t> </a:t>
+            </a:r>
+            <a:r>
+              <a:rPr lang="de-AT" b="0" baseline="0" dirty="0" err="1" smtClean="0"/>
+              <a:t>needed</a:t>
+            </a:r>
+            <a:r>
+              <a:rPr lang="de-AT" b="0" baseline="0" dirty="0" smtClean="0"/>
+              <a:t>.</a:t>
+            </a:r>
+            <a:endParaRPr lang="de-AT" b="0" baseline="0" dirty="0" smtClean="0"/>
+          </a:p>
+          <a:p>
+            <a:pPr marL="171450" indent="-171450">
+              <a:buFont typeface="Arial" panose="020B0604020202020204" pitchFamily="34" charset="0"/>
+              <a:buChar char="•"/>
+            </a:pPr>
+            <a:r>
+              <a:rPr lang="de-AT" b="0" baseline="0" dirty="0" smtClean="0"/>
               <a:t>Browser </a:t>
             </a:r>
             <a:r>
@@ -2256,6 +2388,90 @@
     <p:extLst>
       <p:ext uri="{BB962C8B-B14F-4D97-AF65-F5344CB8AC3E}">
         <p14:creationId xmlns:p14="http://schemas.microsoft.com/office/powerpoint/2010/main" val="337208470"/>
+      </p:ext>
+    </p:extLst>
+  </p:cSld>
+  <p:clrMapOvr>
+    <a:masterClrMapping/>
+  </p:clrMapOvr>
+</p:notes>
+</file>
+
+<file path=ppt/notesSlides/notesSlide5.xml><?xml version="1.0" encoding="utf-8"?>
+<p:notes xmlns:a="http://schemas.openxmlformats.org/drawingml/2006/main" xmlns:r="http://schemas.openxmlformats.org/officeDocument/2006/relationships" xmlns:p="http://schemas.openxmlformats.org/presentationml/2006/main">
+  <p:cSld>
+    <p:spTree>
+      <p:nvGrpSpPr>
+        <p:cNvPr id="1" name=""/>
+        <p:cNvGrpSpPr/>
+        <p:nvPr/>
+      </p:nvGrpSpPr>
+      <p:grpSpPr>
+        <a:xfrm>
+          <a:off x="0" y="0"/>
+          <a:ext cx="0" cy="0"/>
+          <a:chOff x="0" y="0"/>
+          <a:chExt cx="0" cy="0"/>
+        </a:xfrm>
+      </p:grpSpPr>
+      <p:sp>
+        <p:nvSpPr>
+          <p:cNvPr id="2" name="Folienbildplatzhalter 1"/>
+          <p:cNvSpPr>
+            <a:spLocks noGrp="1" noRot="1" noChangeAspect="1"/>
+          </p:cNvSpPr>
+          <p:nvPr>
+            <p:ph type="sldImg"/>
+          </p:nvPr>
+        </p:nvSpPr>
+        <p:spPr/>
+      </p:sp>
+      <p:sp>
+        <p:nvSpPr>
+          <p:cNvPr id="3" name="Notizenplatzhalter 2"/>
+          <p:cNvSpPr>
+            <a:spLocks noGrp="1"/>
+          </p:cNvSpPr>
+          <p:nvPr>
+            <p:ph type="body" idx="1"/>
+          </p:nvPr>
+        </p:nvSpPr>
+        <p:spPr/>
+        <p:txBody>
+          <a:bodyPr/>
+          <a:lstStyle/>
+          <a:p>
+            <a:endParaRPr lang="de-AT" dirty="0"/>
+          </a:p>
+        </p:txBody>
+      </p:sp>
+      <p:sp>
+        <p:nvSpPr>
+          <p:cNvPr id="4" name="Foliennummernplatzhalter 3"/>
+          <p:cNvSpPr>
+            <a:spLocks noGrp="1"/>
+          </p:cNvSpPr>
+          <p:nvPr>
+            <p:ph type="sldNum" sz="quarter" idx="10"/>
+          </p:nvPr>
+        </p:nvSpPr>
+        <p:spPr/>
+        <p:txBody>
+          <a:bodyPr/>
+          <a:lstStyle/>
+          <a:p>
+            <a:fld id="{2AFEA223-4F50-4DD6-9CC4-15E4F51256E0}" type="slidenum">
+              <a:rPr lang="de-AT" smtClean="0"/>
+              <a:t>6</a:t>
+            </a:fld>
+            <a:endParaRPr lang="de-AT"/>
+          </a:p>
+        </p:txBody>
+      </p:sp>
+    </p:spTree>
+    <p:extLst>
+      <p:ext uri="{BB962C8B-B14F-4D97-AF65-F5344CB8AC3E}">
+        <p14:creationId xmlns:p14="http://schemas.microsoft.com/office/powerpoint/2010/main" val="3113798683"/>
       </p:ext>
     </p:extLst>
   </p:cSld>
@@ -5452,11 +5668,6 @@
               </a:rPr>
               <a:t>hesis I / Project Work II</a:t>
             </a:r>
-            <a:endParaRPr lang="de-DE" sz="4000" dirty="0" smtClean="0">
-              <a:solidFill>
-                <a:schemeClr val="bg1"/>
-              </a:solidFill>
-            </a:endParaRPr>
           </a:p>
           <a:p>
             <a:endParaRPr lang="de-DE" sz="4000" b="1" dirty="0" smtClean="0">
@@ -5630,7 +5841,83 @@
   <p:timing>
     <p:tnLst>
       <p:par>
-        <p:cTn id="1" dur="indefinite" restart="never" nodeType="tmRoot"/>
+        <p:cTn id="1" dur="indefinite" restart="never" nodeType="tmRoot">
+          <p:childTnLst>
+            <p:seq concurrent="1" nextAc="seek">
+              <p:cTn id="2" dur="indefinite" nodeType="mainSeq">
+                <p:childTnLst>
+                  <p:par>
+                    <p:cTn id="3" fill="hold">
+                      <p:stCondLst>
+                        <p:cond delay="indefinite"/>
+                      </p:stCondLst>
+                      <p:childTnLst>
+                        <p:par>
+                          <p:cTn id="4" fill="hold">
+                            <p:stCondLst>
+                              <p:cond delay="0"/>
+                            </p:stCondLst>
+                            <p:childTnLst>
+                              <p:par>
+                                <p:cTn id="5" presetID="10" presetClass="entr" presetSubtype="0" fill="hold" nodeType="clickEffect">
+                                  <p:stCondLst>
+                                    <p:cond delay="0"/>
+                                  </p:stCondLst>
+                                  <p:childTnLst>
+                                    <p:set>
+                                      <p:cBhvr>
+                                        <p:cTn id="6" dur="1" fill="hold">
+                                          <p:stCondLst>
+                                            <p:cond delay="0"/>
+                                          </p:stCondLst>
+                                        </p:cTn>
+                                        <p:tgtEl>
+                                          <p:spTgt spid="1028"/>
+                                        </p:tgtEl>
+                                        <p:attrNameLst>
+                                          <p:attrName>style.visibility</p:attrName>
+                                        </p:attrNameLst>
+                                      </p:cBhvr>
+                                      <p:to>
+                                        <p:strVal val="visible"/>
+                                      </p:to>
+                                    </p:set>
+                                    <p:animEffect transition="in" filter="fade">
+                                      <p:cBhvr>
+                                        <p:cTn id="7" dur="500"/>
+                                        <p:tgtEl>
+                                          <p:spTgt spid="1028"/>
+                                        </p:tgtEl>
+                                      </p:cBhvr>
+                                    </p:animEffect>
+                                  </p:childTnLst>
+                                </p:cTn>
+                              </p:par>
+                            </p:childTnLst>
+                          </p:cTn>
+                        </p:par>
+                      </p:childTnLst>
+                    </p:cTn>
+                  </p:par>
+                </p:childTnLst>
+              </p:cTn>
+              <p:prevCondLst>
+                <p:cond evt="onPrev" delay="0">
+                  <p:tgtEl>
+                    <p:sldTgt/>
+                  </p:tgtEl>
+                </p:cond>
+              </p:prevCondLst>
+              <p:nextCondLst>
+                <p:cond evt="onNext" delay="0">
+                  <p:tgtEl>
+                    <p:sldTgt/>
+                  </p:tgtEl>
+                </p:cond>
+              </p:nextCondLst>
+            </p:seq>
+          </p:childTnLst>
+        </p:cTn>
       </p:par>
     </p:tnLst>
   </p:timing>
@@ -5990,6 +6277,47 @@
           </a:fontRef>
         </p:style>
       </p:cxnSp>
+      <p:pic>
+        <p:nvPicPr>
+          <p:cNvPr id="11" name="Picture 4" descr="http://www.telepresenceoptions.com/images/WebRTC_Logo.png"/>
+          <p:cNvPicPr>
+            <a:picLocks noChangeAspect="1" noChangeArrowheads="1"/>
+          </p:cNvPicPr>
+          <p:nvPr/>
+        </p:nvPicPr>
+        <p:blipFill>
+          <a:blip r:embed="rId5">
+            <a:extLst>
+              <a:ext uri="{28A0092B-C50C-407E-A947-70E740481C1C}">
+                <a14:useLocalDpi xmlns:a14="http://schemas.microsoft.com/office/drawing/2010/main" val="0"/>
+              </a:ext>
+            </a:extLst>
+          </a:blip>
+          <a:srcRect/>
+          <a:stretch>
+            <a:fillRect/>
+          </a:stretch>
+        </p:blipFill>
+        <p:spPr bwMode="auto">
+          <a:xfrm>
+            <a:off x="3727938" y="3489250"/>
+            <a:ext cx="1485832" cy="1040083"/>
+          </a:xfrm>
+          <a:prstGeom prst="rect">
+            <a:avLst/>
+          </a:prstGeom>
+          <a:noFill/>
+          <a:extLst>
+            <a:ext uri="{909E8E84-426E-40DD-AFC4-6F175D3DCCD1}">
+              <a14:hiddenFill xmlns:a14="http://schemas.microsoft.com/office/drawing/2010/main">
+                <a:solidFill>
+                  <a:srgbClr val="FFFFFF"/>
+                </a:solidFill>
+              </a14:hiddenFill>
+            </a:ext>
+          </a:extLst>
+        </p:spPr>
+      </p:pic>
     </p:spTree>
     <p:extLst>
       <p:ext uri="{BB962C8B-B14F-4D97-AF65-F5344CB8AC3E}">
@@ -6003,7 +6331,675 @@
   <p:timing>
     <p:tnLst>
       <p:par>
-        <p:cTn id="1" dur="indefinite" restart="never" nodeType="tmRoot"/>
+        <p:cTn id="1" dur="indefinite" restart="never" nodeType="tmRoot">
+          <p:childTnLst>
+            <p:seq concurrent="1" nextAc="seek">
+              <p:cTn id="2" dur="indefinite" nodeType="mainSeq">
+                <p:childTnLst>
+                  <p:par>
+                    <p:cTn id="3" fill="hold">
+                      <p:stCondLst>
+                        <p:cond delay="indefinite"/>
+                      </p:stCondLst>
+                      <p:childTnLst>
+                        <p:par>
+                          <p:cTn id="4" fill="hold">
+                            <p:stCondLst>
+                              <p:cond delay="0"/>
+                            </p:stCondLst>
+                            <p:childTnLst>
+                              <p:par>
+                                <p:cTn id="5" presetID="10" presetClass="entr" presetSubtype="0" fill="hold" nodeType="clickEffect">
+                                  <p:stCondLst>
+                                    <p:cond delay="0"/>
+                                  </p:stCondLst>
+                                  <p:childTnLst>
+                                    <p:set>
+                                      <p:cBhvr>
+                                        <p:cTn id="6" dur="1" fill="hold">
+                                          <p:stCondLst>
+                                            <p:cond delay="0"/>
+                                          </p:stCondLst>
+                                        </p:cTn>
+                                        <p:tgtEl>
+                                          <p:spTgt spid="2052"/>
+                                        </p:tgtEl>
+                                        <p:attrNameLst>
+                                          <p:attrName>style.visibility</p:attrName>
+                                        </p:attrNameLst>
+                                      </p:cBhvr>
+                                      <p:to>
+                                        <p:strVal val="visible"/>
+                                      </p:to>
+                                    </p:set>
+                                    <p:animEffect transition="in" filter="fade">
+                                      <p:cBhvr>
+                                        <p:cTn id="7" dur="500"/>
+                                        <p:tgtEl>
+                                          <p:spTgt spid="2052"/>
+                                        </p:tgtEl>
+                                      </p:cBhvr>
+                                    </p:animEffect>
+                                  </p:childTnLst>
+                                </p:cTn>
+                              </p:par>
+                            </p:childTnLst>
+                          </p:cTn>
+                        </p:par>
+                      </p:childTnLst>
+                    </p:cTn>
+                  </p:par>
+                  <p:par>
+                    <p:cTn id="8" fill="hold">
+                      <p:stCondLst>
+                        <p:cond delay="indefinite"/>
+                      </p:stCondLst>
+                      <p:childTnLst>
+                        <p:par>
+                          <p:cTn id="9" fill="hold">
+                            <p:stCondLst>
+                              <p:cond delay="0"/>
+                            </p:stCondLst>
+                            <p:childTnLst>
+                              <p:par>
+                                <p:cTn id="10" presetID="10" presetClass="entr" presetSubtype="0" fill="hold" nodeType="clickEffect">
+                                  <p:stCondLst>
+                                    <p:cond delay="0"/>
+                                  </p:stCondLst>
+                                  <p:childTnLst>
+                                    <p:set>
+                                      <p:cBhvr>
+                                        <p:cTn id="11" dur="1" fill="hold">
+                                          <p:stCondLst>
+                                            <p:cond delay="0"/>
+                                          </p:stCondLst>
+                                        </p:cTn>
+                                        <p:tgtEl>
+                                          <p:spTgt spid="5"/>
+                                        </p:tgtEl>
+                                        <p:attrNameLst>
+                                          <p:attrName>style.visibility</p:attrName>
+                                        </p:attrNameLst>
+                                      </p:cBhvr>
+                                      <p:to>
+                                        <p:strVal val="visible"/>
+                                      </p:to>
+                                    </p:set>
+                                    <p:animEffect transition="in" filter="fade">
+                                      <p:cBhvr>
+                                        <p:cTn id="12" dur="500"/>
+                                        <p:tgtEl>
+                                          <p:spTgt spid="5"/>
+                                        </p:tgtEl>
+                                      </p:cBhvr>
+                                    </p:animEffect>
+                                  </p:childTnLst>
+                                </p:cTn>
+                              </p:par>
+                            </p:childTnLst>
+                          </p:cTn>
+                        </p:par>
+                      </p:childTnLst>
+                    </p:cTn>
+                  </p:par>
+                  <p:par>
+                    <p:cTn id="13" fill="hold">
+                      <p:stCondLst>
+                        <p:cond delay="indefinite"/>
+                      </p:stCondLst>
+                      <p:childTnLst>
+                        <p:par>
+                          <p:cTn id="14" fill="hold">
+                            <p:stCondLst>
+                              <p:cond delay="0"/>
+                            </p:stCondLst>
+                            <p:childTnLst>
+                              <p:par>
+                                <p:cTn id="15" presetID="10" presetClass="entr" presetSubtype="0" fill="hold" nodeType="clickEffect">
+                                  <p:stCondLst>
+                                    <p:cond delay="0"/>
+                                  </p:stCondLst>
+                                  <p:childTnLst>
+                                    <p:set>
+                                      <p:cBhvr>
+                                        <p:cTn id="16" dur="1" fill="hold">
+                                          <p:stCondLst>
+                                            <p:cond delay="0"/>
+                                          </p:stCondLst>
+                                        </p:cTn>
+                                        <p:tgtEl>
+                                          <p:spTgt spid="2050"/>
+                                        </p:tgtEl>
+                                        <p:attrNameLst>
+                                          <p:attrName>style.visibility</p:attrName>
+                                        </p:attrNameLst>
+                                      </p:cBhvr>
+                                      <p:to>
+                                        <p:strVal val="visible"/>
+                                      </p:to>
+                                    </p:set>
+                                    <p:animEffect transition="in" filter="fade">
+                                      <p:cBhvr>
+                                        <p:cTn id="17" dur="500"/>
+                                        <p:tgtEl>
+                                          <p:spTgt spid="2050"/>
+                                        </p:tgtEl>
+                                      </p:cBhvr>
+                                    </p:animEffect>
+                                  </p:childTnLst>
+                                </p:cTn>
+                              </p:par>
+                            </p:childTnLst>
+                          </p:cTn>
+                        </p:par>
+                      </p:childTnLst>
+                    </p:cTn>
+                  </p:par>
+                  <p:par>
+                    <p:cTn id="18" fill="hold">
+                      <p:stCondLst>
+                        <p:cond delay="indefinite"/>
+                      </p:stCondLst>
+                      <p:childTnLst>
+                        <p:par>
+                          <p:cTn id="19" fill="hold">
+                            <p:stCondLst>
+                              <p:cond delay="0"/>
+                            </p:stCondLst>
+                            <p:childTnLst>
+                              <p:par>
+                                <p:cTn id="20" presetID="10" presetClass="entr" presetSubtype="0" fill="hold" nodeType="clickEffect">
+                                  <p:stCondLst>
+                                    <p:cond delay="0"/>
+                                  </p:stCondLst>
+                                  <p:childTnLst>
+                                    <p:set>
+                                      <p:cBhvr>
+                                        <p:cTn id="21" dur="1" fill="hold">
+                                          <p:stCondLst>
+                                            <p:cond delay="0"/>
+                                          </p:stCondLst>
+                                        </p:cTn>
+                                        <p:tgtEl>
+                                          <p:spTgt spid="3"/>
+                                        </p:tgtEl>
+                                        <p:attrNameLst>
+                                          <p:attrName>style.visibility</p:attrName>
+                                        </p:attrNameLst>
+                                      </p:cBhvr>
+                                      <p:to>
+                                        <p:strVal val="visible"/>
+                                      </p:to>
+                                    </p:set>
+                                    <p:animEffect transition="in" filter="fade">
+                                      <p:cBhvr>
+                                        <p:cTn id="22" dur="500"/>
+                                        <p:tgtEl>
+                                          <p:spTgt spid="3"/>
+                                        </p:tgtEl>
+                                      </p:cBhvr>
+                                    </p:animEffect>
+                                  </p:childTnLst>
+                                </p:cTn>
+                              </p:par>
+                              <p:par>
+                                <p:cTn id="23" presetID="10" presetClass="entr" presetSubtype="0" fill="hold" nodeType="withEffect">
+                                  <p:stCondLst>
+                                    <p:cond delay="0"/>
+                                  </p:stCondLst>
+                                  <p:childTnLst>
+                                    <p:set>
+                                      <p:cBhvr>
+                                        <p:cTn id="24" dur="1" fill="hold">
+                                          <p:stCondLst>
+                                            <p:cond delay="0"/>
+                                          </p:stCondLst>
+                                        </p:cTn>
+                                        <p:tgtEl>
+                                          <p:spTgt spid="7"/>
+                                        </p:tgtEl>
+                                        <p:attrNameLst>
+                                          <p:attrName>style.visibility</p:attrName>
+                                        </p:attrNameLst>
+                                      </p:cBhvr>
+                                      <p:to>
+                                        <p:strVal val="visible"/>
+                                      </p:to>
+                                    </p:set>
+                                    <p:animEffect transition="in" filter="fade">
+                                      <p:cBhvr>
+                                        <p:cTn id="25" dur="500"/>
+                                        <p:tgtEl>
+                                          <p:spTgt spid="7"/>
+                                        </p:tgtEl>
+                                      </p:cBhvr>
+                                    </p:animEffect>
+                                  </p:childTnLst>
+                                </p:cTn>
+                              </p:par>
+                            </p:childTnLst>
+                          </p:cTn>
+                        </p:par>
+                      </p:childTnLst>
+                    </p:cTn>
+                  </p:par>
+                  <p:par>
+                    <p:cTn id="26" fill="hold">
+                      <p:stCondLst>
+                        <p:cond delay="indefinite"/>
+                      </p:stCondLst>
+                      <p:childTnLst>
+                        <p:par>
+                          <p:cTn id="27" fill="hold">
+                            <p:stCondLst>
+                              <p:cond delay="0"/>
+                            </p:stCondLst>
+                            <p:childTnLst>
+                              <p:par>
+                                <p:cTn id="28" presetID="10" presetClass="entr" presetSubtype="0" fill="hold" nodeType="clickEffect">
+                                  <p:stCondLst>
+                                    <p:cond delay="0"/>
+                                  </p:stCondLst>
+                                  <p:childTnLst>
+                                    <p:set>
+                                      <p:cBhvr>
+                                        <p:cTn id="29" dur="1" fill="hold">
+                                          <p:stCondLst>
+                                            <p:cond delay="0"/>
+                                          </p:stCondLst>
+                                        </p:cTn>
+                                        <p:tgtEl>
+                                          <p:spTgt spid="10"/>
+                                        </p:tgtEl>
+                                        <p:attrNameLst>
+                                          <p:attrName>style.visibility</p:attrName>
+                                        </p:attrNameLst>
+                                      </p:cBhvr>
+                                      <p:to>
+                                        <p:strVal val="visible"/>
+                                      </p:to>
+                                    </p:set>
+                                    <p:animEffect transition="in" filter="fade">
+                                      <p:cBhvr>
+                                        <p:cTn id="30" dur="500"/>
+                                        <p:tgtEl>
+                                          <p:spTgt spid="10"/>
+                                        </p:tgtEl>
+                                      </p:cBhvr>
+                                    </p:animEffect>
+                                  </p:childTnLst>
+                                </p:cTn>
+                              </p:par>
+                              <p:par>
+                                <p:cTn id="31" presetID="10" presetClass="entr" presetSubtype="0" fill="hold" nodeType="withEffect">
+                                  <p:stCondLst>
+                                    <p:cond delay="0"/>
+                                  </p:stCondLst>
+                                  <p:childTnLst>
+                                    <p:set>
+                                      <p:cBhvr>
+                                        <p:cTn id="32" dur="1" fill="hold">
+                                          <p:stCondLst>
+                                            <p:cond delay="0"/>
+                                          </p:stCondLst>
+                                        </p:cTn>
+                                        <p:tgtEl>
+                                          <p:spTgt spid="12"/>
+                                        </p:tgtEl>
+                                        <p:attrNameLst>
+                                          <p:attrName>style.visibility</p:attrName>
+                                        </p:attrNameLst>
+                                      </p:cBhvr>
+                                      <p:to>
+                                        <p:strVal val="visible"/>
+                                      </p:to>
+                                    </p:set>
+                                    <p:animEffect transition="in" filter="fade">
+                                      <p:cBhvr>
+                                        <p:cTn id="33" dur="500"/>
+                                        <p:tgtEl>
+                                          <p:spTgt spid="12"/>
+                                        </p:tgtEl>
+                                      </p:cBhvr>
+                                    </p:animEffect>
+                                  </p:childTnLst>
+                                </p:cTn>
+                              </p:par>
+                            </p:childTnLst>
+                          </p:cTn>
+                        </p:par>
+                      </p:childTnLst>
+                    </p:cTn>
+                  </p:par>
+                  <p:par>
+                    <p:cTn id="34" fill="hold">
+                      <p:stCondLst>
+                        <p:cond delay="indefinite"/>
+                      </p:stCondLst>
+                      <p:childTnLst>
+                        <p:par>
+                          <p:cTn id="35" fill="hold">
+                            <p:stCondLst>
+                              <p:cond delay="0"/>
+                            </p:stCondLst>
+                            <p:childTnLst>
+                              <p:par>
+                                <p:cTn id="36" presetID="1" presetClass="entr" presetSubtype="0" fill="hold" nodeType="clickEffect">
+                                  <p:stCondLst>
+                                    <p:cond delay="0"/>
+                                  </p:stCondLst>
+                                  <p:childTnLst>
+                                    <p:set>
+                                      <p:cBhvr>
+                                        <p:cTn id="37" dur="1" fill="hold">
+                                          <p:stCondLst>
+                                            <p:cond delay="0"/>
+                                          </p:stCondLst>
+                                        </p:cTn>
+                                        <p:tgtEl>
+                                          <p:spTgt spid="11"/>
+                                        </p:tgtEl>
+                                        <p:attrNameLst>
+                                          <p:attrName>style.visibility</p:attrName>
+                                        </p:attrNameLst>
+                                      </p:cBhvr>
+                                      <p:to>
+                                        <p:strVal val="visible"/>
+                                      </p:to>
+                                    </p:set>
+                                  </p:childTnLst>
+                                </p:cTn>
+                              </p:par>
+                            </p:childTnLst>
+                          </p:cTn>
+                        </p:par>
+                      </p:childTnLst>
+                    </p:cTn>
+                  </p:par>
+                  <p:par>
+                    <p:cTn id="38" fill="hold">
+                      <p:stCondLst>
+                        <p:cond delay="indefinite"/>
+                      </p:stCondLst>
+                      <p:childTnLst>
+                        <p:par>
+                          <p:cTn id="39" fill="hold">
+                            <p:stCondLst>
+                              <p:cond delay="0"/>
+                            </p:stCondLst>
+                            <p:childTnLst>
+                              <p:par>
+                                <p:cTn id="40" presetID="1" presetClass="entr" presetSubtype="0" fill="hold" nodeType="clickEffect">
+                                  <p:stCondLst>
+                                    <p:cond delay="0"/>
+                                  </p:stCondLst>
+                                  <p:childTnLst>
+                                    <p:set>
+                                      <p:cBhvr>
+                                        <p:cTn id="41" dur="1" fill="hold">
+                                          <p:stCondLst>
+                                            <p:cond delay="0"/>
+                                          </p:stCondLst>
+                                        </p:cTn>
+                                        <p:tgtEl>
+                                          <p:spTgt spid="18"/>
+                                        </p:tgtEl>
+                                        <p:attrNameLst>
+                                          <p:attrName>style.visibility</p:attrName>
+                                        </p:attrNameLst>
+                                      </p:cBhvr>
+                                      <p:to>
+                                        <p:strVal val="visible"/>
+                                      </p:to>
+                                    </p:set>
+                                  </p:childTnLst>
+                                </p:cTn>
+                              </p:par>
+                              <p:par>
+                                <p:cTn id="42" presetID="1" presetClass="entr" presetSubtype="0" fill="hold" nodeType="withEffect">
+                                  <p:stCondLst>
+                                    <p:cond delay="0"/>
+                                  </p:stCondLst>
+                                  <p:childTnLst>
+                                    <p:set>
+                                      <p:cBhvr>
+                                        <p:cTn id="43" dur="1" fill="hold">
+                                          <p:stCondLst>
+                                            <p:cond delay="0"/>
+                                          </p:stCondLst>
+                                        </p:cTn>
+                                        <p:tgtEl>
+                                          <p:spTgt spid="20"/>
+                                        </p:tgtEl>
+                                        <p:attrNameLst>
+                                          <p:attrName>style.visibility</p:attrName>
+                                        </p:attrNameLst>
+                                      </p:cBhvr>
+                                      <p:to>
+                                        <p:strVal val="visible"/>
+                                      </p:to>
+                                    </p:set>
+                                  </p:childTnLst>
+                                </p:cTn>
+                              </p:par>
+                            </p:childTnLst>
+                          </p:cTn>
+                        </p:par>
+                      </p:childTnLst>
+                    </p:cTn>
+                  </p:par>
+                  <p:par>
+                    <p:cTn id="44" fill="hold">
+                      <p:stCondLst>
+                        <p:cond delay="indefinite"/>
+                      </p:stCondLst>
+                      <p:childTnLst>
+                        <p:par>
+                          <p:cTn id="45" fill="hold">
+                            <p:stCondLst>
+                              <p:cond delay="0"/>
+                            </p:stCondLst>
+                            <p:childTnLst>
+                              <p:par>
+                                <p:cTn id="46" presetID="10" presetClass="exit" presetSubtype="0" fill="hold" nodeType="clickEffect">
+                                  <p:stCondLst>
+                                    <p:cond delay="0"/>
+                                  </p:stCondLst>
+                                  <p:childTnLst>
+                                    <p:animEffect transition="out" filter="fade">
+                                      <p:cBhvr>
+                                        <p:cTn id="47" dur="500"/>
+                                        <p:tgtEl>
+                                          <p:spTgt spid="2050"/>
+                                        </p:tgtEl>
+                                      </p:cBhvr>
+                                    </p:animEffect>
+                                    <p:set>
+                                      <p:cBhvr>
+                                        <p:cTn id="48" dur="1" fill="hold">
+                                          <p:stCondLst>
+                                            <p:cond delay="499"/>
+                                          </p:stCondLst>
+                                        </p:cTn>
+                                        <p:tgtEl>
+                                          <p:spTgt spid="2050"/>
+                                        </p:tgtEl>
+                                        <p:attrNameLst>
+                                          <p:attrName>style.visibility</p:attrName>
+                                        </p:attrNameLst>
+                                      </p:cBhvr>
+                                      <p:to>
+                                        <p:strVal val="hidden"/>
+                                      </p:to>
+                                    </p:set>
+                                  </p:childTnLst>
+                                </p:cTn>
+                              </p:par>
+                              <p:par>
+                                <p:cTn id="49" presetID="10" presetClass="exit" presetSubtype="0" fill="hold" nodeType="withEffect">
+                                  <p:stCondLst>
+                                    <p:cond delay="0"/>
+                                  </p:stCondLst>
+                                  <p:childTnLst>
+                                    <p:animEffect transition="out" filter="fade">
+                                      <p:cBhvr>
+                                        <p:cTn id="50" dur="500"/>
+                                        <p:tgtEl>
+                                          <p:spTgt spid="3"/>
+                                        </p:tgtEl>
+                                      </p:cBhvr>
+                                    </p:animEffect>
+                                    <p:set>
+                                      <p:cBhvr>
+                                        <p:cTn id="51" dur="1" fill="hold">
+                                          <p:stCondLst>
+                                            <p:cond delay="499"/>
+                                          </p:stCondLst>
+                                        </p:cTn>
+                                        <p:tgtEl>
+                                          <p:spTgt spid="3"/>
+                                        </p:tgtEl>
+                                        <p:attrNameLst>
+                                          <p:attrName>style.visibility</p:attrName>
+                                        </p:attrNameLst>
+                                      </p:cBhvr>
+                                      <p:to>
+                                        <p:strVal val="hidden"/>
+                                      </p:to>
+                                    </p:set>
+                                  </p:childTnLst>
+                                </p:cTn>
+                              </p:par>
+                              <p:par>
+                                <p:cTn id="52" presetID="10" presetClass="exit" presetSubtype="0" fill="hold" nodeType="withEffect">
+                                  <p:stCondLst>
+                                    <p:cond delay="0"/>
+                                  </p:stCondLst>
+                                  <p:childTnLst>
+                                    <p:animEffect transition="out" filter="fade">
+                                      <p:cBhvr>
+                                        <p:cTn id="53" dur="500"/>
+                                        <p:tgtEl>
+                                          <p:spTgt spid="7"/>
+                                        </p:tgtEl>
+                                      </p:cBhvr>
+                                    </p:animEffect>
+                                    <p:set>
+                                      <p:cBhvr>
+                                        <p:cTn id="54" dur="1" fill="hold">
+                                          <p:stCondLst>
+                                            <p:cond delay="499"/>
+                                          </p:stCondLst>
+                                        </p:cTn>
+                                        <p:tgtEl>
+                                          <p:spTgt spid="7"/>
+                                        </p:tgtEl>
+                                        <p:attrNameLst>
+                                          <p:attrName>style.visibility</p:attrName>
+                                        </p:attrNameLst>
+                                      </p:cBhvr>
+                                      <p:to>
+                                        <p:strVal val="hidden"/>
+                                      </p:to>
+                                    </p:set>
+                                  </p:childTnLst>
+                                </p:cTn>
+                              </p:par>
+                              <p:par>
+                                <p:cTn id="55" presetID="10" presetClass="exit" presetSubtype="0" fill="hold" nodeType="withEffect">
+                                  <p:stCondLst>
+                                    <p:cond delay="0"/>
+                                  </p:stCondLst>
+                                  <p:childTnLst>
+                                    <p:animEffect transition="out" filter="fade">
+                                      <p:cBhvr>
+                                        <p:cTn id="56" dur="500"/>
+                                        <p:tgtEl>
+                                          <p:spTgt spid="10"/>
+                                        </p:tgtEl>
+                                      </p:cBhvr>
+                                    </p:animEffect>
+                                    <p:set>
+                                      <p:cBhvr>
+                                        <p:cTn id="57" dur="1" fill="hold">
+                                          <p:stCondLst>
+                                            <p:cond delay="499"/>
+                                          </p:stCondLst>
+                                        </p:cTn>
+                                        <p:tgtEl>
+                                          <p:spTgt spid="10"/>
+                                        </p:tgtEl>
+                                        <p:attrNameLst>
+                                          <p:attrName>style.visibility</p:attrName>
+                                        </p:attrNameLst>
+                                      </p:cBhvr>
+                                      <p:to>
+                                        <p:strVal val="hidden"/>
+                                      </p:to>
+                                    </p:set>
+                                  </p:childTnLst>
+                                </p:cTn>
+                              </p:par>
+                              <p:par>
+                                <p:cTn id="58" presetID="10" presetClass="exit" presetSubtype="0" fill="hold" nodeType="withEffect">
+                                  <p:stCondLst>
+                                    <p:cond delay="0"/>
+                                  </p:stCondLst>
+                                  <p:childTnLst>
+                                    <p:animEffect transition="out" filter="fade">
+                                      <p:cBhvr>
+                                        <p:cTn id="59" dur="500"/>
+                                        <p:tgtEl>
+                                          <p:spTgt spid="12"/>
+                                        </p:tgtEl>
+                                      </p:cBhvr>
+                                    </p:animEffect>
+                                    <p:set>
+                                      <p:cBhvr>
+                                        <p:cTn id="60" dur="1" fill="hold">
+                                          <p:stCondLst>
+                                            <p:cond delay="499"/>
+                                          </p:stCondLst>
+                                        </p:cTn>
+                                        <p:tgtEl>
+                                          <p:spTgt spid="12"/>
+                                        </p:tgtEl>
+                                        <p:attrNameLst>
+                                          <p:attrName>style.visibility</p:attrName>
+                                        </p:attrNameLst>
+                                      </p:cBhvr>
+                                      <p:to>
+                                        <p:strVal val="hidden"/>
+                                      </p:to>
+                                    </p:set>
+                                  </p:childTnLst>
+                                </p:cTn>
+                              </p:par>
+                            </p:childTnLst>
+                          </p:cTn>
+                        </p:par>
+                      </p:childTnLst>
+                    </p:cTn>
+                  </p:par>
+                </p:childTnLst>
+              </p:cTn>
+              <p:prevCondLst>
+                <p:cond evt="onPrev" delay="0">
+                  <p:tgtEl>
+                    <p:sldTgt/>
+                  </p:tgtEl>
+                </p:cond>
+              </p:prevCondLst>
+              <p:nextCondLst>
+                <p:cond evt="onNext" delay="0">
+                  <p:tgtEl>
+                    <p:sldTgt/>
+                  </p:tgtEl>
+                </p:cond>
+              </p:nextCondLst>
+            </p:seq>
+          </p:childTnLst>
+        </p:cTn>
       </p:par>
     </p:tnLst>
   </p:timing>
@@ -6163,7 +7159,136 @@
   <p:timing>
     <p:tnLst>
       <p:par>
-        <p:cTn id="1" dur="indefinite" restart="never" nodeType="tmRoot"/>
+        <p:cTn id="1" dur="indefinite" restart="never" nodeType="tmRoot">
+          <p:childTnLst>
+            <p:seq concurrent="1" nextAc="seek">
+              <p:cTn id="2" dur="indefinite" nodeType="mainSeq">
+                <p:childTnLst>
+                  <p:par>
+                    <p:cTn id="3" fill="hold">
+                      <p:stCondLst>
+                        <p:cond delay="indefinite"/>
+                      </p:stCondLst>
+                      <p:childTnLst>
+                        <p:par>
+                          <p:cTn id="4" fill="hold">
+                            <p:stCondLst>
+                              <p:cond delay="0"/>
+                            </p:stCondLst>
+                            <p:childTnLst>
+                              <p:par>
+                                <p:cTn id="5" presetID="10" presetClass="entr" presetSubtype="0" fill="hold" nodeType="clickEffect">
+                                  <p:stCondLst>
+                                    <p:cond delay="0"/>
+                                  </p:stCondLst>
+                                  <p:childTnLst>
+                                    <p:set>
+                                      <p:cBhvr>
+                                        <p:cTn id="6" dur="1" fill="hold">
+                                          <p:stCondLst>
+                                            <p:cond delay="0"/>
+                                          </p:stCondLst>
+                                        </p:cTn>
+                                        <p:tgtEl>
+                                          <p:spTgt spid="3074"/>
+                                        </p:tgtEl>
+                                        <p:attrNameLst>
+                                          <p:attrName>style.visibility</p:attrName>
+                                        </p:attrNameLst>
+                                      </p:cBhvr>
+                                      <p:to>
+                                        <p:strVal val="visible"/>
+                                      </p:to>
+                                    </p:set>
+                                    <p:animEffect transition="in" filter="fade">
+                                      <p:cBhvr>
+                                        <p:cTn id="7" dur="500"/>
+                                        <p:tgtEl>
+                                          <p:spTgt spid="3074"/>
+                                        </p:tgtEl>
+                                      </p:cBhvr>
+                                    </p:animEffect>
+                                  </p:childTnLst>
+                                </p:cTn>
+                              </p:par>
+                            </p:childTnLst>
+                          </p:cTn>
+                        </p:par>
+                      </p:childTnLst>
+                    </p:cTn>
+                  </p:par>
+                  <p:par>
+                    <p:cTn id="8" fill="hold">
+                      <p:stCondLst>
+                        <p:cond delay="indefinite"/>
+                      </p:stCondLst>
+                      <p:childTnLst>
+                        <p:par>
+                          <p:cTn id="9" fill="hold">
+                            <p:stCondLst>
+                              <p:cond delay="0"/>
+                            </p:stCondLst>
+                            <p:childTnLst>
+                              <p:par>
+                                <p:cTn id="10" presetID="10" presetClass="entr" presetSubtype="0" fill="hold" nodeType="clickEffect">
+                                  <p:stCondLst>
+                                    <p:cond delay="0"/>
+                                  </p:stCondLst>
+                                  <p:childTnLst>
+                                    <p:set>
+                                      <p:cBhvr>
+                                        <p:cTn id="11" dur="1" fill="hold">
+                                          <p:stCondLst>
+                                            <p:cond delay="0"/>
+                                          </p:stCondLst>
+                                        </p:cTn>
+                                        <p:tgtEl>
+                                          <p:spTgt spid="3076"/>
+                                        </p:tgtEl>
+                                        <p:attrNameLst>
+                                          <p:attrName>style.visibility</p:attrName>
+                                        </p:attrNameLst>
+                                      </p:cBhvr>
+                                      <p:to>
+                                        <p:strVal val="visible"/>
+                                      </p:to>
+                                    </p:set>
+                                    <p:animEffect transition="in" filter="fade">
+                                      <p:cBhvr>
+                                        <p:cTn id="12" dur="500"/>
+                                        <p:tgtEl>
+                                          <p:spTgt spid="3076"/>
+                                        </p:tgtEl>
+                                      </p:cBhvr>
+                                    </p:animEffect>
+                                  </p:childTnLst>
+                                </p:cTn>
+                              </p:par>
+                            </p:childTnLst>
+                          </p:cTn>
+                        </p:par>
+                      </p:childTnLst>
+                    </p:cTn>
+                  </p:par>
+                </p:childTnLst>
+              </p:cTn>
+              <p:prevCondLst>
+                <p:cond evt="onPrev" delay="0">
+                  <p:tgtEl>
+                    <p:sldTgt/>
+                  </p:tgtEl>
+                </p:cond>
+              </p:prevCondLst>
+              <p:nextCondLst>
+                <p:cond evt="onNext" delay="0">
+                  <p:tgtEl>
+                    <p:sldTgt/>
+                  </p:tgtEl>
+                </p:cond>
+              </p:nextCondLst>
+            </p:seq>
+          </p:childTnLst>
+        </p:cTn>
       </p:par>
     </p:tnLst>
   </p:timing>
@@ -6292,39 +7417,72 @@
       </p:grpSpPr>
       <p:sp>
         <p:nvSpPr>
-          <p:cNvPr id="2" name="Titel 1"/>
-          <p:cNvSpPr>
-            <a:spLocks noGrp="1"/>
-          </p:cNvSpPr>
-          <p:nvPr>
-            <p:ph type="title"/>
-          </p:nvPr>
-        </p:nvSpPr>
-        <p:spPr/>
-        <p:txBody>
-          <a:bodyPr/>
+          <p:cNvPr id="4" name="Textfeld 3"/>
+          <p:cNvSpPr txBox="1"/>
+          <p:nvPr/>
+        </p:nvSpPr>
+        <p:spPr>
+          <a:xfrm>
+            <a:off x="0" y="1314447"/>
+            <a:ext cx="9144000" cy="830997"/>
+          </a:xfrm>
+          <a:prstGeom prst="rect">
+            <a:avLst/>
+          </a:prstGeom>
+          <a:noFill/>
+        </p:spPr>
+        <p:txBody>
+          <a:bodyPr wrap="square" rtlCol="0">
+            <a:spAutoFit/>
+          </a:bodyPr>
           <a:lstStyle/>
           <a:p>
-            <a:endParaRPr lang="de-AT"/>
-          </a:p>
-        </p:txBody>
-      </p:sp>
-      <p:sp>
-        <p:nvSpPr>
-          <p:cNvPr id="3" name="Inhaltsplatzhalter 2"/>
-          <p:cNvSpPr>
-            <a:spLocks noGrp="1"/>
-          </p:cNvSpPr>
-          <p:nvPr>
-            <p:ph idx="1"/>
-          </p:nvPr>
-        </p:nvSpPr>
-        <p:spPr/>
-        <p:txBody>
-          <a:bodyPr/>
-          <a:lstStyle/>
-          <a:p>
-            <a:endParaRPr lang="de-AT"/>
+            <a:pPr algn="ctr"/>
+            <a:r>
+              <a:rPr lang="de-AT" sz="4800" b="1" dirty="0">
+                <a:solidFill>
+                  <a:srgbClr val="76B82A"/>
+                </a:solidFill>
+              </a:rPr>
+              <a:t>R</a:t>
+            </a:r>
+            <a:r>
+              <a:rPr lang="de-AT" sz="4800" b="1" dirty="0" smtClean="0">
+                <a:solidFill>
+                  <a:srgbClr val="76B82A"/>
+                </a:solidFill>
+              </a:rPr>
+              <a:t>emote </a:t>
+            </a:r>
+            <a:r>
+              <a:rPr lang="de-AT" sz="4800" b="1" dirty="0" err="1" smtClean="0">
+                <a:solidFill>
+                  <a:srgbClr val="76B82A"/>
+                </a:solidFill>
+              </a:rPr>
+              <a:t>support</a:t>
+            </a:r>
+            <a:r>
+              <a:rPr lang="de-AT" sz="4800" b="1" dirty="0" smtClean="0">
+                <a:solidFill>
+                  <a:srgbClr val="76B82A"/>
+                </a:solidFill>
+              </a:rPr>
+              <a:t> </a:t>
+            </a:r>
+            <a:r>
+              <a:rPr lang="de-AT" sz="4800" b="1" dirty="0" err="1" smtClean="0">
+                <a:solidFill>
+                  <a:srgbClr val="76B82A"/>
+                </a:solidFill>
+              </a:rPr>
+              <a:t>application</a:t>
+            </a:r>
+            <a:endParaRPr lang="de-AT" sz="4800" b="1" dirty="0">
+              <a:solidFill>
+                <a:srgbClr val="76B82A"/>
+              </a:solidFill>
+            </a:endParaRPr>
           </a:p>
         </p:txBody>
       </p:sp>
@@ -6349,6 +7507,43 @@
 </file>
 
 <file path=ppt/slides/slide7.xml><?xml version="1.0" encoding="utf-8"?>
+<p:sld xmlns:a="http://schemas.openxmlformats.org/drawingml/2006/main" xmlns:r="http://schemas.openxmlformats.org/officeDocument/2006/relationships" xmlns:p="http://schemas.openxmlformats.org/presentationml/2006/main">
+  <p:cSld>
+    <p:spTree>
+      <p:nvGrpSpPr>
+        <p:cNvPr id="1" name=""/>
+        <p:cNvGrpSpPr/>
+        <p:nvPr/>
+      </p:nvGrpSpPr>
+      <p:grpSpPr>
+        <a:xfrm>
+          <a:off x="0" y="0"/>
+          <a:ext cx="0" cy="0"/>
+          <a:chOff x="0" y="0"/>
+          <a:chExt cx="0" cy="0"/>
+        </a:xfrm>
+      </p:grpSpPr>
+    </p:spTree>
+    <p:extLst>
+      <p:ext uri="{BB962C8B-B14F-4D97-AF65-F5344CB8AC3E}">
+        <p14:creationId xmlns:p14="http://schemas.microsoft.com/office/powerpoint/2010/main" val="586403055"/>
+      </p:ext>
+    </p:extLst>
+  </p:cSld>
+  <p:clrMapOvr>
+    <a:masterClrMapping/>
+  </p:clrMapOvr>
+  <p:timing>
+    <p:tnLst>
+      <p:par>
+        <p:cTn id="1" dur="indefinite" restart="never" nodeType="tmRoot"/>
+      </p:par>
+    </p:tnLst>
+  </p:timing>
+</p:sld>
+</file>
+
+<file path=ppt/slides/slide8.xml><?xml version="1.0" encoding="utf-8"?>
 <p:sld xmlns:a="http://schemas.openxmlformats.org/drawingml/2006/main" xmlns:r="http://schemas.openxmlformats.org/officeDocument/2006/relationships" xmlns:p="http://schemas.openxmlformats.org/presentationml/2006/main">
   <p:cSld>
     <p:spTree>

</xml_diff>

<commit_message>
Extended initial presentation - updated log file
</commit_message>
<xml_diff>
--- a/presentations/20151113 Initial presentation/WebRTC_Initial.pptx
+++ b/presentations/20151113 Initial presentation/WebRTC_Initial.pptx
@@ -116,7 +116,7 @@
   </p:defaultTextStyle>
   <p:extLst>
     <p:ext uri="{EFAFB233-063F-42B5-8137-9DF3F51BA10A}">
-      <p15:sldGuideLst xmlns:p15="http://schemas.microsoft.com/office/powerpoint/2012/main" xmlns="">
+      <p15:sldGuideLst xmlns:p15="http://schemas.microsoft.com/office/powerpoint/2012/main">
         <p15:guide id="1" orient="horz" pos="1002">
           <p15:clr>
             <a:srgbClr val="A4A3A4"/>
@@ -215,7 +215,7 @@
           <a:p>
             <a:fld id="{7A19BEE0-598C-4858-A439-753E34679212}" type="datetimeFigureOut">
               <a:rPr lang="de-AT" smtClean="0"/>
-              <a:t>06.11.2015</a:t>
+              <a:t>08.11.2015</a:t>
             </a:fld>
             <a:endParaRPr lang="de-AT"/>
           </a:p>
@@ -2164,7 +2164,6 @@
               <a:rPr lang="de-AT" b="0" baseline="0" dirty="0" smtClean="0"/>
               <a:t>.</a:t>
             </a:r>
-            <a:endParaRPr lang="de-AT" b="0" baseline="0" dirty="0" smtClean="0"/>
           </a:p>
           <a:p>
             <a:pPr marL="171450" indent="-171450">
@@ -2441,6 +2440,119 @@
           <a:bodyPr/>
           <a:lstStyle/>
           <a:p>
+            <a:r>
+              <a:rPr lang="de-AT" dirty="0" smtClean="0"/>
+              <a:t>Advantages:</a:t>
+            </a:r>
+          </a:p>
+          <a:p>
+            <a:pPr marL="171450" indent="-171450">
+              <a:buFont typeface="Arial" panose="020B0604020202020204" pitchFamily="34" charset="0"/>
+              <a:buChar char="•"/>
+            </a:pPr>
+            <a:r>
+              <a:rPr lang="de-AT" dirty="0" err="1" smtClean="0"/>
+              <a:t>Experts</a:t>
+            </a:r>
+            <a:r>
+              <a:rPr lang="de-AT" dirty="0" smtClean="0"/>
+              <a:t> </a:t>
+            </a:r>
+            <a:r>
+              <a:rPr lang="de-AT" dirty="0" err="1" smtClean="0"/>
+              <a:t>can</a:t>
+            </a:r>
+            <a:r>
+              <a:rPr lang="de-AT" dirty="0" smtClean="0"/>
+              <a:t> </a:t>
+            </a:r>
+            <a:r>
+              <a:rPr lang="de-AT" dirty="0" err="1" smtClean="0"/>
+              <a:t>consult</a:t>
+            </a:r>
+            <a:r>
+              <a:rPr lang="de-AT" dirty="0" smtClean="0"/>
+              <a:t> </a:t>
+            </a:r>
+            <a:r>
+              <a:rPr lang="de-AT" dirty="0" err="1" smtClean="0"/>
+              <a:t>without</a:t>
+            </a:r>
+            <a:r>
+              <a:rPr lang="de-AT" dirty="0" smtClean="0"/>
+              <a:t> </a:t>
+            </a:r>
+            <a:r>
+              <a:rPr lang="de-AT" dirty="0" err="1" smtClean="0"/>
+              <a:t>being</a:t>
+            </a:r>
+            <a:r>
+              <a:rPr lang="de-AT" dirty="0" smtClean="0"/>
+              <a:t> </a:t>
+            </a:r>
+            <a:r>
+              <a:rPr lang="de-AT" dirty="0" err="1" smtClean="0"/>
+              <a:t>physically</a:t>
+            </a:r>
+            <a:r>
+              <a:rPr lang="de-AT" dirty="0" smtClean="0"/>
+              <a:t> </a:t>
+            </a:r>
+            <a:r>
+              <a:rPr lang="de-AT" dirty="0" err="1" smtClean="0"/>
+              <a:t>there</a:t>
+            </a:r>
+            <a:endParaRPr lang="de-AT" dirty="0" smtClean="0"/>
+          </a:p>
+          <a:p>
+            <a:pPr marL="171450" indent="-171450">
+              <a:buFont typeface="Arial" panose="020B0604020202020204" pitchFamily="34" charset="0"/>
+              <a:buChar char="•"/>
+            </a:pPr>
+            <a:r>
+              <a:rPr lang="de-AT" dirty="0" err="1" smtClean="0"/>
+              <a:t>Malfunctions</a:t>
+            </a:r>
+            <a:r>
+              <a:rPr lang="de-AT" baseline="0" dirty="0" smtClean="0"/>
+              <a:t> </a:t>
+            </a:r>
+            <a:r>
+              <a:rPr lang="de-AT" baseline="0" dirty="0" err="1" smtClean="0"/>
+              <a:t>can</a:t>
+            </a:r>
+            <a:r>
+              <a:rPr lang="de-AT" baseline="0" dirty="0" smtClean="0"/>
+              <a:t> </a:t>
+            </a:r>
+            <a:r>
+              <a:rPr lang="de-AT" baseline="0" dirty="0" err="1" smtClean="0"/>
+              <a:t>be</a:t>
+            </a:r>
+            <a:r>
+              <a:rPr lang="de-AT" baseline="0" dirty="0" smtClean="0"/>
+              <a:t> </a:t>
+            </a:r>
+            <a:r>
+              <a:rPr lang="de-AT" baseline="0" dirty="0" err="1" smtClean="0"/>
+              <a:t>repaired</a:t>
+            </a:r>
+            <a:r>
+              <a:rPr lang="de-AT" baseline="0" dirty="0" smtClean="0"/>
+              <a:t> quicker, </a:t>
+            </a:r>
+            <a:r>
+              <a:rPr lang="de-AT" baseline="0" dirty="0" err="1" smtClean="0"/>
+              <a:t>by</a:t>
+            </a:r>
+            <a:r>
+              <a:rPr lang="de-AT" baseline="0" dirty="0" smtClean="0"/>
+              <a:t> on-site </a:t>
+            </a:r>
+            <a:r>
+              <a:rPr lang="de-AT" baseline="0" dirty="0" err="1" smtClean="0"/>
+              <a:t>personnel</a:t>
+            </a:r>
             <a:endParaRPr lang="de-AT" dirty="0"/>
           </a:p>
         </p:txBody>
@@ -2813,7 +2925,7 @@
           <a:p>
             <a:fld id="{BD334F44-700B-E44C-96AB-E83A6820DFD3}" type="datetimeFigureOut">
               <a:rPr lang="de-DE" smtClean="0"/>
-              <a:t>06.11.2015</a:t>
+              <a:t>08.11.2015</a:t>
             </a:fld>
             <a:endParaRPr lang="de-DE"/>
           </a:p>
@@ -2993,7 +3105,7 @@
           <a:p>
             <a:fld id="{BD334F44-700B-E44C-96AB-E83A6820DFD3}" type="datetimeFigureOut">
               <a:rPr lang="de-DE" smtClean="0"/>
-              <a:t>06.11.2015</a:t>
+              <a:t>08.11.2015</a:t>
             </a:fld>
             <a:endParaRPr lang="de-DE"/>
           </a:p>
@@ -3163,7 +3275,7 @@
           <a:p>
             <a:fld id="{BD334F44-700B-E44C-96AB-E83A6820DFD3}" type="datetimeFigureOut">
               <a:rPr lang="de-DE" smtClean="0"/>
-              <a:t>06.11.2015</a:t>
+              <a:t>08.11.2015</a:t>
             </a:fld>
             <a:endParaRPr lang="de-DE"/>
           </a:p>
@@ -3409,7 +3521,7 @@
           <a:p>
             <a:fld id="{BD334F44-700B-E44C-96AB-E83A6820DFD3}" type="datetimeFigureOut">
               <a:rPr lang="de-DE" smtClean="0"/>
-              <a:t>06.11.2015</a:t>
+              <a:t>08.11.2015</a:t>
             </a:fld>
             <a:endParaRPr lang="de-DE"/>
           </a:p>
@@ -3697,7 +3809,7 @@
           <a:p>
             <a:fld id="{BD334F44-700B-E44C-96AB-E83A6820DFD3}" type="datetimeFigureOut">
               <a:rPr lang="de-DE" smtClean="0"/>
-              <a:t>06.11.2015</a:t>
+              <a:t>08.11.2015</a:t>
             </a:fld>
             <a:endParaRPr lang="de-DE"/>
           </a:p>
@@ -4119,7 +4231,7 @@
           <a:p>
             <a:fld id="{BD334F44-700B-E44C-96AB-E83A6820DFD3}" type="datetimeFigureOut">
               <a:rPr lang="de-DE" smtClean="0"/>
-              <a:t>06.11.2015</a:t>
+              <a:t>08.11.2015</a:t>
             </a:fld>
             <a:endParaRPr lang="de-DE"/>
           </a:p>
@@ -4237,7 +4349,7 @@
           <a:p>
             <a:fld id="{BD334F44-700B-E44C-96AB-E83A6820DFD3}" type="datetimeFigureOut">
               <a:rPr lang="de-DE" smtClean="0"/>
-              <a:t>06.11.2015</a:t>
+              <a:t>08.11.2015</a:t>
             </a:fld>
             <a:endParaRPr lang="de-DE"/>
           </a:p>
@@ -4332,7 +4444,7 @@
           <a:p>
             <a:fld id="{BD334F44-700B-E44C-96AB-E83A6820DFD3}" type="datetimeFigureOut">
               <a:rPr lang="de-DE" smtClean="0"/>
-              <a:t>06.11.2015</a:t>
+              <a:t>08.11.2015</a:t>
             </a:fld>
             <a:endParaRPr lang="de-DE"/>
           </a:p>
@@ -4655,7 +4767,7 @@
           <a:p>
             <a:fld id="{BD334F44-700B-E44C-96AB-E83A6820DFD3}" type="datetimeFigureOut">
               <a:rPr lang="de-DE" smtClean="0"/>
-              <a:t>06.11.2015</a:t>
+              <a:t>08.11.2015</a:t>
             </a:fld>
             <a:endParaRPr lang="de-DE"/>
           </a:p>
@@ -4908,7 +5020,7 @@
           <a:p>
             <a:fld id="{BD334F44-700B-E44C-96AB-E83A6820DFD3}" type="datetimeFigureOut">
               <a:rPr lang="de-DE" smtClean="0"/>
-              <a:t>06.11.2015</a:t>
+              <a:t>08.11.2015</a:t>
             </a:fld>
             <a:endParaRPr lang="de-DE"/>
           </a:p>
@@ -5121,7 +5233,7 @@
           <a:p>
             <a:fld id="{BD334F44-700B-E44C-96AB-E83A6820DFD3}" type="datetimeFigureOut">
               <a:rPr lang="de-DE" smtClean="0"/>
-              <a:t>06.11.2015</a:t>
+              <a:t>08.11.2015</a:t>
             </a:fld>
             <a:endParaRPr lang="de-DE"/>
           </a:p>
@@ -7107,13 +7219,13 @@
       </p:pic>
       <p:pic>
         <p:nvPicPr>
-          <p:cNvPr id="3076" name="Picture 4" descr="https://encrypted-tbn2.gstatic.com/images?q=tbn:ANd9GcSltLuIWhkH720aN7r24-8mXyMwb5yO-B_dc1lHJCU3Ay6Rc8mXHQ"/>
+          <p:cNvPr id="2" name="Picture 2" descr="http://static.iconsplace.com/icons/preview/red/minus-2-256.png"/>
           <p:cNvPicPr>
             <a:picLocks noChangeAspect="1" noChangeArrowheads="1"/>
           </p:cNvPicPr>
           <p:nvPr/>
         </p:nvPicPr>
-        <p:blipFill>
+        <p:blipFill rotWithShape="1">
           <a:blip r:embed="rId5">
             <a:extLst>
               <a:ext uri="{28A0092B-C50C-407E-A947-70E740481C1C}">
@@ -7121,15 +7233,13 @@
               </a:ext>
             </a:extLst>
           </a:blip>
-          <a:srcRect/>
-          <a:stretch>
-            <a:fillRect/>
-          </a:stretch>
+          <a:srcRect l="5632" t="28204" r="7046" b="28403"/>
+          <a:stretch/>
         </p:blipFill>
         <p:spPr bwMode="auto">
           <a:xfrm>
-            <a:off x="3426312" y="4712642"/>
-            <a:ext cx="1851025" cy="1851025"/>
+            <a:off x="3012852" y="5024456"/>
+            <a:ext cx="2677944" cy="1330758"/>
           </a:xfrm>
           <a:prstGeom prst="rect">
             <a:avLst/>
@@ -7243,7 +7353,7 @@
                                           </p:stCondLst>
                                         </p:cTn>
                                         <p:tgtEl>
-                                          <p:spTgt spid="3076"/>
+                                          <p:spTgt spid="2"/>
                                         </p:tgtEl>
                                         <p:attrNameLst>
                                           <p:attrName>style.visibility</p:attrName>
@@ -7257,7 +7367,7 @@
                                       <p:cBhvr>
                                         <p:cTn id="12" dur="500"/>
                                         <p:tgtEl>
-                                          <p:spTgt spid="3076"/>
+                                          <p:spTgt spid="2"/>
                                         </p:tgtEl>
                                       </p:cBhvr>
                                     </p:animEffect>
@@ -7523,6 +7633,88 @@
           <a:chExt cx="0" cy="0"/>
         </a:xfrm>
       </p:grpSpPr>
+      <p:pic>
+        <p:nvPicPr>
+          <p:cNvPr id="2" name="Picture 2" descr="http://www.clipartbest.com/cliparts/eTM/kqd/eTMkqdRXc.png"/>
+          <p:cNvPicPr>
+            <a:picLocks noChangeAspect="1" noChangeArrowheads="1"/>
+          </p:cNvPicPr>
+          <p:nvPr/>
+        </p:nvPicPr>
+        <p:blipFill>
+          <a:blip r:embed="rId2">
+            <a:extLst>
+              <a:ext uri="{28A0092B-C50C-407E-A947-70E740481C1C}">
+                <a14:useLocalDpi xmlns:a14="http://schemas.microsoft.com/office/drawing/2010/main" val="0"/>
+              </a:ext>
+            </a:extLst>
+          </a:blip>
+          <a:srcRect/>
+          <a:stretch>
+            <a:fillRect/>
+          </a:stretch>
+        </p:blipFill>
+        <p:spPr bwMode="auto">
+          <a:xfrm>
+            <a:off x="454513" y="671146"/>
+            <a:ext cx="3743325" cy="3743325"/>
+          </a:xfrm>
+          <a:prstGeom prst="rect">
+            <a:avLst/>
+          </a:prstGeom>
+          <a:noFill/>
+          <a:extLst>
+            <a:ext uri="{909E8E84-426E-40DD-AFC4-6F175D3DCCD1}">
+              <a14:hiddenFill xmlns:a14="http://schemas.microsoft.com/office/drawing/2010/main">
+                <a:solidFill>
+                  <a:srgbClr val="FFFFFF"/>
+                </a:solidFill>
+              </a14:hiddenFill>
+            </a:ext>
+          </a:extLst>
+        </p:spPr>
+      </p:pic>
+      <p:pic>
+        <p:nvPicPr>
+          <p:cNvPr id="2050" name="Picture 2" descr="https://encrypted-tbn2.gstatic.com/images?q=tbn:ANd9GcTx8Q3WGGo5Iiao3-8jUzWoRzBySHgN43SB8-2XLWiHlmZ-YrKF"/>
+          <p:cNvPicPr>
+            <a:picLocks noChangeAspect="1" noChangeArrowheads="1"/>
+          </p:cNvPicPr>
+          <p:nvPr/>
+        </p:nvPicPr>
+        <p:blipFill>
+          <a:blip r:embed="rId3">
+            <a:extLst>
+              <a:ext uri="{28A0092B-C50C-407E-A947-70E740481C1C}">
+                <a14:useLocalDpi xmlns:a14="http://schemas.microsoft.com/office/drawing/2010/main" val="0"/>
+              </a:ext>
+            </a:extLst>
+          </a:blip>
+          <a:srcRect/>
+          <a:stretch>
+            <a:fillRect/>
+          </a:stretch>
+        </p:blipFill>
+        <p:spPr bwMode="auto">
+          <a:xfrm>
+            <a:off x="4622068" y="1392115"/>
+            <a:ext cx="3743325" cy="3743325"/>
+          </a:xfrm>
+          <a:prstGeom prst="rect">
+            <a:avLst/>
+          </a:prstGeom>
+          <a:noFill/>
+          <a:extLst>
+            <a:ext uri="{909E8E84-426E-40DD-AFC4-6F175D3DCCD1}">
+              <a14:hiddenFill xmlns:a14="http://schemas.microsoft.com/office/drawing/2010/main">
+                <a:solidFill>
+                  <a:srgbClr val="FFFFFF"/>
+                </a:solidFill>
+              </a14:hiddenFill>
+            </a:ext>
+          </a:extLst>
+        </p:spPr>
+      </p:pic>
     </p:spTree>
     <p:extLst>
       <p:ext uri="{BB962C8B-B14F-4D97-AF65-F5344CB8AC3E}">

</xml_diff>

<commit_message>
Extended initial presentation - added why, goals and approach slides
</commit_message>
<xml_diff>
--- a/presentations/20151113 Initial presentation/WebRTC_Initial.pptx
+++ b/presentations/20151113 Initial presentation/WebRTC_Initial.pptx
@@ -5,7 +5,7 @@
     <p:sldMasterId id="2147483648" r:id="rId1"/>
   </p:sldMasterIdLst>
   <p:notesMasterIdLst>
-    <p:notesMasterId r:id="rId10"/>
+    <p:notesMasterId r:id="rId12"/>
   </p:notesMasterIdLst>
   <p:sldIdLst>
     <p:sldId id="263" r:id="rId2"/>
@@ -14,8 +14,10 @@
     <p:sldId id="270" r:id="rId5"/>
     <p:sldId id="272" r:id="rId6"/>
     <p:sldId id="273" r:id="rId7"/>
-    <p:sldId id="274" r:id="rId8"/>
-    <p:sldId id="269" r:id="rId9"/>
+    <p:sldId id="275" r:id="rId8"/>
+    <p:sldId id="276" r:id="rId9"/>
+    <p:sldId id="277" r:id="rId10"/>
+    <p:sldId id="269" r:id="rId11"/>
   </p:sldIdLst>
   <p:sldSz cx="9144000" cy="6858000" type="screen4x3"/>
   <p:notesSz cx="6858000" cy="9144000"/>
@@ -116,7 +118,7 @@
   </p:defaultTextStyle>
   <p:extLst>
     <p:ext uri="{EFAFB233-063F-42B5-8137-9DF3F51BA10A}">
-      <p15:sldGuideLst xmlns:p15="http://schemas.microsoft.com/office/powerpoint/2012/main">
+      <p15:sldGuideLst xmlns:p15="http://schemas.microsoft.com/office/powerpoint/2012/main" xmlns="">
         <p15:guide id="1" orient="horz" pos="1002">
           <p15:clr>
             <a:srgbClr val="A4A3A4"/>
@@ -215,7 +217,7 @@
           <a:p>
             <a:fld id="{7A19BEE0-598C-4858-A439-753E34679212}" type="datetimeFigureOut">
               <a:rPr lang="de-AT" smtClean="0"/>
-              <a:t>08.11.2015</a:t>
+              <a:t>09.11.2015</a:t>
             </a:fld>
             <a:endParaRPr lang="de-AT"/>
           </a:p>
@@ -1514,7 +1516,26 @@
               <a:rPr lang="de-AT" b="0" baseline="0" dirty="0" err="1" smtClean="0"/>
               <a:t>signalling</a:t>
             </a:r>
-            <a:endParaRPr lang="de-AT" b="0" baseline="0" dirty="0" smtClean="0"/>
+            <a:r>
+              <a:rPr lang="de-AT" b="0" baseline="0" dirty="0" smtClean="0"/>
+              <a:t> (</a:t>
+            </a:r>
+            <a:r>
+              <a:rPr lang="de-AT" b="0" baseline="0" dirty="0" err="1" smtClean="0"/>
+              <a:t>standard</a:t>
+            </a:r>
+            <a:r>
+              <a:rPr lang="de-AT" b="0" baseline="0" dirty="0" smtClean="0"/>
+              <a:t> AES </a:t>
+            </a:r>
+            <a:r>
+              <a:rPr lang="de-AT" b="0" baseline="0" dirty="0" err="1" smtClean="0"/>
+              <a:t>encryption</a:t>
+            </a:r>
+            <a:r>
+              <a:rPr lang="de-AT" b="0" baseline="0" dirty="0" smtClean="0"/>
+              <a:t>)</a:t>
+            </a:r>
           </a:p>
           <a:p>
             <a:pPr marL="171450" indent="-171450">
@@ -1522,32 +1543,12 @@
               <a:buChar char="•"/>
             </a:pPr>
             <a:r>
+              <a:rPr lang="de-AT" b="0" baseline="0" dirty="0" smtClean="0"/>
+              <a:t>Data </a:t>
+            </a:r>
+            <a:r>
               <a:rPr lang="de-AT" b="0" baseline="0" dirty="0" err="1" smtClean="0"/>
-              <a:t>For</a:t>
-            </a:r>
-            <a:r>
-              <a:rPr lang="de-AT" b="0" baseline="0" dirty="0" smtClean="0"/>
-              <a:t> </a:t>
-            </a:r>
-            <a:r>
-              <a:rPr lang="de-AT" b="0" baseline="0" dirty="0" err="1" smtClean="0"/>
-              <a:t>companies</a:t>
-            </a:r>
-            <a:r>
-              <a:rPr lang="de-AT" b="0" baseline="0" dirty="0" smtClean="0"/>
-              <a:t>: Communication </a:t>
-            </a:r>
-            <a:r>
-              <a:rPr lang="de-AT" b="0" baseline="0" dirty="0" err="1" smtClean="0"/>
-              <a:t>with</a:t>
-            </a:r>
-            <a:r>
-              <a:rPr lang="de-AT" b="0" baseline="0" dirty="0" smtClean="0"/>
-              <a:t> </a:t>
-            </a:r>
-            <a:r>
-              <a:rPr lang="de-AT" b="0" baseline="0" dirty="0" err="1" smtClean="0"/>
-              <a:t>customers</a:t>
+              <a:t>flows</a:t>
             </a:r>
             <a:r>
               <a:rPr lang="de-AT" b="0" baseline="0" dirty="0" smtClean="0"/>
@@ -1563,15 +1564,39 @@
             </a:r>
             <a:r>
               <a:rPr lang="de-AT" b="0" baseline="0" dirty="0" err="1" smtClean="0"/>
-              <a:t>through</a:t>
+              <a:t>between</a:t>
             </a:r>
             <a:r>
               <a:rPr lang="de-AT" b="0" baseline="0" dirty="0" smtClean="0"/>
-              <a:t> web </a:t>
+              <a:t> </a:t>
             </a:r>
             <a:r>
               <a:rPr lang="de-AT" b="0" baseline="0" dirty="0" err="1" smtClean="0"/>
-              <a:t>page</a:t>
+              <a:t>users</a:t>
+            </a:r>
+            <a:r>
+              <a:rPr lang="de-AT" b="0" baseline="0" dirty="0" smtClean="0"/>
+              <a:t>, </a:t>
+            </a:r>
+            <a:r>
+              <a:rPr lang="de-AT" b="0" baseline="0" dirty="0" err="1" smtClean="0"/>
+              <a:t>no</a:t>
+            </a:r>
+            <a:r>
+              <a:rPr lang="de-AT" b="0" baseline="0" dirty="0" smtClean="0"/>
+              <a:t> </a:t>
+            </a:r>
+            <a:r>
+              <a:rPr lang="de-AT" b="0" baseline="0" dirty="0" err="1" smtClean="0"/>
+              <a:t>servers</a:t>
+            </a:r>
+            <a:r>
+              <a:rPr lang="de-AT" b="0" baseline="0" dirty="0" smtClean="0"/>
+              <a:t> </a:t>
+            </a:r>
+            <a:r>
+              <a:rPr lang="de-AT" b="0" baseline="0" dirty="0" err="1" smtClean="0"/>
+              <a:t>involved</a:t>
             </a:r>
             <a:endParaRPr lang="de-AT" b="0" baseline="0" dirty="0" smtClean="0"/>
           </a:p>
@@ -1800,11 +1825,59 @@
             </a:pPr>
             <a:r>
               <a:rPr lang="de-AT" b="0" baseline="0" dirty="0" smtClean="0"/>
-              <a:t>In </a:t>
+              <a:t>As </a:t>
             </a:r>
             <a:r>
               <a:rPr lang="de-AT" b="0" baseline="0" dirty="0" err="1" smtClean="0"/>
-              <a:t>order</a:t>
+              <a:t>data</a:t>
+            </a:r>
+            <a:r>
+              <a:rPr lang="de-AT" b="0" baseline="0" dirty="0" smtClean="0"/>
+              <a:t> </a:t>
+            </a:r>
+            <a:r>
+              <a:rPr lang="de-AT" b="0" baseline="0" dirty="0" err="1" smtClean="0"/>
+              <a:t>is</a:t>
+            </a:r>
+            <a:r>
+              <a:rPr lang="de-AT" b="0" baseline="0" dirty="0" smtClean="0"/>
+              <a:t> not </a:t>
+            </a:r>
+            <a:r>
+              <a:rPr lang="de-AT" b="0" baseline="0" dirty="0" err="1" smtClean="0"/>
+              <a:t>processed</a:t>
+            </a:r>
+            <a:r>
+              <a:rPr lang="de-AT" b="0" baseline="0" dirty="0" smtClean="0"/>
+              <a:t> </a:t>
+            </a:r>
+            <a:r>
+              <a:rPr lang="de-AT" b="0" baseline="0" dirty="0" err="1" smtClean="0"/>
+              <a:t>by</a:t>
+            </a:r>
+            <a:r>
+              <a:rPr lang="de-AT" b="0" baseline="0" dirty="0" smtClean="0"/>
+              <a:t> a </a:t>
+            </a:r>
+            <a:r>
+              <a:rPr lang="de-AT" b="0" baseline="0" dirty="0" err="1" smtClean="0"/>
+              <a:t>server</a:t>
+            </a:r>
+            <a:r>
+              <a:rPr lang="de-AT" b="0" baseline="0" dirty="0" smtClean="0"/>
+              <a:t>, </a:t>
+            </a:r>
+            <a:r>
+              <a:rPr lang="de-AT" b="0" baseline="0" dirty="0" err="1" smtClean="0"/>
+              <a:t>clients</a:t>
+            </a:r>
+            <a:r>
+              <a:rPr lang="de-AT" b="0" baseline="0" dirty="0" smtClean="0"/>
+              <a:t> </a:t>
+            </a:r>
+            <a:r>
+              <a:rPr lang="de-AT" b="0" baseline="0" dirty="0" err="1" smtClean="0"/>
+              <a:t>have</a:t>
             </a:r>
             <a:r>
               <a:rPr lang="de-AT" b="0" baseline="0" dirty="0" smtClean="0"/>
@@ -1820,31 +1893,31 @@
             </a:r>
             <a:r>
               <a:rPr lang="de-AT" b="0" baseline="0" dirty="0" err="1" smtClean="0"/>
-              <a:t>communicate</a:t>
+              <a:t>store</a:t>
             </a:r>
             <a:r>
               <a:rPr lang="de-AT" b="0" baseline="0" dirty="0" smtClean="0"/>
-              <a:t> peer-</a:t>
+              <a:t> </a:t>
             </a:r>
             <a:r>
               <a:rPr lang="de-AT" b="0" baseline="0" dirty="0" err="1" smtClean="0"/>
-              <a:t>to</a:t>
+              <a:t>chat</a:t>
             </a:r>
             <a:r>
               <a:rPr lang="de-AT" b="0" baseline="0" dirty="0" smtClean="0"/>
-              <a:t>-</a:t>
+              <a:t> </a:t>
             </a:r>
             <a:r>
               <a:rPr lang="de-AT" b="0" baseline="0" dirty="0" err="1" smtClean="0"/>
-              <a:t>peer</a:t>
+              <a:t>messages</a:t>
             </a:r>
             <a:r>
               <a:rPr lang="de-AT" b="0" baseline="0" dirty="0" smtClean="0"/>
-              <a:t>, </a:t>
+              <a:t> </a:t>
             </a:r>
             <a:r>
               <a:rPr lang="de-AT" b="0" baseline="0" dirty="0" err="1" smtClean="0"/>
-              <a:t>it</a:t>
+              <a:t>locally</a:t>
             </a:r>
             <a:r>
               <a:rPr lang="de-AT" b="0" baseline="0" dirty="0" smtClean="0"/>
@@ -1852,7 +1925,7 @@
             </a:r>
             <a:r>
               <a:rPr lang="de-AT" b="0" baseline="0" dirty="0" err="1" smtClean="0"/>
-              <a:t>is</a:t>
+              <a:t>if</a:t>
             </a:r>
             <a:r>
               <a:rPr lang="de-AT" b="0" baseline="0" dirty="0" smtClean="0"/>
@@ -1860,180 +1933,9 @@
             </a:r>
             <a:r>
               <a:rPr lang="de-AT" b="0" baseline="0" dirty="0" err="1" smtClean="0"/>
-              <a:t>necessary</a:t>
-            </a:r>
-            <a:r>
-              <a:rPr lang="de-AT" b="0" baseline="0" dirty="0" smtClean="0"/>
-              <a:t> </a:t>
-            </a:r>
-            <a:r>
-              <a:rPr lang="de-AT" b="0" baseline="0" dirty="0" err="1" smtClean="0"/>
-              <a:t>to</a:t>
-            </a:r>
-            <a:r>
-              <a:rPr lang="de-AT" b="0" baseline="0" dirty="0" smtClean="0"/>
-              <a:t> </a:t>
-            </a:r>
-            <a:r>
-              <a:rPr lang="de-AT" b="0" baseline="0" dirty="0" err="1" smtClean="0"/>
-              <a:t>know</a:t>
-            </a:r>
-            <a:r>
-              <a:rPr lang="de-AT" b="0" baseline="0" dirty="0" smtClean="0"/>
-              <a:t> </a:t>
-            </a:r>
-            <a:r>
-              <a:rPr lang="de-AT" b="0" baseline="0" dirty="0" err="1" smtClean="0"/>
-              <a:t>the</a:t>
-            </a:r>
-            <a:r>
-              <a:rPr lang="de-AT" b="0" baseline="0" dirty="0" smtClean="0"/>
-              <a:t> </a:t>
-            </a:r>
-            <a:r>
-              <a:rPr lang="de-AT" b="0" baseline="0" dirty="0" err="1" smtClean="0"/>
-              <a:t>public</a:t>
-            </a:r>
-            <a:r>
-              <a:rPr lang="de-AT" b="0" baseline="0" dirty="0" smtClean="0"/>
-              <a:t> IP </a:t>
-            </a:r>
-            <a:r>
-              <a:rPr lang="de-AT" b="0" baseline="0" dirty="0" err="1" smtClean="0"/>
-              <a:t>address</a:t>
-            </a:r>
-            <a:r>
-              <a:rPr lang="de-AT" b="0" baseline="0" dirty="0" smtClean="0"/>
-              <a:t> </a:t>
-            </a:r>
-            <a:r>
-              <a:rPr lang="de-AT" b="0" baseline="0" dirty="0" err="1" smtClean="0"/>
-              <a:t>of</a:t>
-            </a:r>
-            <a:r>
-              <a:rPr lang="de-AT" b="0" baseline="0" dirty="0" smtClean="0"/>
-              <a:t> </a:t>
-            </a:r>
-            <a:r>
-              <a:rPr lang="de-AT" b="0" baseline="0" dirty="0" err="1" smtClean="0"/>
-              <a:t>the</a:t>
-            </a:r>
-            <a:r>
-              <a:rPr lang="de-AT" b="0" baseline="0" dirty="0" smtClean="0"/>
-              <a:t> </a:t>
-            </a:r>
-            <a:r>
-              <a:rPr lang="de-AT" b="0" baseline="0" dirty="0" err="1" smtClean="0"/>
-              <a:t>users</a:t>
-            </a:r>
-            <a:r>
-              <a:rPr lang="de-AT" b="0" baseline="0" dirty="0" smtClean="0"/>
-              <a:t>. Through Network </a:t>
-            </a:r>
-            <a:r>
-              <a:rPr lang="de-AT" b="0" baseline="0" dirty="0" err="1" smtClean="0"/>
-              <a:t>Address</a:t>
-            </a:r>
-            <a:r>
-              <a:rPr lang="de-AT" b="0" baseline="0" dirty="0" smtClean="0"/>
-              <a:t> Translation (NAT), </a:t>
-            </a:r>
-            <a:r>
-              <a:rPr lang="de-AT" b="0" baseline="0" dirty="0" err="1" smtClean="0"/>
-              <a:t>this</a:t>
-            </a:r>
-            <a:r>
-              <a:rPr lang="de-AT" b="0" baseline="0" dirty="0" smtClean="0"/>
-              <a:t> </a:t>
-            </a:r>
-            <a:r>
-              <a:rPr lang="de-AT" b="0" baseline="0" dirty="0" err="1" smtClean="0"/>
-              <a:t>could</a:t>
-            </a:r>
-            <a:r>
-              <a:rPr lang="de-AT" b="0" baseline="0" dirty="0" smtClean="0"/>
-              <a:t> </a:t>
-            </a:r>
-            <a:r>
-              <a:rPr lang="de-AT" b="0" baseline="0" dirty="0" err="1" smtClean="0"/>
-              <a:t>become</a:t>
-            </a:r>
-            <a:r>
-              <a:rPr lang="de-AT" b="0" baseline="0" dirty="0" smtClean="0"/>
-              <a:t> </a:t>
-            </a:r>
-            <a:r>
-              <a:rPr lang="de-AT" b="0" baseline="0" dirty="0" err="1" smtClean="0"/>
-              <a:t>problematic</a:t>
-            </a:r>
-            <a:r>
-              <a:rPr lang="de-AT" b="0" baseline="0" dirty="0" smtClean="0"/>
-              <a:t>. The </a:t>
-            </a:r>
-            <a:r>
-              <a:rPr lang="de-AT" b="0" baseline="0" dirty="0" err="1" smtClean="0"/>
-              <a:t>solution</a:t>
-            </a:r>
-            <a:r>
-              <a:rPr lang="de-AT" b="0" baseline="0" dirty="0" smtClean="0"/>
-              <a:t> </a:t>
-            </a:r>
-            <a:r>
-              <a:rPr lang="de-AT" b="0" baseline="0" dirty="0" err="1" smtClean="0"/>
-              <a:t>for</a:t>
-            </a:r>
-            <a:r>
-              <a:rPr lang="de-AT" b="0" baseline="0" dirty="0" smtClean="0"/>
-              <a:t> </a:t>
-            </a:r>
-            <a:r>
-              <a:rPr lang="de-AT" b="0" baseline="0" dirty="0" err="1" smtClean="0"/>
-              <a:t>that</a:t>
-            </a:r>
-            <a:r>
-              <a:rPr lang="de-AT" b="0" baseline="0" dirty="0" smtClean="0"/>
-              <a:t> </a:t>
-            </a:r>
-            <a:r>
-              <a:rPr lang="de-AT" b="0" baseline="0" dirty="0" err="1" smtClean="0"/>
-              <a:t>is</a:t>
-            </a:r>
-            <a:r>
-              <a:rPr lang="de-AT" b="0" baseline="0" dirty="0" smtClean="0"/>
-              <a:t> </a:t>
-            </a:r>
-            <a:r>
-              <a:rPr lang="de-AT" b="0" baseline="0" dirty="0" err="1" smtClean="0"/>
-              <a:t>to</a:t>
-            </a:r>
-            <a:r>
-              <a:rPr lang="de-AT" b="0" baseline="0" dirty="0" smtClean="0"/>
-              <a:t> </a:t>
-            </a:r>
-            <a:r>
-              <a:rPr lang="de-AT" b="0" baseline="0" dirty="0" err="1" smtClean="0"/>
-              <a:t>use</a:t>
-            </a:r>
-            <a:r>
-              <a:rPr lang="de-AT" b="0" baseline="0" dirty="0" smtClean="0"/>
-              <a:t> STUN </a:t>
-            </a:r>
-            <a:r>
-              <a:rPr lang="de-AT" b="0" baseline="0" dirty="0" err="1" smtClean="0"/>
-              <a:t>and</a:t>
-            </a:r>
-            <a:r>
-              <a:rPr lang="de-AT" b="0" baseline="0" dirty="0" smtClean="0"/>
-              <a:t> TURN </a:t>
-            </a:r>
-            <a:r>
-              <a:rPr lang="de-AT" b="0" baseline="0" dirty="0" err="1" smtClean="0"/>
-              <a:t>servers</a:t>
-            </a:r>
-            <a:r>
-              <a:rPr lang="de-AT" b="0" baseline="0" dirty="0" smtClean="0"/>
-              <a:t>.</a:t>
-            </a:r>
+              <a:t>needed</a:t>
+            </a:r>
+            <a:endParaRPr lang="de-AT" b="0" baseline="0" dirty="0" smtClean="0"/>
           </a:p>
           <a:p>
             <a:pPr marL="171450" indent="-171450">
@@ -2042,6 +1944,248 @@
             </a:pPr>
             <a:r>
               <a:rPr lang="de-AT" b="0" baseline="0" dirty="0" smtClean="0"/>
+              <a:t>In </a:t>
+            </a:r>
+            <a:r>
+              <a:rPr lang="de-AT" b="0" baseline="0" dirty="0" err="1" smtClean="0"/>
+              <a:t>order</a:t>
+            </a:r>
+            <a:r>
+              <a:rPr lang="de-AT" b="0" baseline="0" dirty="0" smtClean="0"/>
+              <a:t> </a:t>
+            </a:r>
+            <a:r>
+              <a:rPr lang="de-AT" b="0" baseline="0" dirty="0" err="1" smtClean="0"/>
+              <a:t>to</a:t>
+            </a:r>
+            <a:r>
+              <a:rPr lang="de-AT" b="0" baseline="0" dirty="0" smtClean="0"/>
+              <a:t> </a:t>
+            </a:r>
+            <a:r>
+              <a:rPr lang="de-AT" b="0" baseline="0" dirty="0" err="1" smtClean="0"/>
+              <a:t>communicate</a:t>
+            </a:r>
+            <a:r>
+              <a:rPr lang="de-AT" b="0" baseline="0" dirty="0" smtClean="0"/>
+              <a:t> peer-</a:t>
+            </a:r>
+            <a:r>
+              <a:rPr lang="de-AT" b="0" baseline="0" dirty="0" err="1" smtClean="0"/>
+              <a:t>to</a:t>
+            </a:r>
+            <a:r>
+              <a:rPr lang="de-AT" b="0" baseline="0" dirty="0" smtClean="0"/>
+              <a:t>-</a:t>
+            </a:r>
+            <a:r>
+              <a:rPr lang="de-AT" b="0" baseline="0" dirty="0" err="1" smtClean="0"/>
+              <a:t>peer</a:t>
+            </a:r>
+            <a:r>
+              <a:rPr lang="de-AT" b="0" baseline="0" dirty="0" smtClean="0"/>
+              <a:t>, </a:t>
+            </a:r>
+            <a:r>
+              <a:rPr lang="de-AT" b="0" baseline="0" dirty="0" err="1" smtClean="0"/>
+              <a:t>it</a:t>
+            </a:r>
+            <a:r>
+              <a:rPr lang="de-AT" b="0" baseline="0" dirty="0" smtClean="0"/>
+              <a:t> </a:t>
+            </a:r>
+            <a:r>
+              <a:rPr lang="de-AT" b="0" baseline="0" dirty="0" err="1" smtClean="0"/>
+              <a:t>is</a:t>
+            </a:r>
+            <a:r>
+              <a:rPr lang="de-AT" b="0" baseline="0" dirty="0" smtClean="0"/>
+              <a:t> </a:t>
+            </a:r>
+            <a:r>
+              <a:rPr lang="de-AT" b="0" baseline="0" dirty="0" err="1" smtClean="0"/>
+              <a:t>necessary</a:t>
+            </a:r>
+            <a:r>
+              <a:rPr lang="de-AT" b="0" baseline="0" dirty="0" smtClean="0"/>
+              <a:t> </a:t>
+            </a:r>
+            <a:r>
+              <a:rPr lang="de-AT" b="0" baseline="0" dirty="0" err="1" smtClean="0"/>
+              <a:t>to</a:t>
+            </a:r>
+            <a:r>
+              <a:rPr lang="de-AT" b="0" baseline="0" dirty="0" smtClean="0"/>
+              <a:t> </a:t>
+            </a:r>
+            <a:r>
+              <a:rPr lang="de-AT" b="0" baseline="0" dirty="0" err="1" smtClean="0"/>
+              <a:t>know</a:t>
+            </a:r>
+            <a:r>
+              <a:rPr lang="de-AT" b="0" baseline="0" dirty="0" smtClean="0"/>
+              <a:t> </a:t>
+            </a:r>
+            <a:r>
+              <a:rPr lang="de-AT" b="0" baseline="0" dirty="0" err="1" smtClean="0"/>
+              <a:t>the</a:t>
+            </a:r>
+            <a:r>
+              <a:rPr lang="de-AT" b="0" baseline="0" dirty="0" smtClean="0"/>
+              <a:t> </a:t>
+            </a:r>
+            <a:r>
+              <a:rPr lang="de-AT" b="0" baseline="0" dirty="0" err="1" smtClean="0"/>
+              <a:t>public</a:t>
+            </a:r>
+            <a:r>
+              <a:rPr lang="de-AT" b="0" baseline="0" dirty="0" smtClean="0"/>
+              <a:t> IP </a:t>
+            </a:r>
+            <a:r>
+              <a:rPr lang="de-AT" b="0" baseline="0" dirty="0" err="1" smtClean="0"/>
+              <a:t>address</a:t>
+            </a:r>
+            <a:r>
+              <a:rPr lang="de-AT" b="0" baseline="0" dirty="0" smtClean="0"/>
+              <a:t> </a:t>
+            </a:r>
+            <a:r>
+              <a:rPr lang="de-AT" b="0" baseline="0" dirty="0" err="1" smtClean="0"/>
+              <a:t>of</a:t>
+            </a:r>
+            <a:r>
+              <a:rPr lang="de-AT" b="0" baseline="0" dirty="0" smtClean="0"/>
+              <a:t> </a:t>
+            </a:r>
+            <a:r>
+              <a:rPr lang="de-AT" b="0" baseline="0" dirty="0" err="1" smtClean="0"/>
+              <a:t>the</a:t>
+            </a:r>
+            <a:r>
+              <a:rPr lang="de-AT" b="0" baseline="0" dirty="0" smtClean="0"/>
+              <a:t> </a:t>
+            </a:r>
+            <a:r>
+              <a:rPr lang="de-AT" b="0" baseline="0" dirty="0" err="1" smtClean="0"/>
+              <a:t>users</a:t>
+            </a:r>
+            <a:r>
+              <a:rPr lang="de-AT" b="0" baseline="0" dirty="0" smtClean="0"/>
+              <a:t>. Through Network </a:t>
+            </a:r>
+            <a:r>
+              <a:rPr lang="de-AT" b="0" baseline="0" dirty="0" err="1" smtClean="0"/>
+              <a:t>Address</a:t>
+            </a:r>
+            <a:r>
+              <a:rPr lang="de-AT" b="0" baseline="0" dirty="0" smtClean="0"/>
+              <a:t> Translation (NAT), </a:t>
+            </a:r>
+            <a:r>
+              <a:rPr lang="de-AT" b="0" baseline="0" dirty="0" err="1" smtClean="0"/>
+              <a:t>this</a:t>
+            </a:r>
+            <a:r>
+              <a:rPr lang="de-AT" b="0" baseline="0" dirty="0" smtClean="0"/>
+              <a:t> </a:t>
+            </a:r>
+            <a:r>
+              <a:rPr lang="de-AT" b="0" baseline="0" dirty="0" err="1" smtClean="0"/>
+              <a:t>could</a:t>
+            </a:r>
+            <a:r>
+              <a:rPr lang="de-AT" b="0" baseline="0" dirty="0" smtClean="0"/>
+              <a:t> </a:t>
+            </a:r>
+            <a:r>
+              <a:rPr lang="de-AT" b="0" baseline="0" dirty="0" err="1" smtClean="0"/>
+              <a:t>become</a:t>
+            </a:r>
+            <a:r>
+              <a:rPr lang="de-AT" b="0" baseline="0" dirty="0" smtClean="0"/>
+              <a:t> </a:t>
+            </a:r>
+            <a:r>
+              <a:rPr lang="de-AT" b="0" baseline="0" dirty="0" err="1" smtClean="0"/>
+              <a:t>problematic</a:t>
+            </a:r>
+            <a:r>
+              <a:rPr lang="de-AT" b="0" baseline="0" dirty="0" smtClean="0"/>
+              <a:t>. The </a:t>
+            </a:r>
+            <a:r>
+              <a:rPr lang="de-AT" b="0" baseline="0" dirty="0" err="1" smtClean="0"/>
+              <a:t>solution</a:t>
+            </a:r>
+            <a:r>
+              <a:rPr lang="de-AT" b="0" baseline="0" dirty="0" smtClean="0"/>
+              <a:t> </a:t>
+            </a:r>
+            <a:r>
+              <a:rPr lang="de-AT" b="0" baseline="0" dirty="0" err="1" smtClean="0"/>
+              <a:t>for</a:t>
+            </a:r>
+            <a:r>
+              <a:rPr lang="de-AT" b="0" baseline="0" dirty="0" smtClean="0"/>
+              <a:t> </a:t>
+            </a:r>
+            <a:r>
+              <a:rPr lang="de-AT" b="0" baseline="0" dirty="0" err="1" smtClean="0"/>
+              <a:t>that</a:t>
+            </a:r>
+            <a:r>
+              <a:rPr lang="de-AT" b="0" baseline="0" dirty="0" smtClean="0"/>
+              <a:t> </a:t>
+            </a:r>
+            <a:r>
+              <a:rPr lang="de-AT" b="0" baseline="0" dirty="0" err="1" smtClean="0"/>
+              <a:t>is</a:t>
+            </a:r>
+            <a:r>
+              <a:rPr lang="de-AT" b="0" baseline="0" dirty="0" smtClean="0"/>
+              <a:t> </a:t>
+            </a:r>
+            <a:r>
+              <a:rPr lang="de-AT" b="0" baseline="0" dirty="0" err="1" smtClean="0"/>
+              <a:t>to</a:t>
+            </a:r>
+            <a:r>
+              <a:rPr lang="de-AT" b="0" baseline="0" dirty="0" smtClean="0"/>
+              <a:t> </a:t>
+            </a:r>
+            <a:r>
+              <a:rPr lang="de-AT" b="0" baseline="0" dirty="0" err="1" smtClean="0"/>
+              <a:t>use</a:t>
+            </a:r>
+            <a:r>
+              <a:rPr lang="de-AT" b="0" baseline="0" dirty="0" smtClean="0"/>
+              <a:t> STUN </a:t>
+            </a:r>
+            <a:r>
+              <a:rPr lang="de-AT" b="0" baseline="0" dirty="0" err="1" smtClean="0"/>
+              <a:t>and</a:t>
+            </a:r>
+            <a:r>
+              <a:rPr lang="de-AT" b="0" baseline="0" dirty="0" smtClean="0"/>
+              <a:t> TURN </a:t>
+            </a:r>
+            <a:r>
+              <a:rPr lang="de-AT" b="0" baseline="0" dirty="0" err="1" smtClean="0"/>
+              <a:t>servers</a:t>
+            </a:r>
+            <a:r>
+              <a:rPr lang="de-AT" b="0" baseline="0" dirty="0" smtClean="0"/>
+              <a:t>.</a:t>
+            </a:r>
+          </a:p>
+          <a:p>
+            <a:pPr marL="171450" indent="-171450">
+              <a:buFont typeface="Arial" panose="020B0604020202020204" pitchFamily="34" charset="0"/>
+              <a:buChar char="•"/>
+            </a:pPr>
+            <a:r>
+              <a:rPr lang="de-AT" b="0" baseline="0" dirty="0" smtClean="0"/>
               <a:t>As </a:t>
             </a:r>
             <a:r>
@@ -2118,7 +2262,7 @@
             </a:r>
             <a:r>
               <a:rPr lang="de-AT" b="0" baseline="0" dirty="0" err="1" smtClean="0"/>
-              <a:t>then</a:t>
+              <a:t>there</a:t>
             </a:r>
             <a:r>
               <a:rPr lang="de-AT" b="0" baseline="0" dirty="0" smtClean="0"/>
@@ -2146,7 +2290,11 @@
             </a:r>
             <a:r>
               <a:rPr lang="de-AT" b="0" baseline="0" dirty="0" smtClean="0"/>
-              <a:t>. An MCU </a:t>
+              <a:t>. </a:t>
+            </a:r>
+            <a:r>
+              <a:rPr lang="de-AT" b="0" baseline="0" dirty="0" smtClean="0"/>
+              <a:t>A Multipoint Control Unit (MCU) </a:t>
             </a:r>
             <a:r>
               <a:rPr lang="de-AT" b="0" baseline="0" dirty="0" err="1" smtClean="0"/>
@@ -2442,7 +2590,109 @@
           <a:p>
             <a:r>
               <a:rPr lang="de-AT" dirty="0" smtClean="0"/>
-              <a:t>Advantages:</a:t>
+              <a:t>„Industrie 4.0“ </a:t>
+            </a:r>
+            <a:r>
+              <a:rPr lang="de-AT" dirty="0" err="1" smtClean="0"/>
+              <a:t>is</a:t>
+            </a:r>
+            <a:r>
+              <a:rPr lang="de-AT" baseline="0" dirty="0" smtClean="0"/>
+              <a:t> </a:t>
+            </a:r>
+            <a:r>
+              <a:rPr lang="de-AT" baseline="0" dirty="0" err="1" smtClean="0"/>
+              <a:t>one</a:t>
+            </a:r>
+            <a:r>
+              <a:rPr lang="de-AT" baseline="0" dirty="0" smtClean="0"/>
+              <a:t> </a:t>
+            </a:r>
+            <a:r>
+              <a:rPr lang="de-AT" baseline="0" dirty="0" err="1" smtClean="0"/>
+              <a:t>of</a:t>
+            </a:r>
+            <a:r>
+              <a:rPr lang="de-AT" baseline="0" dirty="0" smtClean="0"/>
+              <a:t> </a:t>
+            </a:r>
+            <a:r>
+              <a:rPr lang="de-AT" baseline="0" dirty="0" err="1" smtClean="0"/>
+              <a:t>the</a:t>
+            </a:r>
+            <a:r>
+              <a:rPr lang="de-AT" baseline="0" dirty="0" smtClean="0"/>
+              <a:t> </a:t>
+            </a:r>
+            <a:r>
+              <a:rPr lang="de-AT" baseline="0" dirty="0" err="1" smtClean="0"/>
+              <a:t>biggest</a:t>
+            </a:r>
+            <a:r>
+              <a:rPr lang="de-AT" baseline="0" dirty="0" smtClean="0"/>
+              <a:t> </a:t>
+            </a:r>
+            <a:r>
+              <a:rPr lang="de-AT" baseline="0" dirty="0" err="1" smtClean="0"/>
+              <a:t>trends</a:t>
+            </a:r>
+            <a:r>
+              <a:rPr lang="de-AT" baseline="0" dirty="0" smtClean="0"/>
+              <a:t> in </a:t>
+            </a:r>
+            <a:r>
+              <a:rPr lang="de-AT" baseline="0" dirty="0" err="1" smtClean="0"/>
+              <a:t>technology</a:t>
+            </a:r>
+            <a:r>
+              <a:rPr lang="de-AT" baseline="0" dirty="0" smtClean="0"/>
+              <a:t> </a:t>
+            </a:r>
+            <a:r>
+              <a:rPr lang="de-AT" baseline="0" dirty="0" err="1" smtClean="0"/>
+              <a:t>for</a:t>
+            </a:r>
+            <a:r>
+              <a:rPr lang="de-AT" baseline="0" dirty="0" smtClean="0"/>
+              <a:t> a </a:t>
+            </a:r>
+            <a:r>
+              <a:rPr lang="de-AT" baseline="0" dirty="0" err="1" smtClean="0"/>
+              <a:t>few</a:t>
+            </a:r>
+            <a:r>
+              <a:rPr lang="de-AT" baseline="0" dirty="0" smtClean="0"/>
+              <a:t> </a:t>
+            </a:r>
+            <a:r>
+              <a:rPr lang="de-AT" baseline="0" dirty="0" err="1" smtClean="0"/>
+              <a:t>years</a:t>
+            </a:r>
+            <a:r>
+              <a:rPr lang="de-AT" baseline="0" dirty="0" smtClean="0"/>
+              <a:t> </a:t>
+            </a:r>
+            <a:r>
+              <a:rPr lang="de-AT" baseline="0" dirty="0" err="1" smtClean="0"/>
+              <a:t>now</a:t>
+            </a:r>
+            <a:r>
+              <a:rPr lang="de-AT" baseline="0" dirty="0" smtClean="0"/>
+              <a:t>. </a:t>
+            </a:r>
+            <a:endParaRPr lang="de-AT" dirty="0" smtClean="0"/>
+          </a:p>
+          <a:p>
+            <a:endParaRPr lang="de-AT" dirty="0" smtClean="0"/>
+          </a:p>
+          <a:p>
+            <a:r>
+              <a:rPr lang="de-AT" dirty="0" smtClean="0"/>
+              <a:t>Advantages</a:t>
+            </a:r>
+            <a:r>
+              <a:rPr lang="de-AT" dirty="0" smtClean="0"/>
+              <a:t>:</a:t>
             </a:r>
           </a:p>
           <a:p>
@@ -2553,6 +2803,95 @@
               <a:rPr lang="de-AT" baseline="0" dirty="0" err="1" smtClean="0"/>
               <a:t>personnel</a:t>
             </a:r>
+            <a:r>
+              <a:rPr lang="de-AT" baseline="0" dirty="0" smtClean="0"/>
+              <a:t>. </a:t>
+            </a:r>
+            <a:r>
+              <a:rPr lang="de-AT" baseline="0" dirty="0" err="1" smtClean="0"/>
+              <a:t>It</a:t>
+            </a:r>
+            <a:r>
+              <a:rPr lang="de-AT" baseline="0" dirty="0" smtClean="0"/>
+              <a:t> </a:t>
+            </a:r>
+            <a:r>
+              <a:rPr lang="de-AT" baseline="0" dirty="0" err="1" smtClean="0"/>
+              <a:t>is</a:t>
+            </a:r>
+            <a:r>
+              <a:rPr lang="de-AT" baseline="0" dirty="0" smtClean="0"/>
+              <a:t> not </a:t>
+            </a:r>
+            <a:r>
+              <a:rPr lang="de-AT" baseline="0" dirty="0" err="1" smtClean="0"/>
+              <a:t>necessary</a:t>
+            </a:r>
+            <a:r>
+              <a:rPr lang="de-AT" baseline="0" dirty="0" smtClean="0"/>
+              <a:t> </a:t>
+            </a:r>
+            <a:r>
+              <a:rPr lang="de-AT" baseline="0" dirty="0" err="1" smtClean="0"/>
+              <a:t>for</a:t>
+            </a:r>
+            <a:r>
+              <a:rPr lang="de-AT" baseline="0" dirty="0" smtClean="0"/>
+              <a:t> an expert </a:t>
+            </a:r>
+            <a:r>
+              <a:rPr lang="de-AT" baseline="0" dirty="0" err="1" smtClean="0"/>
+              <a:t>to</a:t>
+            </a:r>
+            <a:r>
+              <a:rPr lang="de-AT" baseline="0" dirty="0" smtClean="0"/>
+              <a:t> </a:t>
+            </a:r>
+            <a:r>
+              <a:rPr lang="de-AT" baseline="0" dirty="0" err="1" smtClean="0"/>
+              <a:t>visit</a:t>
+            </a:r>
+            <a:r>
+              <a:rPr lang="de-AT" baseline="0" dirty="0" smtClean="0"/>
+              <a:t> </a:t>
+            </a:r>
+            <a:r>
+              <a:rPr lang="de-AT" baseline="0" dirty="0" err="1" smtClean="0"/>
+              <a:t>the</a:t>
+            </a:r>
+            <a:r>
+              <a:rPr lang="de-AT" baseline="0" dirty="0" smtClean="0"/>
+              <a:t> </a:t>
+            </a:r>
+            <a:r>
+              <a:rPr lang="de-AT" baseline="0" dirty="0" err="1" smtClean="0"/>
+              <a:t>site</a:t>
+            </a:r>
+            <a:r>
+              <a:rPr lang="de-AT" baseline="0" dirty="0" smtClean="0"/>
+              <a:t> </a:t>
+            </a:r>
+            <a:r>
+              <a:rPr lang="de-AT" baseline="0" dirty="0" err="1" smtClean="0"/>
+              <a:t>personally</a:t>
+            </a:r>
+            <a:r>
+              <a:rPr lang="de-AT" baseline="0" dirty="0" smtClean="0"/>
+              <a:t>.</a:t>
+            </a:r>
+          </a:p>
+          <a:p>
+            <a:pPr marL="171450" indent="-171450">
+              <a:buFont typeface="Arial" panose="020B0604020202020204" pitchFamily="34" charset="0"/>
+              <a:buChar char="•"/>
+            </a:pPr>
+            <a:endParaRPr lang="de-AT" baseline="0" dirty="0" smtClean="0"/>
+          </a:p>
+          <a:p>
+            <a:pPr marL="171450" indent="-171450">
+              <a:buFont typeface="Arial" panose="020B0604020202020204" pitchFamily="34" charset="0"/>
+              <a:buChar char="•"/>
+            </a:pPr>
             <a:endParaRPr lang="de-AT" dirty="0"/>
           </a:p>
         </p:txBody>
@@ -2575,6 +2914,2786 @@
             <a:fld id="{2AFEA223-4F50-4DD6-9CC4-15E4F51256E0}" type="slidenum">
               <a:rPr lang="de-AT" smtClean="0"/>
               <a:t>6</a:t>
+            </a:fld>
+            <a:endParaRPr lang="de-AT"/>
+          </a:p>
+        </p:txBody>
+      </p:sp>
+    </p:spTree>
+    <p:extLst>
+      <p:ext uri="{BB962C8B-B14F-4D97-AF65-F5344CB8AC3E}">
+        <p14:creationId xmlns:p14="http://schemas.microsoft.com/office/powerpoint/2010/main" val="3113798683"/>
+      </p:ext>
+    </p:extLst>
+  </p:cSld>
+  <p:clrMapOvr>
+    <a:masterClrMapping/>
+  </p:clrMapOvr>
+</p:notes>
+</file>
+
+<file path=ppt/notesSlides/notesSlide6.xml><?xml version="1.0" encoding="utf-8"?>
+<p:notes xmlns:a="http://schemas.openxmlformats.org/drawingml/2006/main" xmlns:r="http://schemas.openxmlformats.org/officeDocument/2006/relationships" xmlns:p="http://schemas.openxmlformats.org/presentationml/2006/main">
+  <p:cSld>
+    <p:spTree>
+      <p:nvGrpSpPr>
+        <p:cNvPr id="1" name=""/>
+        <p:cNvGrpSpPr/>
+        <p:nvPr/>
+      </p:nvGrpSpPr>
+      <p:grpSpPr>
+        <a:xfrm>
+          <a:off x="0" y="0"/>
+          <a:ext cx="0" cy="0"/>
+          <a:chOff x="0" y="0"/>
+          <a:chExt cx="0" cy="0"/>
+        </a:xfrm>
+      </p:grpSpPr>
+      <p:sp>
+        <p:nvSpPr>
+          <p:cNvPr id="2" name="Folienbildplatzhalter 1"/>
+          <p:cNvSpPr>
+            <a:spLocks noGrp="1" noRot="1" noChangeAspect="1"/>
+          </p:cNvSpPr>
+          <p:nvPr>
+            <p:ph type="sldImg"/>
+          </p:nvPr>
+        </p:nvSpPr>
+        <p:spPr/>
+      </p:sp>
+      <p:sp>
+        <p:nvSpPr>
+          <p:cNvPr id="3" name="Notizenplatzhalter 2"/>
+          <p:cNvSpPr>
+            <a:spLocks noGrp="1"/>
+          </p:cNvSpPr>
+          <p:nvPr>
+            <p:ph type="body" idx="1"/>
+          </p:nvPr>
+        </p:nvSpPr>
+        <p:spPr/>
+        <p:txBody>
+          <a:bodyPr/>
+          <a:lstStyle/>
+          <a:p>
+            <a:pPr marL="0" indent="0">
+              <a:buFont typeface="Arial" panose="020B0604020202020204" pitchFamily="34" charset="0"/>
+              <a:buNone/>
+            </a:pPr>
+            <a:r>
+              <a:rPr lang="de-AT" dirty="0" err="1" smtClean="0"/>
+              <a:t>Using</a:t>
+            </a:r>
+            <a:r>
+              <a:rPr lang="de-AT" dirty="0" smtClean="0"/>
+              <a:t> a </a:t>
+            </a:r>
+            <a:r>
+              <a:rPr lang="de-AT" dirty="0" err="1" smtClean="0"/>
+              <a:t>proprietary</a:t>
+            </a:r>
+            <a:r>
+              <a:rPr lang="de-AT" dirty="0" smtClean="0"/>
+              <a:t> </a:t>
+            </a:r>
+            <a:r>
+              <a:rPr lang="de-AT" dirty="0" err="1" smtClean="0"/>
+              <a:t>video</a:t>
+            </a:r>
+            <a:r>
+              <a:rPr lang="de-AT" dirty="0" smtClean="0"/>
+              <a:t> </a:t>
+            </a:r>
+            <a:r>
+              <a:rPr lang="de-AT" dirty="0" err="1" smtClean="0"/>
+              <a:t>chat</a:t>
+            </a:r>
+            <a:r>
+              <a:rPr lang="de-AT" dirty="0" smtClean="0"/>
+              <a:t> </a:t>
+            </a:r>
+            <a:r>
+              <a:rPr lang="de-AT" dirty="0" err="1" smtClean="0"/>
+              <a:t>application</a:t>
+            </a:r>
+            <a:r>
+              <a:rPr lang="de-AT" dirty="0" smtClean="0"/>
+              <a:t> </a:t>
+            </a:r>
+            <a:r>
+              <a:rPr lang="de-AT" dirty="0" err="1" smtClean="0"/>
+              <a:t>might</a:t>
+            </a:r>
+            <a:r>
+              <a:rPr lang="de-AT" dirty="0" smtClean="0"/>
+              <a:t> not </a:t>
+            </a:r>
+            <a:r>
+              <a:rPr lang="de-AT" dirty="0" err="1" smtClean="0"/>
+              <a:t>be</a:t>
+            </a:r>
+            <a:r>
+              <a:rPr lang="de-AT" dirty="0" smtClean="0"/>
+              <a:t> an </a:t>
+            </a:r>
+            <a:r>
+              <a:rPr lang="de-AT" dirty="0" err="1" smtClean="0"/>
+              <a:t>option</a:t>
+            </a:r>
+            <a:r>
+              <a:rPr lang="de-AT" dirty="0" smtClean="0"/>
+              <a:t> </a:t>
+            </a:r>
+            <a:r>
+              <a:rPr lang="de-AT" dirty="0" err="1" smtClean="0"/>
+              <a:t>for</a:t>
+            </a:r>
+            <a:r>
+              <a:rPr lang="de-AT" dirty="0" smtClean="0"/>
+              <a:t> </a:t>
+            </a:r>
+            <a:r>
+              <a:rPr lang="de-AT" dirty="0" err="1" smtClean="0"/>
+              <a:t>companies</a:t>
+            </a:r>
+            <a:r>
+              <a:rPr lang="de-AT" dirty="0" smtClean="0"/>
+              <a:t>.</a:t>
+            </a:r>
+            <a:r>
+              <a:rPr lang="de-AT" baseline="0" dirty="0" smtClean="0"/>
+              <a:t> </a:t>
+            </a:r>
+            <a:r>
+              <a:rPr lang="de-AT" baseline="0" dirty="0" err="1" smtClean="0"/>
+              <a:t>Especially</a:t>
+            </a:r>
+            <a:r>
+              <a:rPr lang="de-AT" baseline="0" dirty="0" smtClean="0"/>
+              <a:t> </a:t>
+            </a:r>
+            <a:r>
+              <a:rPr lang="de-AT" baseline="0" dirty="0" err="1" smtClean="0"/>
+              <a:t>if</a:t>
+            </a:r>
+            <a:r>
+              <a:rPr lang="de-AT" baseline="0" dirty="0" smtClean="0"/>
+              <a:t> </a:t>
+            </a:r>
+            <a:r>
+              <a:rPr lang="de-AT" baseline="0" dirty="0" err="1" smtClean="0"/>
+              <a:t>they</a:t>
+            </a:r>
+            <a:r>
+              <a:rPr lang="de-AT" baseline="0" dirty="0" smtClean="0"/>
+              <a:t> </a:t>
+            </a:r>
+            <a:r>
+              <a:rPr lang="de-AT" baseline="0" dirty="0" err="1" smtClean="0"/>
+              <a:t>are</a:t>
+            </a:r>
+            <a:r>
+              <a:rPr lang="de-AT" baseline="0" dirty="0" smtClean="0"/>
+              <a:t> sensitive </a:t>
+            </a:r>
+            <a:r>
+              <a:rPr lang="de-AT" baseline="0" dirty="0" err="1" smtClean="0"/>
+              <a:t>about</a:t>
+            </a:r>
+            <a:r>
+              <a:rPr lang="de-AT" baseline="0" dirty="0" smtClean="0"/>
+              <a:t> </a:t>
+            </a:r>
+            <a:r>
+              <a:rPr lang="de-AT" baseline="0" dirty="0" err="1" smtClean="0"/>
+              <a:t>their</a:t>
+            </a:r>
+            <a:r>
+              <a:rPr lang="de-AT" baseline="0" dirty="0" smtClean="0"/>
+              <a:t> </a:t>
+            </a:r>
+            <a:r>
+              <a:rPr lang="de-AT" baseline="0" dirty="0" err="1" smtClean="0"/>
+              <a:t>data</a:t>
+            </a:r>
+            <a:r>
+              <a:rPr lang="de-AT" baseline="0" dirty="0" smtClean="0"/>
+              <a:t>, </a:t>
+            </a:r>
+            <a:r>
+              <a:rPr lang="de-AT" baseline="0" dirty="0" err="1" smtClean="0"/>
+              <a:t>WebRTC</a:t>
+            </a:r>
+            <a:r>
+              <a:rPr lang="de-AT" baseline="0" dirty="0" smtClean="0"/>
+              <a:t> </a:t>
+            </a:r>
+            <a:r>
+              <a:rPr lang="de-AT" baseline="0" dirty="0" err="1" smtClean="0"/>
+              <a:t>might</a:t>
+            </a:r>
+            <a:r>
+              <a:rPr lang="de-AT" baseline="0" dirty="0" smtClean="0"/>
+              <a:t> </a:t>
+            </a:r>
+            <a:r>
+              <a:rPr lang="de-AT" baseline="0" dirty="0" err="1" smtClean="0"/>
+              <a:t>be</a:t>
+            </a:r>
+            <a:r>
+              <a:rPr lang="de-AT" baseline="0" dirty="0" smtClean="0"/>
+              <a:t> </a:t>
+            </a:r>
+            <a:r>
+              <a:rPr lang="de-AT" baseline="0" dirty="0" err="1" smtClean="0"/>
+              <a:t>something</a:t>
+            </a:r>
+            <a:r>
+              <a:rPr lang="de-AT" baseline="0" dirty="0" smtClean="0"/>
+              <a:t> </a:t>
+            </a:r>
+            <a:r>
+              <a:rPr lang="de-AT" baseline="0" dirty="0" err="1" smtClean="0"/>
+              <a:t>that</a:t>
+            </a:r>
+            <a:r>
+              <a:rPr lang="de-AT" baseline="0" dirty="0" smtClean="0"/>
+              <a:t> </a:t>
+            </a:r>
+            <a:r>
+              <a:rPr lang="de-AT" baseline="0" dirty="0" err="1" smtClean="0"/>
+              <a:t>they</a:t>
+            </a:r>
+            <a:r>
+              <a:rPr lang="de-AT" baseline="0" dirty="0" smtClean="0"/>
+              <a:t> will </a:t>
+            </a:r>
+            <a:r>
+              <a:rPr lang="de-AT" baseline="0" dirty="0" err="1" smtClean="0"/>
+              <a:t>be</a:t>
+            </a:r>
+            <a:r>
+              <a:rPr lang="de-AT" baseline="0" dirty="0" smtClean="0"/>
+              <a:t> </a:t>
+            </a:r>
+            <a:r>
+              <a:rPr lang="de-AT" baseline="0" dirty="0" err="1" smtClean="0"/>
+              <a:t>really</a:t>
+            </a:r>
+            <a:r>
+              <a:rPr lang="de-AT" baseline="0" dirty="0" smtClean="0"/>
+              <a:t> </a:t>
+            </a:r>
+            <a:r>
+              <a:rPr lang="de-AT" baseline="0" dirty="0" err="1" smtClean="0"/>
+              <a:t>interested</a:t>
+            </a:r>
+            <a:r>
+              <a:rPr lang="de-AT" baseline="0" dirty="0" smtClean="0"/>
+              <a:t> in. </a:t>
+            </a:r>
+            <a:r>
+              <a:rPr lang="de-AT" baseline="0" dirty="0" err="1" smtClean="0"/>
+              <a:t>Especially</a:t>
+            </a:r>
+            <a:r>
+              <a:rPr lang="de-AT" baseline="0" dirty="0" smtClean="0"/>
+              <a:t> </a:t>
+            </a:r>
+            <a:r>
+              <a:rPr lang="de-AT" baseline="0" dirty="0" err="1" smtClean="0"/>
+              <a:t>the</a:t>
+            </a:r>
+            <a:r>
+              <a:rPr lang="de-AT" baseline="0" dirty="0" smtClean="0"/>
+              <a:t> </a:t>
+            </a:r>
+            <a:r>
+              <a:rPr lang="de-AT" baseline="0" dirty="0" err="1" smtClean="0"/>
+              <a:t>advantages</a:t>
+            </a:r>
+            <a:r>
+              <a:rPr lang="de-AT" baseline="0" dirty="0" smtClean="0"/>
+              <a:t> </a:t>
+            </a:r>
+            <a:r>
+              <a:rPr lang="de-AT" baseline="0" dirty="0" err="1" smtClean="0"/>
+              <a:t>of</a:t>
+            </a:r>
+            <a:r>
+              <a:rPr lang="de-AT" baseline="0" dirty="0" smtClean="0"/>
+              <a:t> </a:t>
+            </a:r>
+            <a:r>
+              <a:rPr lang="de-AT" baseline="0" dirty="0" err="1" smtClean="0"/>
+              <a:t>WebRTC</a:t>
+            </a:r>
+            <a:r>
+              <a:rPr lang="de-AT" baseline="0" dirty="0" smtClean="0"/>
+              <a:t>, like </a:t>
+            </a:r>
+            <a:r>
+              <a:rPr lang="de-AT" baseline="0" dirty="0" err="1" smtClean="0"/>
+              <a:t>mandatory</a:t>
+            </a:r>
+            <a:r>
+              <a:rPr lang="de-AT" baseline="0" dirty="0" smtClean="0"/>
+              <a:t> </a:t>
+            </a:r>
+            <a:r>
+              <a:rPr lang="de-AT" baseline="0" dirty="0" err="1" smtClean="0"/>
+              <a:t>encryption</a:t>
+            </a:r>
+            <a:r>
+              <a:rPr lang="de-AT" baseline="0" dirty="0" smtClean="0"/>
+              <a:t> </a:t>
+            </a:r>
+            <a:r>
+              <a:rPr lang="de-AT" baseline="0" dirty="0" err="1" smtClean="0"/>
+              <a:t>of</a:t>
+            </a:r>
+            <a:r>
+              <a:rPr lang="de-AT" baseline="0" dirty="0" smtClean="0"/>
+              <a:t> </a:t>
+            </a:r>
+            <a:r>
+              <a:rPr lang="de-AT" baseline="0" dirty="0" err="1" smtClean="0"/>
+              <a:t>data</a:t>
+            </a:r>
+            <a:r>
+              <a:rPr lang="de-AT" baseline="0" dirty="0" smtClean="0"/>
+              <a:t> </a:t>
+            </a:r>
+            <a:r>
+              <a:rPr lang="de-AT" baseline="0" dirty="0" err="1" smtClean="0"/>
+              <a:t>and</a:t>
+            </a:r>
+            <a:r>
+              <a:rPr lang="de-AT" baseline="0" dirty="0" smtClean="0"/>
+              <a:t> </a:t>
+            </a:r>
+            <a:r>
+              <a:rPr lang="de-AT" baseline="0" dirty="0" err="1" smtClean="0"/>
+              <a:t>the</a:t>
+            </a:r>
+            <a:r>
+              <a:rPr lang="de-AT" baseline="0" dirty="0" smtClean="0"/>
+              <a:t> </a:t>
+            </a:r>
+            <a:r>
+              <a:rPr lang="de-AT" baseline="0" dirty="0" err="1" smtClean="0"/>
+              <a:t>removal</a:t>
+            </a:r>
+            <a:r>
+              <a:rPr lang="de-AT" baseline="0" dirty="0" smtClean="0"/>
+              <a:t> </a:t>
+            </a:r>
+            <a:r>
+              <a:rPr lang="de-AT" baseline="0" dirty="0" err="1" smtClean="0"/>
+              <a:t>of</a:t>
+            </a:r>
+            <a:r>
+              <a:rPr lang="de-AT" baseline="0" dirty="0" smtClean="0"/>
+              <a:t> a </a:t>
+            </a:r>
+            <a:r>
+              <a:rPr lang="de-AT" baseline="0" dirty="0" err="1" smtClean="0"/>
+              <a:t>third</a:t>
+            </a:r>
+            <a:r>
+              <a:rPr lang="de-AT" baseline="0" dirty="0" smtClean="0"/>
+              <a:t>-party </a:t>
+            </a:r>
+            <a:r>
+              <a:rPr lang="de-AT" baseline="0" dirty="0" err="1" smtClean="0"/>
+              <a:t>server</a:t>
+            </a:r>
+            <a:r>
+              <a:rPr lang="de-AT" baseline="0" dirty="0" smtClean="0"/>
+              <a:t> in </a:t>
+            </a:r>
+            <a:r>
+              <a:rPr lang="de-AT" baseline="0" dirty="0" err="1" smtClean="0"/>
+              <a:t>the</a:t>
+            </a:r>
+            <a:r>
+              <a:rPr lang="de-AT" baseline="0" dirty="0" smtClean="0"/>
+              <a:t> </a:t>
+            </a:r>
+            <a:r>
+              <a:rPr lang="de-AT" baseline="0" dirty="0" err="1" smtClean="0"/>
+              <a:t>communication</a:t>
+            </a:r>
+            <a:r>
+              <a:rPr lang="de-AT" baseline="0" dirty="0" smtClean="0"/>
+              <a:t> </a:t>
+            </a:r>
+            <a:r>
+              <a:rPr lang="de-AT" baseline="0" dirty="0" err="1" smtClean="0"/>
+              <a:t>process</a:t>
+            </a:r>
+            <a:r>
+              <a:rPr lang="de-AT" baseline="0" dirty="0" smtClean="0"/>
+              <a:t>, </a:t>
+            </a:r>
+            <a:r>
+              <a:rPr lang="de-AT" baseline="0" dirty="0" err="1" smtClean="0"/>
+              <a:t>solve</a:t>
+            </a:r>
+            <a:r>
+              <a:rPr lang="de-AT" baseline="0" dirty="0" smtClean="0"/>
+              <a:t> a </a:t>
+            </a:r>
+            <a:r>
+              <a:rPr lang="de-AT" baseline="0" dirty="0" err="1" smtClean="0"/>
+              <a:t>lot</a:t>
+            </a:r>
+            <a:r>
+              <a:rPr lang="de-AT" baseline="0" dirty="0" smtClean="0"/>
+              <a:t> </a:t>
+            </a:r>
+            <a:r>
+              <a:rPr lang="de-AT" baseline="0" dirty="0" err="1" smtClean="0"/>
+              <a:t>of</a:t>
+            </a:r>
+            <a:r>
+              <a:rPr lang="de-AT" baseline="0" dirty="0" smtClean="0"/>
+              <a:t> </a:t>
+            </a:r>
+            <a:r>
+              <a:rPr lang="de-AT" baseline="0" dirty="0" err="1" smtClean="0"/>
+              <a:t>the</a:t>
+            </a:r>
+            <a:r>
+              <a:rPr lang="de-AT" baseline="0" dirty="0" smtClean="0"/>
+              <a:t> </a:t>
+            </a:r>
+            <a:r>
+              <a:rPr lang="de-AT" baseline="0" dirty="0" err="1" smtClean="0"/>
+              <a:t>security</a:t>
+            </a:r>
+            <a:r>
+              <a:rPr lang="de-AT" baseline="0" dirty="0" smtClean="0"/>
+              <a:t> </a:t>
+            </a:r>
+            <a:r>
+              <a:rPr lang="de-AT" baseline="0" dirty="0" err="1" smtClean="0"/>
+              <a:t>concerns</a:t>
+            </a:r>
+            <a:r>
+              <a:rPr lang="de-AT" baseline="0" dirty="0" smtClean="0"/>
+              <a:t> </a:t>
+            </a:r>
+            <a:r>
+              <a:rPr lang="de-AT" baseline="0" dirty="0" err="1" smtClean="0"/>
+              <a:t>that</a:t>
+            </a:r>
+            <a:r>
+              <a:rPr lang="de-AT" baseline="0" dirty="0" smtClean="0"/>
+              <a:t> </a:t>
+            </a:r>
+            <a:r>
+              <a:rPr lang="de-AT" baseline="0" dirty="0" err="1" smtClean="0"/>
+              <a:t>companies</a:t>
+            </a:r>
+            <a:r>
+              <a:rPr lang="de-AT" baseline="0" dirty="0" smtClean="0"/>
+              <a:t> </a:t>
+            </a:r>
+            <a:r>
+              <a:rPr lang="de-AT" baseline="0" dirty="0" err="1" smtClean="0"/>
+              <a:t>might</a:t>
+            </a:r>
+            <a:r>
+              <a:rPr lang="de-AT" baseline="0" dirty="0" smtClean="0"/>
+              <a:t> </a:t>
+            </a:r>
+            <a:r>
+              <a:rPr lang="de-AT" baseline="0" dirty="0" err="1" smtClean="0"/>
+              <a:t>have</a:t>
+            </a:r>
+            <a:r>
+              <a:rPr lang="de-AT" baseline="0" dirty="0" smtClean="0"/>
+              <a:t>.</a:t>
+            </a:r>
+          </a:p>
+          <a:p>
+            <a:pPr marL="0" indent="0">
+              <a:buFont typeface="Arial" panose="020B0604020202020204" pitchFamily="34" charset="0"/>
+              <a:buNone/>
+            </a:pPr>
+            <a:endParaRPr lang="de-AT" baseline="0" dirty="0" smtClean="0"/>
+          </a:p>
+          <a:p>
+            <a:pPr marL="0" indent="0">
+              <a:buFont typeface="Arial" panose="020B0604020202020204" pitchFamily="34" charset="0"/>
+              <a:buNone/>
+            </a:pPr>
+            <a:r>
+              <a:rPr lang="de-AT" baseline="0" dirty="0" err="1" smtClean="0"/>
+              <a:t>There</a:t>
+            </a:r>
+            <a:r>
+              <a:rPr lang="de-AT" baseline="0" dirty="0" smtClean="0"/>
+              <a:t> </a:t>
+            </a:r>
+            <a:r>
+              <a:rPr lang="de-AT" baseline="0" dirty="0" err="1" smtClean="0"/>
+              <a:t>are</a:t>
+            </a:r>
+            <a:r>
+              <a:rPr lang="de-AT" baseline="0" dirty="0" smtClean="0"/>
+              <a:t> a </a:t>
+            </a:r>
+            <a:r>
+              <a:rPr lang="de-AT" baseline="0" dirty="0" err="1" smtClean="0"/>
+              <a:t>lot</a:t>
+            </a:r>
+            <a:r>
+              <a:rPr lang="de-AT" baseline="0" dirty="0" smtClean="0"/>
+              <a:t> </a:t>
+            </a:r>
+            <a:r>
+              <a:rPr lang="de-AT" baseline="0" dirty="0" err="1" smtClean="0"/>
+              <a:t>of</a:t>
+            </a:r>
+            <a:r>
+              <a:rPr lang="de-AT" baseline="0" dirty="0" smtClean="0"/>
+              <a:t> </a:t>
+            </a:r>
+            <a:r>
+              <a:rPr lang="de-AT" baseline="0" dirty="0" err="1" smtClean="0"/>
+              <a:t>loose</a:t>
+            </a:r>
+            <a:r>
+              <a:rPr lang="de-AT" baseline="0" dirty="0" smtClean="0"/>
+              <a:t> </a:t>
+            </a:r>
+            <a:r>
+              <a:rPr lang="de-AT" baseline="0" dirty="0" err="1" smtClean="0"/>
+              <a:t>code</a:t>
+            </a:r>
+            <a:r>
+              <a:rPr lang="de-AT" baseline="0" dirty="0" smtClean="0"/>
+              <a:t> </a:t>
+            </a:r>
+            <a:r>
+              <a:rPr lang="de-AT" baseline="0" dirty="0" err="1" smtClean="0"/>
+              <a:t>snippets</a:t>
+            </a:r>
+            <a:r>
+              <a:rPr lang="de-AT" baseline="0" dirty="0" smtClean="0"/>
+              <a:t> </a:t>
+            </a:r>
+            <a:r>
+              <a:rPr lang="de-AT" baseline="0" dirty="0" err="1" smtClean="0"/>
+              <a:t>for</a:t>
+            </a:r>
+            <a:r>
+              <a:rPr lang="de-AT" baseline="0" dirty="0" smtClean="0"/>
+              <a:t> </a:t>
+            </a:r>
+            <a:r>
+              <a:rPr lang="de-AT" baseline="0" dirty="0" err="1" smtClean="0"/>
+              <a:t>building</a:t>
+            </a:r>
+            <a:r>
+              <a:rPr lang="de-AT" baseline="0" dirty="0" smtClean="0"/>
+              <a:t> a </a:t>
+            </a:r>
+            <a:r>
+              <a:rPr lang="de-AT" baseline="0" dirty="0" err="1" smtClean="0"/>
+              <a:t>WebRTC</a:t>
+            </a:r>
+            <a:r>
+              <a:rPr lang="de-AT" baseline="0" dirty="0" smtClean="0"/>
+              <a:t> </a:t>
+            </a:r>
+            <a:r>
+              <a:rPr lang="de-AT" baseline="0" dirty="0" err="1" smtClean="0"/>
+              <a:t>demo</a:t>
+            </a:r>
+            <a:r>
+              <a:rPr lang="de-AT" baseline="0" dirty="0" smtClean="0"/>
+              <a:t> </a:t>
+            </a:r>
+            <a:r>
+              <a:rPr lang="de-AT" baseline="0" dirty="0" err="1" smtClean="0"/>
+              <a:t>from</a:t>
+            </a:r>
+            <a:r>
+              <a:rPr lang="de-AT" baseline="0" dirty="0" smtClean="0"/>
+              <a:t> a </a:t>
+            </a:r>
+            <a:r>
+              <a:rPr lang="de-AT" baseline="0" dirty="0" err="1" smtClean="0"/>
+              <a:t>few</a:t>
+            </a:r>
+            <a:r>
+              <a:rPr lang="de-AT" baseline="0" dirty="0" smtClean="0"/>
+              <a:t> </a:t>
+            </a:r>
+            <a:r>
+              <a:rPr lang="de-AT" baseline="0" dirty="0" err="1" smtClean="0"/>
+              <a:t>years</a:t>
+            </a:r>
+            <a:r>
+              <a:rPr lang="de-AT" baseline="0" dirty="0" smtClean="0"/>
+              <a:t> </a:t>
+            </a:r>
+            <a:r>
+              <a:rPr lang="de-AT" baseline="0" dirty="0" err="1" smtClean="0"/>
+              <a:t>ago</a:t>
+            </a:r>
+            <a:r>
+              <a:rPr lang="de-AT" baseline="0" dirty="0" smtClean="0"/>
+              <a:t>, </a:t>
+            </a:r>
+            <a:r>
+              <a:rPr lang="de-AT" baseline="0" dirty="0" err="1" smtClean="0"/>
+              <a:t>when</a:t>
+            </a:r>
+            <a:r>
+              <a:rPr lang="de-AT" baseline="0" dirty="0" smtClean="0"/>
+              <a:t> </a:t>
+            </a:r>
+            <a:r>
+              <a:rPr lang="de-AT" baseline="0" dirty="0" err="1" smtClean="0"/>
+              <a:t>WebRTC</a:t>
+            </a:r>
+            <a:r>
+              <a:rPr lang="de-AT" baseline="0" dirty="0" smtClean="0"/>
+              <a:t> was </a:t>
+            </a:r>
+            <a:r>
+              <a:rPr lang="de-AT" baseline="0" dirty="0" err="1" smtClean="0"/>
+              <a:t>introduced</a:t>
+            </a:r>
+            <a:r>
+              <a:rPr lang="de-AT" baseline="0" dirty="0" smtClean="0"/>
+              <a:t>, </a:t>
+            </a:r>
+            <a:r>
+              <a:rPr lang="de-AT" baseline="0" dirty="0" err="1" smtClean="0"/>
+              <a:t>including</a:t>
+            </a:r>
+            <a:r>
+              <a:rPr lang="de-AT" baseline="0" dirty="0" smtClean="0"/>
+              <a:t> </a:t>
+            </a:r>
+            <a:r>
+              <a:rPr lang="de-AT" baseline="0" dirty="0" err="1" smtClean="0"/>
+              <a:t>propositions</a:t>
+            </a:r>
+            <a:r>
+              <a:rPr lang="de-AT" baseline="0" dirty="0" smtClean="0"/>
+              <a:t> on </a:t>
+            </a:r>
+            <a:r>
+              <a:rPr lang="de-AT" baseline="0" dirty="0" err="1" smtClean="0"/>
+              <a:t>how</a:t>
+            </a:r>
+            <a:r>
+              <a:rPr lang="de-AT" baseline="0" dirty="0" smtClean="0"/>
+              <a:t> </a:t>
+            </a:r>
+            <a:r>
+              <a:rPr lang="de-AT" baseline="0" dirty="0" err="1" smtClean="0"/>
+              <a:t>to</a:t>
+            </a:r>
+            <a:r>
+              <a:rPr lang="de-AT" baseline="0" dirty="0" smtClean="0"/>
+              <a:t> </a:t>
+            </a:r>
+            <a:r>
+              <a:rPr lang="de-AT" baseline="0" dirty="0" err="1" smtClean="0"/>
+              <a:t>integrate</a:t>
+            </a:r>
+            <a:r>
+              <a:rPr lang="de-AT" baseline="0" dirty="0" smtClean="0"/>
+              <a:t> a </a:t>
+            </a:r>
+            <a:r>
+              <a:rPr lang="de-AT" baseline="0" dirty="0" err="1" smtClean="0"/>
+              <a:t>management</a:t>
+            </a:r>
+            <a:r>
+              <a:rPr lang="de-AT" baseline="0" dirty="0" smtClean="0"/>
+              <a:t> </a:t>
+            </a:r>
+            <a:r>
+              <a:rPr lang="de-AT" baseline="0" dirty="0" err="1" smtClean="0"/>
+              <a:t>server</a:t>
+            </a:r>
+            <a:r>
+              <a:rPr lang="de-AT" baseline="0" dirty="0" smtClean="0"/>
+              <a:t>. </a:t>
+            </a:r>
+            <a:r>
+              <a:rPr lang="de-AT" baseline="0" dirty="0" err="1" smtClean="0"/>
+              <a:t>However</a:t>
+            </a:r>
+            <a:r>
+              <a:rPr lang="de-AT" baseline="0" dirty="0" smtClean="0"/>
+              <a:t>, </a:t>
+            </a:r>
+            <a:r>
+              <a:rPr lang="de-AT" baseline="0" dirty="0" err="1" smtClean="0"/>
+              <a:t>there‘s</a:t>
+            </a:r>
+            <a:r>
+              <a:rPr lang="de-AT" baseline="0" dirty="0" smtClean="0"/>
+              <a:t> a lack </a:t>
+            </a:r>
+            <a:r>
+              <a:rPr lang="de-AT" baseline="0" dirty="0" err="1" smtClean="0"/>
+              <a:t>of</a:t>
+            </a:r>
+            <a:r>
+              <a:rPr lang="de-AT" baseline="0" dirty="0" smtClean="0"/>
+              <a:t> a </a:t>
+            </a:r>
+            <a:r>
+              <a:rPr lang="de-AT" baseline="0" dirty="0" err="1" smtClean="0"/>
+              <a:t>fully</a:t>
+            </a:r>
+            <a:r>
+              <a:rPr lang="de-AT" baseline="0" dirty="0" smtClean="0"/>
+              <a:t> </a:t>
+            </a:r>
+            <a:r>
+              <a:rPr lang="de-AT" baseline="0" dirty="0" err="1" smtClean="0"/>
+              <a:t>integrated</a:t>
+            </a:r>
+            <a:r>
+              <a:rPr lang="de-AT" baseline="0" dirty="0" smtClean="0"/>
+              <a:t> open </a:t>
+            </a:r>
+            <a:r>
+              <a:rPr lang="de-AT" baseline="0" dirty="0" err="1" smtClean="0"/>
+              <a:t>source</a:t>
+            </a:r>
+            <a:r>
+              <a:rPr lang="de-AT" baseline="0" dirty="0" smtClean="0"/>
+              <a:t> </a:t>
+            </a:r>
+            <a:r>
+              <a:rPr lang="de-AT" baseline="0" dirty="0" err="1" smtClean="0"/>
+              <a:t>solution</a:t>
+            </a:r>
+            <a:r>
+              <a:rPr lang="de-AT" baseline="0" dirty="0" smtClean="0"/>
+              <a:t> </a:t>
+            </a:r>
+            <a:r>
+              <a:rPr lang="de-AT" baseline="0" dirty="0" err="1" smtClean="0"/>
+              <a:t>with</a:t>
+            </a:r>
+            <a:r>
+              <a:rPr lang="de-AT" baseline="0" dirty="0" smtClean="0"/>
+              <a:t> </a:t>
+            </a:r>
+            <a:r>
+              <a:rPr lang="de-AT" baseline="0" dirty="0" err="1" smtClean="0"/>
+              <a:t>the</a:t>
+            </a:r>
+            <a:r>
+              <a:rPr lang="de-AT" baseline="0" dirty="0" smtClean="0"/>
+              <a:t> </a:t>
+            </a:r>
+            <a:r>
+              <a:rPr lang="de-AT" baseline="0" dirty="0" err="1" smtClean="0"/>
+              <a:t>current</a:t>
+            </a:r>
+            <a:r>
+              <a:rPr lang="de-AT" baseline="0" dirty="0" smtClean="0"/>
+              <a:t> </a:t>
+            </a:r>
+            <a:r>
+              <a:rPr lang="de-AT" baseline="0" dirty="0" err="1" smtClean="0"/>
+              <a:t>WebRTC</a:t>
+            </a:r>
+            <a:r>
+              <a:rPr lang="de-AT" baseline="0" dirty="0" smtClean="0"/>
+              <a:t> </a:t>
+            </a:r>
+            <a:r>
+              <a:rPr lang="de-AT" baseline="0" dirty="0" err="1" smtClean="0"/>
+              <a:t>specifications</a:t>
+            </a:r>
+            <a:r>
+              <a:rPr lang="de-AT" baseline="0" dirty="0" smtClean="0"/>
+              <a:t>. </a:t>
+            </a:r>
+            <a:r>
+              <a:rPr lang="de-AT" baseline="0" dirty="0" err="1" smtClean="0"/>
+              <a:t>Aditionally</a:t>
+            </a:r>
+            <a:r>
+              <a:rPr lang="de-AT" baseline="0" dirty="0" smtClean="0"/>
+              <a:t>, </a:t>
+            </a:r>
+            <a:r>
+              <a:rPr lang="de-AT" baseline="0" dirty="0" err="1" smtClean="0"/>
+              <a:t>most</a:t>
+            </a:r>
+            <a:r>
+              <a:rPr lang="de-AT" baseline="0" dirty="0" smtClean="0"/>
+              <a:t> </a:t>
+            </a:r>
+            <a:r>
+              <a:rPr lang="de-AT" baseline="0" dirty="0" err="1" smtClean="0"/>
+              <a:t>of</a:t>
+            </a:r>
+            <a:r>
+              <a:rPr lang="de-AT" baseline="0" dirty="0" smtClean="0"/>
+              <a:t> </a:t>
+            </a:r>
+            <a:r>
+              <a:rPr lang="de-AT" baseline="0" dirty="0" err="1" smtClean="0"/>
+              <a:t>the</a:t>
+            </a:r>
+            <a:r>
+              <a:rPr lang="de-AT" baseline="0" dirty="0" smtClean="0"/>
+              <a:t> </a:t>
+            </a:r>
+            <a:r>
+              <a:rPr lang="de-AT" baseline="0" dirty="0" err="1" smtClean="0"/>
+              <a:t>demos</a:t>
+            </a:r>
+            <a:r>
+              <a:rPr lang="de-AT" baseline="0" dirty="0" smtClean="0"/>
+              <a:t> </a:t>
+            </a:r>
+            <a:r>
+              <a:rPr lang="de-AT" baseline="0" dirty="0" err="1" smtClean="0"/>
+              <a:t>use</a:t>
+            </a:r>
+            <a:r>
+              <a:rPr lang="de-AT" baseline="0" dirty="0" smtClean="0"/>
+              <a:t> additional </a:t>
+            </a:r>
+            <a:r>
+              <a:rPr lang="de-AT" baseline="0" dirty="0" err="1" smtClean="0"/>
+              <a:t>libraries</a:t>
+            </a:r>
+            <a:r>
+              <a:rPr lang="de-AT" baseline="0" dirty="0" smtClean="0"/>
+              <a:t>, like socket.io. In </a:t>
+            </a:r>
+            <a:r>
+              <a:rPr lang="de-AT" baseline="0" dirty="0" err="1" smtClean="0"/>
+              <a:t>this</a:t>
+            </a:r>
+            <a:r>
+              <a:rPr lang="de-AT" baseline="0" dirty="0" smtClean="0"/>
+              <a:t> </a:t>
+            </a:r>
+            <a:r>
+              <a:rPr lang="de-AT" baseline="0" dirty="0" err="1" smtClean="0"/>
+              <a:t>application</a:t>
+            </a:r>
+            <a:r>
+              <a:rPr lang="de-AT" baseline="0" dirty="0" smtClean="0"/>
+              <a:t>, all </a:t>
+            </a:r>
+            <a:r>
+              <a:rPr lang="de-AT" baseline="0" dirty="0" err="1" smtClean="0"/>
+              <a:t>of</a:t>
+            </a:r>
+            <a:r>
+              <a:rPr lang="de-AT" baseline="0" dirty="0" smtClean="0"/>
+              <a:t> </a:t>
+            </a:r>
+            <a:r>
+              <a:rPr lang="de-AT" baseline="0" dirty="0" err="1" smtClean="0"/>
+              <a:t>the</a:t>
+            </a:r>
+            <a:r>
+              <a:rPr lang="de-AT" baseline="0" dirty="0" smtClean="0"/>
+              <a:t> </a:t>
+            </a:r>
+            <a:r>
+              <a:rPr lang="de-AT" baseline="0" dirty="0" err="1" smtClean="0"/>
+              <a:t>server</a:t>
+            </a:r>
+            <a:r>
+              <a:rPr lang="de-AT" baseline="0" dirty="0" smtClean="0"/>
+              <a:t> </a:t>
+            </a:r>
+            <a:r>
+              <a:rPr lang="de-AT" baseline="0" dirty="0" err="1" smtClean="0"/>
+              <a:t>functionality</a:t>
+            </a:r>
+            <a:r>
+              <a:rPr lang="de-AT" baseline="0" dirty="0" smtClean="0"/>
+              <a:t> </a:t>
+            </a:r>
+            <a:r>
+              <a:rPr lang="de-AT" baseline="0" dirty="0" err="1" smtClean="0"/>
+              <a:t>is</a:t>
+            </a:r>
+            <a:r>
+              <a:rPr lang="de-AT" baseline="0" dirty="0" smtClean="0"/>
+              <a:t> </a:t>
+            </a:r>
+            <a:r>
+              <a:rPr lang="de-AT" baseline="0" dirty="0" err="1" smtClean="0"/>
+              <a:t>self-developed</a:t>
+            </a:r>
+            <a:r>
+              <a:rPr lang="de-AT" baseline="0" dirty="0" smtClean="0"/>
+              <a:t> </a:t>
+            </a:r>
+            <a:r>
+              <a:rPr lang="de-AT" baseline="0" dirty="0" err="1" smtClean="0"/>
+              <a:t>and</a:t>
+            </a:r>
+            <a:r>
+              <a:rPr lang="de-AT" baseline="0" dirty="0" smtClean="0"/>
+              <a:t> open </a:t>
+            </a:r>
+            <a:r>
+              <a:rPr lang="de-AT" baseline="0" dirty="0" err="1" smtClean="0"/>
+              <a:t>source</a:t>
+            </a:r>
+            <a:r>
+              <a:rPr lang="de-AT" baseline="0" dirty="0" smtClean="0"/>
+              <a:t>, </a:t>
+            </a:r>
+            <a:r>
+              <a:rPr lang="de-AT" baseline="0" dirty="0" err="1" smtClean="0"/>
+              <a:t>thus</a:t>
+            </a:r>
+            <a:r>
+              <a:rPr lang="de-AT" baseline="0" dirty="0" smtClean="0"/>
+              <a:t> </a:t>
+            </a:r>
+            <a:r>
+              <a:rPr lang="de-AT" baseline="0" dirty="0" err="1" smtClean="0"/>
+              <a:t>fully</a:t>
+            </a:r>
+            <a:r>
+              <a:rPr lang="de-AT" baseline="0" dirty="0" smtClean="0"/>
+              <a:t> </a:t>
+            </a:r>
+            <a:r>
+              <a:rPr lang="de-AT" baseline="0" dirty="0" err="1" smtClean="0"/>
+              <a:t>configurable</a:t>
+            </a:r>
+            <a:r>
+              <a:rPr lang="de-AT" baseline="0" dirty="0" smtClean="0"/>
+              <a:t> </a:t>
+            </a:r>
+            <a:r>
+              <a:rPr lang="de-AT" baseline="0" dirty="0" err="1" smtClean="0"/>
+              <a:t>and</a:t>
+            </a:r>
+            <a:r>
+              <a:rPr lang="de-AT" baseline="0" dirty="0" smtClean="0"/>
+              <a:t> </a:t>
+            </a:r>
+            <a:r>
+              <a:rPr lang="de-AT" baseline="0" dirty="0" err="1" smtClean="0"/>
+              <a:t>extendable</a:t>
+            </a:r>
+            <a:r>
+              <a:rPr lang="de-AT" baseline="0" dirty="0" smtClean="0"/>
+              <a:t>.</a:t>
+            </a:r>
+          </a:p>
+          <a:p>
+            <a:pPr marL="0" indent="0">
+              <a:buFont typeface="Arial" panose="020B0604020202020204" pitchFamily="34" charset="0"/>
+              <a:buNone/>
+            </a:pPr>
+            <a:endParaRPr lang="de-AT" baseline="0" dirty="0" smtClean="0"/>
+          </a:p>
+          <a:p>
+            <a:pPr marL="0" indent="0">
+              <a:buFont typeface="Arial" panose="020B0604020202020204" pitchFamily="34" charset="0"/>
+              <a:buNone/>
+            </a:pPr>
+            <a:r>
+              <a:rPr lang="de-AT" baseline="0" dirty="0" err="1" smtClean="0"/>
+              <a:t>It‘s</a:t>
+            </a:r>
+            <a:r>
+              <a:rPr lang="de-AT" baseline="0" dirty="0" smtClean="0"/>
+              <a:t> a </a:t>
+            </a:r>
+            <a:r>
+              <a:rPr lang="de-AT" baseline="0" dirty="0" err="1" smtClean="0"/>
+              <a:t>very</a:t>
+            </a:r>
+            <a:r>
+              <a:rPr lang="de-AT" baseline="0" dirty="0" smtClean="0"/>
+              <a:t> </a:t>
+            </a:r>
+            <a:r>
+              <a:rPr lang="de-AT" baseline="0" dirty="0" err="1" smtClean="0"/>
+              <a:t>interesting</a:t>
+            </a:r>
+            <a:r>
+              <a:rPr lang="de-AT" baseline="0" dirty="0" smtClean="0"/>
+              <a:t> </a:t>
+            </a:r>
+            <a:r>
+              <a:rPr lang="de-AT" baseline="0" dirty="0" err="1" smtClean="0"/>
+              <a:t>and</a:t>
+            </a:r>
+            <a:r>
+              <a:rPr lang="de-AT" baseline="0" dirty="0" smtClean="0"/>
+              <a:t> fast-</a:t>
+            </a:r>
+            <a:r>
+              <a:rPr lang="de-AT" baseline="0" dirty="0" err="1" smtClean="0"/>
+              <a:t>emerging</a:t>
+            </a:r>
+            <a:r>
+              <a:rPr lang="de-AT" baseline="0" dirty="0" smtClean="0"/>
+              <a:t> </a:t>
+            </a:r>
+            <a:r>
+              <a:rPr lang="de-AT" baseline="0" dirty="0" err="1" smtClean="0"/>
+              <a:t>technology</a:t>
+            </a:r>
+            <a:r>
+              <a:rPr lang="de-AT" baseline="0" dirty="0" smtClean="0"/>
+              <a:t>:</a:t>
+            </a:r>
+          </a:p>
+          <a:p>
+            <a:pPr marL="171450" indent="-171450">
+              <a:buFont typeface="Arial" panose="020B0604020202020204" pitchFamily="34" charset="0"/>
+              <a:buChar char="•"/>
+            </a:pPr>
+            <a:r>
+              <a:rPr lang="de-AT" baseline="0" dirty="0" smtClean="0"/>
+              <a:t>Just </a:t>
+            </a:r>
+            <a:r>
+              <a:rPr lang="de-AT" baseline="0" dirty="0" err="1" smtClean="0"/>
+              <a:t>four</a:t>
+            </a:r>
+            <a:r>
+              <a:rPr lang="de-AT" baseline="0" dirty="0" smtClean="0"/>
+              <a:t> </a:t>
+            </a:r>
+            <a:r>
+              <a:rPr lang="de-AT" baseline="0" dirty="0" err="1" smtClean="0"/>
+              <a:t>years</a:t>
+            </a:r>
+            <a:r>
+              <a:rPr lang="de-AT" baseline="0" dirty="0" smtClean="0"/>
+              <a:t> </a:t>
+            </a:r>
+            <a:r>
+              <a:rPr lang="de-AT" baseline="0" dirty="0" err="1" smtClean="0"/>
+              <a:t>ago</a:t>
+            </a:r>
+            <a:r>
+              <a:rPr lang="de-AT" baseline="0" dirty="0" smtClean="0"/>
+              <a:t> </a:t>
+            </a:r>
+            <a:r>
+              <a:rPr lang="de-AT" baseline="0" dirty="0" err="1" smtClean="0"/>
+              <a:t>it</a:t>
+            </a:r>
+            <a:r>
+              <a:rPr lang="de-AT" baseline="0" dirty="0" smtClean="0"/>
+              <a:t> was </a:t>
+            </a:r>
+            <a:r>
+              <a:rPr lang="de-AT" baseline="0" dirty="0" err="1" smtClean="0"/>
+              <a:t>announced</a:t>
+            </a:r>
+            <a:r>
+              <a:rPr lang="de-AT" baseline="0" dirty="0" smtClean="0"/>
+              <a:t> </a:t>
+            </a:r>
+            <a:r>
+              <a:rPr lang="de-AT" baseline="0" dirty="0" err="1" smtClean="0"/>
+              <a:t>for</a:t>
+            </a:r>
+            <a:r>
+              <a:rPr lang="de-AT" baseline="0" dirty="0" smtClean="0"/>
+              <a:t> </a:t>
+            </a:r>
+            <a:r>
+              <a:rPr lang="de-AT" baseline="0" dirty="0" err="1" smtClean="0"/>
+              <a:t>the</a:t>
+            </a:r>
+            <a:r>
+              <a:rPr lang="de-AT" baseline="0" dirty="0" smtClean="0"/>
+              <a:t> </a:t>
+            </a:r>
+            <a:r>
+              <a:rPr lang="de-AT" baseline="0" dirty="0" err="1" smtClean="0"/>
+              <a:t>first</a:t>
+            </a:r>
+            <a:r>
+              <a:rPr lang="de-AT" baseline="0" dirty="0" smtClean="0"/>
+              <a:t> time </a:t>
+            </a:r>
+            <a:r>
+              <a:rPr lang="de-AT" baseline="0" dirty="0" err="1" smtClean="0"/>
+              <a:t>by</a:t>
+            </a:r>
+            <a:r>
+              <a:rPr lang="de-AT" baseline="0" dirty="0" smtClean="0"/>
+              <a:t> Google</a:t>
+            </a:r>
+          </a:p>
+          <a:p>
+            <a:pPr marL="171450" indent="-171450">
+              <a:buFont typeface="Arial" panose="020B0604020202020204" pitchFamily="34" charset="0"/>
+              <a:buChar char="•"/>
+            </a:pPr>
+            <a:r>
+              <a:rPr lang="de-AT" baseline="0" dirty="0" err="1" smtClean="0"/>
+              <a:t>For</a:t>
+            </a:r>
+            <a:r>
+              <a:rPr lang="de-AT" baseline="0" dirty="0" smtClean="0"/>
+              <a:t> a </a:t>
+            </a:r>
+            <a:r>
+              <a:rPr lang="de-AT" baseline="0" dirty="0" err="1" smtClean="0"/>
+              <a:t>little</a:t>
+            </a:r>
+            <a:r>
+              <a:rPr lang="de-AT" baseline="0" dirty="0" smtClean="0"/>
+              <a:t> </a:t>
+            </a:r>
+            <a:r>
+              <a:rPr lang="de-AT" baseline="0" dirty="0" err="1" smtClean="0"/>
+              <a:t>over</a:t>
+            </a:r>
+            <a:r>
+              <a:rPr lang="de-AT" baseline="0" dirty="0" smtClean="0"/>
+              <a:t> </a:t>
+            </a:r>
+            <a:r>
+              <a:rPr lang="de-AT" baseline="0" dirty="0" err="1" smtClean="0"/>
+              <a:t>two</a:t>
+            </a:r>
+            <a:r>
+              <a:rPr lang="de-AT" baseline="0" dirty="0" smtClean="0"/>
+              <a:t> </a:t>
+            </a:r>
+            <a:r>
+              <a:rPr lang="de-AT" baseline="0" dirty="0" err="1" smtClean="0"/>
+              <a:t>years</a:t>
+            </a:r>
+            <a:r>
+              <a:rPr lang="de-AT" baseline="0" dirty="0" smtClean="0"/>
+              <a:t>, Chrome </a:t>
+            </a:r>
+            <a:r>
+              <a:rPr lang="de-AT" baseline="0" dirty="0" err="1" smtClean="0"/>
+              <a:t>and</a:t>
+            </a:r>
+            <a:r>
+              <a:rPr lang="de-AT" baseline="0" dirty="0" smtClean="0"/>
+              <a:t> Firefox </a:t>
+            </a:r>
+            <a:r>
+              <a:rPr lang="de-AT" baseline="0" dirty="0" err="1" smtClean="0"/>
+              <a:t>can</a:t>
+            </a:r>
+            <a:r>
+              <a:rPr lang="de-AT" baseline="0" dirty="0" smtClean="0"/>
+              <a:t> </a:t>
+            </a:r>
+            <a:r>
+              <a:rPr lang="de-AT" baseline="0" dirty="0" err="1" smtClean="0"/>
+              <a:t>work</a:t>
+            </a:r>
+            <a:r>
+              <a:rPr lang="de-AT" baseline="0" dirty="0" smtClean="0"/>
+              <a:t> </a:t>
+            </a:r>
+            <a:r>
+              <a:rPr lang="de-AT" baseline="0" dirty="0" err="1" smtClean="0"/>
+              <a:t>together</a:t>
+            </a:r>
+            <a:endParaRPr lang="de-AT" baseline="0" dirty="0" smtClean="0"/>
+          </a:p>
+          <a:p>
+            <a:pPr marL="0" indent="0">
+              <a:buFont typeface="Arial" panose="020B0604020202020204" pitchFamily="34" charset="0"/>
+              <a:buNone/>
+            </a:pPr>
+            <a:endParaRPr lang="de-AT" baseline="0" dirty="0" smtClean="0"/>
+          </a:p>
+          <a:p>
+            <a:pPr marL="0" indent="0">
+              <a:buFont typeface="Arial" panose="020B0604020202020204" pitchFamily="34" charset="0"/>
+              <a:buNone/>
+            </a:pPr>
+            <a:r>
+              <a:rPr lang="de-AT" baseline="0" dirty="0" err="1" smtClean="0"/>
+              <a:t>It</a:t>
+            </a:r>
+            <a:r>
+              <a:rPr lang="de-AT" baseline="0" dirty="0" smtClean="0"/>
+              <a:t> </a:t>
+            </a:r>
+            <a:r>
+              <a:rPr lang="de-AT" baseline="0" dirty="0" err="1" smtClean="0"/>
+              <a:t>brings</a:t>
+            </a:r>
+            <a:r>
+              <a:rPr lang="de-AT" baseline="0" dirty="0" smtClean="0"/>
+              <a:t> lots </a:t>
+            </a:r>
+            <a:r>
+              <a:rPr lang="de-AT" baseline="0" dirty="0" err="1" smtClean="0"/>
+              <a:t>of</a:t>
+            </a:r>
+            <a:r>
+              <a:rPr lang="de-AT" baseline="0" dirty="0" smtClean="0"/>
+              <a:t> </a:t>
+            </a:r>
+            <a:r>
+              <a:rPr lang="de-AT" baseline="0" dirty="0" err="1" smtClean="0"/>
+              <a:t>advantages</a:t>
+            </a:r>
+            <a:r>
+              <a:rPr lang="de-AT" baseline="0" dirty="0" smtClean="0"/>
+              <a:t> </a:t>
+            </a:r>
+            <a:r>
+              <a:rPr lang="de-AT" baseline="0" dirty="0" err="1" smtClean="0"/>
+              <a:t>for</a:t>
+            </a:r>
+            <a:r>
+              <a:rPr lang="de-AT" baseline="0" dirty="0" smtClean="0"/>
+              <a:t> </a:t>
+            </a:r>
+            <a:r>
+              <a:rPr lang="de-AT" baseline="0" dirty="0" err="1" smtClean="0"/>
+              <a:t>business</a:t>
+            </a:r>
+            <a:r>
+              <a:rPr lang="de-AT" baseline="0" dirty="0" smtClean="0"/>
+              <a:t> </a:t>
+            </a:r>
+            <a:r>
+              <a:rPr lang="de-AT" baseline="0" dirty="0" err="1" smtClean="0"/>
+              <a:t>and</a:t>
+            </a:r>
+            <a:r>
+              <a:rPr lang="de-AT" baseline="0" dirty="0" smtClean="0"/>
+              <a:t> </a:t>
+            </a:r>
+            <a:r>
+              <a:rPr lang="de-AT" baseline="0" dirty="0" err="1" smtClean="0"/>
+              <a:t>customers</a:t>
+            </a:r>
+            <a:r>
+              <a:rPr lang="de-AT" baseline="0" dirty="0" smtClean="0"/>
+              <a:t>: Companies </a:t>
+            </a:r>
+            <a:r>
+              <a:rPr lang="de-AT" baseline="0" dirty="0" err="1" smtClean="0"/>
+              <a:t>can</a:t>
+            </a:r>
+            <a:r>
+              <a:rPr lang="de-AT" baseline="0" dirty="0" smtClean="0"/>
+              <a:t> </a:t>
+            </a:r>
+            <a:r>
+              <a:rPr lang="de-AT" baseline="0" dirty="0" err="1" smtClean="0"/>
+              <a:t>communicate</a:t>
+            </a:r>
+            <a:r>
+              <a:rPr lang="de-AT" baseline="0" dirty="0" smtClean="0"/>
+              <a:t> </a:t>
+            </a:r>
+            <a:r>
+              <a:rPr lang="de-AT" baseline="0" dirty="0" err="1" smtClean="0"/>
+              <a:t>with</a:t>
+            </a:r>
+            <a:r>
+              <a:rPr lang="de-AT" baseline="0" dirty="0" smtClean="0"/>
+              <a:t> </a:t>
+            </a:r>
+            <a:r>
+              <a:rPr lang="de-AT" baseline="0" dirty="0" err="1" smtClean="0"/>
+              <a:t>their</a:t>
+            </a:r>
+            <a:r>
+              <a:rPr lang="de-AT" baseline="0" dirty="0" smtClean="0"/>
+              <a:t> </a:t>
+            </a:r>
+            <a:r>
+              <a:rPr lang="de-AT" baseline="0" dirty="0" err="1" smtClean="0"/>
+              <a:t>customers</a:t>
+            </a:r>
+            <a:r>
+              <a:rPr lang="de-AT" baseline="0" dirty="0" smtClean="0"/>
+              <a:t> </a:t>
+            </a:r>
+            <a:r>
+              <a:rPr lang="de-AT" baseline="0" dirty="0" err="1" smtClean="0"/>
+              <a:t>directly</a:t>
+            </a:r>
+            <a:r>
+              <a:rPr lang="de-AT" baseline="0" dirty="0" smtClean="0"/>
+              <a:t> </a:t>
+            </a:r>
+            <a:r>
+              <a:rPr lang="de-AT" baseline="0" dirty="0" err="1" smtClean="0"/>
+              <a:t>through</a:t>
+            </a:r>
+            <a:r>
+              <a:rPr lang="de-AT" baseline="0" dirty="0" smtClean="0"/>
+              <a:t> </a:t>
+            </a:r>
+            <a:r>
+              <a:rPr lang="de-AT" baseline="0" dirty="0" err="1" smtClean="0"/>
+              <a:t>the</a:t>
+            </a:r>
+            <a:r>
+              <a:rPr lang="de-AT" baseline="0" dirty="0" smtClean="0"/>
+              <a:t> web </a:t>
+            </a:r>
+            <a:r>
+              <a:rPr lang="de-AT" baseline="0" dirty="0" err="1" smtClean="0"/>
+              <a:t>page</a:t>
+            </a:r>
+            <a:r>
+              <a:rPr lang="de-AT" baseline="0" dirty="0" smtClean="0"/>
+              <a:t>, </a:t>
+            </a:r>
+            <a:r>
+              <a:rPr lang="de-AT" baseline="0" dirty="0" err="1" smtClean="0"/>
+              <a:t>thus</a:t>
+            </a:r>
+            <a:r>
+              <a:rPr lang="de-AT" baseline="0" dirty="0" smtClean="0"/>
+              <a:t> </a:t>
+            </a:r>
+            <a:r>
+              <a:rPr lang="de-AT" baseline="0" dirty="0" err="1" smtClean="0"/>
+              <a:t>eliminating</a:t>
+            </a:r>
+            <a:r>
+              <a:rPr lang="de-AT" baseline="0" dirty="0" smtClean="0"/>
+              <a:t> </a:t>
+            </a:r>
+            <a:r>
+              <a:rPr lang="de-AT" baseline="0" dirty="0" err="1" smtClean="0"/>
+              <a:t>the</a:t>
+            </a:r>
+            <a:r>
+              <a:rPr lang="de-AT" baseline="0" dirty="0" smtClean="0"/>
+              <a:t> </a:t>
+            </a:r>
+            <a:r>
+              <a:rPr lang="de-AT" baseline="0" dirty="0" err="1" smtClean="0"/>
+              <a:t>obstacle</a:t>
+            </a:r>
+            <a:r>
+              <a:rPr lang="de-AT" baseline="0" dirty="0" smtClean="0"/>
+              <a:t> </a:t>
+            </a:r>
+            <a:r>
+              <a:rPr lang="de-AT" baseline="0" dirty="0" err="1" smtClean="0"/>
+              <a:t>of</a:t>
+            </a:r>
+            <a:r>
+              <a:rPr lang="de-AT" baseline="0" dirty="0" smtClean="0"/>
+              <a:t> </a:t>
+            </a:r>
+            <a:r>
+              <a:rPr lang="de-AT" baseline="0" dirty="0" err="1" smtClean="0"/>
+              <a:t>setting</a:t>
+            </a:r>
+            <a:r>
+              <a:rPr lang="de-AT" baseline="0" dirty="0" smtClean="0"/>
+              <a:t> </a:t>
+            </a:r>
+            <a:r>
+              <a:rPr lang="de-AT" baseline="0" dirty="0" err="1" smtClean="0"/>
+              <a:t>up</a:t>
+            </a:r>
+            <a:r>
+              <a:rPr lang="de-AT" baseline="0" dirty="0" smtClean="0"/>
+              <a:t> a personal </a:t>
+            </a:r>
+            <a:r>
+              <a:rPr lang="de-AT" baseline="0" dirty="0" err="1" smtClean="0"/>
+              <a:t>appointment</a:t>
+            </a:r>
+            <a:endParaRPr lang="de-AT" baseline="0" dirty="0" smtClean="0"/>
+          </a:p>
+          <a:p>
+            <a:pPr marL="0" indent="0">
+              <a:buFont typeface="Arial" panose="020B0604020202020204" pitchFamily="34" charset="0"/>
+              <a:buNone/>
+            </a:pPr>
+            <a:endParaRPr lang="de-AT" baseline="0" dirty="0" smtClean="0"/>
+          </a:p>
+          <a:p>
+            <a:pPr marL="0" indent="0">
+              <a:buFont typeface="Arial" panose="020B0604020202020204" pitchFamily="34" charset="0"/>
+              <a:buNone/>
+            </a:pPr>
+            <a:r>
+              <a:rPr lang="de-AT" baseline="0" dirty="0" err="1" smtClean="0"/>
+              <a:t>Examples</a:t>
+            </a:r>
+            <a:r>
+              <a:rPr lang="de-AT" baseline="0" dirty="0" smtClean="0"/>
+              <a:t> </a:t>
+            </a:r>
+            <a:r>
+              <a:rPr lang="de-AT" baseline="0" dirty="0" err="1" smtClean="0"/>
+              <a:t>of</a:t>
+            </a:r>
+            <a:r>
+              <a:rPr lang="de-AT" baseline="0" dirty="0" smtClean="0"/>
+              <a:t> </a:t>
+            </a:r>
+            <a:r>
+              <a:rPr lang="de-AT" baseline="0" dirty="0" err="1" smtClean="0"/>
+              <a:t>existing</a:t>
+            </a:r>
+            <a:r>
+              <a:rPr lang="de-AT" baseline="0" dirty="0" smtClean="0"/>
+              <a:t> </a:t>
+            </a:r>
+            <a:r>
+              <a:rPr lang="de-AT" baseline="0" dirty="0" err="1" smtClean="0"/>
+              <a:t>WebRTC</a:t>
+            </a:r>
+            <a:r>
+              <a:rPr lang="de-AT" baseline="0" dirty="0" smtClean="0"/>
+              <a:t> </a:t>
+            </a:r>
+            <a:r>
+              <a:rPr lang="de-AT" baseline="0" dirty="0" err="1" smtClean="0"/>
+              <a:t>range</a:t>
+            </a:r>
+            <a:r>
+              <a:rPr lang="de-AT" baseline="0" dirty="0" smtClean="0"/>
+              <a:t> </a:t>
+            </a:r>
+            <a:r>
+              <a:rPr lang="de-AT" baseline="0" dirty="0" err="1" smtClean="0"/>
+              <a:t>of</a:t>
+            </a:r>
+            <a:r>
+              <a:rPr lang="de-AT" baseline="0" dirty="0" smtClean="0"/>
+              <a:t> </a:t>
+            </a:r>
+            <a:r>
+              <a:rPr lang="de-AT" baseline="0" dirty="0" err="1" smtClean="0"/>
+              <a:t>use</a:t>
+            </a:r>
+            <a:r>
+              <a:rPr lang="de-AT" baseline="0" dirty="0" smtClean="0"/>
+              <a:t> </a:t>
+            </a:r>
+            <a:r>
+              <a:rPr lang="de-AT" baseline="0" dirty="0" err="1" smtClean="0"/>
+              <a:t>and</a:t>
+            </a:r>
+            <a:r>
+              <a:rPr lang="de-AT" baseline="0" dirty="0" smtClean="0"/>
+              <a:t> </a:t>
+            </a:r>
+            <a:r>
+              <a:rPr lang="de-AT" baseline="0" dirty="0" err="1" smtClean="0"/>
+              <a:t>applications</a:t>
+            </a:r>
+            <a:r>
+              <a:rPr lang="de-AT" baseline="0" dirty="0" smtClean="0"/>
+              <a:t>:</a:t>
+            </a:r>
+          </a:p>
+          <a:p>
+            <a:pPr marL="171450" indent="-171450">
+              <a:buFont typeface="Arial" panose="020B0604020202020204" pitchFamily="34" charset="0"/>
+              <a:buChar char="•"/>
+            </a:pPr>
+            <a:r>
+              <a:rPr lang="de-AT" baseline="0" dirty="0" smtClean="0"/>
+              <a:t>All </a:t>
+            </a:r>
+            <a:r>
+              <a:rPr lang="de-AT" baseline="0" dirty="0" err="1" smtClean="0"/>
+              <a:t>kinds</a:t>
+            </a:r>
+            <a:r>
+              <a:rPr lang="de-AT" baseline="0" dirty="0" smtClean="0"/>
+              <a:t> </a:t>
+            </a:r>
+            <a:r>
+              <a:rPr lang="de-AT" baseline="0" dirty="0" err="1" smtClean="0"/>
+              <a:t>of</a:t>
+            </a:r>
+            <a:r>
+              <a:rPr lang="de-AT" baseline="0" dirty="0" smtClean="0"/>
+              <a:t> </a:t>
+            </a:r>
+            <a:r>
+              <a:rPr lang="de-AT" baseline="0" dirty="0" err="1" smtClean="0"/>
+              <a:t>domestic</a:t>
+            </a:r>
+            <a:r>
+              <a:rPr lang="de-AT" baseline="0" dirty="0" smtClean="0"/>
+              <a:t> </a:t>
+            </a:r>
+            <a:r>
+              <a:rPr lang="de-AT" baseline="0" dirty="0" err="1" smtClean="0"/>
+              <a:t>consultation</a:t>
+            </a:r>
+            <a:r>
+              <a:rPr lang="de-AT" baseline="0" dirty="0" smtClean="0"/>
+              <a:t> (</a:t>
+            </a:r>
+            <a:r>
+              <a:rPr lang="de-AT" baseline="0" dirty="0" err="1" smtClean="0"/>
+              <a:t>furniture</a:t>
+            </a:r>
+            <a:r>
+              <a:rPr lang="de-AT" baseline="0" dirty="0" smtClean="0"/>
+              <a:t>, </a:t>
+            </a:r>
+            <a:r>
+              <a:rPr lang="de-AT" baseline="0" dirty="0" err="1" smtClean="0"/>
+              <a:t>painting</a:t>
+            </a:r>
+            <a:r>
+              <a:rPr lang="de-AT" baseline="0" dirty="0" smtClean="0"/>
+              <a:t>)</a:t>
+            </a:r>
+          </a:p>
+          <a:p>
+            <a:pPr marL="171450" indent="-171450">
+              <a:buFont typeface="Arial" panose="020B0604020202020204" pitchFamily="34" charset="0"/>
+              <a:buChar char="•"/>
+            </a:pPr>
+            <a:r>
+              <a:rPr lang="de-AT" baseline="0" dirty="0" smtClean="0"/>
+              <a:t>„</a:t>
+            </a:r>
+            <a:r>
+              <a:rPr lang="de-AT" baseline="0" dirty="0" err="1" smtClean="0"/>
+              <a:t>Be</a:t>
+            </a:r>
+            <a:r>
+              <a:rPr lang="de-AT" baseline="0" dirty="0" smtClean="0"/>
+              <a:t> </a:t>
+            </a:r>
+            <a:r>
+              <a:rPr lang="de-AT" baseline="0" dirty="0" err="1" smtClean="0"/>
+              <a:t>My</a:t>
+            </a:r>
+            <a:r>
+              <a:rPr lang="de-AT" baseline="0" dirty="0" smtClean="0"/>
+              <a:t> Eyes“ – </a:t>
+            </a:r>
+            <a:r>
+              <a:rPr lang="de-AT" baseline="0" dirty="0" err="1" smtClean="0"/>
+              <a:t>volunteers</a:t>
+            </a:r>
+            <a:r>
+              <a:rPr lang="de-AT" baseline="0" dirty="0" smtClean="0"/>
+              <a:t> </a:t>
+            </a:r>
+            <a:r>
+              <a:rPr lang="de-AT" baseline="0" dirty="0" err="1" smtClean="0"/>
+              <a:t>can</a:t>
+            </a:r>
+            <a:r>
+              <a:rPr lang="de-AT" baseline="0" dirty="0" smtClean="0"/>
+              <a:t> </a:t>
+            </a:r>
+            <a:r>
+              <a:rPr lang="de-AT" baseline="0" dirty="0" err="1" smtClean="0"/>
+              <a:t>read</a:t>
+            </a:r>
+            <a:r>
+              <a:rPr lang="de-AT" baseline="0" dirty="0" smtClean="0"/>
+              <a:t> </a:t>
+            </a:r>
+            <a:r>
+              <a:rPr lang="de-AT" baseline="0" dirty="0" err="1" smtClean="0"/>
+              <a:t>nutrition</a:t>
+            </a:r>
+            <a:r>
+              <a:rPr lang="de-AT" baseline="0" dirty="0" smtClean="0"/>
+              <a:t>/</a:t>
+            </a:r>
+            <a:r>
+              <a:rPr lang="de-AT" baseline="0" dirty="0" err="1" smtClean="0"/>
+              <a:t>medicine</a:t>
+            </a:r>
+            <a:r>
+              <a:rPr lang="de-AT" baseline="0" dirty="0" smtClean="0"/>
+              <a:t> </a:t>
+            </a:r>
+            <a:r>
+              <a:rPr lang="de-AT" baseline="0" dirty="0" err="1" smtClean="0"/>
+              <a:t>labels</a:t>
+            </a:r>
+            <a:r>
+              <a:rPr lang="de-AT" baseline="0" dirty="0" smtClean="0"/>
+              <a:t> </a:t>
+            </a:r>
+            <a:r>
+              <a:rPr lang="de-AT" baseline="0" dirty="0" err="1" smtClean="0"/>
+              <a:t>for</a:t>
+            </a:r>
+            <a:r>
+              <a:rPr lang="de-AT" baseline="0" dirty="0" smtClean="0"/>
+              <a:t> blind/</a:t>
+            </a:r>
+            <a:r>
+              <a:rPr lang="de-AT" baseline="0" dirty="0" err="1" smtClean="0"/>
+              <a:t>visually</a:t>
+            </a:r>
+            <a:r>
+              <a:rPr lang="de-AT" baseline="0" dirty="0" smtClean="0"/>
+              <a:t> </a:t>
+            </a:r>
+            <a:r>
+              <a:rPr lang="de-AT" baseline="0" dirty="0" err="1" smtClean="0"/>
+              <a:t>impaired</a:t>
+            </a:r>
+            <a:r>
+              <a:rPr lang="de-AT" baseline="0" dirty="0" smtClean="0"/>
+              <a:t> </a:t>
+            </a:r>
+            <a:r>
+              <a:rPr lang="de-AT" baseline="0" dirty="0" err="1" smtClean="0"/>
+              <a:t>people</a:t>
+            </a:r>
+            <a:endParaRPr lang="de-AT" baseline="0" dirty="0" smtClean="0"/>
+          </a:p>
+        </p:txBody>
+      </p:sp>
+      <p:sp>
+        <p:nvSpPr>
+          <p:cNvPr id="4" name="Foliennummernplatzhalter 3"/>
+          <p:cNvSpPr>
+            <a:spLocks noGrp="1"/>
+          </p:cNvSpPr>
+          <p:nvPr>
+            <p:ph type="sldNum" sz="quarter" idx="10"/>
+          </p:nvPr>
+        </p:nvSpPr>
+        <p:spPr/>
+        <p:txBody>
+          <a:bodyPr/>
+          <a:lstStyle/>
+          <a:p>
+            <a:fld id="{2AFEA223-4F50-4DD6-9CC4-15E4F51256E0}" type="slidenum">
+              <a:rPr lang="de-AT" smtClean="0"/>
+              <a:t>7</a:t>
+            </a:fld>
+            <a:endParaRPr lang="de-AT"/>
+          </a:p>
+        </p:txBody>
+      </p:sp>
+    </p:spTree>
+    <p:extLst>
+      <p:ext uri="{BB962C8B-B14F-4D97-AF65-F5344CB8AC3E}">
+        <p14:creationId xmlns:p14="http://schemas.microsoft.com/office/powerpoint/2010/main" val="3113798683"/>
+      </p:ext>
+    </p:extLst>
+  </p:cSld>
+  <p:clrMapOvr>
+    <a:masterClrMapping/>
+  </p:clrMapOvr>
+</p:notes>
+</file>
+
+<file path=ppt/notesSlides/notesSlide7.xml><?xml version="1.0" encoding="utf-8"?>
+<p:notes xmlns:a="http://schemas.openxmlformats.org/drawingml/2006/main" xmlns:r="http://schemas.openxmlformats.org/officeDocument/2006/relationships" xmlns:p="http://schemas.openxmlformats.org/presentationml/2006/main">
+  <p:cSld>
+    <p:spTree>
+      <p:nvGrpSpPr>
+        <p:cNvPr id="1" name=""/>
+        <p:cNvGrpSpPr/>
+        <p:nvPr/>
+      </p:nvGrpSpPr>
+      <p:grpSpPr>
+        <a:xfrm>
+          <a:off x="0" y="0"/>
+          <a:ext cx="0" cy="0"/>
+          <a:chOff x="0" y="0"/>
+          <a:chExt cx="0" cy="0"/>
+        </a:xfrm>
+      </p:grpSpPr>
+      <p:sp>
+        <p:nvSpPr>
+          <p:cNvPr id="2" name="Folienbildplatzhalter 1"/>
+          <p:cNvSpPr>
+            <a:spLocks noGrp="1" noRot="1" noChangeAspect="1"/>
+          </p:cNvSpPr>
+          <p:nvPr>
+            <p:ph type="sldImg"/>
+          </p:nvPr>
+        </p:nvSpPr>
+        <p:spPr/>
+      </p:sp>
+      <p:sp>
+        <p:nvSpPr>
+          <p:cNvPr id="3" name="Notizenplatzhalter 2"/>
+          <p:cNvSpPr>
+            <a:spLocks noGrp="1"/>
+          </p:cNvSpPr>
+          <p:nvPr>
+            <p:ph type="body" idx="1"/>
+          </p:nvPr>
+        </p:nvSpPr>
+        <p:spPr/>
+        <p:txBody>
+          <a:bodyPr/>
+          <a:lstStyle/>
+          <a:p>
+            <a:pPr marL="0" indent="0">
+              <a:buFont typeface="Arial" panose="020B0604020202020204" pitchFamily="34" charset="0"/>
+              <a:buNone/>
+            </a:pPr>
+            <a:r>
+              <a:rPr lang="de-AT" dirty="0" smtClean="0"/>
+              <a:t>Prototype</a:t>
+            </a:r>
+          </a:p>
+          <a:p>
+            <a:pPr marL="171450" indent="-171450">
+              <a:buFont typeface="Arial" panose="020B0604020202020204" pitchFamily="34" charset="0"/>
+              <a:buChar char="•"/>
+            </a:pPr>
+            <a:r>
+              <a:rPr lang="de-AT" dirty="0" smtClean="0"/>
+              <a:t>Simpl</a:t>
+            </a:r>
+            <a:r>
+              <a:rPr lang="de-AT" baseline="0" dirty="0" smtClean="0"/>
+              <a:t>e </a:t>
+            </a:r>
+            <a:r>
+              <a:rPr lang="de-AT" baseline="0" dirty="0" err="1" smtClean="0"/>
+              <a:t>a</a:t>
+            </a:r>
+            <a:r>
+              <a:rPr lang="de-AT" dirty="0" err="1" smtClean="0"/>
+              <a:t>pplication</a:t>
+            </a:r>
+            <a:endParaRPr lang="de-AT" dirty="0" smtClean="0"/>
+          </a:p>
+          <a:p>
+            <a:pPr marL="171450" indent="-171450">
+              <a:buFont typeface="Arial" panose="020B0604020202020204" pitchFamily="34" charset="0"/>
+              <a:buChar char="•"/>
+            </a:pPr>
+            <a:r>
+              <a:rPr lang="de-AT" baseline="0" dirty="0" smtClean="0"/>
+              <a:t>Lightweight </a:t>
+            </a:r>
+            <a:r>
+              <a:rPr lang="de-AT" baseline="0" dirty="0" err="1" smtClean="0"/>
+              <a:t>management</a:t>
+            </a:r>
+            <a:r>
+              <a:rPr lang="de-AT" baseline="0" dirty="0" smtClean="0"/>
+              <a:t> </a:t>
+            </a:r>
+            <a:r>
+              <a:rPr lang="de-AT" baseline="0" dirty="0" err="1" smtClean="0"/>
+              <a:t>server</a:t>
+            </a:r>
+            <a:r>
+              <a:rPr lang="de-AT" baseline="0" dirty="0" smtClean="0"/>
+              <a:t> – </a:t>
+            </a:r>
+            <a:r>
+              <a:rPr lang="de-AT" baseline="0" dirty="0" err="1" smtClean="0"/>
+              <a:t>everything</a:t>
+            </a:r>
+            <a:r>
+              <a:rPr lang="de-AT" baseline="0" dirty="0" smtClean="0"/>
+              <a:t> </a:t>
+            </a:r>
+            <a:r>
+              <a:rPr lang="de-AT" baseline="0" dirty="0" err="1" smtClean="0"/>
+              <a:t>is</a:t>
+            </a:r>
+            <a:r>
+              <a:rPr lang="de-AT" baseline="0" dirty="0" smtClean="0"/>
+              <a:t> </a:t>
+            </a:r>
+            <a:r>
+              <a:rPr lang="de-AT" baseline="0" dirty="0" err="1" smtClean="0"/>
+              <a:t>self-developed</a:t>
+            </a:r>
+            <a:r>
+              <a:rPr lang="de-AT" baseline="0" dirty="0" smtClean="0"/>
+              <a:t> </a:t>
+            </a:r>
+            <a:r>
+              <a:rPr lang="de-AT" baseline="0" dirty="0" err="1" smtClean="0"/>
+              <a:t>and</a:t>
+            </a:r>
+            <a:r>
+              <a:rPr lang="de-AT" baseline="0" dirty="0" smtClean="0"/>
+              <a:t> </a:t>
+            </a:r>
+            <a:r>
+              <a:rPr lang="de-AT" baseline="0" dirty="0" err="1" smtClean="0"/>
+              <a:t>can</a:t>
+            </a:r>
+            <a:r>
+              <a:rPr lang="de-AT" baseline="0" dirty="0" smtClean="0"/>
+              <a:t> </a:t>
+            </a:r>
+            <a:r>
+              <a:rPr lang="de-AT" baseline="0" dirty="0" err="1" smtClean="0"/>
+              <a:t>be</a:t>
+            </a:r>
+            <a:r>
+              <a:rPr lang="de-AT" baseline="0" dirty="0" smtClean="0"/>
+              <a:t> </a:t>
+            </a:r>
+            <a:r>
+              <a:rPr lang="de-AT" baseline="0" dirty="0" err="1" smtClean="0"/>
+              <a:t>extended</a:t>
+            </a:r>
+            <a:endParaRPr lang="de-AT" dirty="0" smtClean="0"/>
+          </a:p>
+          <a:p>
+            <a:pPr marL="171450" indent="-171450">
+              <a:buFont typeface="Arial" panose="020B0604020202020204" pitchFamily="34" charset="0"/>
+              <a:buChar char="•"/>
+            </a:pPr>
+            <a:r>
+              <a:rPr lang="de-AT" dirty="0" err="1" smtClean="0"/>
+              <a:t>Automatic</a:t>
+            </a:r>
+            <a:r>
+              <a:rPr lang="de-AT" baseline="0" dirty="0" smtClean="0"/>
+              <a:t> </a:t>
+            </a:r>
+            <a:r>
+              <a:rPr lang="de-AT" baseline="0" dirty="0" err="1" smtClean="0"/>
+              <a:t>user</a:t>
+            </a:r>
+            <a:r>
+              <a:rPr lang="de-AT" baseline="0" dirty="0" smtClean="0"/>
+              <a:t> </a:t>
+            </a:r>
+            <a:r>
+              <a:rPr lang="de-AT" baseline="0" dirty="0" err="1" smtClean="0"/>
+              <a:t>discovery</a:t>
+            </a:r>
+            <a:r>
+              <a:rPr lang="de-AT" baseline="0" dirty="0" smtClean="0"/>
+              <a:t> (</a:t>
+            </a:r>
+            <a:r>
+              <a:rPr lang="de-AT" baseline="0" dirty="0" err="1" smtClean="0"/>
+              <a:t>no</a:t>
+            </a:r>
+            <a:r>
+              <a:rPr lang="de-AT" baseline="0" dirty="0" smtClean="0"/>
+              <a:t> </a:t>
+            </a:r>
+            <a:r>
+              <a:rPr lang="de-AT" baseline="0" dirty="0" err="1" smtClean="0"/>
+              <a:t>authentication</a:t>
+            </a:r>
+            <a:r>
+              <a:rPr lang="de-AT" baseline="0" dirty="0" smtClean="0"/>
+              <a:t> </a:t>
+            </a:r>
+            <a:r>
+              <a:rPr lang="de-AT" baseline="0" dirty="0" err="1" smtClean="0"/>
+              <a:t>for</a:t>
+            </a:r>
+            <a:r>
+              <a:rPr lang="de-AT" baseline="0" dirty="0" smtClean="0"/>
+              <a:t> </a:t>
+            </a:r>
+            <a:r>
+              <a:rPr lang="de-AT" baseline="0" dirty="0" err="1" smtClean="0"/>
+              <a:t>now</a:t>
+            </a:r>
+            <a:r>
+              <a:rPr lang="de-AT" baseline="0" dirty="0" smtClean="0"/>
+              <a:t>)</a:t>
+            </a:r>
+          </a:p>
+          <a:p>
+            <a:pPr marL="171450" indent="-171450">
+              <a:buFont typeface="Arial" panose="020B0604020202020204" pitchFamily="34" charset="0"/>
+              <a:buChar char="•"/>
+            </a:pPr>
+            <a:r>
+              <a:rPr lang="de-AT" baseline="0" dirty="0" err="1" smtClean="0"/>
+              <a:t>Only</a:t>
+            </a:r>
+            <a:r>
+              <a:rPr lang="de-AT" baseline="0" dirty="0" smtClean="0"/>
+              <a:t> in same </a:t>
+            </a:r>
+            <a:r>
+              <a:rPr lang="de-AT" baseline="0" dirty="0" err="1" smtClean="0"/>
+              <a:t>network</a:t>
+            </a:r>
+            <a:endParaRPr lang="de-AT" baseline="0" dirty="0" smtClean="0"/>
+          </a:p>
+          <a:p>
+            <a:pPr marL="171450" indent="-171450">
+              <a:buFont typeface="Arial" panose="020B0604020202020204" pitchFamily="34" charset="0"/>
+              <a:buChar char="•"/>
+            </a:pPr>
+            <a:r>
+              <a:rPr lang="de-AT" dirty="0" err="1" smtClean="0"/>
+              <a:t>Possibility</a:t>
+            </a:r>
+            <a:r>
+              <a:rPr lang="de-AT" dirty="0" smtClean="0"/>
+              <a:t> </a:t>
+            </a:r>
+            <a:r>
+              <a:rPr lang="de-AT" dirty="0" err="1" smtClean="0"/>
+              <a:t>to</a:t>
+            </a:r>
+            <a:r>
+              <a:rPr lang="de-AT" dirty="0" smtClean="0"/>
+              <a:t> </a:t>
+            </a:r>
+            <a:r>
+              <a:rPr lang="de-AT" dirty="0" err="1" smtClean="0"/>
+              <a:t>call</a:t>
+            </a:r>
+            <a:r>
+              <a:rPr lang="de-AT" dirty="0" smtClean="0"/>
+              <a:t> </a:t>
+            </a:r>
+            <a:r>
+              <a:rPr lang="de-AT" dirty="0" err="1" smtClean="0"/>
+              <a:t>one</a:t>
+            </a:r>
+            <a:r>
+              <a:rPr lang="de-AT" dirty="0" smtClean="0"/>
+              <a:t> </a:t>
+            </a:r>
+            <a:r>
+              <a:rPr lang="de-AT" dirty="0" err="1" smtClean="0"/>
+              <a:t>other</a:t>
+            </a:r>
+            <a:r>
+              <a:rPr lang="de-AT" dirty="0" smtClean="0"/>
+              <a:t> </a:t>
+            </a:r>
+            <a:r>
+              <a:rPr lang="de-AT" dirty="0" err="1" smtClean="0"/>
+              <a:t>user</a:t>
+            </a:r>
+            <a:r>
+              <a:rPr lang="de-AT" dirty="0" smtClean="0"/>
+              <a:t> (at</a:t>
+            </a:r>
+            <a:r>
+              <a:rPr lang="de-AT" baseline="0" dirty="0" smtClean="0"/>
+              <a:t> a time)</a:t>
+            </a:r>
+          </a:p>
+          <a:p>
+            <a:pPr marL="171450" indent="-171450">
+              <a:buFont typeface="Arial" panose="020B0604020202020204" pitchFamily="34" charset="0"/>
+              <a:buChar char="•"/>
+            </a:pPr>
+            <a:r>
+              <a:rPr lang="de-AT" dirty="0" smtClean="0"/>
+              <a:t>Video,</a:t>
+            </a:r>
+            <a:r>
+              <a:rPr lang="de-AT" baseline="0" dirty="0" smtClean="0"/>
+              <a:t> </a:t>
+            </a:r>
+            <a:r>
+              <a:rPr lang="de-AT" baseline="0" dirty="0" err="1" smtClean="0"/>
+              <a:t>audio</a:t>
+            </a:r>
+            <a:r>
+              <a:rPr lang="de-AT" baseline="0" dirty="0" smtClean="0"/>
+              <a:t> </a:t>
+            </a:r>
+            <a:r>
+              <a:rPr lang="de-AT" baseline="0" dirty="0" err="1" smtClean="0"/>
+              <a:t>and</a:t>
+            </a:r>
+            <a:r>
+              <a:rPr lang="de-AT" baseline="0" dirty="0" smtClean="0"/>
+              <a:t> </a:t>
+            </a:r>
+            <a:r>
+              <a:rPr lang="de-AT" baseline="0" dirty="0" err="1" smtClean="0"/>
+              <a:t>text</a:t>
+            </a:r>
+            <a:r>
+              <a:rPr lang="de-AT" baseline="0" dirty="0" smtClean="0"/>
+              <a:t> </a:t>
+            </a:r>
+            <a:r>
+              <a:rPr lang="de-AT" baseline="0" dirty="0" err="1" smtClean="0"/>
+              <a:t>chat</a:t>
+            </a:r>
+            <a:endParaRPr lang="de-AT" baseline="0" dirty="0" smtClean="0"/>
+          </a:p>
+          <a:p>
+            <a:pPr marL="171450" indent="-171450">
+              <a:buFont typeface="Arial" panose="020B0604020202020204" pitchFamily="34" charset="0"/>
+              <a:buChar char="•"/>
+            </a:pPr>
+            <a:r>
+              <a:rPr lang="de-AT" baseline="0" dirty="0" err="1" smtClean="0"/>
+              <a:t>Possibility</a:t>
+            </a:r>
+            <a:r>
+              <a:rPr lang="de-AT" baseline="0" dirty="0" smtClean="0"/>
+              <a:t> </a:t>
+            </a:r>
+            <a:r>
+              <a:rPr lang="de-AT" baseline="0" dirty="0" err="1" smtClean="0"/>
+              <a:t>to</a:t>
+            </a:r>
+            <a:r>
+              <a:rPr lang="de-AT" baseline="0" dirty="0" smtClean="0"/>
+              <a:t> </a:t>
+            </a:r>
+            <a:r>
+              <a:rPr lang="de-AT" baseline="0" dirty="0" err="1" smtClean="0"/>
+              <a:t>share</a:t>
+            </a:r>
+            <a:r>
+              <a:rPr lang="de-AT" baseline="0" dirty="0" smtClean="0"/>
+              <a:t> </a:t>
+            </a:r>
+            <a:r>
+              <a:rPr lang="de-AT" baseline="0" dirty="0" err="1" smtClean="0"/>
+              <a:t>the</a:t>
+            </a:r>
+            <a:r>
+              <a:rPr lang="de-AT" baseline="0" dirty="0" smtClean="0"/>
+              <a:t> </a:t>
+            </a:r>
+            <a:r>
+              <a:rPr lang="de-AT" baseline="0" dirty="0" err="1" smtClean="0"/>
+              <a:t>screen</a:t>
+            </a:r>
+            <a:r>
+              <a:rPr lang="de-AT" baseline="0" dirty="0" smtClean="0"/>
+              <a:t> </a:t>
+            </a:r>
+            <a:r>
+              <a:rPr lang="de-AT" baseline="0" dirty="0" err="1" smtClean="0"/>
+              <a:t>with</a:t>
+            </a:r>
+            <a:r>
+              <a:rPr lang="de-AT" baseline="0" dirty="0" smtClean="0"/>
+              <a:t> </a:t>
+            </a:r>
+            <a:r>
+              <a:rPr lang="de-AT" baseline="0" dirty="0" err="1" smtClean="0"/>
+              <a:t>the</a:t>
+            </a:r>
+            <a:r>
+              <a:rPr lang="de-AT" baseline="0" dirty="0" smtClean="0"/>
+              <a:t> </a:t>
+            </a:r>
+            <a:r>
+              <a:rPr lang="de-AT" baseline="0" dirty="0" err="1" smtClean="0"/>
+              <a:t>other</a:t>
+            </a:r>
+            <a:r>
+              <a:rPr lang="de-AT" baseline="0" dirty="0" smtClean="0"/>
+              <a:t> </a:t>
+            </a:r>
+            <a:r>
+              <a:rPr lang="de-AT" baseline="0" dirty="0" err="1" smtClean="0"/>
+              <a:t>user</a:t>
+            </a:r>
+            <a:r>
+              <a:rPr lang="de-AT" baseline="0" dirty="0" smtClean="0"/>
+              <a:t>. </a:t>
+            </a:r>
+            <a:r>
+              <a:rPr lang="de-AT" baseline="0" dirty="0" err="1" smtClean="0"/>
+              <a:t>Both</a:t>
+            </a:r>
+            <a:r>
+              <a:rPr lang="de-AT" baseline="0" dirty="0" smtClean="0"/>
+              <a:t> </a:t>
+            </a:r>
+            <a:r>
+              <a:rPr lang="de-AT" baseline="0" dirty="0" err="1" smtClean="0"/>
+              <a:t>users</a:t>
+            </a:r>
+            <a:r>
+              <a:rPr lang="de-AT" baseline="0" dirty="0" smtClean="0"/>
+              <a:t> </a:t>
+            </a:r>
+            <a:r>
+              <a:rPr lang="de-AT" baseline="0" dirty="0" err="1" smtClean="0"/>
+              <a:t>can</a:t>
+            </a:r>
+            <a:r>
+              <a:rPr lang="de-AT" baseline="0" dirty="0" smtClean="0"/>
+              <a:t> </a:t>
+            </a:r>
+            <a:r>
+              <a:rPr lang="de-AT" baseline="0" dirty="0" err="1" smtClean="0"/>
+              <a:t>make</a:t>
+            </a:r>
+            <a:r>
+              <a:rPr lang="de-AT" baseline="0" dirty="0" smtClean="0"/>
+              <a:t> </a:t>
+            </a:r>
+            <a:r>
+              <a:rPr lang="de-AT" baseline="0" dirty="0" err="1" smtClean="0"/>
+              <a:t>remarks</a:t>
+            </a:r>
+            <a:r>
+              <a:rPr lang="de-AT" baseline="0" dirty="0" smtClean="0"/>
+              <a:t> in form </a:t>
+            </a:r>
+            <a:r>
+              <a:rPr lang="de-AT" baseline="0" dirty="0" err="1" smtClean="0"/>
+              <a:t>of</a:t>
+            </a:r>
+            <a:r>
+              <a:rPr lang="de-AT" baseline="0" dirty="0" smtClean="0"/>
+              <a:t> simple </a:t>
+            </a:r>
+            <a:r>
+              <a:rPr lang="de-AT" baseline="0" dirty="0" err="1" smtClean="0"/>
+              <a:t>geometric</a:t>
+            </a:r>
+            <a:r>
+              <a:rPr lang="de-AT" baseline="0" dirty="0" smtClean="0"/>
+              <a:t> </a:t>
+            </a:r>
+            <a:r>
+              <a:rPr lang="de-AT" baseline="0" dirty="0" err="1" smtClean="0"/>
+              <a:t>shapes</a:t>
+            </a:r>
+            <a:r>
+              <a:rPr lang="de-AT" baseline="0" dirty="0" smtClean="0"/>
+              <a:t> like </a:t>
+            </a:r>
+            <a:r>
+              <a:rPr lang="de-AT" baseline="0" dirty="0" err="1" smtClean="0"/>
+              <a:t>circles</a:t>
+            </a:r>
+            <a:r>
+              <a:rPr lang="de-AT" baseline="0" dirty="0" smtClean="0"/>
+              <a:t>, </a:t>
+            </a:r>
+            <a:r>
+              <a:rPr lang="de-AT" baseline="0" dirty="0" err="1" smtClean="0"/>
+              <a:t>rectangles</a:t>
+            </a:r>
+            <a:r>
+              <a:rPr lang="de-AT" baseline="0" dirty="0" smtClean="0"/>
+              <a:t> </a:t>
+            </a:r>
+            <a:r>
+              <a:rPr lang="de-AT" baseline="0" dirty="0" err="1" smtClean="0"/>
+              <a:t>or</a:t>
+            </a:r>
+            <a:r>
+              <a:rPr lang="de-AT" baseline="0" dirty="0" smtClean="0"/>
+              <a:t> </a:t>
+            </a:r>
+            <a:r>
+              <a:rPr lang="de-AT" baseline="0" dirty="0" err="1" smtClean="0"/>
+              <a:t>lines</a:t>
+            </a:r>
+            <a:r>
+              <a:rPr lang="de-AT" baseline="0" dirty="0" smtClean="0"/>
+              <a:t> </a:t>
+            </a:r>
+            <a:r>
+              <a:rPr lang="de-AT" baseline="0" dirty="0" err="1" smtClean="0"/>
+              <a:t>that</a:t>
+            </a:r>
+            <a:r>
+              <a:rPr lang="de-AT" baseline="0" dirty="0" smtClean="0"/>
+              <a:t> </a:t>
+            </a:r>
+            <a:r>
+              <a:rPr lang="de-AT" baseline="0" dirty="0" err="1" smtClean="0"/>
+              <a:t>both</a:t>
+            </a:r>
+            <a:r>
+              <a:rPr lang="de-AT" baseline="0" dirty="0" smtClean="0"/>
+              <a:t> </a:t>
+            </a:r>
+            <a:r>
+              <a:rPr lang="de-AT" baseline="0" dirty="0" err="1" smtClean="0"/>
+              <a:t>users</a:t>
+            </a:r>
+            <a:r>
+              <a:rPr lang="de-AT" baseline="0" dirty="0" smtClean="0"/>
+              <a:t> </a:t>
+            </a:r>
+            <a:r>
+              <a:rPr lang="de-AT" baseline="0" dirty="0" err="1" smtClean="0"/>
+              <a:t>can</a:t>
+            </a:r>
+            <a:r>
+              <a:rPr lang="de-AT" baseline="0" dirty="0" smtClean="0"/>
+              <a:t> </a:t>
+            </a:r>
+            <a:r>
+              <a:rPr lang="de-AT" baseline="0" dirty="0" err="1" smtClean="0"/>
+              <a:t>see</a:t>
+            </a:r>
+            <a:r>
+              <a:rPr lang="de-AT" baseline="0" dirty="0" smtClean="0"/>
+              <a:t>.</a:t>
+            </a:r>
+          </a:p>
+          <a:p>
+            <a:pPr marL="171450" indent="-171450">
+              <a:buFont typeface="Arial" panose="020B0604020202020204" pitchFamily="34" charset="0"/>
+              <a:buChar char="•"/>
+            </a:pPr>
+            <a:r>
+              <a:rPr lang="de-AT" baseline="0" dirty="0" err="1" smtClean="0"/>
+              <a:t>Additionally</a:t>
+            </a:r>
+            <a:r>
+              <a:rPr lang="de-AT" baseline="0" dirty="0" smtClean="0"/>
+              <a:t>, </a:t>
+            </a:r>
+            <a:r>
+              <a:rPr lang="de-AT" baseline="0" dirty="0" err="1" smtClean="0"/>
+              <a:t>the</a:t>
+            </a:r>
+            <a:r>
+              <a:rPr lang="de-AT" baseline="0" dirty="0" smtClean="0"/>
+              <a:t> prototype will </a:t>
+            </a:r>
+            <a:r>
+              <a:rPr lang="de-AT" baseline="0" dirty="0" err="1" smtClean="0"/>
+              <a:t>be</a:t>
+            </a:r>
+            <a:r>
+              <a:rPr lang="de-AT" baseline="0" dirty="0" smtClean="0"/>
+              <a:t> </a:t>
+            </a:r>
+            <a:r>
+              <a:rPr lang="de-AT" baseline="0" dirty="0" err="1" smtClean="0"/>
+              <a:t>tested</a:t>
+            </a:r>
+            <a:r>
+              <a:rPr lang="de-AT" baseline="0" dirty="0" smtClean="0"/>
+              <a:t> on </a:t>
+            </a:r>
+            <a:r>
+              <a:rPr lang="de-AT" baseline="0" dirty="0" err="1" smtClean="0"/>
+              <a:t>how</a:t>
+            </a:r>
+            <a:r>
+              <a:rPr lang="de-AT" baseline="0" dirty="0" smtClean="0"/>
+              <a:t> </a:t>
+            </a:r>
+            <a:r>
+              <a:rPr lang="de-AT" baseline="0" dirty="0" err="1" smtClean="0"/>
+              <a:t>well</a:t>
+            </a:r>
+            <a:r>
+              <a:rPr lang="de-AT" baseline="0" dirty="0" smtClean="0"/>
+              <a:t> </a:t>
+            </a:r>
+            <a:r>
+              <a:rPr lang="de-AT" baseline="0" dirty="0" err="1" smtClean="0"/>
+              <a:t>the</a:t>
+            </a:r>
+            <a:r>
+              <a:rPr lang="de-AT" baseline="0" dirty="0" smtClean="0"/>
+              <a:t> </a:t>
+            </a:r>
+            <a:r>
+              <a:rPr lang="de-AT" baseline="0" dirty="0" err="1" smtClean="0"/>
+              <a:t>quality</a:t>
+            </a:r>
+            <a:r>
+              <a:rPr lang="de-AT" baseline="0" dirty="0" smtClean="0"/>
+              <a:t> </a:t>
+            </a:r>
+            <a:r>
+              <a:rPr lang="de-AT" baseline="0" dirty="0" err="1" smtClean="0"/>
+              <a:t>of</a:t>
+            </a:r>
+            <a:r>
+              <a:rPr lang="de-AT" baseline="0" dirty="0" smtClean="0"/>
+              <a:t> </a:t>
+            </a:r>
+            <a:r>
+              <a:rPr lang="de-AT" baseline="0" dirty="0" err="1" smtClean="0"/>
+              <a:t>video</a:t>
+            </a:r>
+            <a:r>
+              <a:rPr lang="de-AT" baseline="0" dirty="0" smtClean="0"/>
+              <a:t>/</a:t>
+            </a:r>
+            <a:r>
+              <a:rPr lang="de-AT" baseline="0" dirty="0" err="1" smtClean="0"/>
+              <a:t>audio</a:t>
+            </a:r>
+            <a:r>
+              <a:rPr lang="de-AT" baseline="0" dirty="0" smtClean="0"/>
+              <a:t> </a:t>
+            </a:r>
+            <a:r>
+              <a:rPr lang="de-AT" baseline="0" dirty="0" err="1" smtClean="0"/>
+              <a:t>responds</a:t>
+            </a:r>
+            <a:r>
+              <a:rPr lang="de-AT" baseline="0" dirty="0" smtClean="0"/>
+              <a:t> </a:t>
+            </a:r>
+            <a:r>
+              <a:rPr lang="de-AT" baseline="0" dirty="0" err="1" smtClean="0"/>
+              <a:t>to</a:t>
+            </a:r>
+            <a:r>
+              <a:rPr lang="de-AT" baseline="0" dirty="0" smtClean="0"/>
+              <a:t> </a:t>
+            </a:r>
+            <a:r>
+              <a:rPr lang="de-AT" baseline="0" dirty="0" err="1" smtClean="0"/>
+              <a:t>poor</a:t>
+            </a:r>
+            <a:r>
+              <a:rPr lang="de-AT" baseline="0" dirty="0" smtClean="0"/>
+              <a:t> </a:t>
+            </a:r>
+            <a:r>
+              <a:rPr lang="de-AT" baseline="0" dirty="0" err="1" smtClean="0"/>
+              <a:t>network</a:t>
+            </a:r>
+            <a:r>
+              <a:rPr lang="de-AT" baseline="0" dirty="0" smtClean="0"/>
+              <a:t> </a:t>
+            </a:r>
+            <a:r>
+              <a:rPr lang="de-AT" baseline="0" dirty="0" err="1" smtClean="0"/>
+              <a:t>reachability</a:t>
+            </a:r>
+            <a:endParaRPr lang="de-AT" dirty="0"/>
+          </a:p>
+        </p:txBody>
+      </p:sp>
+      <p:sp>
+        <p:nvSpPr>
+          <p:cNvPr id="4" name="Foliennummernplatzhalter 3"/>
+          <p:cNvSpPr>
+            <a:spLocks noGrp="1"/>
+          </p:cNvSpPr>
+          <p:nvPr>
+            <p:ph type="sldNum" sz="quarter" idx="10"/>
+          </p:nvPr>
+        </p:nvSpPr>
+        <p:spPr/>
+        <p:txBody>
+          <a:bodyPr/>
+          <a:lstStyle/>
+          <a:p>
+            <a:fld id="{2AFEA223-4F50-4DD6-9CC4-15E4F51256E0}" type="slidenum">
+              <a:rPr lang="de-AT" smtClean="0"/>
+              <a:t>8</a:t>
+            </a:fld>
+            <a:endParaRPr lang="de-AT"/>
+          </a:p>
+        </p:txBody>
+      </p:sp>
+    </p:spTree>
+    <p:extLst>
+      <p:ext uri="{BB962C8B-B14F-4D97-AF65-F5344CB8AC3E}">
+        <p14:creationId xmlns:p14="http://schemas.microsoft.com/office/powerpoint/2010/main" val="3113798683"/>
+      </p:ext>
+    </p:extLst>
+  </p:cSld>
+  <p:clrMapOvr>
+    <a:masterClrMapping/>
+  </p:clrMapOvr>
+</p:notes>
+</file>
+
+<file path=ppt/notesSlides/notesSlide8.xml><?xml version="1.0" encoding="utf-8"?>
+<p:notes xmlns:a="http://schemas.openxmlformats.org/drawingml/2006/main" xmlns:r="http://schemas.openxmlformats.org/officeDocument/2006/relationships" xmlns:p="http://schemas.openxmlformats.org/presentationml/2006/main">
+  <p:cSld>
+    <p:spTree>
+      <p:nvGrpSpPr>
+        <p:cNvPr id="1" name=""/>
+        <p:cNvGrpSpPr/>
+        <p:nvPr/>
+      </p:nvGrpSpPr>
+      <p:grpSpPr>
+        <a:xfrm>
+          <a:off x="0" y="0"/>
+          <a:ext cx="0" cy="0"/>
+          <a:chOff x="0" y="0"/>
+          <a:chExt cx="0" cy="0"/>
+        </a:xfrm>
+      </p:grpSpPr>
+      <p:sp>
+        <p:nvSpPr>
+          <p:cNvPr id="2" name="Folienbildplatzhalter 1"/>
+          <p:cNvSpPr>
+            <a:spLocks noGrp="1" noRot="1" noChangeAspect="1"/>
+          </p:cNvSpPr>
+          <p:nvPr>
+            <p:ph type="sldImg"/>
+          </p:nvPr>
+        </p:nvSpPr>
+        <p:spPr/>
+      </p:sp>
+      <p:sp>
+        <p:nvSpPr>
+          <p:cNvPr id="3" name="Notizenplatzhalter 2"/>
+          <p:cNvSpPr>
+            <a:spLocks noGrp="1"/>
+          </p:cNvSpPr>
+          <p:nvPr>
+            <p:ph type="body" idx="1"/>
+          </p:nvPr>
+        </p:nvSpPr>
+        <p:spPr/>
+        <p:txBody>
+          <a:bodyPr/>
+          <a:lstStyle/>
+          <a:p>
+            <a:pPr marL="171450" indent="-171450">
+              <a:buFont typeface="Arial" panose="020B0604020202020204" pitchFamily="34" charset="0"/>
+              <a:buChar char="•"/>
+            </a:pPr>
+            <a:r>
+              <a:rPr lang="de-AT" dirty="0" smtClean="0"/>
+              <a:t>Development</a:t>
+            </a:r>
+            <a:r>
+              <a:rPr lang="de-AT" baseline="0" dirty="0" smtClean="0"/>
+              <a:t> </a:t>
+            </a:r>
+            <a:r>
+              <a:rPr lang="de-AT" baseline="0" dirty="0" err="1" smtClean="0"/>
+              <a:t>of</a:t>
+            </a:r>
+            <a:r>
+              <a:rPr lang="de-AT" baseline="0" dirty="0" smtClean="0"/>
+              <a:t> </a:t>
+            </a:r>
+            <a:r>
+              <a:rPr lang="de-AT" baseline="0" dirty="0" err="1" smtClean="0"/>
+              <a:t>management</a:t>
+            </a:r>
+            <a:r>
+              <a:rPr lang="de-AT" baseline="0" dirty="0" smtClean="0"/>
+              <a:t> </a:t>
+            </a:r>
+            <a:r>
+              <a:rPr lang="de-AT" baseline="0" dirty="0" err="1" smtClean="0"/>
+              <a:t>server</a:t>
+            </a:r>
+            <a:r>
+              <a:rPr lang="de-AT" baseline="0" dirty="0" smtClean="0"/>
+              <a:t> (Node.js)</a:t>
+            </a:r>
+            <a:endParaRPr lang="de-AT" baseline="0" dirty="0"/>
+          </a:p>
+          <a:p>
+            <a:pPr marL="171450" indent="-171450">
+              <a:buFont typeface="Arial" panose="020B0604020202020204" pitchFamily="34" charset="0"/>
+              <a:buChar char="•"/>
+            </a:pPr>
+            <a:r>
+              <a:rPr lang="de-AT" baseline="0" dirty="0" smtClean="0"/>
+              <a:t>Implementation </a:t>
+            </a:r>
+            <a:r>
+              <a:rPr lang="de-AT" baseline="0" dirty="0" err="1" smtClean="0"/>
+              <a:t>of</a:t>
+            </a:r>
+            <a:r>
+              <a:rPr lang="de-AT" baseline="0" dirty="0" smtClean="0"/>
+              <a:t> </a:t>
+            </a:r>
+            <a:r>
+              <a:rPr lang="de-AT" baseline="0" dirty="0" err="1" smtClean="0"/>
+              <a:t>WebRTC</a:t>
+            </a:r>
+            <a:r>
+              <a:rPr lang="de-AT" baseline="0" dirty="0" smtClean="0"/>
+              <a:t> </a:t>
+            </a:r>
+            <a:r>
+              <a:rPr lang="de-AT" baseline="0" dirty="0" err="1" smtClean="0"/>
+              <a:t>functionality</a:t>
+            </a:r>
+            <a:r>
+              <a:rPr lang="de-AT" baseline="0" dirty="0" smtClean="0"/>
+              <a:t> on </a:t>
+            </a:r>
+            <a:r>
+              <a:rPr lang="de-AT" baseline="0" dirty="0" err="1" smtClean="0"/>
+              <a:t>client</a:t>
+            </a:r>
+            <a:r>
+              <a:rPr lang="de-AT" baseline="0" dirty="0" smtClean="0"/>
+              <a:t> </a:t>
+            </a:r>
+            <a:r>
+              <a:rPr lang="de-AT" baseline="0" dirty="0" err="1" smtClean="0"/>
+              <a:t>side</a:t>
+            </a:r>
+            <a:endParaRPr lang="de-AT" baseline="0" dirty="0" smtClean="0"/>
+          </a:p>
+          <a:p>
+            <a:pPr marL="171450" indent="-171450">
+              <a:buFont typeface="Arial" panose="020B0604020202020204" pitchFamily="34" charset="0"/>
+              <a:buChar char="•"/>
+            </a:pPr>
+            <a:r>
+              <a:rPr lang="de-AT" baseline="0" dirty="0" err="1" smtClean="0"/>
+              <a:t>Responsive</a:t>
+            </a:r>
+            <a:r>
+              <a:rPr lang="de-AT" baseline="0" dirty="0" smtClean="0"/>
+              <a:t> design </a:t>
+            </a:r>
+            <a:r>
+              <a:rPr lang="de-AT" baseline="0" dirty="0" err="1" smtClean="0"/>
+              <a:t>for</a:t>
+            </a:r>
+            <a:r>
+              <a:rPr lang="de-AT" baseline="0" dirty="0" smtClean="0"/>
+              <a:t> mobile </a:t>
+            </a:r>
+            <a:r>
+              <a:rPr lang="de-AT" baseline="0" dirty="0" err="1" smtClean="0"/>
+              <a:t>devices</a:t>
+            </a:r>
+            <a:r>
+              <a:rPr lang="de-AT" baseline="0" dirty="0" smtClean="0"/>
+              <a:t> (</a:t>
+            </a:r>
+            <a:r>
+              <a:rPr lang="de-AT" baseline="0" dirty="0" err="1" smtClean="0"/>
+              <a:t>smartphones</a:t>
+            </a:r>
+            <a:r>
+              <a:rPr lang="de-AT" baseline="0" dirty="0" smtClean="0"/>
+              <a:t>, </a:t>
+            </a:r>
+            <a:r>
+              <a:rPr lang="de-AT" baseline="0" dirty="0" err="1" smtClean="0"/>
+              <a:t>tablets</a:t>
+            </a:r>
+            <a:r>
+              <a:rPr lang="de-AT" baseline="0" dirty="0" smtClean="0"/>
+              <a:t>)</a:t>
+            </a:r>
+          </a:p>
+          <a:p>
+            <a:pPr marL="171450" indent="-171450">
+              <a:buFont typeface="Arial" panose="020B0604020202020204" pitchFamily="34" charset="0"/>
+              <a:buChar char="•"/>
+            </a:pPr>
+            <a:r>
+              <a:rPr lang="de-AT" baseline="0" dirty="0" smtClean="0"/>
+              <a:t>Determination </a:t>
+            </a:r>
+            <a:r>
+              <a:rPr lang="de-AT" baseline="0" dirty="0" err="1" smtClean="0"/>
+              <a:t>of</a:t>
+            </a:r>
+            <a:r>
+              <a:rPr lang="de-AT" baseline="0" dirty="0" smtClean="0"/>
+              <a:t> </a:t>
+            </a:r>
+            <a:r>
+              <a:rPr lang="de-AT" baseline="0" dirty="0" err="1" smtClean="0"/>
+              <a:t>audio</a:t>
+            </a:r>
+            <a:r>
+              <a:rPr lang="de-AT" baseline="0" dirty="0" smtClean="0"/>
+              <a:t>/</a:t>
+            </a:r>
+            <a:r>
+              <a:rPr lang="de-AT" baseline="0" dirty="0" err="1" smtClean="0"/>
+              <a:t>video</a:t>
+            </a:r>
+            <a:r>
+              <a:rPr lang="de-AT" baseline="0" dirty="0" smtClean="0"/>
+              <a:t> </a:t>
+            </a:r>
+            <a:r>
+              <a:rPr lang="de-AT" baseline="0" dirty="0" err="1" smtClean="0"/>
+              <a:t>quality</a:t>
+            </a:r>
+            <a:r>
+              <a:rPr lang="de-AT" baseline="0" dirty="0" smtClean="0"/>
+              <a:t> </a:t>
+            </a:r>
+            <a:r>
+              <a:rPr lang="de-AT" baseline="0" dirty="0" err="1" smtClean="0"/>
+              <a:t>behaviour</a:t>
+            </a:r>
+            <a:r>
+              <a:rPr lang="de-AT" baseline="0" dirty="0" smtClean="0"/>
+              <a:t> </a:t>
+            </a:r>
+            <a:r>
+              <a:rPr lang="de-AT" baseline="0" dirty="0" err="1" smtClean="0"/>
+              <a:t>under</a:t>
+            </a:r>
+            <a:r>
+              <a:rPr lang="de-AT" baseline="0" dirty="0" smtClean="0"/>
+              <a:t> limited </a:t>
+            </a:r>
+            <a:r>
+              <a:rPr lang="de-AT" baseline="0" dirty="0" err="1" smtClean="0"/>
+              <a:t>network</a:t>
+            </a:r>
+            <a:r>
+              <a:rPr lang="de-AT" baseline="0" dirty="0" smtClean="0"/>
+              <a:t> (</a:t>
+            </a:r>
+            <a:r>
+              <a:rPr lang="de-AT" baseline="0" dirty="0" err="1" smtClean="0"/>
+              <a:t>WiFi</a:t>
+            </a:r>
+            <a:r>
+              <a:rPr lang="de-AT" baseline="0" dirty="0" smtClean="0"/>
+              <a:t>) </a:t>
+            </a:r>
+            <a:r>
+              <a:rPr lang="de-AT" baseline="0" dirty="0" err="1" smtClean="0"/>
+              <a:t>reachability</a:t>
+            </a:r>
+            <a:endParaRPr lang="de-AT" baseline="0" dirty="0" smtClean="0"/>
+          </a:p>
+          <a:p>
+            <a:pPr marL="171450" indent="-171450">
+              <a:buFont typeface="Arial" panose="020B0604020202020204" pitchFamily="34" charset="0"/>
+              <a:buChar char="•"/>
+            </a:pPr>
+            <a:endParaRPr lang="de-AT" baseline="0" dirty="0" smtClean="0"/>
+          </a:p>
+          <a:p>
+            <a:pPr marL="171450" indent="-171450">
+              <a:buFont typeface="Arial" panose="020B0604020202020204" pitchFamily="34" charset="0"/>
+              <a:buChar char="•"/>
+            </a:pPr>
+            <a:r>
+              <a:rPr lang="de-AT" baseline="0" dirty="0" smtClean="0"/>
+              <a:t>Evaluation: Working prototype like </a:t>
+            </a:r>
+            <a:r>
+              <a:rPr lang="de-AT" baseline="0" dirty="0" err="1" smtClean="0"/>
+              <a:t>described</a:t>
+            </a:r>
+            <a:r>
+              <a:rPr lang="de-AT" baseline="0" dirty="0" smtClean="0"/>
+              <a:t> </a:t>
+            </a:r>
+            <a:r>
+              <a:rPr lang="de-AT" baseline="0" dirty="0" err="1" smtClean="0"/>
+              <a:t>before</a:t>
+            </a:r>
+            <a:r>
+              <a:rPr lang="de-AT" baseline="0" dirty="0" smtClean="0"/>
+              <a:t>, </a:t>
+            </a:r>
+            <a:r>
+              <a:rPr lang="de-AT" baseline="0" dirty="0" err="1" smtClean="0"/>
+              <a:t>meaningful</a:t>
+            </a:r>
+            <a:r>
+              <a:rPr lang="de-AT" baseline="0" dirty="0" smtClean="0"/>
+              <a:t> </a:t>
+            </a:r>
+            <a:r>
+              <a:rPr lang="de-AT" baseline="0" dirty="0" err="1" smtClean="0"/>
+              <a:t>investigatino</a:t>
+            </a:r>
+            <a:r>
+              <a:rPr lang="de-AT" baseline="0" dirty="0" smtClean="0"/>
+              <a:t> </a:t>
+            </a:r>
+            <a:r>
+              <a:rPr lang="de-AT" baseline="0" dirty="0" err="1" smtClean="0"/>
+              <a:t>about</a:t>
+            </a:r>
+            <a:r>
+              <a:rPr lang="de-AT" baseline="0" dirty="0" smtClean="0"/>
+              <a:t> </a:t>
+            </a:r>
+            <a:r>
+              <a:rPr lang="de-AT" baseline="0" dirty="0" err="1" smtClean="0"/>
+              <a:t>WebRTC</a:t>
+            </a:r>
+            <a:r>
+              <a:rPr lang="de-AT" baseline="0" dirty="0" smtClean="0"/>
+              <a:t> </a:t>
+            </a:r>
+            <a:r>
+              <a:rPr lang="de-AT" baseline="0" dirty="0" err="1" smtClean="0"/>
+              <a:t>media</a:t>
+            </a:r>
+            <a:r>
+              <a:rPr lang="de-AT" baseline="0" dirty="0" smtClean="0"/>
+              <a:t> </a:t>
+            </a:r>
+            <a:r>
+              <a:rPr lang="de-AT" baseline="0" dirty="0" err="1" smtClean="0"/>
+              <a:t>quality</a:t>
+            </a:r>
+            <a:r>
+              <a:rPr lang="de-AT" baseline="0" dirty="0" smtClean="0"/>
+              <a:t> </a:t>
+            </a:r>
+            <a:r>
+              <a:rPr lang="de-AT" baseline="0" dirty="0" err="1" smtClean="0"/>
+              <a:t>behaviour</a:t>
+            </a:r>
+            <a:endParaRPr lang="de-AT" baseline="0" dirty="0" smtClean="0"/>
+          </a:p>
+        </p:txBody>
+      </p:sp>
+      <p:sp>
+        <p:nvSpPr>
+          <p:cNvPr id="4" name="Foliennummernplatzhalter 3"/>
+          <p:cNvSpPr>
+            <a:spLocks noGrp="1"/>
+          </p:cNvSpPr>
+          <p:nvPr>
+            <p:ph type="sldNum" sz="quarter" idx="10"/>
+          </p:nvPr>
+        </p:nvSpPr>
+        <p:spPr/>
+        <p:txBody>
+          <a:bodyPr/>
+          <a:lstStyle/>
+          <a:p>
+            <a:fld id="{2AFEA223-4F50-4DD6-9CC4-15E4F51256E0}" type="slidenum">
+              <a:rPr lang="de-AT" smtClean="0"/>
+              <a:t>9</a:t>
             </a:fld>
             <a:endParaRPr lang="de-AT"/>
           </a:p>
@@ -2925,7 +6044,7 @@
           <a:p>
             <a:fld id="{BD334F44-700B-E44C-96AB-E83A6820DFD3}" type="datetimeFigureOut">
               <a:rPr lang="de-DE" smtClean="0"/>
-              <a:t>08.11.2015</a:t>
+              <a:t>09.11.2015</a:t>
             </a:fld>
             <a:endParaRPr lang="de-DE"/>
           </a:p>
@@ -3105,7 +6224,7 @@
           <a:p>
             <a:fld id="{BD334F44-700B-E44C-96AB-E83A6820DFD3}" type="datetimeFigureOut">
               <a:rPr lang="de-DE" smtClean="0"/>
-              <a:t>08.11.2015</a:t>
+              <a:t>09.11.2015</a:t>
             </a:fld>
             <a:endParaRPr lang="de-DE"/>
           </a:p>
@@ -3275,7 +6394,7 @@
           <a:p>
             <a:fld id="{BD334F44-700B-E44C-96AB-E83A6820DFD3}" type="datetimeFigureOut">
               <a:rPr lang="de-DE" smtClean="0"/>
-              <a:t>08.11.2015</a:t>
+              <a:t>09.11.2015</a:t>
             </a:fld>
             <a:endParaRPr lang="de-DE"/>
           </a:p>
@@ -3521,7 +6640,7 @@
           <a:p>
             <a:fld id="{BD334F44-700B-E44C-96AB-E83A6820DFD3}" type="datetimeFigureOut">
               <a:rPr lang="de-DE" smtClean="0"/>
-              <a:t>08.11.2015</a:t>
+              <a:t>09.11.2015</a:t>
             </a:fld>
             <a:endParaRPr lang="de-DE"/>
           </a:p>
@@ -3809,7 +6928,7 @@
           <a:p>
             <a:fld id="{BD334F44-700B-E44C-96AB-E83A6820DFD3}" type="datetimeFigureOut">
               <a:rPr lang="de-DE" smtClean="0"/>
-              <a:t>08.11.2015</a:t>
+              <a:t>09.11.2015</a:t>
             </a:fld>
             <a:endParaRPr lang="de-DE"/>
           </a:p>
@@ -4231,7 +7350,7 @@
           <a:p>
             <a:fld id="{BD334F44-700B-E44C-96AB-E83A6820DFD3}" type="datetimeFigureOut">
               <a:rPr lang="de-DE" smtClean="0"/>
-              <a:t>08.11.2015</a:t>
+              <a:t>09.11.2015</a:t>
             </a:fld>
             <a:endParaRPr lang="de-DE"/>
           </a:p>
@@ -4349,7 +7468,7 @@
           <a:p>
             <a:fld id="{BD334F44-700B-E44C-96AB-E83A6820DFD3}" type="datetimeFigureOut">
               <a:rPr lang="de-DE" smtClean="0"/>
-              <a:t>08.11.2015</a:t>
+              <a:t>09.11.2015</a:t>
             </a:fld>
             <a:endParaRPr lang="de-DE"/>
           </a:p>
@@ -4444,7 +7563,7 @@
           <a:p>
             <a:fld id="{BD334F44-700B-E44C-96AB-E83A6820DFD3}" type="datetimeFigureOut">
               <a:rPr lang="de-DE" smtClean="0"/>
-              <a:t>08.11.2015</a:t>
+              <a:t>09.11.2015</a:t>
             </a:fld>
             <a:endParaRPr lang="de-DE"/>
           </a:p>
@@ -4767,7 +7886,7 @@
           <a:p>
             <a:fld id="{BD334F44-700B-E44C-96AB-E83A6820DFD3}" type="datetimeFigureOut">
               <a:rPr lang="de-DE" smtClean="0"/>
-              <a:t>08.11.2015</a:t>
+              <a:t>09.11.2015</a:t>
             </a:fld>
             <a:endParaRPr lang="de-DE"/>
           </a:p>
@@ -5020,7 +8139,7 @@
           <a:p>
             <a:fld id="{BD334F44-700B-E44C-96AB-E83A6820DFD3}" type="datetimeFigureOut">
               <a:rPr lang="de-DE" smtClean="0"/>
-              <a:t>08.11.2015</a:t>
+              <a:t>09.11.2015</a:t>
             </a:fld>
             <a:endParaRPr lang="de-DE"/>
           </a:p>
@@ -5233,7 +8352,7 @@
           <a:p>
             <a:fld id="{BD334F44-700B-E44C-96AB-E83A6820DFD3}" type="datetimeFigureOut">
               <a:rPr lang="de-DE" smtClean="0"/>
-              <a:t>08.11.2015</a:t>
+              <a:t>09.11.2015</a:t>
             </a:fld>
             <a:endParaRPr lang="de-DE"/>
           </a:p>
@@ -5866,6 +8985,139 @@
     <p:extLst>
       <p:ext uri="{BB962C8B-B14F-4D97-AF65-F5344CB8AC3E}">
         <p14:creationId xmlns:p14="http://schemas.microsoft.com/office/powerpoint/2010/main" val="3969208"/>
+      </p:ext>
+    </p:extLst>
+  </p:cSld>
+  <p:clrMapOvr>
+    <a:masterClrMapping/>
+  </p:clrMapOvr>
+  <p:timing>
+    <p:tnLst>
+      <p:par>
+        <p:cTn id="1" dur="indefinite" restart="never" nodeType="tmRoot"/>
+      </p:par>
+    </p:tnLst>
+  </p:timing>
+</p:sld>
+</file>
+
+<file path=ppt/slides/slide10.xml><?xml version="1.0" encoding="utf-8"?>
+<p:sld xmlns:a="http://schemas.openxmlformats.org/drawingml/2006/main" xmlns:r="http://schemas.openxmlformats.org/officeDocument/2006/relationships" xmlns:p="http://schemas.openxmlformats.org/presentationml/2006/main">
+  <p:cSld>
+    <p:spTree>
+      <p:nvGrpSpPr>
+        <p:cNvPr id="1" name=""/>
+        <p:cNvGrpSpPr/>
+        <p:nvPr/>
+      </p:nvGrpSpPr>
+      <p:grpSpPr>
+        <a:xfrm>
+          <a:off x="0" y="0"/>
+          <a:ext cx="0" cy="0"/>
+          <a:chOff x="0" y="0"/>
+          <a:chExt cx="0" cy="0"/>
+        </a:xfrm>
+      </p:grpSpPr>
+      <p:sp>
+        <p:nvSpPr>
+          <p:cNvPr id="3" name="Textfeld 2"/>
+          <p:cNvSpPr txBox="1"/>
+          <p:nvPr/>
+        </p:nvSpPr>
+        <p:spPr>
+          <a:xfrm>
+            <a:off x="280588" y="1319497"/>
+            <a:ext cx="7760446" cy="707886"/>
+          </a:xfrm>
+          <a:prstGeom prst="rect">
+            <a:avLst/>
+          </a:prstGeom>
+          <a:noFill/>
+        </p:spPr>
+        <p:txBody>
+          <a:bodyPr wrap="square" rtlCol="0">
+            <a:spAutoFit/>
+          </a:bodyPr>
+          <a:lstStyle/>
+          <a:p>
+            <a:r>
+              <a:rPr lang="de-DE" sz="4000" dirty="0" err="1" smtClean="0">
+                <a:solidFill>
+                  <a:schemeClr val="bg1"/>
+                </a:solidFill>
+              </a:rPr>
+              <a:t>Thanks</a:t>
+            </a:r>
+            <a:r>
+              <a:rPr lang="de-DE" sz="4000" dirty="0" smtClean="0">
+                <a:solidFill>
+                  <a:schemeClr val="bg1"/>
+                </a:solidFill>
+              </a:rPr>
+              <a:t> </a:t>
+            </a:r>
+            <a:r>
+              <a:rPr lang="de-DE" sz="4000" dirty="0" err="1" smtClean="0">
+                <a:solidFill>
+                  <a:schemeClr val="bg1"/>
+                </a:solidFill>
+              </a:rPr>
+              <a:t>for</a:t>
+            </a:r>
+            <a:r>
+              <a:rPr lang="de-DE" sz="4000" dirty="0" smtClean="0">
+                <a:solidFill>
+                  <a:schemeClr val="bg1"/>
+                </a:solidFill>
+              </a:rPr>
+              <a:t> </a:t>
+            </a:r>
+            <a:r>
+              <a:rPr lang="de-DE" sz="4000" dirty="0" err="1" smtClean="0">
+                <a:solidFill>
+                  <a:schemeClr val="bg1"/>
+                </a:solidFill>
+              </a:rPr>
+              <a:t>your</a:t>
+            </a:r>
+            <a:r>
+              <a:rPr lang="de-DE" sz="4000" dirty="0" smtClean="0">
+                <a:solidFill>
+                  <a:schemeClr val="bg1"/>
+                </a:solidFill>
+              </a:rPr>
+              <a:t> </a:t>
+            </a:r>
+            <a:r>
+              <a:rPr lang="de-DE" sz="4000" dirty="0" err="1" smtClean="0">
+                <a:solidFill>
+                  <a:schemeClr val="bg1"/>
+                </a:solidFill>
+              </a:rPr>
+              <a:t>attention</a:t>
+            </a:r>
+            <a:r>
+              <a:rPr lang="de-DE" sz="4000" dirty="0" smtClean="0">
+                <a:solidFill>
+                  <a:schemeClr val="bg1"/>
+                </a:solidFill>
+              </a:rPr>
+              <a:t>!</a:t>
+            </a:r>
+            <a:endParaRPr lang="de-DE" sz="2400" i="1" dirty="0">
+              <a:solidFill>
+                <a:schemeClr val="bg1"/>
+              </a:solidFill>
+              <a:latin typeface="Georgia"/>
+              <a:cs typeface="Georgia"/>
+            </a:endParaRPr>
+          </a:p>
+        </p:txBody>
+      </p:sp>
+    </p:spTree>
+    <p:extLst>
+      <p:ext uri="{BB962C8B-B14F-4D97-AF65-F5344CB8AC3E}">
+        <p14:creationId xmlns:p14="http://schemas.microsoft.com/office/powerpoint/2010/main" val="628786468"/>
       </p:ext>
     </p:extLst>
   </p:cSld>
@@ -7596,6 +10848,262 @@
           </a:p>
         </p:txBody>
       </p:sp>
+      <p:pic>
+        <p:nvPicPr>
+          <p:cNvPr id="3" name="Picture 2" descr="http://www.clipartbest.com/cliparts/eTM/kqd/eTMkqdRXc.png"/>
+          <p:cNvPicPr>
+            <a:picLocks noChangeAspect="1" noChangeArrowheads="1"/>
+          </p:cNvPicPr>
+          <p:nvPr/>
+        </p:nvPicPr>
+        <p:blipFill>
+          <a:blip r:embed="rId3">
+            <a:extLst>
+              <a:ext uri="{28A0092B-C50C-407E-A947-70E740481C1C}">
+                <a14:useLocalDpi xmlns:a14="http://schemas.microsoft.com/office/drawing/2010/main" val="0"/>
+              </a:ext>
+            </a:extLst>
+          </a:blip>
+          <a:srcRect/>
+          <a:stretch>
+            <a:fillRect/>
+          </a:stretch>
+        </p:blipFill>
+        <p:spPr bwMode="auto">
+          <a:xfrm>
+            <a:off x="880183" y="3634015"/>
+            <a:ext cx="2998134" cy="2998134"/>
+          </a:xfrm>
+          <a:prstGeom prst="rect">
+            <a:avLst/>
+          </a:prstGeom>
+          <a:noFill/>
+          <a:extLst>
+            <a:ext uri="{909E8E84-426E-40DD-AFC4-6F175D3DCCD1}">
+              <a14:hiddenFill xmlns:a14="http://schemas.microsoft.com/office/drawing/2010/main">
+                <a:solidFill>
+                  <a:srgbClr val="FFFFFF"/>
+                </a:solidFill>
+              </a14:hiddenFill>
+            </a:ext>
+          </a:extLst>
+        </p:spPr>
+      </p:pic>
+      <p:pic>
+        <p:nvPicPr>
+          <p:cNvPr id="5" name="Picture 2" descr="https://encrypted-tbn2.gstatic.com/images?q=tbn:ANd9GcTx8Q3WGGo5Iiao3-8jUzWoRzBySHgN43SB8-2XLWiHlmZ-YrKF"/>
+          <p:cNvPicPr>
+            <a:picLocks noChangeAspect="1" noChangeArrowheads="1"/>
+          </p:cNvPicPr>
+          <p:nvPr/>
+        </p:nvPicPr>
+        <p:blipFill>
+          <a:blip r:embed="rId4">
+            <a:extLst>
+              <a:ext uri="{28A0092B-C50C-407E-A947-70E740481C1C}">
+                <a14:useLocalDpi xmlns:a14="http://schemas.microsoft.com/office/drawing/2010/main" val="0"/>
+              </a:ext>
+            </a:extLst>
+          </a:blip>
+          <a:srcRect/>
+          <a:stretch>
+            <a:fillRect/>
+          </a:stretch>
+        </p:blipFill>
+        <p:spPr bwMode="auto">
+          <a:xfrm>
+            <a:off x="5360276" y="2483004"/>
+            <a:ext cx="2314971" cy="2314971"/>
+          </a:xfrm>
+          <a:prstGeom prst="rect">
+            <a:avLst/>
+          </a:prstGeom>
+          <a:noFill/>
+          <a:extLst>
+            <a:ext uri="{909E8E84-426E-40DD-AFC4-6F175D3DCCD1}">
+              <a14:hiddenFill xmlns:a14="http://schemas.microsoft.com/office/drawing/2010/main">
+                <a:solidFill>
+                  <a:srgbClr val="FFFFFF"/>
+                </a:solidFill>
+              </a14:hiddenFill>
+            </a:ext>
+          </a:extLst>
+        </p:spPr>
+      </p:pic>
+      <p:pic>
+        <p:nvPicPr>
+          <p:cNvPr id="8" name="Picture 8" descr="http://ktpmalta.org/wp-content/themes/ktp/images/default.png"/>
+          <p:cNvPicPr>
+            <a:picLocks noChangeAspect="1" noChangeArrowheads="1"/>
+          </p:cNvPicPr>
+          <p:nvPr/>
+        </p:nvPicPr>
+        <p:blipFill>
+          <a:blip r:embed="rId5">
+            <a:extLst>
+              <a:ext uri="{28A0092B-C50C-407E-A947-70E740481C1C}">
+                <a14:useLocalDpi xmlns:a14="http://schemas.microsoft.com/office/drawing/2010/main" val="0"/>
+              </a:ext>
+            </a:extLst>
+          </a:blip>
+          <a:srcRect/>
+          <a:stretch>
+            <a:fillRect/>
+          </a:stretch>
+        </p:blipFill>
+        <p:spPr bwMode="auto">
+          <a:xfrm>
+            <a:off x="6091051" y="3213779"/>
+            <a:ext cx="853419" cy="853419"/>
+          </a:xfrm>
+          <a:prstGeom prst="rect">
+            <a:avLst/>
+          </a:prstGeom>
+          <a:noFill/>
+          <a:extLst>
+            <a:ext uri="{909E8E84-426E-40DD-AFC4-6F175D3DCCD1}">
+              <a14:hiddenFill xmlns:a14="http://schemas.microsoft.com/office/drawing/2010/main">
+                <a:solidFill>
+                  <a:srgbClr val="FFFFFF"/>
+                </a:solidFill>
+              </a14:hiddenFill>
+            </a:ext>
+          </a:extLst>
+        </p:spPr>
+      </p:pic>
+      <p:pic>
+        <p:nvPicPr>
+          <p:cNvPr id="9" name="Picture 8" descr="http://ktpmalta.org/wp-content/themes/ktp/images/default.png"/>
+          <p:cNvPicPr>
+            <a:picLocks noChangeAspect="1" noChangeArrowheads="1"/>
+          </p:cNvPicPr>
+          <p:nvPr/>
+        </p:nvPicPr>
+        <p:blipFill>
+          <a:blip r:embed="rId5">
+            <a:extLst>
+              <a:ext uri="{28A0092B-C50C-407E-A947-70E740481C1C}">
+                <a14:useLocalDpi xmlns:a14="http://schemas.microsoft.com/office/drawing/2010/main" val="0"/>
+              </a:ext>
+            </a:extLst>
+          </a:blip>
+          <a:srcRect/>
+          <a:stretch>
+            <a:fillRect/>
+          </a:stretch>
+        </p:blipFill>
+        <p:spPr bwMode="auto">
+          <a:xfrm>
+            <a:off x="2144418" y="4453998"/>
+            <a:ext cx="853419" cy="853419"/>
+          </a:xfrm>
+          <a:prstGeom prst="rect">
+            <a:avLst/>
+          </a:prstGeom>
+          <a:noFill/>
+          <a:extLst>
+            <a:ext uri="{909E8E84-426E-40DD-AFC4-6F175D3DCCD1}">
+              <a14:hiddenFill xmlns:a14="http://schemas.microsoft.com/office/drawing/2010/main">
+                <a:solidFill>
+                  <a:srgbClr val="FFFFFF"/>
+                </a:solidFill>
+              </a14:hiddenFill>
+            </a:ext>
+          </a:extLst>
+        </p:spPr>
+      </p:pic>
+      <p:sp>
+        <p:nvSpPr>
+          <p:cNvPr id="10" name="Ellipse 9"/>
+          <p:cNvSpPr/>
+          <p:nvPr/>
+        </p:nvSpPr>
+        <p:spPr>
+          <a:xfrm>
+            <a:off x="2235250" y="4736707"/>
+            <a:ext cx="288000" cy="288000"/>
+          </a:xfrm>
+          <a:prstGeom prst="ellipse">
+            <a:avLst/>
+          </a:prstGeom>
+          <a:noFill/>
+          <a:ln w="50800">
+            <a:solidFill>
+              <a:schemeClr val="accent6">
+                <a:lumMod val="75000"/>
+              </a:schemeClr>
+            </a:solidFill>
+          </a:ln>
+        </p:spPr>
+        <p:style>
+          <a:lnRef idx="1">
+            <a:schemeClr val="accent1"/>
+          </a:lnRef>
+          <a:fillRef idx="3">
+            <a:schemeClr val="accent1"/>
+          </a:fillRef>
+          <a:effectRef idx="2">
+            <a:schemeClr val="accent1"/>
+          </a:effectRef>
+          <a:fontRef idx="minor">
+            <a:schemeClr val="lt1"/>
+          </a:fontRef>
+        </p:style>
+        <p:txBody>
+          <a:bodyPr rtlCol="0" anchor="ctr"/>
+          <a:lstStyle/>
+          <a:p>
+            <a:pPr algn="ctr"/>
+            <a:endParaRPr lang="de-AT"/>
+          </a:p>
+        </p:txBody>
+      </p:sp>
+      <p:sp>
+        <p:nvSpPr>
+          <p:cNvPr id="11" name="Ellipse 10"/>
+          <p:cNvSpPr/>
+          <p:nvPr/>
+        </p:nvSpPr>
+        <p:spPr>
+          <a:xfrm>
+            <a:off x="6182462" y="3496489"/>
+            <a:ext cx="288000" cy="288000"/>
+          </a:xfrm>
+          <a:prstGeom prst="ellipse">
+            <a:avLst/>
+          </a:prstGeom>
+          <a:noFill/>
+          <a:ln w="50800">
+            <a:solidFill>
+              <a:schemeClr val="accent6">
+                <a:lumMod val="75000"/>
+              </a:schemeClr>
+            </a:solidFill>
+          </a:ln>
+        </p:spPr>
+        <p:style>
+          <a:lnRef idx="1">
+            <a:schemeClr val="accent1"/>
+          </a:lnRef>
+          <a:fillRef idx="3">
+            <a:schemeClr val="accent1"/>
+          </a:fillRef>
+          <a:effectRef idx="2">
+            <a:schemeClr val="accent1"/>
+          </a:effectRef>
+          <a:fontRef idx="minor">
+            <a:schemeClr val="lt1"/>
+          </a:fontRef>
+        </p:style>
+        <p:txBody>
+          <a:bodyPr rtlCol="0" anchor="ctr"/>
+          <a:lstStyle/>
+          <a:p>
+            <a:pPr algn="ctr"/>
+            <a:endParaRPr lang="de-AT"/>
+          </a:p>
+        </p:txBody>
+      </p:sp>
     </p:spTree>
     <p:extLst>
       <p:ext uri="{BB962C8B-B14F-4D97-AF65-F5344CB8AC3E}">
@@ -7609,9 +11117,403 @@
   <p:timing>
     <p:tnLst>
       <p:par>
-        <p:cTn id="1" dur="indefinite" restart="never" nodeType="tmRoot"/>
+        <p:cTn id="1" dur="indefinite" restart="never" nodeType="tmRoot">
+          <p:childTnLst>
+            <p:seq concurrent="1" nextAc="seek">
+              <p:cTn id="2" dur="indefinite" nodeType="mainSeq">
+                <p:childTnLst>
+                  <p:par>
+                    <p:cTn id="3" fill="hold">
+                      <p:stCondLst>
+                        <p:cond delay="indefinite"/>
+                      </p:stCondLst>
+                      <p:childTnLst>
+                        <p:par>
+                          <p:cTn id="4" fill="hold">
+                            <p:stCondLst>
+                              <p:cond delay="0"/>
+                            </p:stCondLst>
+                            <p:childTnLst>
+                              <p:par>
+                                <p:cTn id="5" presetID="2" presetClass="entr" presetSubtype="4" fill="hold" nodeType="clickEffect">
+                                  <p:stCondLst>
+                                    <p:cond delay="0"/>
+                                  </p:stCondLst>
+                                  <p:childTnLst>
+                                    <p:set>
+                                      <p:cBhvr>
+                                        <p:cTn id="6" dur="1" fill="hold">
+                                          <p:stCondLst>
+                                            <p:cond delay="0"/>
+                                          </p:stCondLst>
+                                        </p:cTn>
+                                        <p:tgtEl>
+                                          <p:spTgt spid="5"/>
+                                        </p:tgtEl>
+                                        <p:attrNameLst>
+                                          <p:attrName>style.visibility</p:attrName>
+                                        </p:attrNameLst>
+                                      </p:cBhvr>
+                                      <p:to>
+                                        <p:strVal val="visible"/>
+                                      </p:to>
+                                    </p:set>
+                                    <p:anim calcmode="lin" valueType="num">
+                                      <p:cBhvr additive="base">
+                                        <p:cTn id="7" dur="500" fill="hold"/>
+                                        <p:tgtEl>
+                                          <p:spTgt spid="5"/>
+                                        </p:tgtEl>
+                                        <p:attrNameLst>
+                                          <p:attrName>ppt_x</p:attrName>
+                                        </p:attrNameLst>
+                                      </p:cBhvr>
+                                      <p:tavLst>
+                                        <p:tav tm="0">
+                                          <p:val>
+                                            <p:strVal val="#ppt_x"/>
+                                          </p:val>
+                                        </p:tav>
+                                        <p:tav tm="100000">
+                                          <p:val>
+                                            <p:strVal val="#ppt_x"/>
+                                          </p:val>
+                                        </p:tav>
+                                      </p:tavLst>
+                                    </p:anim>
+                                    <p:anim calcmode="lin" valueType="num">
+                                      <p:cBhvr additive="base">
+                                        <p:cTn id="8" dur="500" fill="hold"/>
+                                        <p:tgtEl>
+                                          <p:spTgt spid="5"/>
+                                        </p:tgtEl>
+                                        <p:attrNameLst>
+                                          <p:attrName>ppt_y</p:attrName>
+                                        </p:attrNameLst>
+                                      </p:cBhvr>
+                                      <p:tavLst>
+                                        <p:tav tm="0">
+                                          <p:val>
+                                            <p:strVal val="1+#ppt_h/2"/>
+                                          </p:val>
+                                        </p:tav>
+                                        <p:tav tm="100000">
+                                          <p:val>
+                                            <p:strVal val="#ppt_y"/>
+                                          </p:val>
+                                        </p:tav>
+                                      </p:tavLst>
+                                    </p:anim>
+                                  </p:childTnLst>
+                                </p:cTn>
+                              </p:par>
+                            </p:childTnLst>
+                          </p:cTn>
+                        </p:par>
+                      </p:childTnLst>
+                    </p:cTn>
+                  </p:par>
+                  <p:par>
+                    <p:cTn id="9" fill="hold">
+                      <p:stCondLst>
+                        <p:cond delay="indefinite"/>
+                      </p:stCondLst>
+                      <p:childTnLst>
+                        <p:par>
+                          <p:cTn id="10" fill="hold">
+                            <p:stCondLst>
+                              <p:cond delay="0"/>
+                            </p:stCondLst>
+                            <p:childTnLst>
+                              <p:par>
+                                <p:cTn id="11" presetID="2" presetClass="entr" presetSubtype="4" fill="hold" nodeType="clickEffect">
+                                  <p:stCondLst>
+                                    <p:cond delay="0"/>
+                                  </p:stCondLst>
+                                  <p:childTnLst>
+                                    <p:set>
+                                      <p:cBhvr>
+                                        <p:cTn id="12" dur="1" fill="hold">
+                                          <p:stCondLst>
+                                            <p:cond delay="0"/>
+                                          </p:stCondLst>
+                                        </p:cTn>
+                                        <p:tgtEl>
+                                          <p:spTgt spid="3"/>
+                                        </p:tgtEl>
+                                        <p:attrNameLst>
+                                          <p:attrName>style.visibility</p:attrName>
+                                        </p:attrNameLst>
+                                      </p:cBhvr>
+                                      <p:to>
+                                        <p:strVal val="visible"/>
+                                      </p:to>
+                                    </p:set>
+                                    <p:anim calcmode="lin" valueType="num">
+                                      <p:cBhvr additive="base">
+                                        <p:cTn id="13" dur="500" fill="hold"/>
+                                        <p:tgtEl>
+                                          <p:spTgt spid="3"/>
+                                        </p:tgtEl>
+                                        <p:attrNameLst>
+                                          <p:attrName>ppt_x</p:attrName>
+                                        </p:attrNameLst>
+                                      </p:cBhvr>
+                                      <p:tavLst>
+                                        <p:tav tm="0">
+                                          <p:val>
+                                            <p:strVal val="#ppt_x"/>
+                                          </p:val>
+                                        </p:tav>
+                                        <p:tav tm="100000">
+                                          <p:val>
+                                            <p:strVal val="#ppt_x"/>
+                                          </p:val>
+                                        </p:tav>
+                                      </p:tavLst>
+                                    </p:anim>
+                                    <p:anim calcmode="lin" valueType="num">
+                                      <p:cBhvr additive="base">
+                                        <p:cTn id="14" dur="500" fill="hold"/>
+                                        <p:tgtEl>
+                                          <p:spTgt spid="3"/>
+                                        </p:tgtEl>
+                                        <p:attrNameLst>
+                                          <p:attrName>ppt_y</p:attrName>
+                                        </p:attrNameLst>
+                                      </p:cBhvr>
+                                      <p:tavLst>
+                                        <p:tav tm="0">
+                                          <p:val>
+                                            <p:strVal val="1+#ppt_h/2"/>
+                                          </p:val>
+                                        </p:tav>
+                                        <p:tav tm="100000">
+                                          <p:val>
+                                            <p:strVal val="#ppt_y"/>
+                                          </p:val>
+                                        </p:tav>
+                                      </p:tavLst>
+                                    </p:anim>
+                                  </p:childTnLst>
+                                </p:cTn>
+                              </p:par>
+                            </p:childTnLst>
+                          </p:cTn>
+                        </p:par>
+                      </p:childTnLst>
+                    </p:cTn>
+                  </p:par>
+                  <p:par>
+                    <p:cTn id="15" fill="hold">
+                      <p:stCondLst>
+                        <p:cond delay="indefinite"/>
+                      </p:stCondLst>
+                      <p:childTnLst>
+                        <p:par>
+                          <p:cTn id="16" fill="hold">
+                            <p:stCondLst>
+                              <p:cond delay="0"/>
+                            </p:stCondLst>
+                            <p:childTnLst>
+                              <p:par>
+                                <p:cTn id="17" presetID="10" presetClass="entr" presetSubtype="0" fill="hold" nodeType="clickEffect">
+                                  <p:stCondLst>
+                                    <p:cond delay="0"/>
+                                  </p:stCondLst>
+                                  <p:childTnLst>
+                                    <p:set>
+                                      <p:cBhvr>
+                                        <p:cTn id="18" dur="1" fill="hold">
+                                          <p:stCondLst>
+                                            <p:cond delay="0"/>
+                                          </p:stCondLst>
+                                        </p:cTn>
+                                        <p:tgtEl>
+                                          <p:spTgt spid="8"/>
+                                        </p:tgtEl>
+                                        <p:attrNameLst>
+                                          <p:attrName>style.visibility</p:attrName>
+                                        </p:attrNameLst>
+                                      </p:cBhvr>
+                                      <p:to>
+                                        <p:strVal val="visible"/>
+                                      </p:to>
+                                    </p:set>
+                                    <p:animEffect transition="in" filter="fade">
+                                      <p:cBhvr>
+                                        <p:cTn id="19" dur="500"/>
+                                        <p:tgtEl>
+                                          <p:spTgt spid="8"/>
+                                        </p:tgtEl>
+                                      </p:cBhvr>
+                                    </p:animEffect>
+                                  </p:childTnLst>
+                                </p:cTn>
+                              </p:par>
+                              <p:par>
+                                <p:cTn id="20" presetID="10" presetClass="entr" presetSubtype="0" fill="hold" nodeType="withEffect">
+                                  <p:stCondLst>
+                                    <p:cond delay="0"/>
+                                  </p:stCondLst>
+                                  <p:childTnLst>
+                                    <p:set>
+                                      <p:cBhvr>
+                                        <p:cTn id="21" dur="1" fill="hold">
+                                          <p:stCondLst>
+                                            <p:cond delay="0"/>
+                                          </p:stCondLst>
+                                        </p:cTn>
+                                        <p:tgtEl>
+                                          <p:spTgt spid="9"/>
+                                        </p:tgtEl>
+                                        <p:attrNameLst>
+                                          <p:attrName>style.visibility</p:attrName>
+                                        </p:attrNameLst>
+                                      </p:cBhvr>
+                                      <p:to>
+                                        <p:strVal val="visible"/>
+                                      </p:to>
+                                    </p:set>
+                                    <p:animEffect transition="in" filter="fade">
+                                      <p:cBhvr>
+                                        <p:cTn id="22" dur="500"/>
+                                        <p:tgtEl>
+                                          <p:spTgt spid="9"/>
+                                        </p:tgtEl>
+                                      </p:cBhvr>
+                                    </p:animEffect>
+                                  </p:childTnLst>
+                                </p:cTn>
+                              </p:par>
+                            </p:childTnLst>
+                          </p:cTn>
+                        </p:par>
+                      </p:childTnLst>
+                    </p:cTn>
+                  </p:par>
+                  <p:par>
+                    <p:cTn id="23" fill="hold">
+                      <p:stCondLst>
+                        <p:cond delay="indefinite"/>
+                      </p:stCondLst>
+                      <p:childTnLst>
+                        <p:par>
+                          <p:cTn id="24" fill="hold">
+                            <p:stCondLst>
+                              <p:cond delay="0"/>
+                            </p:stCondLst>
+                            <p:childTnLst>
+                              <p:par>
+                                <p:cTn id="25" presetID="10" presetClass="entr" presetSubtype="0" fill="hold" grpId="0" nodeType="clickEffect">
+                                  <p:stCondLst>
+                                    <p:cond delay="0"/>
+                                  </p:stCondLst>
+                                  <p:childTnLst>
+                                    <p:set>
+                                      <p:cBhvr>
+                                        <p:cTn id="26" dur="1" fill="hold">
+                                          <p:stCondLst>
+                                            <p:cond delay="0"/>
+                                          </p:stCondLst>
+                                        </p:cTn>
+                                        <p:tgtEl>
+                                          <p:spTgt spid="10"/>
+                                        </p:tgtEl>
+                                        <p:attrNameLst>
+                                          <p:attrName>style.visibility</p:attrName>
+                                        </p:attrNameLst>
+                                      </p:cBhvr>
+                                      <p:to>
+                                        <p:strVal val="visible"/>
+                                      </p:to>
+                                    </p:set>
+                                    <p:animEffect transition="in" filter="fade">
+                                      <p:cBhvr>
+                                        <p:cTn id="27" dur="500"/>
+                                        <p:tgtEl>
+                                          <p:spTgt spid="10"/>
+                                        </p:tgtEl>
+                                      </p:cBhvr>
+                                    </p:animEffect>
+                                  </p:childTnLst>
+                                </p:cTn>
+                              </p:par>
+                            </p:childTnLst>
+                          </p:cTn>
+                        </p:par>
+                        <p:par>
+                          <p:cTn id="28" fill="hold">
+                            <p:stCondLst>
+                              <p:cond delay="500"/>
+                            </p:stCondLst>
+                            <p:childTnLst>
+                              <p:par>
+                                <p:cTn id="29" presetID="10" presetClass="entr" presetSubtype="0" fill="hold" grpId="0" nodeType="afterEffect">
+                                  <p:stCondLst>
+                                    <p:cond delay="500"/>
+                                  </p:stCondLst>
+                                  <p:childTnLst>
+                                    <p:set>
+                                      <p:cBhvr>
+                                        <p:cTn id="30" dur="1" fill="hold">
+                                          <p:stCondLst>
+                                            <p:cond delay="0"/>
+                                          </p:stCondLst>
+                                        </p:cTn>
+                                        <p:tgtEl>
+                                          <p:spTgt spid="11"/>
+                                        </p:tgtEl>
+                                        <p:attrNameLst>
+                                          <p:attrName>style.visibility</p:attrName>
+                                        </p:attrNameLst>
+                                      </p:cBhvr>
+                                      <p:to>
+                                        <p:strVal val="visible"/>
+                                      </p:to>
+                                    </p:set>
+                                    <p:animEffect transition="in" filter="fade">
+                                      <p:cBhvr>
+                                        <p:cTn id="31" dur="500"/>
+                                        <p:tgtEl>
+                                          <p:spTgt spid="11"/>
+                                        </p:tgtEl>
+                                      </p:cBhvr>
+                                    </p:animEffect>
+                                  </p:childTnLst>
+                                </p:cTn>
+                              </p:par>
+                            </p:childTnLst>
+                          </p:cTn>
+                        </p:par>
+                      </p:childTnLst>
+                    </p:cTn>
+                  </p:par>
+                </p:childTnLst>
+              </p:cTn>
+              <p:prevCondLst>
+                <p:cond evt="onPrev" delay="0">
+                  <p:tgtEl>
+                    <p:sldTgt/>
+                  </p:tgtEl>
+                </p:cond>
+              </p:prevCondLst>
+              <p:nextCondLst>
+                <p:cond evt="onNext" delay="0">
+                  <p:tgtEl>
+                    <p:sldTgt/>
+                  </p:tgtEl>
+                </p:cond>
+              </p:nextCondLst>
+            </p:seq>
+          </p:childTnLst>
+        </p:cTn>
       </p:par>
     </p:tnLst>
+    <p:bldLst>
+      <p:bldP spid="10" grpId="0" animBg="1"/>
+      <p:bldP spid="11" grpId="0" animBg="1"/>
+    </p:bldLst>
   </p:timing>
 </p:sld>
 </file>
@@ -7633,92 +11535,57 @@
           <a:chExt cx="0" cy="0"/>
         </a:xfrm>
       </p:grpSpPr>
-      <p:pic>
-        <p:nvPicPr>
-          <p:cNvPr id="2" name="Picture 2" descr="http://www.clipartbest.com/cliparts/eTM/kqd/eTMkqdRXc.png"/>
-          <p:cNvPicPr>
-            <a:picLocks noChangeAspect="1" noChangeArrowheads="1"/>
-          </p:cNvPicPr>
+      <p:sp>
+        <p:nvSpPr>
+          <p:cNvPr id="4" name="Textfeld 3"/>
+          <p:cNvSpPr txBox="1"/>
           <p:nvPr/>
-        </p:nvPicPr>
-        <p:blipFill>
-          <a:blip r:embed="rId2">
-            <a:extLst>
-              <a:ext uri="{28A0092B-C50C-407E-A947-70E740481C1C}">
-                <a14:useLocalDpi xmlns:a14="http://schemas.microsoft.com/office/drawing/2010/main" val="0"/>
-              </a:ext>
-            </a:extLst>
-          </a:blip>
-          <a:srcRect/>
-          <a:stretch>
-            <a:fillRect/>
-          </a:stretch>
-        </p:blipFill>
-        <p:spPr bwMode="auto">
+        </p:nvSpPr>
+        <p:spPr>
           <a:xfrm>
-            <a:off x="454513" y="671146"/>
-            <a:ext cx="3743325" cy="3743325"/>
+            <a:off x="0" y="2846517"/>
+            <a:ext cx="9144000" cy="1107996"/>
           </a:xfrm>
           <a:prstGeom prst="rect">
             <a:avLst/>
           </a:prstGeom>
           <a:noFill/>
-          <a:extLst>
-            <a:ext uri="{909E8E84-426E-40DD-AFC4-6F175D3DCCD1}">
-              <a14:hiddenFill xmlns:a14="http://schemas.microsoft.com/office/drawing/2010/main">
+        </p:spPr>
+        <p:txBody>
+          <a:bodyPr wrap="square" rtlCol="0" anchor="ctr">
+            <a:spAutoFit/>
+          </a:bodyPr>
+          <a:lstStyle/>
+          <a:p>
+            <a:pPr algn="ctr"/>
+            <a:r>
+              <a:rPr lang="de-AT" sz="6600" b="1" dirty="0" err="1" smtClean="0">
                 <a:solidFill>
-                  <a:srgbClr val="FFFFFF"/>
+                  <a:srgbClr val="76B82A"/>
                 </a:solidFill>
-              </a14:hiddenFill>
-            </a:ext>
-          </a:extLst>
-        </p:spPr>
-      </p:pic>
-      <p:pic>
-        <p:nvPicPr>
-          <p:cNvPr id="2050" name="Picture 2" descr="https://encrypted-tbn2.gstatic.com/images?q=tbn:ANd9GcTx8Q3WGGo5Iiao3-8jUzWoRzBySHgN43SB8-2XLWiHlmZ-YrKF"/>
-          <p:cNvPicPr>
-            <a:picLocks noChangeAspect="1" noChangeArrowheads="1"/>
-          </p:cNvPicPr>
-          <p:nvPr/>
-        </p:nvPicPr>
-        <p:blipFill>
-          <a:blip r:embed="rId3">
-            <a:extLst>
-              <a:ext uri="{28A0092B-C50C-407E-A947-70E740481C1C}">
-                <a14:useLocalDpi xmlns:a14="http://schemas.microsoft.com/office/drawing/2010/main" val="0"/>
-              </a:ext>
-            </a:extLst>
-          </a:blip>
-          <a:srcRect/>
-          <a:stretch>
-            <a:fillRect/>
-          </a:stretch>
-        </p:blipFill>
-        <p:spPr bwMode="auto">
-          <a:xfrm>
-            <a:off x="4622068" y="1392115"/>
-            <a:ext cx="3743325" cy="3743325"/>
-          </a:xfrm>
-          <a:prstGeom prst="rect">
-            <a:avLst/>
-          </a:prstGeom>
-          <a:noFill/>
-          <a:extLst>
-            <a:ext uri="{909E8E84-426E-40DD-AFC4-6F175D3DCCD1}">
-              <a14:hiddenFill xmlns:a14="http://schemas.microsoft.com/office/drawing/2010/main">
+              </a:rPr>
+              <a:t>Why</a:t>
+            </a:r>
+            <a:r>
+              <a:rPr lang="de-AT" sz="6600" b="1" dirty="0" smtClean="0">
                 <a:solidFill>
-                  <a:srgbClr val="FFFFFF"/>
+                  <a:srgbClr val="76B82A"/>
                 </a:solidFill>
-              </a14:hiddenFill>
-            </a:ext>
-          </a:extLst>
-        </p:spPr>
-      </p:pic>
+              </a:rPr>
+              <a:t>?</a:t>
+            </a:r>
+            <a:endParaRPr lang="de-AT" sz="6600" b="1" dirty="0">
+              <a:solidFill>
+                <a:srgbClr val="76B82A"/>
+              </a:solidFill>
+            </a:endParaRPr>
+          </a:p>
+        </p:txBody>
+      </p:sp>
     </p:spTree>
     <p:extLst>
       <p:ext uri="{BB962C8B-B14F-4D97-AF65-F5344CB8AC3E}">
-        <p14:creationId xmlns:p14="http://schemas.microsoft.com/office/powerpoint/2010/main" val="586403055"/>
+        <p14:creationId xmlns:p14="http://schemas.microsoft.com/office/powerpoint/2010/main" val="1887967147"/>
       </p:ext>
     </p:extLst>
   </p:cSld>
@@ -7754,14 +11621,14 @@
       </p:grpSpPr>
       <p:sp>
         <p:nvSpPr>
-          <p:cNvPr id="3" name="Textfeld 2"/>
+          <p:cNvPr id="4" name="Textfeld 3"/>
           <p:cNvSpPr txBox="1"/>
           <p:nvPr/>
         </p:nvSpPr>
         <p:spPr>
           <a:xfrm>
-            <a:off x="280588" y="1319497"/>
-            <a:ext cx="7760446" cy="707886"/>
+            <a:off x="0" y="2875549"/>
+            <a:ext cx="9144000" cy="1107996"/>
           </a:xfrm>
           <a:prstGeom prst="rect">
             <a:avLst/>
@@ -7774,76 +11641,19 @@
           </a:bodyPr>
           <a:lstStyle/>
           <a:p>
-            <a:r>
-              <a:rPr lang="de-DE" sz="4000" dirty="0" err="1" smtClean="0">
+            <a:pPr algn="ctr"/>
+            <a:r>
+              <a:rPr lang="de-AT" sz="6600" b="1" dirty="0" smtClean="0">
                 <a:solidFill>
-                  <a:schemeClr val="bg1"/>
+                  <a:srgbClr val="76B82A"/>
                 </a:solidFill>
               </a:rPr>
-              <a:t>Thanks</a:t>
-            </a:r>
-            <a:r>
-              <a:rPr lang="de-DE" sz="4000" dirty="0" smtClean="0">
-                <a:solidFill>
-                  <a:schemeClr val="bg1"/>
-                </a:solidFill>
-              </a:rPr>
-              <a:t> </a:t>
-            </a:r>
-            <a:r>
-              <a:rPr lang="de-DE" sz="4000" dirty="0" err="1" smtClean="0">
-                <a:solidFill>
-                  <a:schemeClr val="bg1"/>
-                </a:solidFill>
-              </a:rPr>
-              <a:t>for</a:t>
-            </a:r>
-            <a:r>
-              <a:rPr lang="de-DE" sz="4000" dirty="0" smtClean="0">
-                <a:solidFill>
-                  <a:schemeClr val="bg1"/>
-                </a:solidFill>
-              </a:rPr>
-              <a:t> </a:t>
-            </a:r>
-            <a:r>
-              <a:rPr lang="de-DE" sz="4000" dirty="0" err="1" smtClean="0">
-                <a:solidFill>
-                  <a:schemeClr val="bg1"/>
-                </a:solidFill>
-              </a:rPr>
-              <a:t>your</a:t>
-            </a:r>
-            <a:r>
-              <a:rPr lang="de-DE" sz="4000" dirty="0" smtClean="0">
-                <a:solidFill>
-                  <a:schemeClr val="bg1"/>
-                </a:solidFill>
-              </a:rPr>
-              <a:t> </a:t>
-            </a:r>
-            <a:r>
-              <a:rPr lang="de-DE" sz="4000" dirty="0" err="1" smtClean="0">
-                <a:solidFill>
-                  <a:schemeClr val="bg1"/>
-                </a:solidFill>
-              </a:rPr>
-              <a:t>attention</a:t>
-            </a:r>
-            <a:r>
-              <a:rPr lang="de-DE" sz="4000" dirty="0" smtClean="0">
-                <a:solidFill>
-                  <a:schemeClr val="bg1"/>
-                </a:solidFill>
-              </a:rPr>
-              <a:t>!</a:t>
-            </a:r>
-            <a:endParaRPr lang="de-DE" sz="2400" i="1" dirty="0">
+              <a:t>Goals</a:t>
+            </a:r>
+            <a:endParaRPr lang="de-AT" sz="4800" b="1" dirty="0">
               <a:solidFill>
-                <a:schemeClr val="bg1"/>
+                <a:srgbClr val="76B82A"/>
               </a:solidFill>
-              <a:latin typeface="Georgia"/>
-              <a:cs typeface="Georgia"/>
             </a:endParaRPr>
           </a:p>
         </p:txBody>
@@ -7851,7 +11661,83 @@
     </p:spTree>
     <p:extLst>
       <p:ext uri="{BB962C8B-B14F-4D97-AF65-F5344CB8AC3E}">
-        <p14:creationId xmlns:p14="http://schemas.microsoft.com/office/powerpoint/2010/main" val="628786468"/>
+        <p14:creationId xmlns:p14="http://schemas.microsoft.com/office/powerpoint/2010/main" val="2443400233"/>
+      </p:ext>
+    </p:extLst>
+  </p:cSld>
+  <p:clrMapOvr>
+    <a:masterClrMapping/>
+  </p:clrMapOvr>
+  <p:timing>
+    <p:tnLst>
+      <p:par>
+        <p:cTn id="1" dur="indefinite" restart="never" nodeType="tmRoot"/>
+      </p:par>
+    </p:tnLst>
+  </p:timing>
+</p:sld>
+</file>
+
+<file path=ppt/slides/slide9.xml><?xml version="1.0" encoding="utf-8"?>
+<p:sld xmlns:a="http://schemas.openxmlformats.org/drawingml/2006/main" xmlns:r="http://schemas.openxmlformats.org/officeDocument/2006/relationships" xmlns:p="http://schemas.openxmlformats.org/presentationml/2006/main">
+  <p:cSld>
+    <p:spTree>
+      <p:nvGrpSpPr>
+        <p:cNvPr id="1" name=""/>
+        <p:cNvGrpSpPr/>
+        <p:nvPr/>
+      </p:nvGrpSpPr>
+      <p:grpSpPr>
+        <a:xfrm>
+          <a:off x="0" y="0"/>
+          <a:ext cx="0" cy="0"/>
+          <a:chOff x="0" y="0"/>
+          <a:chExt cx="0" cy="0"/>
+        </a:xfrm>
+      </p:grpSpPr>
+      <p:sp>
+        <p:nvSpPr>
+          <p:cNvPr id="4" name="Textfeld 3"/>
+          <p:cNvSpPr txBox="1"/>
+          <p:nvPr/>
+        </p:nvSpPr>
+        <p:spPr>
+          <a:xfrm>
+            <a:off x="0" y="2875549"/>
+            <a:ext cx="9144000" cy="1107996"/>
+          </a:xfrm>
+          <a:prstGeom prst="rect">
+            <a:avLst/>
+          </a:prstGeom>
+          <a:noFill/>
+        </p:spPr>
+        <p:txBody>
+          <a:bodyPr wrap="square" rtlCol="0">
+            <a:spAutoFit/>
+          </a:bodyPr>
+          <a:lstStyle/>
+          <a:p>
+            <a:pPr algn="ctr"/>
+            <a:r>
+              <a:rPr lang="de-AT" sz="6600" b="1" dirty="0" smtClean="0">
+                <a:solidFill>
+                  <a:srgbClr val="76B82A"/>
+                </a:solidFill>
+              </a:rPr>
+              <a:t>Approach</a:t>
+            </a:r>
+            <a:endParaRPr lang="de-AT" sz="4800" b="1" dirty="0">
+              <a:solidFill>
+                <a:srgbClr val="76B82A"/>
+              </a:solidFill>
+            </a:endParaRPr>
+          </a:p>
+        </p:txBody>
+      </p:sp>
+    </p:spTree>
+    <p:extLst>
+      <p:ext uri="{BB962C8B-B14F-4D97-AF65-F5344CB8AC3E}">
+        <p14:creationId xmlns:p14="http://schemas.microsoft.com/office/powerpoint/2010/main" val="656126677"/>
       </p:ext>
     </p:extLst>
   </p:cSld>

</xml_diff>

<commit_message>
Finished initial presentation - updated animations - edited comment text
</commit_message>
<xml_diff>
--- a/presentations/20151113 Initial presentation/WebRTC_Initial.pptx
+++ b/presentations/20151113 Initial presentation/WebRTC_Initial.pptx
@@ -118,7 +118,7 @@
   </p:defaultTextStyle>
   <p:extLst>
     <p:ext uri="{EFAFB233-063F-42B5-8137-9DF3F51BA10A}">
-      <p15:sldGuideLst xmlns:p15="http://schemas.microsoft.com/office/powerpoint/2012/main" xmlns="">
+      <p15:sldGuideLst xmlns:p15="http://schemas.microsoft.com/office/powerpoint/2012/main">
         <p15:guide id="1" orient="horz" pos="1002">
           <p15:clr>
             <a:srgbClr val="A4A3A4"/>
@@ -217,7 +217,7 @@
           <a:p>
             <a:fld id="{7A19BEE0-598C-4858-A439-753E34679212}" type="datetimeFigureOut">
               <a:rPr lang="de-AT" smtClean="0"/>
-              <a:t>09.11.2015</a:t>
+              <a:t>10.11.2015</a:t>
             </a:fld>
             <a:endParaRPr lang="de-AT"/>
           </a:p>
@@ -551,7 +551,11 @@
             </a:r>
             <a:r>
               <a:rPr lang="de-AT" dirty="0" smtClean="0"/>
-              <a:t> Web Real-Time Communication.</a:t>
+              <a:t> Web Real-Time Communication</a:t>
+            </a:r>
+            <a:r>
+              <a:rPr lang="de-AT" dirty="0" smtClean="0"/>
+              <a:t>.</a:t>
             </a:r>
           </a:p>
           <a:p>
@@ -568,6 +572,84 @@
             </a:r>
             <a:r>
               <a:rPr lang="de-AT" dirty="0" err="1" smtClean="0"/>
+              <a:t>is</a:t>
+            </a:r>
+            <a:r>
+              <a:rPr lang="de-AT" dirty="0" smtClean="0"/>
+              <a:t> a </a:t>
+            </a:r>
+            <a:r>
+              <a:rPr lang="de-AT" dirty="0" err="1" smtClean="0"/>
+              <a:t>new</a:t>
+            </a:r>
+            <a:r>
+              <a:rPr lang="de-AT" dirty="0" smtClean="0"/>
+              <a:t> </a:t>
+            </a:r>
+            <a:r>
+              <a:rPr lang="de-AT" dirty="0" err="1" smtClean="0"/>
+              <a:t>technology</a:t>
+            </a:r>
+            <a:r>
+              <a:rPr lang="de-AT" dirty="0" smtClean="0"/>
+              <a:t> </a:t>
+            </a:r>
+            <a:r>
+              <a:rPr lang="de-AT" dirty="0" err="1" smtClean="0"/>
+              <a:t>and</a:t>
+            </a:r>
+            <a:r>
+              <a:rPr lang="de-AT" dirty="0" smtClean="0"/>
+              <a:t> a W3C API </a:t>
+            </a:r>
+            <a:r>
+              <a:rPr lang="de-AT" dirty="0" err="1" smtClean="0"/>
+              <a:t>definition</a:t>
+            </a:r>
+            <a:r>
+              <a:rPr lang="de-AT" dirty="0" smtClean="0"/>
+              <a:t> </a:t>
+            </a:r>
+            <a:r>
+              <a:rPr lang="de-AT" dirty="0" err="1" smtClean="0"/>
+              <a:t>currently</a:t>
+            </a:r>
+            <a:r>
+              <a:rPr lang="de-AT" dirty="0" smtClean="0"/>
+              <a:t> </a:t>
+            </a:r>
+            <a:r>
+              <a:rPr lang="de-AT" dirty="0" err="1" smtClean="0"/>
+              <a:t>under</a:t>
+            </a:r>
+            <a:r>
+              <a:rPr lang="de-AT" dirty="0" smtClean="0"/>
+              <a:t> </a:t>
+            </a:r>
+            <a:r>
+              <a:rPr lang="de-AT" dirty="0" err="1" smtClean="0"/>
+              <a:t>specification</a:t>
+            </a:r>
+            <a:r>
+              <a:rPr lang="de-AT" dirty="0" smtClean="0"/>
+              <a:t>.</a:t>
+            </a:r>
+            <a:endParaRPr lang="de-AT" dirty="0" smtClean="0"/>
+          </a:p>
+          <a:p>
+            <a:endParaRPr lang="de-AT" dirty="0" smtClean="0"/>
+          </a:p>
+          <a:p>
+            <a:r>
+              <a:rPr lang="de-AT" dirty="0" err="1" smtClean="0"/>
+              <a:t>It</a:t>
+            </a:r>
+            <a:r>
+              <a:rPr lang="de-AT" dirty="0" smtClean="0"/>
+              <a:t> </a:t>
+            </a:r>
+            <a:r>
+              <a:rPr lang="de-AT" dirty="0" err="1" smtClean="0"/>
               <a:t>enables</a:t>
             </a:r>
             <a:r>
@@ -833,8 +915,146 @@
             </a:r>
             <a:r>
               <a:rPr lang="de-AT" baseline="0" dirty="0" smtClean="0"/>
-              <a:t>?“</a:t>
-            </a:r>
+              <a:t>?“, </a:t>
+            </a:r>
+            <a:r>
+              <a:rPr lang="de-AT" baseline="0" dirty="0" err="1" smtClean="0"/>
+              <a:t>then</a:t>
+            </a:r>
+            <a:r>
+              <a:rPr lang="de-AT" baseline="0" dirty="0" smtClean="0"/>
+              <a:t> </a:t>
+            </a:r>
+            <a:r>
+              <a:rPr lang="de-AT" baseline="0" dirty="0" err="1" smtClean="0"/>
+              <a:t>you‘re</a:t>
+            </a:r>
+            <a:r>
+              <a:rPr lang="de-AT" baseline="0" dirty="0" smtClean="0"/>
+              <a:t> </a:t>
+            </a:r>
+            <a:r>
+              <a:rPr lang="de-AT" baseline="0" dirty="0" err="1" smtClean="0"/>
+              <a:t>absolutely</a:t>
+            </a:r>
+            <a:r>
+              <a:rPr lang="de-AT" baseline="0" dirty="0" smtClean="0"/>
+              <a:t> </a:t>
+            </a:r>
+            <a:r>
+              <a:rPr lang="de-AT" baseline="0" dirty="0" err="1" smtClean="0"/>
+              <a:t>right</a:t>
+            </a:r>
+            <a:r>
+              <a:rPr lang="de-AT" baseline="0" dirty="0" smtClean="0"/>
+              <a:t>, Skype </a:t>
+            </a:r>
+            <a:r>
+              <a:rPr lang="de-AT" baseline="0" dirty="0" err="1" smtClean="0"/>
+              <a:t>and</a:t>
+            </a:r>
+            <a:r>
+              <a:rPr lang="de-AT" baseline="0" dirty="0" smtClean="0"/>
+              <a:t> </a:t>
+            </a:r>
+            <a:r>
+              <a:rPr lang="de-AT" baseline="0" dirty="0" err="1" smtClean="0"/>
+              <a:t>many</a:t>
+            </a:r>
+            <a:r>
+              <a:rPr lang="de-AT" baseline="0" dirty="0" smtClean="0"/>
+              <a:t> </a:t>
+            </a:r>
+            <a:r>
+              <a:rPr lang="de-AT" baseline="0" dirty="0" err="1" smtClean="0"/>
+              <a:t>other</a:t>
+            </a:r>
+            <a:r>
+              <a:rPr lang="de-AT" baseline="0" dirty="0" smtClean="0"/>
+              <a:t> </a:t>
+            </a:r>
+            <a:r>
+              <a:rPr lang="de-AT" baseline="0" dirty="0" err="1" smtClean="0"/>
+              <a:t>applications</a:t>
+            </a:r>
+            <a:r>
+              <a:rPr lang="de-AT" baseline="0" dirty="0" smtClean="0"/>
+              <a:t> do </a:t>
+            </a:r>
+            <a:r>
+              <a:rPr lang="de-AT" baseline="0" dirty="0" err="1" smtClean="0"/>
+              <a:t>exactly</a:t>
+            </a:r>
+            <a:r>
+              <a:rPr lang="de-AT" baseline="0" dirty="0" smtClean="0"/>
+              <a:t> </a:t>
+            </a:r>
+            <a:r>
+              <a:rPr lang="de-AT" baseline="0" dirty="0" err="1" smtClean="0"/>
+              <a:t>that</a:t>
+            </a:r>
+            <a:r>
+              <a:rPr lang="de-AT" baseline="0" dirty="0" smtClean="0"/>
+              <a:t>.</a:t>
+            </a:r>
+          </a:p>
+          <a:p>
+            <a:endParaRPr lang="de-AT" baseline="0" dirty="0" smtClean="0"/>
+          </a:p>
+          <a:p>
+            <a:r>
+              <a:rPr lang="de-AT" baseline="0" dirty="0" smtClean="0"/>
+              <a:t>But – </a:t>
+            </a:r>
+            <a:r>
+              <a:rPr lang="de-AT" baseline="0" dirty="0" err="1" smtClean="0"/>
+              <a:t>WebRTC</a:t>
+            </a:r>
+            <a:r>
+              <a:rPr lang="de-AT" baseline="0" dirty="0" smtClean="0"/>
+              <a:t> </a:t>
+            </a:r>
+            <a:r>
+              <a:rPr lang="de-AT" baseline="0" dirty="0" err="1" smtClean="0"/>
+              <a:t>does</a:t>
+            </a:r>
+            <a:r>
+              <a:rPr lang="de-AT" baseline="0" dirty="0" smtClean="0"/>
+              <a:t> a </a:t>
+            </a:r>
+            <a:r>
+              <a:rPr lang="de-AT" baseline="0" dirty="0" err="1" smtClean="0"/>
+              <a:t>few</a:t>
+            </a:r>
+            <a:r>
+              <a:rPr lang="de-AT" baseline="0" dirty="0" smtClean="0"/>
+              <a:t> </a:t>
+            </a:r>
+            <a:r>
+              <a:rPr lang="de-AT" baseline="0" dirty="0" err="1" smtClean="0"/>
+              <a:t>things</a:t>
+            </a:r>
+            <a:r>
+              <a:rPr lang="de-AT" baseline="0" dirty="0" smtClean="0"/>
+              <a:t> in a </a:t>
+            </a:r>
+            <a:r>
+              <a:rPr lang="de-AT" baseline="0" dirty="0" err="1" smtClean="0"/>
+              <a:t>significantly</a:t>
+            </a:r>
+            <a:r>
+              <a:rPr lang="de-AT" baseline="0" dirty="0" smtClean="0"/>
+              <a:t> different </a:t>
+            </a:r>
+            <a:r>
+              <a:rPr lang="de-AT" baseline="0" dirty="0" err="1" smtClean="0"/>
+              <a:t>way</a:t>
+            </a:r>
+            <a:r>
+              <a:rPr lang="de-AT" baseline="0" dirty="0" smtClean="0"/>
+              <a:t>.</a:t>
+            </a:r>
+            <a:endParaRPr lang="de-AT" baseline="0" dirty="0" smtClean="0"/>
           </a:p>
         </p:txBody>
       </p:sp>
@@ -2290,11 +2510,7 @@
             </a:r>
             <a:r>
               <a:rPr lang="de-AT" b="0" baseline="0" dirty="0" smtClean="0"/>
-              <a:t>. </a:t>
-            </a:r>
-            <a:r>
-              <a:rPr lang="de-AT" b="0" baseline="0" dirty="0" smtClean="0"/>
-              <a:t>A Multipoint Control Unit (MCU) </a:t>
+              <a:t>. A Multipoint Control Unit (MCU) </a:t>
             </a:r>
             <a:r>
               <a:rPr lang="de-AT" b="0" baseline="0" dirty="0" err="1" smtClean="0"/>
@@ -2688,11 +2904,7 @@
           <a:p>
             <a:r>
               <a:rPr lang="de-AT" dirty="0" smtClean="0"/>
-              <a:t>Advantages</a:t>
-            </a:r>
-            <a:r>
-              <a:rPr lang="de-AT" dirty="0" smtClean="0"/>
-              <a:t>:</a:t>
+              <a:t>Advantages:</a:t>
             </a:r>
           </a:p>
           <a:p>
@@ -6044,7 +6256,7 @@
           <a:p>
             <a:fld id="{BD334F44-700B-E44C-96AB-E83A6820DFD3}" type="datetimeFigureOut">
               <a:rPr lang="de-DE" smtClean="0"/>
-              <a:t>09.11.2015</a:t>
+              <a:t>10.11.2015</a:t>
             </a:fld>
             <a:endParaRPr lang="de-DE"/>
           </a:p>
@@ -6224,7 +6436,7 @@
           <a:p>
             <a:fld id="{BD334F44-700B-E44C-96AB-E83A6820DFD3}" type="datetimeFigureOut">
               <a:rPr lang="de-DE" smtClean="0"/>
-              <a:t>09.11.2015</a:t>
+              <a:t>10.11.2015</a:t>
             </a:fld>
             <a:endParaRPr lang="de-DE"/>
           </a:p>
@@ -6394,7 +6606,7 @@
           <a:p>
             <a:fld id="{BD334F44-700B-E44C-96AB-E83A6820DFD3}" type="datetimeFigureOut">
               <a:rPr lang="de-DE" smtClean="0"/>
-              <a:t>09.11.2015</a:t>
+              <a:t>10.11.2015</a:t>
             </a:fld>
             <a:endParaRPr lang="de-DE"/>
           </a:p>
@@ -6640,7 +6852,7 @@
           <a:p>
             <a:fld id="{BD334F44-700B-E44C-96AB-E83A6820DFD3}" type="datetimeFigureOut">
               <a:rPr lang="de-DE" smtClean="0"/>
-              <a:t>09.11.2015</a:t>
+              <a:t>10.11.2015</a:t>
             </a:fld>
             <a:endParaRPr lang="de-DE"/>
           </a:p>
@@ -6928,7 +7140,7 @@
           <a:p>
             <a:fld id="{BD334F44-700B-E44C-96AB-E83A6820DFD3}" type="datetimeFigureOut">
               <a:rPr lang="de-DE" smtClean="0"/>
-              <a:t>09.11.2015</a:t>
+              <a:t>10.11.2015</a:t>
             </a:fld>
             <a:endParaRPr lang="de-DE"/>
           </a:p>
@@ -7350,7 +7562,7 @@
           <a:p>
             <a:fld id="{BD334F44-700B-E44C-96AB-E83A6820DFD3}" type="datetimeFigureOut">
               <a:rPr lang="de-DE" smtClean="0"/>
-              <a:t>09.11.2015</a:t>
+              <a:t>10.11.2015</a:t>
             </a:fld>
             <a:endParaRPr lang="de-DE"/>
           </a:p>
@@ -7468,7 +7680,7 @@
           <a:p>
             <a:fld id="{BD334F44-700B-E44C-96AB-E83A6820DFD3}" type="datetimeFigureOut">
               <a:rPr lang="de-DE" smtClean="0"/>
-              <a:t>09.11.2015</a:t>
+              <a:t>10.11.2015</a:t>
             </a:fld>
             <a:endParaRPr lang="de-DE"/>
           </a:p>
@@ -7563,7 +7775,7 @@
           <a:p>
             <a:fld id="{BD334F44-700B-E44C-96AB-E83A6820DFD3}" type="datetimeFigureOut">
               <a:rPr lang="de-DE" smtClean="0"/>
-              <a:t>09.11.2015</a:t>
+              <a:t>10.11.2015</a:t>
             </a:fld>
             <a:endParaRPr lang="de-DE"/>
           </a:p>
@@ -7886,7 +8098,7 @@
           <a:p>
             <a:fld id="{BD334F44-700B-E44C-96AB-E83A6820DFD3}" type="datetimeFigureOut">
               <a:rPr lang="de-DE" smtClean="0"/>
-              <a:t>09.11.2015</a:t>
+              <a:t>10.11.2015</a:t>
             </a:fld>
             <a:endParaRPr lang="de-DE"/>
           </a:p>
@@ -8139,7 +8351,7 @@
           <a:p>
             <a:fld id="{BD334F44-700B-E44C-96AB-E83A6820DFD3}" type="datetimeFigureOut">
               <a:rPr lang="de-DE" smtClean="0"/>
-              <a:t>09.11.2015</a:t>
+              <a:t>10.11.2015</a:t>
             </a:fld>
             <a:endParaRPr lang="de-DE"/>
           </a:p>
@@ -8352,7 +8564,7 @@
           <a:p>
             <a:fld id="{BD334F44-700B-E44C-96AB-E83A6820DFD3}" type="datetimeFigureOut">
               <a:rPr lang="de-DE" smtClean="0"/>
-              <a:t>09.11.2015</a:t>
+              <a:t>10.11.2015</a:t>
             </a:fld>
             <a:endParaRPr lang="de-DE"/>
           </a:p>
@@ -9750,30 +9962,21 @@
                             </p:childTnLst>
                           </p:cTn>
                         </p:par>
-                      </p:childTnLst>
-                    </p:cTn>
-                  </p:par>
-                  <p:par>
-                    <p:cTn id="8" fill="hold">
-                      <p:stCondLst>
-                        <p:cond delay="indefinite"/>
-                      </p:stCondLst>
-                      <p:childTnLst>
                         <p:par>
-                          <p:cTn id="9" fill="hold">
+                          <p:cTn id="8" fill="hold">
                             <p:stCondLst>
-                              <p:cond delay="0"/>
+                              <p:cond delay="500"/>
                             </p:stCondLst>
                             <p:childTnLst>
                               <p:par>
-                                <p:cTn id="10" presetID="10" presetClass="entr" presetSubtype="0" fill="hold" nodeType="clickEffect">
+                                <p:cTn id="9" presetID="10" presetClass="entr" presetSubtype="0" fill="hold" nodeType="afterEffect">
                                   <p:stCondLst>
-                                    <p:cond delay="0"/>
+                                    <p:cond delay="500"/>
                                   </p:stCondLst>
                                   <p:childTnLst>
                                     <p:set>
                                       <p:cBhvr>
-                                        <p:cTn id="11" dur="1" fill="hold">
+                                        <p:cTn id="10" dur="1" fill="hold">
                                           <p:stCondLst>
                                             <p:cond delay="0"/>
                                           </p:stCondLst>
@@ -9791,7 +9994,7 @@
                                     </p:set>
                                     <p:animEffect transition="in" filter="fade">
                                       <p:cBhvr>
-                                        <p:cTn id="12" dur="500"/>
+                                        <p:cTn id="11" dur="500"/>
                                         <p:tgtEl>
                                           <p:spTgt spid="5"/>
                                         </p:tgtEl>
@@ -9807,26 +10010,26 @@
                     </p:cTn>
                   </p:par>
                   <p:par>
-                    <p:cTn id="13" fill="hold">
+                    <p:cTn id="12" fill="hold">
                       <p:stCondLst>
                         <p:cond delay="indefinite"/>
                       </p:stCondLst>
                       <p:childTnLst>
                         <p:par>
-                          <p:cTn id="14" fill="hold">
+                          <p:cTn id="13" fill="hold">
                             <p:stCondLst>
                               <p:cond delay="0"/>
                             </p:stCondLst>
                             <p:childTnLst>
                               <p:par>
-                                <p:cTn id="15" presetID="10" presetClass="entr" presetSubtype="0" fill="hold" nodeType="clickEffect">
+                                <p:cTn id="14" presetID="10" presetClass="entr" presetSubtype="0" fill="hold" nodeType="clickEffect">
                                   <p:stCondLst>
                                     <p:cond delay="0"/>
                                   </p:stCondLst>
                                   <p:childTnLst>
                                     <p:set>
                                       <p:cBhvr>
-                                        <p:cTn id="16" dur="1" fill="hold">
+                                        <p:cTn id="15" dur="1" fill="hold">
                                           <p:stCondLst>
                                             <p:cond delay="0"/>
                                           </p:stCondLst>
@@ -9844,7 +10047,7 @@
                                     </p:set>
                                     <p:animEffect transition="in" filter="fade">
                                       <p:cBhvr>
-                                        <p:cTn id="17" dur="500"/>
+                                        <p:cTn id="16" dur="500"/>
                                         <p:tgtEl>
                                           <p:spTgt spid="2050"/>
                                         </p:tgtEl>
@@ -9860,26 +10063,26 @@
                     </p:cTn>
                   </p:par>
                   <p:par>
-                    <p:cTn id="18" fill="hold">
+                    <p:cTn id="17" fill="hold">
                       <p:stCondLst>
                         <p:cond delay="indefinite"/>
                       </p:stCondLst>
                       <p:childTnLst>
                         <p:par>
-                          <p:cTn id="19" fill="hold">
+                          <p:cTn id="18" fill="hold">
                             <p:stCondLst>
                               <p:cond delay="0"/>
                             </p:stCondLst>
                             <p:childTnLst>
                               <p:par>
-                                <p:cTn id="20" presetID="10" presetClass="entr" presetSubtype="0" fill="hold" nodeType="clickEffect">
+                                <p:cTn id="19" presetID="10" presetClass="entr" presetSubtype="0" fill="hold" nodeType="clickEffect">
                                   <p:stCondLst>
                                     <p:cond delay="0"/>
                                   </p:stCondLst>
                                   <p:childTnLst>
                                     <p:set>
                                       <p:cBhvr>
-                                        <p:cTn id="21" dur="1" fill="hold">
+                                        <p:cTn id="20" dur="1" fill="hold">
                                           <p:stCondLst>
                                             <p:cond delay="0"/>
                                           </p:stCondLst>
@@ -9897,7 +10100,7 @@
                                     </p:set>
                                     <p:animEffect transition="in" filter="fade">
                                       <p:cBhvr>
-                                        <p:cTn id="22" dur="500"/>
+                                        <p:cTn id="21" dur="500"/>
                                         <p:tgtEl>
                                           <p:spTgt spid="3"/>
                                         </p:tgtEl>
@@ -9907,14 +10110,14 @@
                                 </p:cTn>
                               </p:par>
                               <p:par>
-                                <p:cTn id="23" presetID="10" presetClass="entr" presetSubtype="0" fill="hold" nodeType="withEffect">
+                                <p:cTn id="22" presetID="10" presetClass="entr" presetSubtype="0" fill="hold" nodeType="withEffect">
                                   <p:stCondLst>
                                     <p:cond delay="0"/>
                                   </p:stCondLst>
                                   <p:childTnLst>
                                     <p:set>
                                       <p:cBhvr>
-                                        <p:cTn id="24" dur="1" fill="hold">
+                                        <p:cTn id="23" dur="1" fill="hold">
                                           <p:stCondLst>
                                             <p:cond delay="0"/>
                                           </p:stCondLst>
@@ -9932,7 +10135,7 @@
                                     </p:set>
                                     <p:animEffect transition="in" filter="fade">
                                       <p:cBhvr>
-                                        <p:cTn id="25" dur="500"/>
+                                        <p:cTn id="24" dur="500"/>
                                         <p:tgtEl>
                                           <p:spTgt spid="7"/>
                                         </p:tgtEl>
@@ -9948,26 +10151,26 @@
                     </p:cTn>
                   </p:par>
                   <p:par>
-                    <p:cTn id="26" fill="hold">
+                    <p:cTn id="25" fill="hold">
                       <p:stCondLst>
                         <p:cond delay="indefinite"/>
                       </p:stCondLst>
                       <p:childTnLst>
                         <p:par>
-                          <p:cTn id="27" fill="hold">
+                          <p:cTn id="26" fill="hold">
                             <p:stCondLst>
                               <p:cond delay="0"/>
                             </p:stCondLst>
                             <p:childTnLst>
                               <p:par>
-                                <p:cTn id="28" presetID="10" presetClass="entr" presetSubtype="0" fill="hold" nodeType="clickEffect">
+                                <p:cTn id="27" presetID="10" presetClass="entr" presetSubtype="0" fill="hold" nodeType="clickEffect">
                                   <p:stCondLst>
                                     <p:cond delay="0"/>
                                   </p:stCondLst>
                                   <p:childTnLst>
                                     <p:set>
                                       <p:cBhvr>
-                                        <p:cTn id="29" dur="1" fill="hold">
+                                        <p:cTn id="28" dur="1" fill="hold">
                                           <p:stCondLst>
                                             <p:cond delay="0"/>
                                           </p:stCondLst>
@@ -9985,7 +10188,7 @@
                                     </p:set>
                                     <p:animEffect transition="in" filter="fade">
                                       <p:cBhvr>
-                                        <p:cTn id="30" dur="500"/>
+                                        <p:cTn id="29" dur="500"/>
                                         <p:tgtEl>
                                           <p:spTgt spid="10"/>
                                         </p:tgtEl>
@@ -9995,14 +10198,14 @@
                                 </p:cTn>
                               </p:par>
                               <p:par>
-                                <p:cTn id="31" presetID="10" presetClass="entr" presetSubtype="0" fill="hold" nodeType="withEffect">
+                                <p:cTn id="30" presetID="10" presetClass="entr" presetSubtype="0" fill="hold" nodeType="withEffect">
                                   <p:stCondLst>
                                     <p:cond delay="0"/>
                                   </p:stCondLst>
                                   <p:childTnLst>
                                     <p:set>
                                       <p:cBhvr>
-                                        <p:cTn id="32" dur="1" fill="hold">
+                                        <p:cTn id="31" dur="1" fill="hold">
                                           <p:stCondLst>
                                             <p:cond delay="0"/>
                                           </p:stCondLst>
@@ -10020,7 +10223,7 @@
                                     </p:set>
                                     <p:animEffect transition="in" filter="fade">
                                       <p:cBhvr>
-                                        <p:cTn id="33" dur="500"/>
+                                        <p:cTn id="32" dur="500"/>
                                         <p:tgtEl>
                                           <p:spTgt spid="12"/>
                                         </p:tgtEl>
@@ -10036,26 +10239,26 @@
                     </p:cTn>
                   </p:par>
                   <p:par>
-                    <p:cTn id="34" fill="hold">
+                    <p:cTn id="33" fill="hold">
                       <p:stCondLst>
                         <p:cond delay="indefinite"/>
                       </p:stCondLst>
                       <p:childTnLst>
                         <p:par>
-                          <p:cTn id="35" fill="hold">
+                          <p:cTn id="34" fill="hold">
                             <p:stCondLst>
                               <p:cond delay="0"/>
                             </p:stCondLst>
                             <p:childTnLst>
                               <p:par>
-                                <p:cTn id="36" presetID="1" presetClass="entr" presetSubtype="0" fill="hold" nodeType="clickEffect">
+                                <p:cTn id="35" presetID="10" presetClass="entr" presetSubtype="0" fill="hold" nodeType="clickEffect">
                                   <p:stCondLst>
                                     <p:cond delay="0"/>
                                   </p:stCondLst>
                                   <p:childTnLst>
                                     <p:set>
                                       <p:cBhvr>
-                                        <p:cTn id="37" dur="1" fill="hold">
+                                        <p:cTn id="36" dur="1" fill="hold">
                                           <p:stCondLst>
                                             <p:cond delay="0"/>
                                           </p:stCondLst>
@@ -10071,6 +10274,14 @@
                                         <p:strVal val="visible"/>
                                       </p:to>
                                     </p:set>
+                                    <p:animEffect transition="in" filter="fade">
+                                      <p:cBhvr>
+                                        <p:cTn id="37" dur="500"/>
+                                        <p:tgtEl>
+                                          <p:spTgt spid="11"/>
+                                        </p:tgtEl>
+                                      </p:cBhvr>
+                                    </p:animEffect>
                                   </p:childTnLst>
                                 </p:cTn>
                               </p:par>
@@ -10093,7 +10304,7 @@
                             </p:stCondLst>
                             <p:childTnLst>
                               <p:par>
-                                <p:cTn id="40" presetID="1" presetClass="entr" presetSubtype="0" fill="hold" nodeType="clickEffect">
+                                <p:cTn id="40" presetID="10" presetClass="entr" presetSubtype="0" fill="hold" nodeType="clickEffect">
                                   <p:stCondLst>
                                     <p:cond delay="0"/>
                                   </p:stCondLst>
@@ -10116,18 +10327,26 @@
                                         <p:strVal val="visible"/>
                                       </p:to>
                                     </p:set>
+                                    <p:animEffect transition="in" filter="fade">
+                                      <p:cBhvr>
+                                        <p:cTn id="42" dur="500"/>
+                                        <p:tgtEl>
+                                          <p:spTgt spid="18"/>
+                                        </p:tgtEl>
+                                      </p:cBhvr>
+                                    </p:animEffect>
                                   </p:childTnLst>
                                 </p:cTn>
                               </p:par>
                               <p:par>
-                                <p:cTn id="42" presetID="1" presetClass="entr" presetSubtype="0" fill="hold" nodeType="withEffect">
+                                <p:cTn id="43" presetID="10" presetClass="entr" presetSubtype="0" fill="hold" nodeType="withEffect">
                                   <p:stCondLst>
                                     <p:cond delay="0"/>
                                   </p:stCondLst>
                                   <p:childTnLst>
                                     <p:set>
                                       <p:cBhvr>
-                                        <p:cTn id="43" dur="1" fill="hold">
+                                        <p:cTn id="44" dur="1" fill="hold">
                                           <p:stCondLst>
                                             <p:cond delay="0"/>
                                           </p:stCondLst>
@@ -10143,31 +10362,21 @@
                                         <p:strVal val="visible"/>
                                       </p:to>
                                     </p:set>
+                                    <p:animEffect transition="in" filter="fade">
+                                      <p:cBhvr>
+                                        <p:cTn id="45" dur="500"/>
+                                        <p:tgtEl>
+                                          <p:spTgt spid="20"/>
+                                        </p:tgtEl>
+                                      </p:cBhvr>
+                                    </p:animEffect>
                                   </p:childTnLst>
                                 </p:cTn>
                               </p:par>
-                            </p:childTnLst>
-                          </p:cTn>
-                        </p:par>
-                      </p:childTnLst>
-                    </p:cTn>
-                  </p:par>
-                  <p:par>
-                    <p:cTn id="44" fill="hold">
-                      <p:stCondLst>
-                        <p:cond delay="indefinite"/>
-                      </p:stCondLst>
-                      <p:childTnLst>
-                        <p:par>
-                          <p:cTn id="45" fill="hold">
-                            <p:stCondLst>
-                              <p:cond delay="0"/>
-                            </p:stCondLst>
-                            <p:childTnLst>
                               <p:par>
-                                <p:cTn id="46" presetID="10" presetClass="exit" presetSubtype="0" fill="hold" nodeType="clickEffect">
+                                <p:cTn id="46" presetID="10" presetClass="exit" presetSubtype="0" fill="hold" nodeType="withEffect">
                                   <p:stCondLst>
-                                    <p:cond delay="0"/>
+                                    <p:cond delay="750"/>
                                   </p:stCondLst>
                                   <p:childTnLst>
                                     <p:animEffect transition="out" filter="fade">
@@ -10202,7 +10411,7 @@
                               <p:par>
                                 <p:cTn id="49" presetID="10" presetClass="exit" presetSubtype="0" fill="hold" nodeType="withEffect">
                                   <p:stCondLst>
-                                    <p:cond delay="0"/>
+                                    <p:cond delay="750"/>
                                   </p:stCondLst>
                                   <p:childTnLst>
                                     <p:animEffect transition="out" filter="fade">
@@ -10237,7 +10446,7 @@
                               <p:par>
                                 <p:cTn id="52" presetID="10" presetClass="exit" presetSubtype="0" fill="hold" nodeType="withEffect">
                                   <p:stCondLst>
-                                    <p:cond delay="0"/>
+                                    <p:cond delay="750"/>
                                   </p:stCondLst>
                                   <p:childTnLst>
                                     <p:animEffect transition="out" filter="fade">
@@ -10272,7 +10481,7 @@
                               <p:par>
                                 <p:cTn id="55" presetID="10" presetClass="exit" presetSubtype="0" fill="hold" nodeType="withEffect">
                                   <p:stCondLst>
-                                    <p:cond delay="0"/>
+                                    <p:cond delay="750"/>
                                   </p:stCondLst>
                                   <p:childTnLst>
                                     <p:animEffect transition="out" filter="fade">
@@ -10307,7 +10516,7 @@
                               <p:par>
                                 <p:cTn id="58" presetID="10" presetClass="exit" presetSubtype="0" fill="hold" nodeType="withEffect">
                                   <p:stCondLst>
-                                    <p:cond delay="0"/>
+                                    <p:cond delay="750"/>
                                   </p:stCondLst>
                                   <p:childTnLst>
                                     <p:animEffect transition="out" filter="fade">
@@ -11135,7 +11344,7 @@
                             </p:stCondLst>
                             <p:childTnLst>
                               <p:par>
-                                <p:cTn id="5" presetID="2" presetClass="entr" presetSubtype="4" fill="hold" nodeType="clickEffect">
+                                <p:cTn id="5" presetID="10" presetClass="entr" presetSubtype="0" fill="hold" grpId="0" nodeType="clickEffect">
                                   <p:stCondLst>
                                     <p:cond delay="0"/>
                                   </p:stCondLst>
@@ -11143,6 +11352,59 @@
                                     <p:set>
                                       <p:cBhvr>
                                         <p:cTn id="6" dur="1" fill="hold">
+                                          <p:stCondLst>
+                                            <p:cond delay="0"/>
+                                          </p:stCondLst>
+                                        </p:cTn>
+                                        <p:tgtEl>
+                                          <p:spTgt spid="4"/>
+                                        </p:tgtEl>
+                                        <p:attrNameLst>
+                                          <p:attrName>style.visibility</p:attrName>
+                                        </p:attrNameLst>
+                                      </p:cBhvr>
+                                      <p:to>
+                                        <p:strVal val="visible"/>
+                                      </p:to>
+                                    </p:set>
+                                    <p:animEffect transition="in" filter="fade">
+                                      <p:cBhvr>
+                                        <p:cTn id="7" dur="500"/>
+                                        <p:tgtEl>
+                                          <p:spTgt spid="4"/>
+                                        </p:tgtEl>
+                                      </p:cBhvr>
+                                    </p:animEffect>
+                                  </p:childTnLst>
+                                </p:cTn>
+                              </p:par>
+                            </p:childTnLst>
+                          </p:cTn>
+                        </p:par>
+                      </p:childTnLst>
+                    </p:cTn>
+                  </p:par>
+                  <p:par>
+                    <p:cTn id="8" fill="hold">
+                      <p:stCondLst>
+                        <p:cond delay="indefinite"/>
+                      </p:stCondLst>
+                      <p:childTnLst>
+                        <p:par>
+                          <p:cTn id="9" fill="hold">
+                            <p:stCondLst>
+                              <p:cond delay="0"/>
+                            </p:stCondLst>
+                            <p:childTnLst>
+                              <p:par>
+                                <p:cTn id="10" presetID="2" presetClass="entr" presetSubtype="4" fill="hold" nodeType="clickEffect">
+                                  <p:stCondLst>
+                                    <p:cond delay="0"/>
+                                  </p:stCondLst>
+                                  <p:childTnLst>
+                                    <p:set>
+                                      <p:cBhvr>
+                                        <p:cTn id="11" dur="1" fill="hold">
                                           <p:stCondLst>
                                             <p:cond delay="0"/>
                                           </p:stCondLst>
@@ -11160,7 +11422,7 @@
                                     </p:set>
                                     <p:anim calcmode="lin" valueType="num">
                                       <p:cBhvr additive="base">
-                                        <p:cTn id="7" dur="500" fill="hold"/>
+                                        <p:cTn id="12" dur="500" fill="hold"/>
                                         <p:tgtEl>
                                           <p:spTgt spid="5"/>
                                         </p:tgtEl>
@@ -11183,7 +11445,7 @@
                                     </p:anim>
                                     <p:anim calcmode="lin" valueType="num">
                                       <p:cBhvr additive="base">
-                                        <p:cTn id="8" dur="500" fill="hold"/>
+                                        <p:cTn id="13" dur="500" fill="hold"/>
                                         <p:tgtEl>
                                           <p:spTgt spid="5"/>
                                         </p:tgtEl>
@@ -11214,26 +11476,26 @@
                     </p:cTn>
                   </p:par>
                   <p:par>
-                    <p:cTn id="9" fill="hold">
+                    <p:cTn id="14" fill="hold">
                       <p:stCondLst>
                         <p:cond delay="indefinite"/>
                       </p:stCondLst>
                       <p:childTnLst>
                         <p:par>
-                          <p:cTn id="10" fill="hold">
+                          <p:cTn id="15" fill="hold">
                             <p:stCondLst>
                               <p:cond delay="0"/>
                             </p:stCondLst>
                             <p:childTnLst>
                               <p:par>
-                                <p:cTn id="11" presetID="2" presetClass="entr" presetSubtype="4" fill="hold" nodeType="clickEffect">
+                                <p:cTn id="16" presetID="2" presetClass="entr" presetSubtype="4" fill="hold" nodeType="clickEffect">
                                   <p:stCondLst>
                                     <p:cond delay="0"/>
                                   </p:stCondLst>
                                   <p:childTnLst>
                                     <p:set>
                                       <p:cBhvr>
-                                        <p:cTn id="12" dur="1" fill="hold">
+                                        <p:cTn id="17" dur="1" fill="hold">
                                           <p:stCondLst>
                                             <p:cond delay="0"/>
                                           </p:stCondLst>
@@ -11251,7 +11513,7 @@
                                     </p:set>
                                     <p:anim calcmode="lin" valueType="num">
                                       <p:cBhvr additive="base">
-                                        <p:cTn id="13" dur="500" fill="hold"/>
+                                        <p:cTn id="18" dur="500" fill="hold"/>
                                         <p:tgtEl>
                                           <p:spTgt spid="3"/>
                                         </p:tgtEl>
@@ -11274,7 +11536,7 @@
                                     </p:anim>
                                     <p:anim calcmode="lin" valueType="num">
                                       <p:cBhvr additive="base">
-                                        <p:cTn id="14" dur="500" fill="hold"/>
+                                        <p:cTn id="19" dur="500" fill="hold"/>
                                         <p:tgtEl>
                                           <p:spTgt spid="3"/>
                                         </p:tgtEl>
@@ -11305,26 +11567,26 @@
                     </p:cTn>
                   </p:par>
                   <p:par>
-                    <p:cTn id="15" fill="hold">
+                    <p:cTn id="20" fill="hold">
                       <p:stCondLst>
                         <p:cond delay="indefinite"/>
                       </p:stCondLst>
                       <p:childTnLst>
                         <p:par>
-                          <p:cTn id="16" fill="hold">
+                          <p:cTn id="21" fill="hold">
                             <p:stCondLst>
                               <p:cond delay="0"/>
                             </p:stCondLst>
                             <p:childTnLst>
                               <p:par>
-                                <p:cTn id="17" presetID="10" presetClass="entr" presetSubtype="0" fill="hold" nodeType="clickEffect">
+                                <p:cTn id="22" presetID="10" presetClass="entr" presetSubtype="0" fill="hold" nodeType="clickEffect">
                                   <p:stCondLst>
                                     <p:cond delay="0"/>
                                   </p:stCondLst>
                                   <p:childTnLst>
                                     <p:set>
                                       <p:cBhvr>
-                                        <p:cTn id="18" dur="1" fill="hold">
+                                        <p:cTn id="23" dur="1" fill="hold">
                                           <p:stCondLst>
                                             <p:cond delay="0"/>
                                           </p:stCondLst>
@@ -11342,7 +11604,7 @@
                                     </p:set>
                                     <p:animEffect transition="in" filter="fade">
                                       <p:cBhvr>
-                                        <p:cTn id="19" dur="500"/>
+                                        <p:cTn id="24" dur="500"/>
                                         <p:tgtEl>
                                           <p:spTgt spid="8"/>
                                         </p:tgtEl>
@@ -11352,14 +11614,14 @@
                                 </p:cTn>
                               </p:par>
                               <p:par>
-                                <p:cTn id="20" presetID="10" presetClass="entr" presetSubtype="0" fill="hold" nodeType="withEffect">
+                                <p:cTn id="25" presetID="10" presetClass="entr" presetSubtype="0" fill="hold" nodeType="withEffect">
                                   <p:stCondLst>
                                     <p:cond delay="0"/>
                                   </p:stCondLst>
                                   <p:childTnLst>
                                     <p:set>
                                       <p:cBhvr>
-                                        <p:cTn id="21" dur="1" fill="hold">
+                                        <p:cTn id="26" dur="1" fill="hold">
                                           <p:stCondLst>
                                             <p:cond delay="0"/>
                                           </p:stCondLst>
@@ -11377,7 +11639,7 @@
                                     </p:set>
                                     <p:animEffect transition="in" filter="fade">
                                       <p:cBhvr>
-                                        <p:cTn id="22" dur="500"/>
+                                        <p:cTn id="27" dur="500"/>
                                         <p:tgtEl>
                                           <p:spTgt spid="9"/>
                                         </p:tgtEl>
@@ -11393,26 +11655,26 @@
                     </p:cTn>
                   </p:par>
                   <p:par>
-                    <p:cTn id="23" fill="hold">
+                    <p:cTn id="28" fill="hold">
                       <p:stCondLst>
                         <p:cond delay="indefinite"/>
                       </p:stCondLst>
                       <p:childTnLst>
                         <p:par>
-                          <p:cTn id="24" fill="hold">
+                          <p:cTn id="29" fill="hold">
                             <p:stCondLst>
                               <p:cond delay="0"/>
                             </p:stCondLst>
                             <p:childTnLst>
                               <p:par>
-                                <p:cTn id="25" presetID="10" presetClass="entr" presetSubtype="0" fill="hold" grpId="0" nodeType="clickEffect">
+                                <p:cTn id="30" presetID="10" presetClass="entr" presetSubtype="0" fill="hold" grpId="0" nodeType="clickEffect">
                                   <p:stCondLst>
                                     <p:cond delay="0"/>
                                   </p:stCondLst>
                                   <p:childTnLst>
                                     <p:set>
                                       <p:cBhvr>
-                                        <p:cTn id="26" dur="1" fill="hold">
+                                        <p:cTn id="31" dur="1" fill="hold">
                                           <p:stCondLst>
                                             <p:cond delay="0"/>
                                           </p:stCondLst>
@@ -11430,7 +11692,7 @@
                                     </p:set>
                                     <p:animEffect transition="in" filter="fade">
                                       <p:cBhvr>
-                                        <p:cTn id="27" dur="500"/>
+                                        <p:cTn id="32" dur="500"/>
                                         <p:tgtEl>
                                           <p:spTgt spid="10"/>
                                         </p:tgtEl>
@@ -11443,20 +11705,20 @@
                           </p:cTn>
                         </p:par>
                         <p:par>
-                          <p:cTn id="28" fill="hold">
+                          <p:cTn id="33" fill="hold">
                             <p:stCondLst>
                               <p:cond delay="500"/>
                             </p:stCondLst>
                             <p:childTnLst>
                               <p:par>
-                                <p:cTn id="29" presetID="10" presetClass="entr" presetSubtype="0" fill="hold" grpId="0" nodeType="afterEffect">
+                                <p:cTn id="34" presetID="10" presetClass="entr" presetSubtype="0" fill="hold" grpId="0" nodeType="afterEffect">
                                   <p:stCondLst>
                                     <p:cond delay="500"/>
                                   </p:stCondLst>
                                   <p:childTnLst>
                                     <p:set>
                                       <p:cBhvr>
-                                        <p:cTn id="30" dur="1" fill="hold">
+                                        <p:cTn id="35" dur="1" fill="hold">
                                           <p:stCondLst>
                                             <p:cond delay="0"/>
                                           </p:stCondLst>
@@ -11474,7 +11736,7 @@
                                     </p:set>
                                     <p:animEffect transition="in" filter="fade">
                                       <p:cBhvr>
-                                        <p:cTn id="31" dur="500"/>
+                                        <p:cTn id="36" dur="500"/>
                                         <p:tgtEl>
                                           <p:spTgt spid="11"/>
                                         </p:tgtEl>
@@ -11511,6 +11773,7 @@
       </p:par>
     </p:tnLst>
     <p:bldLst>
+      <p:bldP spid="4" grpId="0"/>
       <p:bldP spid="10" grpId="0" animBg="1"/>
       <p:bldP spid="11" grpId="0" animBg="1"/>
     </p:bldLst>

</xml_diff>

<commit_message>
Final changes in initial presentation
</commit_message>
<xml_diff>
--- a/presentations/20151113 Initial presentation/WebRTC_Initial.pptx
+++ b/presentations/20151113 Initial presentation/WebRTC_Initial.pptx
@@ -118,7 +118,7 @@
   </p:defaultTextStyle>
   <p:extLst>
     <p:ext uri="{EFAFB233-063F-42B5-8137-9DF3F51BA10A}">
-      <p15:sldGuideLst xmlns:p15="http://schemas.microsoft.com/office/powerpoint/2012/main">
+      <p15:sldGuideLst xmlns:p15="http://schemas.microsoft.com/office/powerpoint/2012/main" xmlns="">
         <p15:guide id="1" orient="horz" pos="1002">
           <p15:clr>
             <a:srgbClr val="A4A3A4"/>
@@ -217,7 +217,7 @@
           <a:p>
             <a:fld id="{7A19BEE0-598C-4858-A439-753E34679212}" type="datetimeFigureOut">
               <a:rPr lang="de-AT" smtClean="0"/>
-              <a:t>10.11.2015</a:t>
+              <a:t>11.11.2015</a:t>
             </a:fld>
             <a:endParaRPr lang="de-AT"/>
           </a:p>
@@ -551,11 +551,7 @@
             </a:r>
             <a:r>
               <a:rPr lang="de-AT" dirty="0" smtClean="0"/>
-              <a:t> Web Real-Time Communication</a:t>
-            </a:r>
-            <a:r>
-              <a:rPr lang="de-AT" dirty="0" smtClean="0"/>
-              <a:t>.</a:t>
+              <a:t> Web Real-Time Communication.</a:t>
             </a:r>
           </a:p>
           <a:p>
@@ -631,7 +627,71 @@
               <a:t>specification</a:t>
             </a:r>
             <a:r>
-              <a:rPr lang="de-AT" dirty="0" smtClean="0"/>
+              <a:rPr lang="de-AT" baseline="0" dirty="0" smtClean="0"/>
+              <a:t>. This </a:t>
+            </a:r>
+            <a:r>
+              <a:rPr lang="de-AT" baseline="0" dirty="0" err="1" smtClean="0"/>
+              <a:t>means</a:t>
+            </a:r>
+            <a:r>
+              <a:rPr lang="de-AT" baseline="0" dirty="0" smtClean="0"/>
+              <a:t> </a:t>
+            </a:r>
+            <a:r>
+              <a:rPr lang="de-AT" baseline="0" dirty="0" err="1" smtClean="0"/>
+              <a:t>it</a:t>
+            </a:r>
+            <a:r>
+              <a:rPr lang="de-AT" baseline="0" dirty="0" smtClean="0"/>
+              <a:t> </a:t>
+            </a:r>
+            <a:r>
+              <a:rPr lang="de-AT" baseline="0" dirty="0" err="1" smtClean="0"/>
+              <a:t>is</a:t>
+            </a:r>
+            <a:r>
+              <a:rPr lang="de-AT" baseline="0" dirty="0" smtClean="0"/>
+              <a:t> on </a:t>
+            </a:r>
+            <a:r>
+              <a:rPr lang="de-AT" baseline="0" dirty="0" err="1" smtClean="0"/>
+              <a:t>its</a:t>
+            </a:r>
+            <a:r>
+              <a:rPr lang="de-AT" baseline="0" dirty="0" smtClean="0"/>
+              <a:t> </a:t>
+            </a:r>
+            <a:r>
+              <a:rPr lang="de-AT" baseline="0" dirty="0" err="1" smtClean="0"/>
+              <a:t>way</a:t>
+            </a:r>
+            <a:r>
+              <a:rPr lang="de-AT" baseline="0" dirty="0" smtClean="0"/>
+              <a:t> </a:t>
+            </a:r>
+            <a:r>
+              <a:rPr lang="de-AT" baseline="0" dirty="0" err="1" smtClean="0"/>
+              <a:t>to</a:t>
+            </a:r>
+            <a:r>
+              <a:rPr lang="de-AT" baseline="0" dirty="0" smtClean="0"/>
+              <a:t> </a:t>
+            </a:r>
+            <a:r>
+              <a:rPr lang="de-AT" baseline="0" dirty="0" err="1" smtClean="0"/>
+              <a:t>become</a:t>
+            </a:r>
+            <a:r>
+              <a:rPr lang="de-AT" baseline="0" dirty="0" smtClean="0"/>
+              <a:t> an HTML </a:t>
+            </a:r>
+            <a:r>
+              <a:rPr lang="de-AT" baseline="0" dirty="0" err="1" smtClean="0"/>
+              <a:t>standard</a:t>
+            </a:r>
+            <a:r>
+              <a:rPr lang="de-AT" baseline="0" dirty="0" smtClean="0"/>
               <a:t>.</a:t>
             </a:r>
             <a:endParaRPr lang="de-AT" dirty="0" smtClean="0"/>
@@ -750,13 +810,46 @@
             </a:r>
             <a:r>
               <a:rPr lang="de-AT" baseline="0" dirty="0" smtClean="0"/>
+              <a:t> – </a:t>
+            </a:r>
+            <a:r>
+              <a:rPr lang="de-AT" baseline="0" dirty="0" err="1" smtClean="0"/>
+              <a:t>directly</a:t>
+            </a:r>
+            <a:r>
+              <a:rPr lang="de-AT" baseline="0" dirty="0" smtClean="0"/>
+              <a:t> </a:t>
+            </a:r>
+            <a:r>
+              <a:rPr lang="de-AT" baseline="0" dirty="0" err="1" smtClean="0"/>
+              <a:t>from</a:t>
+            </a:r>
+            <a:r>
+              <a:rPr lang="de-AT" baseline="0" dirty="0" smtClean="0"/>
+              <a:t> </a:t>
+            </a:r>
+            <a:r>
+              <a:rPr lang="de-AT" baseline="0" dirty="0" err="1" smtClean="0"/>
+              <a:t>the</a:t>
+            </a:r>
+            <a:r>
+              <a:rPr lang="de-AT" baseline="0" dirty="0" smtClean="0"/>
+              <a:t> </a:t>
+            </a:r>
+            <a:r>
+              <a:rPr lang="de-AT" baseline="0" dirty="0" err="1" smtClean="0"/>
+              <a:t>browser</a:t>
+            </a:r>
+            <a:r>
+              <a:rPr lang="de-AT" baseline="0" dirty="0" smtClean="0"/>
               <a:t>.</a:t>
             </a:r>
-          </a:p>
-          <a:p>
             <a:endParaRPr lang="de-AT" baseline="0" dirty="0" smtClean="0"/>
           </a:p>
           <a:p>
+            <a:endParaRPr lang="de-AT" baseline="0" dirty="0" smtClean="0"/>
+          </a:p>
+          <a:p>
             <a:r>
               <a:rPr lang="de-AT" baseline="0" dirty="0" err="1" smtClean="0"/>
               <a:t>Now</a:t>
@@ -1054,7 +1147,6 @@
               <a:rPr lang="de-AT" baseline="0" dirty="0" smtClean="0"/>
               <a:t>.</a:t>
             </a:r>
-            <a:endParaRPr lang="de-AT" baseline="0" dirty="0" smtClean="0"/>
           </a:p>
         </p:txBody>
       </p:sp>
@@ -1469,6 +1561,78 @@
             </a:r>
             <a:r>
               <a:rPr lang="de-AT" baseline="0" dirty="0" smtClean="0"/>
+              <a:t>. The </a:t>
+            </a:r>
+            <a:r>
+              <a:rPr lang="de-AT" baseline="0" dirty="0" err="1" smtClean="0"/>
+              <a:t>browser</a:t>
+            </a:r>
+            <a:r>
+              <a:rPr lang="de-AT" baseline="0" dirty="0" smtClean="0"/>
+              <a:t> </a:t>
+            </a:r>
+            <a:r>
+              <a:rPr lang="de-AT" baseline="0" dirty="0" err="1" smtClean="0"/>
+              <a:t>uses</a:t>
+            </a:r>
+            <a:r>
+              <a:rPr lang="de-AT" baseline="0" dirty="0" smtClean="0"/>
+              <a:t> </a:t>
+            </a:r>
+            <a:r>
+              <a:rPr lang="de-AT" baseline="0" dirty="0" err="1" smtClean="0"/>
+              <a:t>the</a:t>
+            </a:r>
+            <a:r>
+              <a:rPr lang="de-AT" baseline="0" dirty="0" smtClean="0"/>
+              <a:t> </a:t>
+            </a:r>
+            <a:r>
+              <a:rPr lang="de-AT" baseline="0" dirty="0" err="1" smtClean="0"/>
+              <a:t>camera</a:t>
+            </a:r>
+            <a:r>
+              <a:rPr lang="de-AT" baseline="0" dirty="0" smtClean="0"/>
+              <a:t> </a:t>
+            </a:r>
+            <a:r>
+              <a:rPr lang="de-AT" baseline="0" dirty="0" err="1" smtClean="0"/>
+              <a:t>and</a:t>
+            </a:r>
+            <a:r>
+              <a:rPr lang="de-AT" baseline="0" dirty="0" smtClean="0"/>
+              <a:t> </a:t>
+            </a:r>
+            <a:r>
+              <a:rPr lang="de-AT" baseline="0" dirty="0" err="1" smtClean="0"/>
+              <a:t>microphone</a:t>
+            </a:r>
+            <a:r>
+              <a:rPr lang="de-AT" baseline="0" dirty="0" smtClean="0"/>
+              <a:t> </a:t>
+            </a:r>
+            <a:r>
+              <a:rPr lang="de-AT" baseline="0" dirty="0" err="1" smtClean="0"/>
+              <a:t>from</a:t>
+            </a:r>
+            <a:r>
+              <a:rPr lang="de-AT" baseline="0" dirty="0" smtClean="0"/>
+              <a:t> </a:t>
+            </a:r>
+            <a:r>
+              <a:rPr lang="de-AT" baseline="0" dirty="0" err="1" smtClean="0"/>
+              <a:t>the</a:t>
+            </a:r>
+            <a:r>
+              <a:rPr lang="de-AT" baseline="0" dirty="0" smtClean="0"/>
+              <a:t> </a:t>
+            </a:r>
+            <a:r>
+              <a:rPr lang="de-AT" baseline="0" dirty="0" err="1" smtClean="0"/>
+              <a:t>device</a:t>
+            </a:r>
+            <a:r>
+              <a:rPr lang="de-AT" baseline="0" smtClean="0"/>
               <a:t>.</a:t>
             </a:r>
             <a:endParaRPr lang="de-AT" dirty="0"/>
@@ -1891,7 +2055,7 @@
             </a:r>
             <a:r>
               <a:rPr lang="de-AT" b="0" baseline="0" dirty="0" err="1" smtClean="0"/>
-              <a:t>connection</a:t>
+              <a:t>connections</a:t>
             </a:r>
             <a:r>
               <a:rPr lang="de-AT" b="0" baseline="0" dirty="0" smtClean="0"/>
@@ -1907,7 +2071,7 @@
             </a:r>
             <a:r>
               <a:rPr lang="de-AT" b="0" baseline="0" dirty="0" err="1" smtClean="0"/>
-              <a:t>stream</a:t>
+              <a:t>streams</a:t>
             </a:r>
             <a:r>
               <a:rPr lang="de-AT" b="0" baseline="0" dirty="0" smtClean="0"/>
@@ -2164,19 +2328,19 @@
             </a:pPr>
             <a:r>
               <a:rPr lang="de-AT" b="0" baseline="0" dirty="0" smtClean="0"/>
-              <a:t>In </a:t>
+              <a:t>STUN </a:t>
             </a:r>
             <a:r>
               <a:rPr lang="de-AT" b="0" baseline="0" dirty="0" err="1" smtClean="0"/>
-              <a:t>order</a:t>
+              <a:t>and</a:t>
             </a:r>
             <a:r>
               <a:rPr lang="de-AT" b="0" baseline="0" dirty="0" smtClean="0"/>
-              <a:t> </a:t>
+              <a:t> TURN </a:t>
             </a:r>
             <a:r>
               <a:rPr lang="de-AT" b="0" baseline="0" dirty="0" err="1" smtClean="0"/>
-              <a:t>to</a:t>
+              <a:t>servers</a:t>
             </a:r>
             <a:r>
               <a:rPr lang="de-AT" b="0" baseline="0" dirty="0" smtClean="0"/>
@@ -2184,39 +2348,7 @@
             </a:r>
             <a:r>
               <a:rPr lang="de-AT" b="0" baseline="0" dirty="0" err="1" smtClean="0"/>
-              <a:t>communicate</a:t>
-            </a:r>
-            <a:r>
-              <a:rPr lang="de-AT" b="0" baseline="0" dirty="0" smtClean="0"/>
-              <a:t> peer-</a:t>
-            </a:r>
-            <a:r>
-              <a:rPr lang="de-AT" b="0" baseline="0" dirty="0" err="1" smtClean="0"/>
-              <a:t>to</a:t>
-            </a:r>
-            <a:r>
-              <a:rPr lang="de-AT" b="0" baseline="0" dirty="0" smtClean="0"/>
-              <a:t>-</a:t>
-            </a:r>
-            <a:r>
-              <a:rPr lang="de-AT" b="0" baseline="0" dirty="0" err="1" smtClean="0"/>
-              <a:t>peer</a:t>
-            </a:r>
-            <a:r>
-              <a:rPr lang="de-AT" b="0" baseline="0" dirty="0" smtClean="0"/>
-              <a:t>, </a:t>
-            </a:r>
-            <a:r>
-              <a:rPr lang="de-AT" b="0" baseline="0" dirty="0" err="1" smtClean="0"/>
-              <a:t>it</a:t>
-            </a:r>
-            <a:r>
-              <a:rPr lang="de-AT" b="0" baseline="0" dirty="0" smtClean="0"/>
-              <a:t> </a:t>
-            </a:r>
-            <a:r>
-              <a:rPr lang="de-AT" b="0" baseline="0" dirty="0" err="1" smtClean="0"/>
-              <a:t>is</a:t>
+              <a:t>are</a:t>
             </a:r>
             <a:r>
               <a:rPr lang="de-AT" b="0" baseline="0" dirty="0" smtClean="0"/>
@@ -2232,7 +2364,7 @@
             </a:r>
             <a:r>
               <a:rPr lang="de-AT" b="0" baseline="0" dirty="0" err="1" smtClean="0"/>
-              <a:t>to</a:t>
+              <a:t>if</a:t>
             </a:r>
             <a:r>
               <a:rPr lang="de-AT" b="0" baseline="0" dirty="0" smtClean="0"/>
@@ -2240,164 +2372,17 @@
             </a:r>
             <a:r>
               <a:rPr lang="de-AT" b="0" baseline="0" dirty="0" err="1" smtClean="0"/>
-              <a:t>know</a:t>
+              <a:t>there‘s</a:t>
             </a:r>
             <a:r>
               <a:rPr lang="de-AT" b="0" baseline="0" dirty="0" smtClean="0"/>
-              <a:t> </a:t>
+              <a:t> NAT </a:t>
             </a:r>
             <a:r>
               <a:rPr lang="de-AT" b="0" baseline="0" dirty="0" err="1" smtClean="0"/>
-              <a:t>the</a:t>
-            </a:r>
-            <a:r>
-              <a:rPr lang="de-AT" b="0" baseline="0" dirty="0" smtClean="0"/>
-              <a:t> </a:t>
-            </a:r>
-            <a:r>
-              <a:rPr lang="de-AT" b="0" baseline="0" dirty="0" err="1" smtClean="0"/>
-              <a:t>public</a:t>
-            </a:r>
-            <a:r>
-              <a:rPr lang="de-AT" b="0" baseline="0" dirty="0" smtClean="0"/>
-              <a:t> IP </a:t>
-            </a:r>
-            <a:r>
-              <a:rPr lang="de-AT" b="0" baseline="0" dirty="0" err="1" smtClean="0"/>
-              <a:t>address</a:t>
-            </a:r>
-            <a:r>
-              <a:rPr lang="de-AT" b="0" baseline="0" dirty="0" smtClean="0"/>
-              <a:t> </a:t>
-            </a:r>
-            <a:r>
-              <a:rPr lang="de-AT" b="0" baseline="0" dirty="0" err="1" smtClean="0"/>
-              <a:t>of</a:t>
-            </a:r>
-            <a:r>
-              <a:rPr lang="de-AT" b="0" baseline="0" dirty="0" smtClean="0"/>
-              <a:t> </a:t>
-            </a:r>
-            <a:r>
-              <a:rPr lang="de-AT" b="0" baseline="0" dirty="0" err="1" smtClean="0"/>
-              <a:t>the</a:t>
-            </a:r>
-            <a:r>
-              <a:rPr lang="de-AT" b="0" baseline="0" dirty="0" smtClean="0"/>
-              <a:t> </a:t>
-            </a:r>
-            <a:r>
-              <a:rPr lang="de-AT" b="0" baseline="0" dirty="0" err="1" smtClean="0"/>
-              <a:t>users</a:t>
-            </a:r>
-            <a:r>
-              <a:rPr lang="de-AT" b="0" baseline="0" dirty="0" smtClean="0"/>
-              <a:t>. Through Network </a:t>
-            </a:r>
-            <a:r>
-              <a:rPr lang="de-AT" b="0" baseline="0" dirty="0" err="1" smtClean="0"/>
-              <a:t>Address</a:t>
-            </a:r>
-            <a:r>
-              <a:rPr lang="de-AT" b="0" baseline="0" dirty="0" smtClean="0"/>
-              <a:t> Translation (NAT), </a:t>
-            </a:r>
-            <a:r>
-              <a:rPr lang="de-AT" b="0" baseline="0" dirty="0" err="1" smtClean="0"/>
-              <a:t>this</a:t>
-            </a:r>
-            <a:r>
-              <a:rPr lang="de-AT" b="0" baseline="0" dirty="0" smtClean="0"/>
-              <a:t> </a:t>
-            </a:r>
-            <a:r>
-              <a:rPr lang="de-AT" b="0" baseline="0" dirty="0" err="1" smtClean="0"/>
-              <a:t>could</a:t>
-            </a:r>
-            <a:r>
-              <a:rPr lang="de-AT" b="0" baseline="0" dirty="0" smtClean="0"/>
-              <a:t> </a:t>
-            </a:r>
-            <a:r>
-              <a:rPr lang="de-AT" b="0" baseline="0" dirty="0" err="1" smtClean="0"/>
-              <a:t>become</a:t>
-            </a:r>
-            <a:r>
-              <a:rPr lang="de-AT" b="0" baseline="0" dirty="0" smtClean="0"/>
-              <a:t> </a:t>
-            </a:r>
-            <a:r>
-              <a:rPr lang="de-AT" b="0" baseline="0" dirty="0" err="1" smtClean="0"/>
-              <a:t>problematic</a:t>
-            </a:r>
-            <a:r>
-              <a:rPr lang="de-AT" b="0" baseline="0" dirty="0" smtClean="0"/>
-              <a:t>. The </a:t>
-            </a:r>
-            <a:r>
-              <a:rPr lang="de-AT" b="0" baseline="0" dirty="0" err="1" smtClean="0"/>
-              <a:t>solution</a:t>
-            </a:r>
-            <a:r>
-              <a:rPr lang="de-AT" b="0" baseline="0" dirty="0" smtClean="0"/>
-              <a:t> </a:t>
-            </a:r>
-            <a:r>
-              <a:rPr lang="de-AT" b="0" baseline="0" dirty="0" err="1" smtClean="0"/>
-              <a:t>for</a:t>
-            </a:r>
-            <a:r>
-              <a:rPr lang="de-AT" b="0" baseline="0" dirty="0" smtClean="0"/>
-              <a:t> </a:t>
-            </a:r>
-            <a:r>
-              <a:rPr lang="de-AT" b="0" baseline="0" dirty="0" err="1" smtClean="0"/>
-              <a:t>that</a:t>
-            </a:r>
-            <a:r>
-              <a:rPr lang="de-AT" b="0" baseline="0" dirty="0" smtClean="0"/>
-              <a:t> </a:t>
-            </a:r>
-            <a:r>
-              <a:rPr lang="de-AT" b="0" baseline="0" dirty="0" err="1" smtClean="0"/>
-              <a:t>is</a:t>
-            </a:r>
-            <a:r>
-              <a:rPr lang="de-AT" b="0" baseline="0" dirty="0" smtClean="0"/>
-              <a:t> </a:t>
-            </a:r>
-            <a:r>
-              <a:rPr lang="de-AT" b="0" baseline="0" dirty="0" err="1" smtClean="0"/>
-              <a:t>to</a:t>
-            </a:r>
-            <a:r>
-              <a:rPr lang="de-AT" b="0" baseline="0" dirty="0" smtClean="0"/>
-              <a:t> </a:t>
-            </a:r>
-            <a:r>
-              <a:rPr lang="de-AT" b="0" baseline="0" dirty="0" err="1" smtClean="0"/>
-              <a:t>use</a:t>
-            </a:r>
-            <a:r>
-              <a:rPr lang="de-AT" b="0" baseline="0" dirty="0" smtClean="0"/>
-              <a:t> STUN </a:t>
-            </a:r>
-            <a:r>
-              <a:rPr lang="de-AT" b="0" baseline="0" dirty="0" err="1" smtClean="0"/>
-              <a:t>and</a:t>
-            </a:r>
-            <a:r>
-              <a:rPr lang="de-AT" b="0" baseline="0" dirty="0" smtClean="0"/>
-              <a:t> TURN </a:t>
-            </a:r>
-            <a:r>
-              <a:rPr lang="de-AT" b="0" baseline="0" dirty="0" err="1" smtClean="0"/>
-              <a:t>servers</a:t>
-            </a:r>
-            <a:r>
-              <a:rPr lang="de-AT" b="0" baseline="0" dirty="0" smtClean="0"/>
-              <a:t>.</a:t>
-            </a:r>
+              <a:t>involved</a:t>
+            </a:r>
+            <a:endParaRPr lang="de-AT" b="0" baseline="0" dirty="0" smtClean="0"/>
           </a:p>
           <a:p>
             <a:pPr marL="171450" indent="-171450">
@@ -2405,20 +2390,24 @@
               <a:buChar char="•"/>
             </a:pPr>
             <a:r>
+              <a:rPr lang="de-AT" b="0" baseline="0" dirty="0" err="1" smtClean="0"/>
+              <a:t>Only</a:t>
+            </a:r>
+            <a:r>
               <a:rPr lang="de-AT" b="0" baseline="0" dirty="0" smtClean="0"/>
-              <a:t>As </a:t>
+              <a:t> </a:t>
             </a:r>
             <a:r>
               <a:rPr lang="de-AT" b="0" baseline="0" dirty="0" err="1" smtClean="0"/>
-              <a:t>long</a:t>
+              <a:t>really</a:t>
             </a:r>
             <a:r>
               <a:rPr lang="de-AT" b="0" baseline="0" dirty="0" smtClean="0"/>
-              <a:t> </a:t>
+              <a:t> easy </a:t>
             </a:r>
             <a:r>
               <a:rPr lang="de-AT" b="0" baseline="0" dirty="0" err="1" smtClean="0"/>
-              <a:t>as</a:t>
+              <a:t>if</a:t>
             </a:r>
             <a:r>
               <a:rPr lang="de-AT" b="0" baseline="0" dirty="0" smtClean="0"/>
@@ -2426,15 +2415,7 @@
             </a:r>
             <a:r>
               <a:rPr lang="de-AT" b="0" baseline="0" dirty="0" err="1" smtClean="0"/>
-              <a:t>it‘s</a:t>
-            </a:r>
-            <a:r>
-              <a:rPr lang="de-AT" b="0" baseline="0" dirty="0" smtClean="0"/>
-              <a:t> </a:t>
-            </a:r>
-            <a:r>
-              <a:rPr lang="de-AT" b="0" baseline="0" dirty="0" err="1" smtClean="0"/>
-              <a:t>only</a:t>
+              <a:t>there‘s</a:t>
             </a:r>
             <a:r>
               <a:rPr lang="de-AT" b="0" baseline="0" dirty="0" smtClean="0"/>
@@ -2450,27 +2431,19 @@
             </a:r>
             <a:r>
               <a:rPr lang="de-AT" b="0" baseline="0" dirty="0" err="1" smtClean="0"/>
-              <a:t>parties</a:t>
+              <a:t>users</a:t>
             </a:r>
             <a:r>
               <a:rPr lang="de-AT" b="0" baseline="0" dirty="0" smtClean="0"/>
-              <a:t>, </a:t>
+              <a:t> </a:t>
             </a:r>
             <a:r>
               <a:rPr lang="de-AT" b="0" baseline="0" dirty="0" err="1" smtClean="0"/>
-              <a:t>it‘s</a:t>
+              <a:t>involved</a:t>
             </a:r>
             <a:r>
               <a:rPr lang="de-AT" b="0" baseline="0" dirty="0" smtClean="0"/>
-              <a:t> </a:t>
-            </a:r>
-            <a:r>
-              <a:rPr lang="de-AT" b="0" baseline="0" dirty="0" err="1" smtClean="0"/>
-              <a:t>really</a:t>
-            </a:r>
-            <a:r>
-              <a:rPr lang="de-AT" b="0" baseline="0" dirty="0" smtClean="0"/>
-              <a:t> simple, but </a:t>
+              <a:t> – </a:t>
             </a:r>
             <a:r>
               <a:rPr lang="de-AT" b="0" baseline="0" dirty="0" err="1" smtClean="0"/>
@@ -2482,11 +2455,11 @@
             </a:r>
             <a:r>
               <a:rPr lang="de-AT" b="0" baseline="0" dirty="0" err="1" smtClean="0"/>
-              <a:t>there</a:t>
+              <a:t>then</a:t>
             </a:r>
             <a:r>
               <a:rPr lang="de-AT" b="0" baseline="0" dirty="0" smtClean="0"/>
-              <a:t> </a:t>
+              <a:t> on </a:t>
             </a:r>
             <a:r>
               <a:rPr lang="de-AT" b="0" baseline="0" dirty="0" err="1" smtClean="0"/>
@@ -2506,28 +2479,9 @@
             </a:r>
             <a:r>
               <a:rPr lang="de-AT" b="0" baseline="0" dirty="0" err="1" smtClean="0"/>
-              <a:t>complicated</a:t>
-            </a:r>
-            <a:r>
-              <a:rPr lang="de-AT" b="0" baseline="0" dirty="0" smtClean="0"/>
-              <a:t>. A Multipoint Control Unit (MCU) </a:t>
-            </a:r>
-            <a:r>
-              <a:rPr lang="de-AT" b="0" baseline="0" dirty="0" err="1" smtClean="0"/>
-              <a:t>is</a:t>
-            </a:r>
-            <a:r>
-              <a:rPr lang="de-AT" b="0" baseline="0" dirty="0" smtClean="0"/>
-              <a:t> </a:t>
-            </a:r>
-            <a:r>
-              <a:rPr lang="de-AT" b="0" baseline="0" dirty="0" err="1" smtClean="0"/>
-              <a:t>needed</a:t>
-            </a:r>
-            <a:r>
-              <a:rPr lang="de-AT" b="0" baseline="0" dirty="0" smtClean="0"/>
-              <a:t>.</a:t>
-            </a:r>
+              <a:t>difficult</a:t>
+            </a:r>
+            <a:endParaRPr lang="de-AT" b="0" baseline="0" dirty="0" smtClean="0"/>
           </a:p>
           <a:p>
             <a:pPr marL="171450" indent="-171450">
@@ -2804,167 +2758,39 @@
           <a:bodyPr/>
           <a:lstStyle/>
           <a:p>
-            <a:r>
-              <a:rPr lang="de-AT" dirty="0" smtClean="0"/>
-              <a:t>„Industrie 4.0“ </a:t>
-            </a:r>
-            <a:r>
-              <a:rPr lang="de-AT" dirty="0" err="1" smtClean="0"/>
-              <a:t>is</a:t>
-            </a:r>
-            <a:r>
-              <a:rPr lang="de-AT" baseline="0" dirty="0" smtClean="0"/>
-              <a:t> </a:t>
-            </a:r>
-            <a:r>
-              <a:rPr lang="de-AT" baseline="0" dirty="0" err="1" smtClean="0"/>
-              <a:t>one</a:t>
-            </a:r>
-            <a:r>
-              <a:rPr lang="de-AT" baseline="0" dirty="0" smtClean="0"/>
-              <a:t> </a:t>
-            </a:r>
-            <a:r>
-              <a:rPr lang="de-AT" baseline="0" dirty="0" err="1" smtClean="0"/>
-              <a:t>of</a:t>
-            </a:r>
-            <a:r>
-              <a:rPr lang="de-AT" baseline="0" dirty="0" smtClean="0"/>
-              <a:t> </a:t>
-            </a:r>
-            <a:r>
-              <a:rPr lang="de-AT" baseline="0" dirty="0" err="1" smtClean="0"/>
-              <a:t>the</a:t>
-            </a:r>
-            <a:r>
-              <a:rPr lang="de-AT" baseline="0" dirty="0" smtClean="0"/>
-              <a:t> </a:t>
-            </a:r>
-            <a:r>
-              <a:rPr lang="de-AT" baseline="0" dirty="0" err="1" smtClean="0"/>
-              <a:t>biggest</a:t>
-            </a:r>
-            <a:r>
-              <a:rPr lang="de-AT" baseline="0" dirty="0" smtClean="0"/>
-              <a:t> </a:t>
-            </a:r>
-            <a:r>
-              <a:rPr lang="de-AT" baseline="0" dirty="0" err="1" smtClean="0"/>
-              <a:t>trends</a:t>
-            </a:r>
-            <a:r>
-              <a:rPr lang="de-AT" baseline="0" dirty="0" smtClean="0"/>
-              <a:t> in </a:t>
-            </a:r>
-            <a:r>
-              <a:rPr lang="de-AT" baseline="0" dirty="0" err="1" smtClean="0"/>
-              <a:t>technology</a:t>
-            </a:r>
-            <a:r>
-              <a:rPr lang="de-AT" baseline="0" dirty="0" smtClean="0"/>
-              <a:t> </a:t>
-            </a:r>
-            <a:r>
-              <a:rPr lang="de-AT" baseline="0" dirty="0" err="1" smtClean="0"/>
-              <a:t>for</a:t>
-            </a:r>
-            <a:r>
-              <a:rPr lang="de-AT" baseline="0" dirty="0" smtClean="0"/>
-              <a:t> a </a:t>
-            </a:r>
-            <a:r>
-              <a:rPr lang="de-AT" baseline="0" dirty="0" err="1" smtClean="0"/>
-              <a:t>few</a:t>
-            </a:r>
-            <a:r>
-              <a:rPr lang="de-AT" baseline="0" dirty="0" smtClean="0"/>
-              <a:t> </a:t>
-            </a:r>
-            <a:r>
-              <a:rPr lang="de-AT" baseline="0" dirty="0" err="1" smtClean="0"/>
-              <a:t>years</a:t>
-            </a:r>
-            <a:r>
-              <a:rPr lang="de-AT" baseline="0" dirty="0" smtClean="0"/>
-              <a:t> </a:t>
-            </a:r>
-            <a:r>
-              <a:rPr lang="de-AT" baseline="0" dirty="0" err="1" smtClean="0"/>
-              <a:t>now</a:t>
-            </a:r>
-            <a:r>
-              <a:rPr lang="de-AT" baseline="0" dirty="0" smtClean="0"/>
-              <a:t>. </a:t>
-            </a:r>
-            <a:endParaRPr lang="de-AT" dirty="0" smtClean="0"/>
-          </a:p>
-          <a:p>
-            <a:endParaRPr lang="de-AT" dirty="0" smtClean="0"/>
-          </a:p>
-          <a:p>
-            <a:r>
-              <a:rPr lang="de-AT" dirty="0" smtClean="0"/>
-              <a:t>Advantages:</a:t>
-            </a:r>
-          </a:p>
-          <a:p>
             <a:pPr marL="171450" indent="-171450">
               <a:buFont typeface="Arial" panose="020B0604020202020204" pitchFamily="34" charset="0"/>
               <a:buChar char="•"/>
             </a:pPr>
             <a:r>
-              <a:rPr lang="de-AT" dirty="0" err="1" smtClean="0"/>
-              <a:t>Experts</a:t>
-            </a:r>
-            <a:r>
-              <a:rPr lang="de-AT" dirty="0" smtClean="0"/>
-              <a:t> </a:t>
-            </a:r>
-            <a:r>
-              <a:rPr lang="de-AT" dirty="0" err="1" smtClean="0"/>
-              <a:t>can</a:t>
-            </a:r>
-            <a:r>
-              <a:rPr lang="de-AT" dirty="0" smtClean="0"/>
-              <a:t> </a:t>
-            </a:r>
-            <a:r>
-              <a:rPr lang="de-AT" dirty="0" err="1" smtClean="0"/>
-              <a:t>consult</a:t>
-            </a:r>
-            <a:r>
-              <a:rPr lang="de-AT" dirty="0" smtClean="0"/>
-              <a:t> </a:t>
-            </a:r>
-            <a:r>
-              <a:rPr lang="de-AT" dirty="0" err="1" smtClean="0"/>
-              <a:t>without</a:t>
-            </a:r>
-            <a:r>
-              <a:rPr lang="de-AT" dirty="0" smtClean="0"/>
-              <a:t> </a:t>
-            </a:r>
-            <a:r>
-              <a:rPr lang="de-AT" dirty="0" err="1" smtClean="0"/>
-              <a:t>being</a:t>
-            </a:r>
-            <a:r>
-              <a:rPr lang="de-AT" dirty="0" smtClean="0"/>
-              <a:t> </a:t>
-            </a:r>
-            <a:r>
-              <a:rPr lang="de-AT" dirty="0" err="1" smtClean="0"/>
-              <a:t>physically</a:t>
-            </a:r>
-            <a:r>
-              <a:rPr lang="de-AT" dirty="0" smtClean="0"/>
-              <a:t> </a:t>
-            </a:r>
-            <a:r>
-              <a:rPr lang="de-AT" dirty="0" err="1" smtClean="0"/>
-              <a:t>there</a:t>
-            </a:r>
-            <a:endParaRPr lang="de-AT" dirty="0" smtClean="0"/>
+              <a:rPr lang="de-AT" baseline="0" dirty="0" err="1" smtClean="0"/>
+              <a:t>Geometric</a:t>
+            </a:r>
+            <a:r>
+              <a:rPr lang="de-AT" baseline="0" dirty="0" smtClean="0"/>
+              <a:t> </a:t>
+            </a:r>
+            <a:r>
+              <a:rPr lang="de-AT" baseline="0" dirty="0" err="1" smtClean="0"/>
+              <a:t>figures</a:t>
+            </a:r>
+            <a:r>
+              <a:rPr lang="de-AT" baseline="0" dirty="0" smtClean="0"/>
+              <a:t> </a:t>
+            </a:r>
+            <a:r>
+              <a:rPr lang="de-AT" baseline="0" dirty="0" err="1" smtClean="0"/>
+              <a:t>for</a:t>
+            </a:r>
+            <a:r>
+              <a:rPr lang="de-AT" baseline="0" dirty="0" smtClean="0"/>
+              <a:t> </a:t>
+            </a:r>
+            <a:r>
+              <a:rPr lang="de-AT" baseline="0" dirty="0" err="1" smtClean="0"/>
+              <a:t>guidance</a:t>
+            </a:r>
+            <a:endParaRPr lang="de-AT" baseline="0" dirty="0" smtClean="0"/>
           </a:p>
           <a:p>
             <a:pPr marL="171450" indent="-171450">
@@ -2972,139 +2798,81 @@
               <a:buChar char="•"/>
             </a:pPr>
             <a:r>
-              <a:rPr lang="de-AT" dirty="0" err="1" smtClean="0"/>
-              <a:t>Malfunctions</a:t>
-            </a:r>
-            <a:r>
-              <a:rPr lang="de-AT" baseline="0" dirty="0" smtClean="0"/>
-              <a:t> </a:t>
-            </a:r>
-            <a:r>
-              <a:rPr lang="de-AT" baseline="0" dirty="0" err="1" smtClean="0"/>
-              <a:t>can</a:t>
-            </a:r>
-            <a:r>
-              <a:rPr lang="de-AT" baseline="0" dirty="0" smtClean="0"/>
-              <a:t> </a:t>
-            </a:r>
-            <a:r>
-              <a:rPr lang="de-AT" baseline="0" dirty="0" err="1" smtClean="0"/>
-              <a:t>be</a:t>
-            </a:r>
-            <a:r>
-              <a:rPr lang="de-AT" baseline="0" dirty="0" smtClean="0"/>
-              <a:t> </a:t>
-            </a:r>
-            <a:r>
-              <a:rPr lang="de-AT" baseline="0" dirty="0" err="1" smtClean="0"/>
-              <a:t>repaired</a:t>
-            </a:r>
-            <a:r>
-              <a:rPr lang="de-AT" baseline="0" dirty="0" smtClean="0"/>
-              <a:t> quicker, </a:t>
-            </a:r>
-            <a:r>
-              <a:rPr lang="de-AT" baseline="0" dirty="0" err="1" smtClean="0"/>
-              <a:t>by</a:t>
-            </a:r>
-            <a:r>
-              <a:rPr lang="de-AT" baseline="0" dirty="0" smtClean="0"/>
-              <a:t> on-site </a:t>
-            </a:r>
-            <a:r>
-              <a:rPr lang="de-AT" baseline="0" dirty="0" err="1" smtClean="0"/>
-              <a:t>personnel</a:t>
-            </a:r>
-            <a:r>
-              <a:rPr lang="de-AT" baseline="0" dirty="0" smtClean="0"/>
-              <a:t>. </a:t>
-            </a:r>
-            <a:r>
-              <a:rPr lang="de-AT" baseline="0" dirty="0" err="1" smtClean="0"/>
-              <a:t>It</a:t>
-            </a:r>
-            <a:r>
-              <a:rPr lang="de-AT" baseline="0" dirty="0" smtClean="0"/>
-              <a:t> </a:t>
-            </a:r>
-            <a:r>
-              <a:rPr lang="de-AT" baseline="0" dirty="0" err="1" smtClean="0"/>
-              <a:t>is</a:t>
-            </a:r>
-            <a:r>
-              <a:rPr lang="de-AT" baseline="0" dirty="0" smtClean="0"/>
-              <a:t> not </a:t>
-            </a:r>
-            <a:r>
-              <a:rPr lang="de-AT" baseline="0" dirty="0" err="1" smtClean="0"/>
-              <a:t>necessary</a:t>
-            </a:r>
-            <a:r>
-              <a:rPr lang="de-AT" baseline="0" dirty="0" smtClean="0"/>
-              <a:t> </a:t>
-            </a:r>
-            <a:r>
-              <a:rPr lang="de-AT" baseline="0" dirty="0" err="1" smtClean="0"/>
-              <a:t>for</a:t>
-            </a:r>
-            <a:r>
-              <a:rPr lang="de-AT" baseline="0" dirty="0" smtClean="0"/>
-              <a:t> an expert </a:t>
-            </a:r>
-            <a:r>
-              <a:rPr lang="de-AT" baseline="0" dirty="0" err="1" smtClean="0"/>
-              <a:t>to</a:t>
-            </a:r>
-            <a:r>
-              <a:rPr lang="de-AT" baseline="0" dirty="0" smtClean="0"/>
-              <a:t> </a:t>
-            </a:r>
-            <a:r>
-              <a:rPr lang="de-AT" baseline="0" dirty="0" err="1" smtClean="0"/>
-              <a:t>visit</a:t>
-            </a:r>
-            <a:r>
-              <a:rPr lang="de-AT" baseline="0" dirty="0" smtClean="0"/>
-              <a:t> </a:t>
-            </a:r>
-            <a:r>
-              <a:rPr lang="de-AT" baseline="0" dirty="0" err="1" smtClean="0"/>
-              <a:t>the</a:t>
-            </a:r>
-            <a:r>
-              <a:rPr lang="de-AT" baseline="0" dirty="0" smtClean="0"/>
-              <a:t> </a:t>
-            </a:r>
-            <a:r>
-              <a:rPr lang="de-AT" baseline="0" dirty="0" err="1" smtClean="0"/>
-              <a:t>site</a:t>
-            </a:r>
-            <a:r>
-              <a:rPr lang="de-AT" baseline="0" dirty="0" smtClean="0"/>
-              <a:t> </a:t>
-            </a:r>
-            <a:r>
-              <a:rPr lang="de-AT" baseline="0" dirty="0" err="1" smtClean="0"/>
-              <a:t>personally</a:t>
-            </a:r>
-            <a:r>
-              <a:rPr lang="de-AT" baseline="0" dirty="0" smtClean="0"/>
-              <a:t>.</a:t>
-            </a:r>
+              <a:rPr lang="de-AT" baseline="0" dirty="0" smtClean="0"/>
+              <a:t>Text </a:t>
+            </a:r>
+            <a:r>
+              <a:rPr lang="de-AT" baseline="0" dirty="0" err="1" smtClean="0"/>
+              <a:t>chat</a:t>
+            </a:r>
+            <a:r>
+              <a:rPr lang="de-AT" baseline="0" dirty="0" smtClean="0"/>
+              <a:t> </a:t>
+            </a:r>
+            <a:r>
+              <a:rPr lang="de-AT" baseline="0" dirty="0" err="1" smtClean="0"/>
+              <a:t>messages</a:t>
+            </a:r>
+            <a:endParaRPr lang="de-AT" baseline="0" dirty="0" smtClean="0"/>
           </a:p>
           <a:p>
             <a:pPr marL="171450" indent="-171450">
               <a:buFont typeface="Arial" panose="020B0604020202020204" pitchFamily="34" charset="0"/>
               <a:buChar char="•"/>
             </a:pPr>
+            <a:r>
+              <a:rPr lang="de-AT" baseline="0" dirty="0" smtClean="0"/>
+              <a:t>Switch </a:t>
+            </a:r>
+            <a:r>
+              <a:rPr lang="de-AT" baseline="0" dirty="0" err="1" smtClean="0"/>
+              <a:t>between</a:t>
+            </a:r>
+            <a:r>
+              <a:rPr lang="de-AT" baseline="0" dirty="0" smtClean="0"/>
+              <a:t> </a:t>
+            </a:r>
+            <a:r>
+              <a:rPr lang="de-AT" baseline="0" dirty="0" err="1" smtClean="0"/>
+              <a:t>modes</a:t>
+            </a:r>
+            <a:r>
+              <a:rPr lang="de-AT" baseline="0" dirty="0" smtClean="0"/>
+              <a:t> (</a:t>
+            </a:r>
+            <a:r>
+              <a:rPr lang="de-AT" baseline="0" dirty="0" err="1" smtClean="0"/>
+              <a:t>support</a:t>
+            </a:r>
+            <a:r>
+              <a:rPr lang="de-AT" baseline="0" dirty="0" smtClean="0"/>
+              <a:t> </a:t>
+            </a:r>
+            <a:r>
+              <a:rPr lang="de-AT" baseline="0" dirty="0" err="1" smtClean="0"/>
+              <a:t>mode</a:t>
+            </a:r>
+            <a:r>
+              <a:rPr lang="de-AT" baseline="0" dirty="0" smtClean="0"/>
+              <a:t>, </a:t>
+            </a:r>
+            <a:r>
+              <a:rPr lang="de-AT" baseline="0" dirty="0" err="1" smtClean="0"/>
+              <a:t>freeze</a:t>
+            </a:r>
+            <a:r>
+              <a:rPr lang="de-AT" baseline="0" dirty="0" smtClean="0"/>
+              <a:t> </a:t>
+            </a:r>
+            <a:r>
+              <a:rPr lang="de-AT" baseline="0" dirty="0" err="1" smtClean="0"/>
+              <a:t>frame</a:t>
+            </a:r>
+            <a:r>
+              <a:rPr lang="de-AT" baseline="0" dirty="0" smtClean="0"/>
+              <a:t>)</a:t>
+            </a:r>
             <a:endParaRPr lang="de-AT" baseline="0" dirty="0" smtClean="0"/>
-          </a:p>
-          <a:p>
-            <a:pPr marL="171450" indent="-171450">
-              <a:buFont typeface="Arial" panose="020B0604020202020204" pitchFamily="34" charset="0"/>
-              <a:buChar char="•"/>
-            </a:pPr>
-            <a:endParaRPr lang="de-AT" dirty="0"/>
           </a:p>
         </p:txBody>
       </p:sp>
@@ -3188,17 +2956,475 @@
           <a:bodyPr/>
           <a:lstStyle/>
           <a:p>
+            <a:r>
+              <a:rPr lang="de-AT" dirty="0" smtClean="0"/>
+              <a:t>These </a:t>
+            </a:r>
+            <a:r>
+              <a:rPr lang="de-AT" dirty="0" err="1" smtClean="0"/>
+              <a:t>kinds</a:t>
+            </a:r>
+            <a:r>
+              <a:rPr lang="de-AT" dirty="0" smtClean="0"/>
+              <a:t> </a:t>
+            </a:r>
+            <a:r>
+              <a:rPr lang="de-AT" dirty="0" err="1" smtClean="0"/>
+              <a:t>of</a:t>
+            </a:r>
+            <a:r>
+              <a:rPr lang="de-AT" dirty="0" smtClean="0"/>
+              <a:t> remote </a:t>
+            </a:r>
+            <a:r>
+              <a:rPr lang="de-AT" dirty="0" err="1" smtClean="0"/>
+              <a:t>support</a:t>
+            </a:r>
+            <a:r>
+              <a:rPr lang="de-AT" dirty="0" smtClean="0"/>
+              <a:t> </a:t>
+            </a:r>
+            <a:r>
+              <a:rPr lang="de-AT" dirty="0" err="1" smtClean="0"/>
+              <a:t>applications</a:t>
+            </a:r>
+            <a:r>
+              <a:rPr lang="de-AT" baseline="0" dirty="0" smtClean="0"/>
+              <a:t> </a:t>
+            </a:r>
+            <a:r>
+              <a:rPr lang="de-AT" baseline="0" dirty="0" err="1" smtClean="0"/>
+              <a:t>are</a:t>
+            </a:r>
+            <a:r>
+              <a:rPr lang="de-AT" baseline="0" dirty="0" smtClean="0"/>
+              <a:t> a </a:t>
+            </a:r>
+            <a:r>
+              <a:rPr lang="de-AT" baseline="0" dirty="0" err="1" smtClean="0"/>
+              <a:t>big</a:t>
+            </a:r>
+            <a:r>
+              <a:rPr lang="de-AT" baseline="0" dirty="0" smtClean="0"/>
+              <a:t> </a:t>
+            </a:r>
+            <a:r>
+              <a:rPr lang="de-AT" baseline="0" dirty="0" err="1" smtClean="0"/>
+              <a:t>part</a:t>
+            </a:r>
+            <a:r>
+              <a:rPr lang="de-AT" baseline="0" dirty="0" smtClean="0"/>
+              <a:t> </a:t>
+            </a:r>
+            <a:r>
+              <a:rPr lang="de-AT" baseline="0" dirty="0" err="1" smtClean="0"/>
+              <a:t>of</a:t>
+            </a:r>
+            <a:r>
+              <a:rPr lang="de-AT" baseline="0" dirty="0" smtClean="0"/>
+              <a:t> „Industrie 4.0“, </a:t>
+            </a:r>
+            <a:r>
+              <a:rPr lang="de-AT" baseline="0" dirty="0" err="1" smtClean="0"/>
+              <a:t>one</a:t>
+            </a:r>
+            <a:r>
+              <a:rPr lang="de-AT" baseline="0" dirty="0" smtClean="0"/>
+              <a:t> </a:t>
+            </a:r>
+            <a:r>
+              <a:rPr lang="de-AT" baseline="0" dirty="0" err="1" smtClean="0"/>
+              <a:t>of</a:t>
+            </a:r>
+            <a:r>
+              <a:rPr lang="de-AT" baseline="0" dirty="0" smtClean="0"/>
+              <a:t> </a:t>
+            </a:r>
+            <a:r>
+              <a:rPr lang="de-AT" baseline="0" dirty="0" err="1" smtClean="0"/>
+              <a:t>the</a:t>
+            </a:r>
+            <a:r>
+              <a:rPr lang="de-AT" baseline="0" dirty="0" smtClean="0"/>
+              <a:t> </a:t>
+            </a:r>
+            <a:r>
+              <a:rPr lang="de-AT" baseline="0" dirty="0" err="1" smtClean="0"/>
+              <a:t>biggest</a:t>
+            </a:r>
+            <a:r>
+              <a:rPr lang="de-AT" baseline="0" dirty="0" smtClean="0"/>
+              <a:t> </a:t>
+            </a:r>
+            <a:r>
+              <a:rPr lang="de-AT" baseline="0" dirty="0" err="1" smtClean="0"/>
+              <a:t>industry</a:t>
+            </a:r>
+            <a:r>
+              <a:rPr lang="de-AT" baseline="0" dirty="0" smtClean="0"/>
+              <a:t> </a:t>
+            </a:r>
+            <a:r>
+              <a:rPr lang="de-AT" baseline="0" dirty="0" err="1" smtClean="0"/>
+              <a:t>trends</a:t>
+            </a:r>
+            <a:r>
+              <a:rPr lang="de-AT" baseline="0" dirty="0" smtClean="0"/>
+              <a:t> </a:t>
+            </a:r>
+            <a:r>
+              <a:rPr lang="de-AT" baseline="0" dirty="0" err="1" smtClean="0"/>
+              <a:t>for</a:t>
+            </a:r>
+            <a:r>
+              <a:rPr lang="de-AT" baseline="0" dirty="0" smtClean="0"/>
+              <a:t> a </a:t>
+            </a:r>
+            <a:r>
+              <a:rPr lang="de-AT" baseline="0" dirty="0" err="1" smtClean="0"/>
+              <a:t>few</a:t>
+            </a:r>
+            <a:r>
+              <a:rPr lang="de-AT" baseline="0" dirty="0" smtClean="0"/>
+              <a:t> </a:t>
+            </a:r>
+            <a:r>
+              <a:rPr lang="de-AT" baseline="0" dirty="0" err="1" smtClean="0"/>
+              <a:t>years</a:t>
+            </a:r>
+            <a:r>
+              <a:rPr lang="de-AT" baseline="0" dirty="0" smtClean="0"/>
+              <a:t> </a:t>
+            </a:r>
+            <a:r>
+              <a:rPr lang="de-AT" baseline="0" dirty="0" err="1" smtClean="0"/>
+              <a:t>now</a:t>
+            </a:r>
+            <a:r>
+              <a:rPr lang="de-AT" baseline="0" dirty="0" smtClean="0"/>
+              <a:t>. </a:t>
+            </a:r>
+            <a:r>
+              <a:rPr lang="de-AT" baseline="0" dirty="0" err="1" smtClean="0"/>
+              <a:t>Really</a:t>
+            </a:r>
+            <a:r>
+              <a:rPr lang="de-AT" baseline="0" dirty="0" smtClean="0"/>
+              <a:t> </a:t>
+            </a:r>
+            <a:r>
+              <a:rPr lang="de-AT" baseline="0" dirty="0" err="1" smtClean="0"/>
+              <a:t>interesting</a:t>
+            </a:r>
+            <a:r>
+              <a:rPr lang="de-AT" baseline="0" dirty="0" smtClean="0"/>
+              <a:t> </a:t>
+            </a:r>
+            <a:r>
+              <a:rPr lang="de-AT" baseline="0" dirty="0" err="1" smtClean="0"/>
+              <a:t>and</a:t>
+            </a:r>
+            <a:r>
+              <a:rPr lang="de-AT" baseline="0" dirty="0" smtClean="0"/>
+              <a:t> fast-</a:t>
+            </a:r>
+            <a:r>
+              <a:rPr lang="de-AT" baseline="0" dirty="0" err="1" smtClean="0"/>
+              <a:t>emerging</a:t>
+            </a:r>
+            <a:r>
+              <a:rPr lang="de-AT" baseline="0" dirty="0" smtClean="0"/>
+              <a:t> </a:t>
+            </a:r>
+            <a:r>
+              <a:rPr lang="de-AT" baseline="0" dirty="0" err="1" smtClean="0"/>
+              <a:t>topic</a:t>
+            </a:r>
+            <a:r>
+              <a:rPr lang="de-AT" baseline="0" dirty="0" smtClean="0"/>
+              <a:t>.</a:t>
+            </a:r>
+            <a:endParaRPr lang="de-AT" dirty="0" smtClean="0"/>
+          </a:p>
+          <a:p>
+            <a:endParaRPr lang="de-AT" dirty="0" smtClean="0"/>
+          </a:p>
+          <a:p>
+            <a:r>
+              <a:rPr lang="de-AT" dirty="0" smtClean="0"/>
+              <a:t>Advantages:</a:t>
+            </a:r>
+          </a:p>
+          <a:p>
+            <a:pPr marL="171450" indent="-171450">
+              <a:buFont typeface="Arial" panose="020B0604020202020204" pitchFamily="34" charset="0"/>
+              <a:buChar char="•"/>
+            </a:pPr>
+            <a:r>
+              <a:rPr lang="de-AT" dirty="0" err="1" smtClean="0"/>
+              <a:t>Experts</a:t>
+            </a:r>
+            <a:r>
+              <a:rPr lang="de-AT" dirty="0" smtClean="0"/>
+              <a:t> </a:t>
+            </a:r>
+            <a:r>
+              <a:rPr lang="de-AT" dirty="0" err="1" smtClean="0"/>
+              <a:t>can</a:t>
+            </a:r>
+            <a:r>
+              <a:rPr lang="de-AT" dirty="0" smtClean="0"/>
+              <a:t> </a:t>
+            </a:r>
+            <a:r>
+              <a:rPr lang="de-AT" dirty="0" err="1" smtClean="0"/>
+              <a:t>consult</a:t>
+            </a:r>
+            <a:r>
+              <a:rPr lang="de-AT" dirty="0" smtClean="0"/>
+              <a:t> </a:t>
+            </a:r>
+            <a:r>
+              <a:rPr lang="de-AT" dirty="0" err="1" smtClean="0"/>
+              <a:t>without</a:t>
+            </a:r>
+            <a:r>
+              <a:rPr lang="de-AT" dirty="0" smtClean="0"/>
+              <a:t> </a:t>
+            </a:r>
+            <a:r>
+              <a:rPr lang="de-AT" dirty="0" err="1" smtClean="0"/>
+              <a:t>being</a:t>
+            </a:r>
+            <a:r>
+              <a:rPr lang="de-AT" dirty="0" smtClean="0"/>
+              <a:t> </a:t>
+            </a:r>
+            <a:r>
+              <a:rPr lang="de-AT" dirty="0" err="1" smtClean="0"/>
+              <a:t>physically</a:t>
+            </a:r>
+            <a:r>
+              <a:rPr lang="de-AT" dirty="0" smtClean="0"/>
+              <a:t> </a:t>
+            </a:r>
+            <a:r>
+              <a:rPr lang="de-AT" dirty="0" err="1" smtClean="0"/>
+              <a:t>there</a:t>
+            </a:r>
+            <a:endParaRPr lang="de-AT" dirty="0" smtClean="0"/>
+          </a:p>
+          <a:p>
+            <a:pPr marL="171450" indent="-171450">
+              <a:buFont typeface="Arial" panose="020B0604020202020204" pitchFamily="34" charset="0"/>
+              <a:buChar char="•"/>
+            </a:pPr>
+            <a:r>
+              <a:rPr lang="de-AT" dirty="0" err="1" smtClean="0"/>
+              <a:t>Malfunctions</a:t>
+            </a:r>
+            <a:r>
+              <a:rPr lang="de-AT" baseline="0" dirty="0" smtClean="0"/>
+              <a:t> </a:t>
+            </a:r>
+            <a:r>
+              <a:rPr lang="de-AT" baseline="0" dirty="0" err="1" smtClean="0"/>
+              <a:t>can</a:t>
+            </a:r>
+            <a:r>
+              <a:rPr lang="de-AT" baseline="0" dirty="0" smtClean="0"/>
+              <a:t> </a:t>
+            </a:r>
+            <a:r>
+              <a:rPr lang="de-AT" baseline="0" dirty="0" err="1" smtClean="0"/>
+              <a:t>be</a:t>
+            </a:r>
+            <a:r>
+              <a:rPr lang="de-AT" baseline="0" dirty="0" smtClean="0"/>
+              <a:t> </a:t>
+            </a:r>
+            <a:r>
+              <a:rPr lang="de-AT" baseline="0" dirty="0" err="1" smtClean="0"/>
+              <a:t>repaired</a:t>
+            </a:r>
+            <a:r>
+              <a:rPr lang="de-AT" baseline="0" dirty="0" smtClean="0"/>
+              <a:t> quicker, </a:t>
+            </a:r>
+            <a:r>
+              <a:rPr lang="de-AT" baseline="0" dirty="0" err="1" smtClean="0"/>
+              <a:t>by</a:t>
+            </a:r>
+            <a:r>
+              <a:rPr lang="de-AT" baseline="0" dirty="0" smtClean="0"/>
+              <a:t> on-site </a:t>
+            </a:r>
+            <a:r>
+              <a:rPr lang="de-AT" baseline="0" dirty="0" err="1" smtClean="0"/>
+              <a:t>personnel</a:t>
+            </a:r>
+            <a:r>
+              <a:rPr lang="de-AT" baseline="0" dirty="0" smtClean="0"/>
+              <a:t>. </a:t>
+            </a:r>
+            <a:r>
+              <a:rPr lang="de-AT" baseline="0" dirty="0" err="1" smtClean="0"/>
+              <a:t>It</a:t>
+            </a:r>
+            <a:r>
+              <a:rPr lang="de-AT" baseline="0" dirty="0" smtClean="0"/>
+              <a:t> </a:t>
+            </a:r>
+            <a:r>
+              <a:rPr lang="de-AT" baseline="0" dirty="0" err="1" smtClean="0"/>
+              <a:t>is</a:t>
+            </a:r>
+            <a:r>
+              <a:rPr lang="de-AT" baseline="0" dirty="0" smtClean="0"/>
+              <a:t> not </a:t>
+            </a:r>
+            <a:r>
+              <a:rPr lang="de-AT" baseline="0" dirty="0" err="1" smtClean="0"/>
+              <a:t>necessary</a:t>
+            </a:r>
+            <a:r>
+              <a:rPr lang="de-AT" baseline="0" dirty="0" smtClean="0"/>
+              <a:t> </a:t>
+            </a:r>
+            <a:r>
+              <a:rPr lang="de-AT" baseline="0" dirty="0" err="1" smtClean="0"/>
+              <a:t>for</a:t>
+            </a:r>
+            <a:r>
+              <a:rPr lang="de-AT" baseline="0" dirty="0" smtClean="0"/>
+              <a:t> an expert </a:t>
+            </a:r>
+            <a:r>
+              <a:rPr lang="de-AT" baseline="0" dirty="0" err="1" smtClean="0"/>
+              <a:t>to</a:t>
+            </a:r>
+            <a:r>
+              <a:rPr lang="de-AT" baseline="0" dirty="0" smtClean="0"/>
+              <a:t> </a:t>
+            </a:r>
+            <a:r>
+              <a:rPr lang="de-AT" baseline="0" dirty="0" err="1" smtClean="0"/>
+              <a:t>visit</a:t>
+            </a:r>
+            <a:r>
+              <a:rPr lang="de-AT" baseline="0" dirty="0" smtClean="0"/>
+              <a:t> </a:t>
+            </a:r>
+            <a:r>
+              <a:rPr lang="de-AT" baseline="0" dirty="0" err="1" smtClean="0"/>
+              <a:t>the</a:t>
+            </a:r>
+            <a:r>
+              <a:rPr lang="de-AT" baseline="0" dirty="0" smtClean="0"/>
+              <a:t> </a:t>
+            </a:r>
+            <a:r>
+              <a:rPr lang="de-AT" baseline="0" dirty="0" err="1" smtClean="0"/>
+              <a:t>site</a:t>
+            </a:r>
+            <a:r>
+              <a:rPr lang="de-AT" baseline="0" dirty="0" smtClean="0"/>
+              <a:t> </a:t>
+            </a:r>
+            <a:r>
+              <a:rPr lang="de-AT" baseline="0" dirty="0" err="1" smtClean="0"/>
+              <a:t>personally</a:t>
+            </a:r>
+            <a:r>
+              <a:rPr lang="de-AT" baseline="0" dirty="0" smtClean="0"/>
+              <a:t>.</a:t>
+            </a:r>
+          </a:p>
+          <a:p>
             <a:pPr marL="0" indent="0">
               <a:buFont typeface="Arial" panose="020B0604020202020204" pitchFamily="34" charset="0"/>
               <a:buNone/>
             </a:pPr>
+            <a:endParaRPr lang="de-AT" dirty="0" smtClean="0"/>
+          </a:p>
+          <a:p>
+            <a:pPr marL="0" indent="0">
+              <a:buFont typeface="Arial" panose="020B0604020202020204" pitchFamily="34" charset="0"/>
+              <a:buNone/>
+            </a:pPr>
+            <a:r>
+              <a:rPr lang="de-AT" dirty="0" err="1" smtClean="0"/>
+              <a:t>Similar</a:t>
+            </a:r>
+            <a:r>
+              <a:rPr lang="de-AT" baseline="0" dirty="0" smtClean="0"/>
+              <a:t> </a:t>
+            </a:r>
+            <a:r>
+              <a:rPr lang="de-AT" baseline="0" dirty="0" err="1" smtClean="0"/>
+              <a:t>applications</a:t>
+            </a:r>
+            <a:r>
+              <a:rPr lang="de-AT" baseline="0" dirty="0" smtClean="0"/>
+              <a:t> </a:t>
+            </a:r>
+            <a:r>
+              <a:rPr lang="de-AT" baseline="0" dirty="0" err="1" smtClean="0"/>
+              <a:t>cost</a:t>
+            </a:r>
+            <a:r>
+              <a:rPr lang="de-AT" baseline="0" dirty="0" smtClean="0"/>
+              <a:t> a </a:t>
+            </a:r>
+            <a:r>
+              <a:rPr lang="de-AT" baseline="0" dirty="0" err="1" smtClean="0"/>
+              <a:t>lot</a:t>
+            </a:r>
+            <a:r>
+              <a:rPr lang="de-AT" baseline="0" dirty="0" smtClean="0"/>
+              <a:t> </a:t>
+            </a:r>
+            <a:r>
+              <a:rPr lang="de-AT" baseline="0" dirty="0" err="1" smtClean="0"/>
+              <a:t>of</a:t>
+            </a:r>
+            <a:r>
+              <a:rPr lang="de-AT" baseline="0" dirty="0" smtClean="0"/>
+              <a:t> </a:t>
+            </a:r>
+            <a:r>
+              <a:rPr lang="de-AT" baseline="0" dirty="0" err="1" smtClean="0"/>
+              <a:t>money</a:t>
+            </a:r>
+            <a:r>
+              <a:rPr lang="de-AT" baseline="0" dirty="0" smtClean="0"/>
+              <a:t>.</a:t>
+            </a:r>
+            <a:endParaRPr lang="de-AT" dirty="0" smtClean="0"/>
+          </a:p>
+          <a:p>
+            <a:pPr marL="0" indent="0">
+              <a:buFont typeface="Arial" panose="020B0604020202020204" pitchFamily="34" charset="0"/>
+              <a:buNone/>
+            </a:pPr>
+            <a:endParaRPr lang="de-AT" dirty="0" smtClean="0"/>
+          </a:p>
+          <a:p>
+            <a:pPr marL="0" indent="0">
+              <a:buFont typeface="Arial" panose="020B0604020202020204" pitchFamily="34" charset="0"/>
+              <a:buNone/>
+            </a:pPr>
             <a:r>
               <a:rPr lang="de-AT" dirty="0" err="1" smtClean="0"/>
               <a:t>Using</a:t>
             </a:r>
             <a:r>
               <a:rPr lang="de-AT" dirty="0" smtClean="0"/>
-              <a:t> a </a:t>
+              <a:t> </a:t>
+            </a:r>
+            <a:r>
+              <a:rPr lang="de-AT" dirty="0" smtClean="0"/>
+              <a:t>a </a:t>
             </a:r>
             <a:r>
               <a:rPr lang="de-AT" dirty="0" err="1" smtClean="0"/>
@@ -4900,6 +5126,26 @@
               <a:rPr lang="de-AT" dirty="0" err="1" smtClean="0"/>
               <a:t>pplication</a:t>
             </a:r>
+            <a:r>
+              <a:rPr lang="de-AT" dirty="0" smtClean="0"/>
+              <a:t>,</a:t>
+            </a:r>
+            <a:r>
+              <a:rPr lang="de-AT" baseline="0" dirty="0" smtClean="0"/>
+              <a:t> </a:t>
+            </a:r>
+            <a:r>
+              <a:rPr lang="de-AT" baseline="0" dirty="0" err="1" smtClean="0"/>
+              <a:t>easily</a:t>
+            </a:r>
+            <a:r>
+              <a:rPr lang="de-AT" baseline="0" dirty="0" smtClean="0"/>
+              <a:t> </a:t>
+            </a:r>
+            <a:r>
+              <a:rPr lang="de-AT" baseline="0" dirty="0" err="1" smtClean="0"/>
+              <a:t>extendable</a:t>
+            </a:r>
             <a:endParaRPr lang="de-AT" dirty="0" smtClean="0"/>
           </a:p>
           <a:p>
@@ -4908,76 +5154,8 @@
               <a:buChar char="•"/>
             </a:pPr>
             <a:r>
-              <a:rPr lang="de-AT" baseline="0" dirty="0" smtClean="0"/>
-              <a:t>Lightweight </a:t>
-            </a:r>
-            <a:r>
-              <a:rPr lang="de-AT" baseline="0" dirty="0" err="1" smtClean="0"/>
-              <a:t>management</a:t>
-            </a:r>
-            <a:r>
-              <a:rPr lang="de-AT" baseline="0" dirty="0" smtClean="0"/>
-              <a:t> </a:t>
-            </a:r>
-            <a:r>
-              <a:rPr lang="de-AT" baseline="0" dirty="0" err="1" smtClean="0"/>
-              <a:t>server</a:t>
-            </a:r>
-            <a:r>
-              <a:rPr lang="de-AT" baseline="0" dirty="0" smtClean="0"/>
-              <a:t> – </a:t>
-            </a:r>
-            <a:r>
-              <a:rPr lang="de-AT" baseline="0" dirty="0" err="1" smtClean="0"/>
-              <a:t>everything</a:t>
-            </a:r>
-            <a:r>
-              <a:rPr lang="de-AT" baseline="0" dirty="0" smtClean="0"/>
-              <a:t> </a:t>
-            </a:r>
-            <a:r>
-              <a:rPr lang="de-AT" baseline="0" dirty="0" err="1" smtClean="0"/>
-              <a:t>is</a:t>
-            </a:r>
-            <a:r>
-              <a:rPr lang="de-AT" baseline="0" dirty="0" smtClean="0"/>
-              <a:t> </a:t>
-            </a:r>
-            <a:r>
-              <a:rPr lang="de-AT" baseline="0" dirty="0" err="1" smtClean="0"/>
-              <a:t>self-developed</a:t>
-            </a:r>
-            <a:r>
-              <a:rPr lang="de-AT" baseline="0" dirty="0" smtClean="0"/>
-              <a:t> </a:t>
-            </a:r>
-            <a:r>
-              <a:rPr lang="de-AT" baseline="0" dirty="0" err="1" smtClean="0"/>
-              <a:t>and</a:t>
-            </a:r>
-            <a:r>
-              <a:rPr lang="de-AT" baseline="0" dirty="0" smtClean="0"/>
-              <a:t> </a:t>
-            </a:r>
-            <a:r>
-              <a:rPr lang="de-AT" baseline="0" dirty="0" err="1" smtClean="0"/>
-              <a:t>can</a:t>
-            </a:r>
-            <a:r>
-              <a:rPr lang="de-AT" baseline="0" dirty="0" smtClean="0"/>
-              <a:t> </a:t>
-            </a:r>
-            <a:r>
-              <a:rPr lang="de-AT" baseline="0" dirty="0" err="1" smtClean="0"/>
-              <a:t>be</a:t>
-            </a:r>
-            <a:r>
-              <a:rPr lang="de-AT" baseline="0" dirty="0" smtClean="0"/>
-              <a:t> </a:t>
-            </a:r>
-            <a:r>
-              <a:rPr lang="de-AT" baseline="0" dirty="0" err="1" smtClean="0"/>
-              <a:t>extended</a:t>
+              <a:rPr lang="de-AT" dirty="0" smtClean="0"/>
+              <a:t>Open Source</a:t>
             </a:r>
             <a:endParaRPr lang="de-AT" dirty="0" smtClean="0"/>
           </a:p>
@@ -4987,61 +5165,78 @@
               <a:buChar char="•"/>
             </a:pPr>
             <a:r>
-              <a:rPr lang="de-AT" dirty="0" err="1" smtClean="0"/>
-              <a:t>Automatic</a:t>
-            </a:r>
-            <a:r>
-              <a:rPr lang="de-AT" baseline="0" dirty="0" smtClean="0"/>
-              <a:t> </a:t>
-            </a:r>
-            <a:r>
-              <a:rPr lang="de-AT" baseline="0" dirty="0" err="1" smtClean="0"/>
-              <a:t>user</a:t>
-            </a:r>
-            <a:r>
-              <a:rPr lang="de-AT" baseline="0" dirty="0" smtClean="0"/>
-              <a:t> </a:t>
-            </a:r>
-            <a:r>
-              <a:rPr lang="de-AT" baseline="0" dirty="0" err="1" smtClean="0"/>
-              <a:t>discovery</a:t>
-            </a:r>
-            <a:r>
-              <a:rPr lang="de-AT" baseline="0" dirty="0" smtClean="0"/>
-              <a:t> (</a:t>
-            </a:r>
-            <a:r>
-              <a:rPr lang="de-AT" baseline="0" dirty="0" err="1" smtClean="0"/>
-              <a:t>no</a:t>
-            </a:r>
-            <a:r>
-              <a:rPr lang="de-AT" baseline="0" dirty="0" smtClean="0"/>
-              <a:t> </a:t>
-            </a:r>
-            <a:r>
-              <a:rPr lang="de-AT" baseline="0" dirty="0" err="1" smtClean="0"/>
-              <a:t>authentication</a:t>
-            </a:r>
-            <a:r>
-              <a:rPr lang="de-AT" baseline="0" dirty="0" smtClean="0"/>
-              <a:t> </a:t>
-            </a:r>
-            <a:r>
-              <a:rPr lang="de-AT" baseline="0" dirty="0" err="1" smtClean="0"/>
-              <a:t>for</a:t>
-            </a:r>
-            <a:r>
-              <a:rPr lang="de-AT" baseline="0" dirty="0" smtClean="0"/>
-              <a:t> </a:t>
-            </a:r>
-            <a:r>
-              <a:rPr lang="de-AT" baseline="0" dirty="0" err="1" smtClean="0"/>
-              <a:t>now</a:t>
-            </a:r>
-            <a:r>
-              <a:rPr lang="de-AT" baseline="0" dirty="0" smtClean="0"/>
-              <a:t>)</a:t>
-            </a:r>
+              <a:rPr lang="de-AT" baseline="0" dirty="0" smtClean="0"/>
+              <a:t>Lightweight </a:t>
+            </a:r>
+            <a:r>
+              <a:rPr lang="de-AT" baseline="0" dirty="0" err="1" smtClean="0"/>
+              <a:t>management</a:t>
+            </a:r>
+            <a:r>
+              <a:rPr lang="de-AT" baseline="0" dirty="0" smtClean="0"/>
+              <a:t> </a:t>
+            </a:r>
+            <a:r>
+              <a:rPr lang="de-AT" baseline="0" dirty="0" err="1" smtClean="0"/>
+              <a:t>server</a:t>
+            </a:r>
+            <a:r>
+              <a:rPr lang="de-AT" baseline="0" dirty="0" smtClean="0"/>
+              <a:t> – </a:t>
+            </a:r>
+            <a:r>
+              <a:rPr lang="de-AT" baseline="0" dirty="0" err="1" smtClean="0"/>
+              <a:t>everything</a:t>
+            </a:r>
+            <a:r>
+              <a:rPr lang="de-AT" baseline="0" dirty="0" smtClean="0"/>
+              <a:t> </a:t>
+            </a:r>
+            <a:r>
+              <a:rPr lang="de-AT" baseline="0" dirty="0" err="1" smtClean="0"/>
+              <a:t>is</a:t>
+            </a:r>
+            <a:r>
+              <a:rPr lang="de-AT" baseline="0" dirty="0" smtClean="0"/>
+              <a:t> </a:t>
+            </a:r>
+            <a:r>
+              <a:rPr lang="de-AT" baseline="0" dirty="0" err="1" smtClean="0"/>
+              <a:t>self-developed</a:t>
+            </a:r>
+            <a:r>
+              <a:rPr lang="de-AT" baseline="0" dirty="0" smtClean="0"/>
+              <a:t> </a:t>
+            </a:r>
+            <a:r>
+              <a:rPr lang="de-AT" baseline="0" dirty="0" err="1" smtClean="0"/>
+              <a:t>and</a:t>
+            </a:r>
+            <a:r>
+              <a:rPr lang="de-AT" baseline="0" dirty="0" smtClean="0"/>
+              <a:t> </a:t>
+            </a:r>
+            <a:r>
+              <a:rPr lang="de-AT" baseline="0" dirty="0" err="1" smtClean="0"/>
+              <a:t>can</a:t>
+            </a:r>
+            <a:r>
+              <a:rPr lang="de-AT" baseline="0" dirty="0" smtClean="0"/>
+              <a:t> </a:t>
+            </a:r>
+            <a:r>
+              <a:rPr lang="de-AT" baseline="0" dirty="0" err="1" smtClean="0"/>
+              <a:t>be</a:t>
+            </a:r>
+            <a:r>
+              <a:rPr lang="de-AT" baseline="0" dirty="0" smtClean="0"/>
+              <a:t> </a:t>
+            </a:r>
+            <a:r>
+              <a:rPr lang="de-AT" baseline="0" dirty="0" err="1" smtClean="0"/>
+              <a:t>extended</a:t>
+            </a:r>
+            <a:endParaRPr lang="de-AT" dirty="0" smtClean="0"/>
           </a:p>
           <a:p>
             <a:pPr marL="171450" indent="-171450">
@@ -5049,18 +5244,61 @@
               <a:buChar char="•"/>
             </a:pPr>
             <a:r>
-              <a:rPr lang="de-AT" baseline="0" dirty="0" err="1" smtClean="0"/>
-              <a:t>Only</a:t>
-            </a:r>
-            <a:r>
-              <a:rPr lang="de-AT" baseline="0" dirty="0" smtClean="0"/>
-              <a:t> in same </a:t>
-            </a:r>
-            <a:r>
-              <a:rPr lang="de-AT" baseline="0" dirty="0" err="1" smtClean="0"/>
-              <a:t>network</a:t>
-            </a:r>
-            <a:endParaRPr lang="de-AT" baseline="0" dirty="0" smtClean="0"/>
+              <a:rPr lang="de-AT" dirty="0" err="1" smtClean="0"/>
+              <a:t>Automatic</a:t>
+            </a:r>
+            <a:r>
+              <a:rPr lang="de-AT" baseline="0" dirty="0" smtClean="0"/>
+              <a:t> </a:t>
+            </a:r>
+            <a:r>
+              <a:rPr lang="de-AT" baseline="0" dirty="0" err="1" smtClean="0"/>
+              <a:t>user</a:t>
+            </a:r>
+            <a:r>
+              <a:rPr lang="de-AT" baseline="0" dirty="0" smtClean="0"/>
+              <a:t> </a:t>
+            </a:r>
+            <a:r>
+              <a:rPr lang="de-AT" baseline="0" dirty="0" err="1" smtClean="0"/>
+              <a:t>discovery</a:t>
+            </a:r>
+            <a:r>
+              <a:rPr lang="de-AT" baseline="0" dirty="0" smtClean="0"/>
+              <a:t> (</a:t>
+            </a:r>
+            <a:r>
+              <a:rPr lang="de-AT" baseline="0" dirty="0" err="1" smtClean="0"/>
+              <a:t>no</a:t>
+            </a:r>
+            <a:r>
+              <a:rPr lang="de-AT" baseline="0" dirty="0" smtClean="0"/>
+              <a:t> </a:t>
+            </a:r>
+            <a:r>
+              <a:rPr lang="de-AT" baseline="0" dirty="0" err="1" smtClean="0"/>
+              <a:t>authentication</a:t>
+            </a:r>
+            <a:r>
+              <a:rPr lang="de-AT" baseline="0" dirty="0" smtClean="0"/>
+              <a:t> </a:t>
+            </a:r>
+            <a:r>
+              <a:rPr lang="de-AT" baseline="0" dirty="0" err="1" smtClean="0"/>
+              <a:t>for</a:t>
+            </a:r>
+            <a:r>
+              <a:rPr lang="de-AT" baseline="0" dirty="0" smtClean="0"/>
+              <a:t> </a:t>
+            </a:r>
+            <a:r>
+              <a:rPr lang="de-AT" baseline="0" dirty="0" err="1" smtClean="0"/>
+              <a:t>now</a:t>
+            </a:r>
+            <a:r>
+              <a:rPr lang="de-AT" baseline="0" dirty="0" smtClean="0"/>
+              <a:t>)</a:t>
+            </a:r>
           </a:p>
           <a:p>
             <a:pPr marL="171450" indent="-171450">
@@ -5376,137 +5614,7 @@
               <a:rPr lang="de-AT" baseline="0" dirty="0" smtClean="0"/>
               <a:t>.</a:t>
             </a:r>
-          </a:p>
-          <a:p>
-            <a:pPr marL="171450" indent="-171450">
-              <a:buFont typeface="Arial" panose="020B0604020202020204" pitchFamily="34" charset="0"/>
-              <a:buChar char="•"/>
-            </a:pPr>
-            <a:r>
-              <a:rPr lang="de-AT" baseline="0" dirty="0" err="1" smtClean="0"/>
-              <a:t>Additionally</a:t>
-            </a:r>
-            <a:r>
-              <a:rPr lang="de-AT" baseline="0" dirty="0" smtClean="0"/>
-              <a:t>, </a:t>
-            </a:r>
-            <a:r>
-              <a:rPr lang="de-AT" baseline="0" dirty="0" err="1" smtClean="0"/>
-              <a:t>the</a:t>
-            </a:r>
-            <a:r>
-              <a:rPr lang="de-AT" baseline="0" dirty="0" smtClean="0"/>
-              <a:t> prototype will </a:t>
-            </a:r>
-            <a:r>
-              <a:rPr lang="de-AT" baseline="0" dirty="0" err="1" smtClean="0"/>
-              <a:t>be</a:t>
-            </a:r>
-            <a:r>
-              <a:rPr lang="de-AT" baseline="0" dirty="0" smtClean="0"/>
-              <a:t> </a:t>
-            </a:r>
-            <a:r>
-              <a:rPr lang="de-AT" baseline="0" dirty="0" err="1" smtClean="0"/>
-              <a:t>tested</a:t>
-            </a:r>
-            <a:r>
-              <a:rPr lang="de-AT" baseline="0" dirty="0" smtClean="0"/>
-              <a:t> on </a:t>
-            </a:r>
-            <a:r>
-              <a:rPr lang="de-AT" baseline="0" dirty="0" err="1" smtClean="0"/>
-              <a:t>how</a:t>
-            </a:r>
-            <a:r>
-              <a:rPr lang="de-AT" baseline="0" dirty="0" smtClean="0"/>
-              <a:t> </a:t>
-            </a:r>
-            <a:r>
-              <a:rPr lang="de-AT" baseline="0" dirty="0" err="1" smtClean="0"/>
-              <a:t>well</a:t>
-            </a:r>
-            <a:r>
-              <a:rPr lang="de-AT" baseline="0" dirty="0" smtClean="0"/>
-              <a:t> </a:t>
-            </a:r>
-            <a:r>
-              <a:rPr lang="de-AT" baseline="0" dirty="0" err="1" smtClean="0"/>
-              <a:t>the</a:t>
-            </a:r>
-            <a:r>
-              <a:rPr lang="de-AT" baseline="0" dirty="0" smtClean="0"/>
-              <a:t> </a:t>
-            </a:r>
-            <a:r>
-              <a:rPr lang="de-AT" baseline="0" dirty="0" err="1" smtClean="0"/>
-              <a:t>quality</a:t>
-            </a:r>
-            <a:r>
-              <a:rPr lang="de-AT" baseline="0" dirty="0" smtClean="0"/>
-              <a:t> </a:t>
-            </a:r>
-            <a:r>
-              <a:rPr lang="de-AT" baseline="0" dirty="0" err="1" smtClean="0"/>
-              <a:t>of</a:t>
-            </a:r>
-            <a:r>
-              <a:rPr lang="de-AT" baseline="0" dirty="0" smtClean="0"/>
-              <a:t> </a:t>
-            </a:r>
-            <a:r>
-              <a:rPr lang="de-AT" baseline="0" dirty="0" err="1" smtClean="0"/>
-              <a:t>video</a:t>
-            </a:r>
-            <a:r>
-              <a:rPr lang="de-AT" baseline="0" dirty="0" smtClean="0"/>
-              <a:t>/</a:t>
-            </a:r>
-            <a:r>
-              <a:rPr lang="de-AT" baseline="0" dirty="0" err="1" smtClean="0"/>
-              <a:t>audio</a:t>
-            </a:r>
-            <a:r>
-              <a:rPr lang="de-AT" baseline="0" dirty="0" smtClean="0"/>
-              <a:t> </a:t>
-            </a:r>
-            <a:r>
-              <a:rPr lang="de-AT" baseline="0" dirty="0" err="1" smtClean="0"/>
-              <a:t>responds</a:t>
-            </a:r>
-            <a:r>
-              <a:rPr lang="de-AT" baseline="0" dirty="0" smtClean="0"/>
-              <a:t> </a:t>
-            </a:r>
-            <a:r>
-              <a:rPr lang="de-AT" baseline="0" dirty="0" err="1" smtClean="0"/>
-              <a:t>to</a:t>
-            </a:r>
-            <a:r>
-              <a:rPr lang="de-AT" baseline="0" dirty="0" smtClean="0"/>
-              <a:t> </a:t>
-            </a:r>
-            <a:r>
-              <a:rPr lang="de-AT" baseline="0" dirty="0" err="1" smtClean="0"/>
-              <a:t>poor</a:t>
-            </a:r>
-            <a:r>
-              <a:rPr lang="de-AT" baseline="0" dirty="0" smtClean="0"/>
-              <a:t> </a:t>
-            </a:r>
-            <a:r>
-              <a:rPr lang="de-AT" baseline="0" dirty="0" err="1" smtClean="0"/>
-              <a:t>network</a:t>
-            </a:r>
-            <a:r>
-              <a:rPr lang="de-AT" baseline="0" dirty="0" smtClean="0"/>
-              <a:t> </a:t>
-            </a:r>
-            <a:r>
-              <a:rPr lang="de-AT" baseline="0" dirty="0" err="1" smtClean="0"/>
-              <a:t>reachability</a:t>
-            </a:r>
-            <a:endParaRPr lang="de-AT" dirty="0"/>
+            <a:endParaRPr lang="de-AT" baseline="0" dirty="0" smtClean="0"/>
           </a:p>
         </p:txBody>
       </p:sp>
@@ -5842,7 +5950,7 @@
             </a:r>
             <a:r>
               <a:rPr lang="de-AT" baseline="0" dirty="0" err="1" smtClean="0"/>
-              <a:t>investigatino</a:t>
+              <a:t>investigation</a:t>
             </a:r>
             <a:r>
               <a:rPr lang="de-AT" baseline="0" dirty="0" smtClean="0"/>
@@ -5883,6 +5991,46 @@
             <a:r>
               <a:rPr lang="de-AT" baseline="0" dirty="0" err="1" smtClean="0"/>
               <a:t>behaviour</a:t>
+            </a:r>
+            <a:r>
+              <a:rPr lang="de-AT" baseline="0" dirty="0" smtClean="0"/>
+              <a:t> </a:t>
+            </a:r>
+            <a:r>
+              <a:rPr lang="de-AT" baseline="0" dirty="0" err="1" smtClean="0"/>
+              <a:t>under</a:t>
+            </a:r>
+            <a:r>
+              <a:rPr lang="de-AT" baseline="0" dirty="0" smtClean="0"/>
+              <a:t> different </a:t>
+            </a:r>
+            <a:r>
+              <a:rPr lang="de-AT" baseline="0" dirty="0" err="1" smtClean="0"/>
+              <a:t>levels</a:t>
+            </a:r>
+            <a:r>
+              <a:rPr lang="de-AT" baseline="0" dirty="0" smtClean="0"/>
+              <a:t> </a:t>
+            </a:r>
+            <a:r>
+              <a:rPr lang="de-AT" baseline="0" dirty="0" err="1" smtClean="0"/>
+              <a:t>of</a:t>
+            </a:r>
+            <a:r>
+              <a:rPr lang="de-AT" baseline="0" dirty="0" smtClean="0"/>
+              <a:t> </a:t>
+            </a:r>
+            <a:r>
+              <a:rPr lang="de-AT" baseline="0" dirty="0" err="1" smtClean="0"/>
+              <a:t>network</a:t>
+            </a:r>
+            <a:r>
+              <a:rPr lang="de-AT" baseline="0" dirty="0" smtClean="0"/>
+              <a:t> </a:t>
+            </a:r>
+            <a:r>
+              <a:rPr lang="de-AT" baseline="0" dirty="0" err="1" smtClean="0"/>
+              <a:t>reachability</a:t>
             </a:r>
             <a:endParaRPr lang="de-AT" baseline="0" dirty="0" smtClean="0"/>
           </a:p>
@@ -6256,7 +6404,7 @@
           <a:p>
             <a:fld id="{BD334F44-700B-E44C-96AB-E83A6820DFD3}" type="datetimeFigureOut">
               <a:rPr lang="de-DE" smtClean="0"/>
-              <a:t>10.11.2015</a:t>
+              <a:t>11.11.2015</a:t>
             </a:fld>
             <a:endParaRPr lang="de-DE"/>
           </a:p>
@@ -6436,7 +6584,7 @@
           <a:p>
             <a:fld id="{BD334F44-700B-E44C-96AB-E83A6820DFD3}" type="datetimeFigureOut">
               <a:rPr lang="de-DE" smtClean="0"/>
-              <a:t>10.11.2015</a:t>
+              <a:t>11.11.2015</a:t>
             </a:fld>
             <a:endParaRPr lang="de-DE"/>
           </a:p>
@@ -6606,7 +6754,7 @@
           <a:p>
             <a:fld id="{BD334F44-700B-E44C-96AB-E83A6820DFD3}" type="datetimeFigureOut">
               <a:rPr lang="de-DE" smtClean="0"/>
-              <a:t>10.11.2015</a:t>
+              <a:t>11.11.2015</a:t>
             </a:fld>
             <a:endParaRPr lang="de-DE"/>
           </a:p>
@@ -6852,7 +7000,7 @@
           <a:p>
             <a:fld id="{BD334F44-700B-E44C-96AB-E83A6820DFD3}" type="datetimeFigureOut">
               <a:rPr lang="de-DE" smtClean="0"/>
-              <a:t>10.11.2015</a:t>
+              <a:t>11.11.2015</a:t>
             </a:fld>
             <a:endParaRPr lang="de-DE"/>
           </a:p>
@@ -7140,7 +7288,7 @@
           <a:p>
             <a:fld id="{BD334F44-700B-E44C-96AB-E83A6820DFD3}" type="datetimeFigureOut">
               <a:rPr lang="de-DE" smtClean="0"/>
-              <a:t>10.11.2015</a:t>
+              <a:t>11.11.2015</a:t>
             </a:fld>
             <a:endParaRPr lang="de-DE"/>
           </a:p>
@@ -7562,7 +7710,7 @@
           <a:p>
             <a:fld id="{BD334F44-700B-E44C-96AB-E83A6820DFD3}" type="datetimeFigureOut">
               <a:rPr lang="de-DE" smtClean="0"/>
-              <a:t>10.11.2015</a:t>
+              <a:t>11.11.2015</a:t>
             </a:fld>
             <a:endParaRPr lang="de-DE"/>
           </a:p>
@@ -7680,7 +7828,7 @@
           <a:p>
             <a:fld id="{BD334F44-700B-E44C-96AB-E83A6820DFD3}" type="datetimeFigureOut">
               <a:rPr lang="de-DE" smtClean="0"/>
-              <a:t>10.11.2015</a:t>
+              <a:t>11.11.2015</a:t>
             </a:fld>
             <a:endParaRPr lang="de-DE"/>
           </a:p>
@@ -7775,7 +7923,7 @@
           <a:p>
             <a:fld id="{BD334F44-700B-E44C-96AB-E83A6820DFD3}" type="datetimeFigureOut">
               <a:rPr lang="de-DE" smtClean="0"/>
-              <a:t>10.11.2015</a:t>
+              <a:t>11.11.2015</a:t>
             </a:fld>
             <a:endParaRPr lang="de-DE"/>
           </a:p>
@@ -8098,7 +8246,7 @@
           <a:p>
             <a:fld id="{BD334F44-700B-E44C-96AB-E83A6820DFD3}" type="datetimeFigureOut">
               <a:rPr lang="de-DE" smtClean="0"/>
-              <a:t>10.11.2015</a:t>
+              <a:t>11.11.2015</a:t>
             </a:fld>
             <a:endParaRPr lang="de-DE"/>
           </a:p>
@@ -8351,7 +8499,7 @@
           <a:p>
             <a:fld id="{BD334F44-700B-E44C-96AB-E83A6820DFD3}" type="datetimeFigureOut">
               <a:rPr lang="de-DE" smtClean="0"/>
-              <a:t>10.11.2015</a:t>
+              <a:t>11.11.2015</a:t>
             </a:fld>
             <a:endParaRPr lang="de-DE"/>
           </a:p>
@@ -8564,7 +8712,7 @@
           <a:p>
             <a:fld id="{BD334F44-700B-E44C-96AB-E83A6820DFD3}" type="datetimeFigureOut">
               <a:rPr lang="de-DE" smtClean="0"/>
-              <a:t>10.11.2015</a:t>
+              <a:t>11.11.2015</a:t>
             </a:fld>
             <a:endParaRPr lang="de-DE"/>
           </a:p>
@@ -9074,7 +9222,7 @@
         <p:spPr>
           <a:xfrm>
             <a:off x="280588" y="1372396"/>
-            <a:ext cx="7760446" cy="3785652"/>
+            <a:ext cx="7760446" cy="1938992"/>
           </a:xfrm>
           <a:prstGeom prst="rect">
             <a:avLst/>
@@ -9134,25 +9282,6 @@
               </a:solidFill>
             </a:endParaRPr>
           </a:p>
-          <a:p>
-            <a:r>
-              <a:rPr lang="en-US" sz="4000" dirty="0">
-                <a:solidFill>
-                  <a:schemeClr val="bg1"/>
-                </a:solidFill>
-                <a:latin typeface="+mj-lt"/>
-                <a:cs typeface="Georgia"/>
-              </a:rPr>
-              <a:t>Development of a browser based real-time peer-to-peer remote support application</a:t>
-            </a:r>
-            <a:endParaRPr lang="de-DE" sz="4000" dirty="0">
-              <a:solidFill>
-                <a:schemeClr val="bg1"/>
-              </a:solidFill>
-              <a:latin typeface="+mj-lt"/>
-              <a:cs typeface="Georgia"/>
-            </a:endParaRPr>
-          </a:p>
         </p:txBody>
       </p:sp>
       <p:sp>
@@ -9164,7 +9293,7 @@
         <p:spPr>
           <a:xfrm>
             <a:off x="432988" y="5978469"/>
-            <a:ext cx="6320592" cy="369332"/>
+            <a:ext cx="6320592" cy="523220"/>
           </a:xfrm>
           <a:prstGeom prst="rect">
             <a:avLst/>
@@ -9178,14 +9307,14 @@
           <a:lstStyle/>
           <a:p>
             <a:r>
-              <a:rPr lang="de-DE" dirty="0" smtClean="0">
+              <a:rPr lang="de-DE" sz="2800" dirty="0" smtClean="0">
                 <a:solidFill>
                   <a:schemeClr val="bg1"/>
                 </a:solidFill>
               </a:rPr>
               <a:t>Michael Stifter</a:t>
             </a:r>
-            <a:endParaRPr lang="de-DE" dirty="0">
+            <a:endParaRPr lang="de-DE" sz="2800" dirty="0">
               <a:solidFill>
                 <a:schemeClr val="bg1"/>
               </a:solidFill>
@@ -9426,6 +9555,9 @@
                     <p:cTn id="3" fill="hold">
                       <p:stCondLst>
                         <p:cond delay="indefinite"/>
+                        <p:cond evt="onBegin" delay="0">
+                          <p:tn val="2"/>
+                        </p:cond>
                       </p:stCondLst>
                       <p:childTnLst>
                         <p:par>
@@ -9435,9 +9567,9 @@
                             </p:stCondLst>
                             <p:childTnLst>
                               <p:par>
-                                <p:cTn id="5" presetID="10" presetClass="entr" presetSubtype="0" fill="hold" nodeType="clickEffect">
+                                <p:cTn id="5" presetID="10" presetClass="entr" presetSubtype="0" fill="hold" nodeType="withEffect">
                                   <p:stCondLst>
-                                    <p:cond delay="0"/>
+                                    <p:cond delay="500"/>
                                   </p:stCondLst>
                                   <p:childTnLst>
                                     <p:set>
@@ -10949,6 +11081,61 @@
           </a:p>
         </p:txBody>
       </p:sp>
+      <p:sp>
+        <p:nvSpPr>
+          <p:cNvPr id="6" name="Textfeld 5"/>
+          <p:cNvSpPr txBox="1"/>
+          <p:nvPr/>
+        </p:nvSpPr>
+        <p:spPr>
+          <a:xfrm>
+            <a:off x="0" y="1314447"/>
+            <a:ext cx="9144000" cy="646331"/>
+          </a:xfrm>
+          <a:prstGeom prst="rect">
+            <a:avLst/>
+          </a:prstGeom>
+          <a:noFill/>
+        </p:spPr>
+        <p:txBody>
+          <a:bodyPr wrap="square" rtlCol="0">
+            <a:spAutoFit/>
+          </a:bodyPr>
+          <a:lstStyle/>
+          <a:p>
+            <a:pPr algn="ctr"/>
+            <a:r>
+              <a:rPr lang="de-AT" sz="3600" b="1" dirty="0" err="1" smtClean="0">
+                <a:solidFill>
+                  <a:srgbClr val="76B82A"/>
+                </a:solidFill>
+              </a:rPr>
+              <a:t>WebRTC</a:t>
+            </a:r>
+            <a:r>
+              <a:rPr lang="de-AT" sz="3600" b="1" dirty="0" smtClean="0">
+                <a:solidFill>
+                  <a:srgbClr val="76B82A"/>
+                </a:solidFill>
+              </a:rPr>
+              <a:t> </a:t>
+            </a:r>
+            <a:r>
+              <a:rPr lang="de-AT" sz="3600" b="1" dirty="0" err="1" smtClean="0">
+                <a:solidFill>
+                  <a:srgbClr val="76B82A"/>
+                </a:solidFill>
+              </a:rPr>
+              <a:t>readiness</a:t>
+            </a:r>
+            <a:endParaRPr lang="de-AT" sz="3600" b="1" dirty="0">
+              <a:solidFill>
+                <a:srgbClr val="76B82A"/>
+              </a:solidFill>
+            </a:endParaRPr>
+          </a:p>
+        </p:txBody>
+      </p:sp>
     </p:spTree>
     <p:extLst>
       <p:ext uri="{BB962C8B-B14F-4D97-AF65-F5344CB8AC3E}">

</xml_diff>